<commit_message>
Upgrading to VS2017/.Net 1.1
</commit_message>
<xml_diff>
--- a/EfCoreGettingStarted.pptx
+++ b/EfCoreGettingStarted.pptx
@@ -2434,7 +2434,7 @@
         <a:lstStyle/>
         <a:p>
           <a:r>
-            <a:rPr lang="en-US" dirty="0"/>
+            <a:rPr lang="en-US" strike="sngStrike" baseline="0" dirty="0"/>
             <a:t>Connection Resiliency</a:t>
           </a:r>
         </a:p>
@@ -2570,6 +2570,28 @@
         </a:p>
       </dgm:t>
     </dgm:pt>
+    <dgm:pt modelId="{A91E1B38-47E8-4617-83FA-B809FE15EC4B}">
+      <dgm:prSet phldrT="[Text]"/>
+      <dgm:spPr/>
+      <dgm:t>
+        <a:bodyPr/>
+        <a:lstStyle/>
+        <a:p>
+          <a:r>
+            <a:rPr lang="en-US" dirty="0"/>
+            <a:t>Field mapping</a:t>
+          </a:r>
+        </a:p>
+      </dgm:t>
+    </dgm:pt>
+    <dgm:pt modelId="{E9296D2E-67C5-4A5F-991E-87DEEF1135B2}" type="parTrans" cxnId="{3DE05BDD-7EB3-4A34-B18E-51C9756F63B5}">
+      <dgm:prSet/>
+      <dgm:spPr/>
+    </dgm:pt>
+    <dgm:pt modelId="{B9CC2752-2DF6-4320-AE39-E3C9DD7C2FB2}" type="sibTrans" cxnId="{3DE05BDD-7EB3-4A34-B18E-51C9756F63B5}">
+      <dgm:prSet/>
+      <dgm:spPr/>
+    </dgm:pt>
     <dgm:pt modelId="{CC2002BB-8352-45E8-9F4A-8A79CDBBEDE1}" type="pres">
       <dgm:prSet presAssocID="{415CCC7A-6D67-45E8-97BA-E168A5DC5238}" presName="theList" presStyleCnt="0">
         <dgm:presLayoutVars>
@@ -2601,7 +2623,7 @@
       <dgm:spPr/>
     </dgm:pt>
     <dgm:pt modelId="{9FBED04B-8AF0-48C2-A2E6-B2EF50C7C707}" type="pres">
-      <dgm:prSet presAssocID="{5993BDE7-0125-4E15-93F4-BB63E1ADBC8E}" presName="childNode" presStyleLbl="node1" presStyleIdx="0" presStyleCnt="16">
+      <dgm:prSet presAssocID="{5993BDE7-0125-4E15-93F4-BB63E1ADBC8E}" presName="childNode" presStyleLbl="node1" presStyleIdx="0" presStyleCnt="17">
         <dgm:presLayoutVars>
           <dgm:bulletEnabled val="1"/>
         </dgm:presLayoutVars>
@@ -2613,7 +2635,7 @@
       <dgm:spPr/>
     </dgm:pt>
     <dgm:pt modelId="{F65791AC-9888-46A1-BDE6-E3E59533413E}" type="pres">
-      <dgm:prSet presAssocID="{D7E2D7AD-A600-4FAC-9339-7A197658B6A0}" presName="childNode" presStyleLbl="node1" presStyleIdx="1" presStyleCnt="16">
+      <dgm:prSet presAssocID="{D7E2D7AD-A600-4FAC-9339-7A197658B6A0}" presName="childNode" presStyleLbl="node1" presStyleIdx="1" presStyleCnt="17">
         <dgm:presLayoutVars>
           <dgm:bulletEnabled val="1"/>
         </dgm:presLayoutVars>
@@ -2625,7 +2647,7 @@
       <dgm:spPr/>
     </dgm:pt>
     <dgm:pt modelId="{26E34D72-05A0-4580-A849-AF44DCA3A345}" type="pres">
-      <dgm:prSet presAssocID="{83C96FBA-92E1-4246-B826-9E86FFE4948A}" presName="childNode" presStyleLbl="node1" presStyleIdx="2" presStyleCnt="16">
+      <dgm:prSet presAssocID="{83C96FBA-92E1-4246-B826-9E86FFE4948A}" presName="childNode" presStyleLbl="node1" presStyleIdx="2" presStyleCnt="17">
         <dgm:presLayoutVars>
           <dgm:bulletEnabled val="1"/>
         </dgm:presLayoutVars>
@@ -2637,7 +2659,7 @@
       <dgm:spPr/>
     </dgm:pt>
     <dgm:pt modelId="{8EE137D0-1B3C-4EA8-95B8-960EC8855A43}" type="pres">
-      <dgm:prSet presAssocID="{88954C57-7964-4873-AEE8-254ED595E1BD}" presName="childNode" presStyleLbl="node1" presStyleIdx="3" presStyleCnt="16">
+      <dgm:prSet presAssocID="{88954C57-7964-4873-AEE8-254ED595E1BD}" presName="childNode" presStyleLbl="node1" presStyleIdx="3" presStyleCnt="17">
         <dgm:presLayoutVars>
           <dgm:bulletEnabled val="1"/>
         </dgm:presLayoutVars>
@@ -2649,7 +2671,7 @@
       <dgm:spPr/>
     </dgm:pt>
     <dgm:pt modelId="{DA621340-0DE1-4443-80DF-0C35FBE78B18}" type="pres">
-      <dgm:prSet presAssocID="{23B27124-AE21-4706-BDC3-355EB6D197D9}" presName="childNode" presStyleLbl="node1" presStyleIdx="4" presStyleCnt="16">
+      <dgm:prSet presAssocID="{23B27124-AE21-4706-BDC3-355EB6D197D9}" presName="childNode" presStyleLbl="node1" presStyleIdx="4" presStyleCnt="17">
         <dgm:presLayoutVars>
           <dgm:bulletEnabled val="1"/>
         </dgm:presLayoutVars>
@@ -2661,7 +2683,7 @@
       <dgm:spPr/>
     </dgm:pt>
     <dgm:pt modelId="{023E5D56-4211-494A-B8F4-15A238C74F35}" type="pres">
-      <dgm:prSet presAssocID="{9C5C9927-BE4F-44C1-ABA7-3D7F1AFDA444}" presName="childNode" presStyleLbl="node1" presStyleIdx="5" presStyleCnt="16">
+      <dgm:prSet presAssocID="{9C5C9927-BE4F-44C1-ABA7-3D7F1AFDA444}" presName="childNode" presStyleLbl="node1" presStyleIdx="5" presStyleCnt="17">
         <dgm:presLayoutVars>
           <dgm:bulletEnabled val="1"/>
         </dgm:presLayoutVars>
@@ -2673,7 +2695,7 @@
       <dgm:spPr/>
     </dgm:pt>
     <dgm:pt modelId="{78113A9F-FE14-4428-96CA-9A0C4D6C3ADA}" type="pres">
-      <dgm:prSet presAssocID="{AF18FC50-02CA-4C7F-AAB4-B98DAC64CC0B}" presName="childNode" presStyleLbl="node1" presStyleIdx="6" presStyleCnt="16">
+      <dgm:prSet presAssocID="{AF18FC50-02CA-4C7F-AAB4-B98DAC64CC0B}" presName="childNode" presStyleLbl="node1" presStyleIdx="6" presStyleCnt="17">
         <dgm:presLayoutVars>
           <dgm:bulletEnabled val="1"/>
         </dgm:presLayoutVars>
@@ -2685,7 +2707,7 @@
       <dgm:spPr/>
     </dgm:pt>
     <dgm:pt modelId="{A35EE627-CDF2-4F62-A508-905A80A951C6}" type="pres">
-      <dgm:prSet presAssocID="{54EC5FBF-A282-49F8-BFCE-277840949B5D}" presName="childNode" presStyleLbl="node1" presStyleIdx="7" presStyleCnt="16">
+      <dgm:prSet presAssocID="{54EC5FBF-A282-49F8-BFCE-277840949B5D}" presName="childNode" presStyleLbl="node1" presStyleIdx="7" presStyleCnt="17">
         <dgm:presLayoutVars>
           <dgm:bulletEnabled val="1"/>
         </dgm:presLayoutVars>
@@ -2697,7 +2719,7 @@
       <dgm:spPr/>
     </dgm:pt>
     <dgm:pt modelId="{05372B2C-48D9-472E-A065-7ACBBBC6117D}" type="pres">
-      <dgm:prSet presAssocID="{57063063-74BB-4FC1-AB0A-3BA36D445589}" presName="childNode" presStyleLbl="node1" presStyleIdx="8" presStyleCnt="16">
+      <dgm:prSet presAssocID="{57063063-74BB-4FC1-AB0A-3BA36D445589}" presName="childNode" presStyleLbl="node1" presStyleIdx="8" presStyleCnt="17">
         <dgm:presLayoutVars>
           <dgm:bulletEnabled val="1"/>
         </dgm:presLayoutVars>
@@ -2729,7 +2751,7 @@
       <dgm:spPr/>
     </dgm:pt>
     <dgm:pt modelId="{55A47DFA-7517-4B16-88BB-6C8E2B1CF15F}" type="pres">
-      <dgm:prSet presAssocID="{5A812A78-3E5F-4B61-BCEF-2C4345424D82}" presName="childNode" presStyleLbl="node1" presStyleIdx="9" presStyleCnt="16">
+      <dgm:prSet presAssocID="{5A812A78-3E5F-4B61-BCEF-2C4345424D82}" presName="childNode" presStyleLbl="node1" presStyleIdx="9" presStyleCnt="17">
         <dgm:presLayoutVars>
           <dgm:bulletEnabled val="1"/>
         </dgm:presLayoutVars>
@@ -2741,7 +2763,7 @@
       <dgm:spPr/>
     </dgm:pt>
     <dgm:pt modelId="{4492ED30-DFB6-444B-9874-430B1F4733BE}" type="pres">
-      <dgm:prSet presAssocID="{1C18845B-1818-48E7-AA15-9C8B2DE71E2D}" presName="childNode" presStyleLbl="node1" presStyleIdx="10" presStyleCnt="16">
+      <dgm:prSet presAssocID="{1C18845B-1818-48E7-AA15-9C8B2DE71E2D}" presName="childNode" presStyleLbl="node1" presStyleIdx="10" presStyleCnt="17">
         <dgm:presLayoutVars>
           <dgm:bulletEnabled val="1"/>
         </dgm:presLayoutVars>
@@ -2753,7 +2775,7 @@
       <dgm:spPr/>
     </dgm:pt>
     <dgm:pt modelId="{4C68117D-1B78-4E72-B96B-76D4AAA8557F}" type="pres">
-      <dgm:prSet presAssocID="{3F14B24A-D8DC-46A9-8F24-5BEB8A497FD6}" presName="childNode" presStyleLbl="node1" presStyleIdx="11" presStyleCnt="16">
+      <dgm:prSet presAssocID="{3F14B24A-D8DC-46A9-8F24-5BEB8A497FD6}" presName="childNode" presStyleLbl="node1" presStyleIdx="11" presStyleCnt="17">
         <dgm:presLayoutVars>
           <dgm:bulletEnabled val="1"/>
         </dgm:presLayoutVars>
@@ -2765,7 +2787,7 @@
       <dgm:spPr/>
     </dgm:pt>
     <dgm:pt modelId="{90ADC1F3-502B-4014-A291-38CDEF5CE6EC}" type="pres">
-      <dgm:prSet presAssocID="{F224977F-6710-45DA-89AC-31C3CE72504F}" presName="childNode" presStyleLbl="node1" presStyleIdx="12" presStyleCnt="16">
+      <dgm:prSet presAssocID="{F224977F-6710-45DA-89AC-31C3CE72504F}" presName="childNode" presStyleLbl="node1" presStyleIdx="12" presStyleCnt="17">
         <dgm:presLayoutVars>
           <dgm:bulletEnabled val="1"/>
         </dgm:presLayoutVars>
@@ -2777,7 +2799,7 @@
       <dgm:spPr/>
     </dgm:pt>
     <dgm:pt modelId="{4141599E-0812-496F-A28B-BD72EDF5B1FC}" type="pres">
-      <dgm:prSet presAssocID="{BA9BA3B3-A41C-414D-B1C8-39EC76FA8BFC}" presName="childNode" presStyleLbl="node1" presStyleIdx="13" presStyleCnt="16">
+      <dgm:prSet presAssocID="{BA9BA3B3-A41C-414D-B1C8-39EC76FA8BFC}" presName="childNode" presStyleLbl="node1" presStyleIdx="13" presStyleCnt="17">
         <dgm:presLayoutVars>
           <dgm:bulletEnabled val="1"/>
         </dgm:presLayoutVars>
@@ -2789,7 +2811,7 @@
       <dgm:spPr/>
     </dgm:pt>
     <dgm:pt modelId="{8D6D6A04-763C-4908-8FF2-39B3F47F9F35}" type="pres">
-      <dgm:prSet presAssocID="{C252FC51-5E1F-40A7-BC68-395DAB3BC9F4}" presName="childNode" presStyleLbl="node1" presStyleIdx="14" presStyleCnt="16">
+      <dgm:prSet presAssocID="{C252FC51-5E1F-40A7-BC68-395DAB3BC9F4}" presName="childNode" presStyleLbl="node1" presStyleIdx="14" presStyleCnt="17">
         <dgm:presLayoutVars>
           <dgm:bulletEnabled val="1"/>
         </dgm:presLayoutVars>
@@ -2800,8 +2822,20 @@
       <dgm:prSet presAssocID="{C252FC51-5E1F-40A7-BC68-395DAB3BC9F4}" presName="aSpace2" presStyleCnt="0"/>
       <dgm:spPr/>
     </dgm:pt>
+    <dgm:pt modelId="{FE23A9C1-A76E-488D-B774-DD7B42FF910A}" type="pres">
+      <dgm:prSet presAssocID="{A91E1B38-47E8-4617-83FA-B809FE15EC4B}" presName="childNode" presStyleLbl="node1" presStyleIdx="15" presStyleCnt="17">
+        <dgm:presLayoutVars>
+          <dgm:bulletEnabled val="1"/>
+        </dgm:presLayoutVars>
+      </dgm:prSet>
+      <dgm:spPr/>
+    </dgm:pt>
+    <dgm:pt modelId="{90AB6924-BFD9-49F6-9C0F-A61DF6180CE7}" type="pres">
+      <dgm:prSet presAssocID="{A91E1B38-47E8-4617-83FA-B809FE15EC4B}" presName="aSpace2" presStyleCnt="0"/>
+      <dgm:spPr/>
+    </dgm:pt>
     <dgm:pt modelId="{F2B97C19-34EF-44C1-B5FD-49E61DD568E8}" type="pres">
-      <dgm:prSet presAssocID="{83C8A754-B822-4C27-9268-26FE57AF5D97}" presName="childNode" presStyleLbl="node1" presStyleIdx="15" presStyleCnt="16">
+      <dgm:prSet presAssocID="{83C8A754-B822-4C27-9268-26FE57AF5D97}" presName="childNode" presStyleLbl="node1" presStyleIdx="16" presStyleCnt="17">
         <dgm:presLayoutVars>
           <dgm:bulletEnabled val="1"/>
         </dgm:presLayoutVars>
@@ -2837,10 +2871,12 @@
     <dgm:cxn modelId="{00A7081B-4655-456C-93B1-23E822BE7C6B}" srcId="{68D1C401-DF17-42EB-8F32-CB92EDBA7007}" destId="{3F14B24A-D8DC-46A9-8F24-5BEB8A497FD6}" srcOrd="2" destOrd="0" parTransId="{0446357D-E736-48A4-B94F-E279DD99A662}" sibTransId="{0D701149-00F9-49B6-B733-C831D47164A9}"/>
     <dgm:cxn modelId="{3238C9CD-BD73-46E7-9790-65A772F67C14}" srcId="{ABA6DD42-C577-4FA2-B745-CBC55F43B96D}" destId="{23B27124-AE21-4706-BDC3-355EB6D197D9}" srcOrd="4" destOrd="0" parTransId="{0A1F2E86-3DD4-4025-B573-A45AB065335F}" sibTransId="{15DD51C1-3AAF-410F-8AAD-E7E97A1DB0C5}"/>
     <dgm:cxn modelId="{A6E59110-BC51-4F53-896E-664616DABDFE}" type="presOf" srcId="{F224977F-6710-45DA-89AC-31C3CE72504F}" destId="{90ADC1F3-502B-4014-A291-38CDEF5CE6EC}" srcOrd="0" destOrd="0" presId="urn:microsoft.com/office/officeart/2005/8/layout/lProcess2"/>
-    <dgm:cxn modelId="{2773F7BE-438D-44C6-99F1-65D3180A5062}" srcId="{68D1C401-DF17-42EB-8F32-CB92EDBA7007}" destId="{83C8A754-B822-4C27-9268-26FE57AF5D97}" srcOrd="6" destOrd="0" parTransId="{A280CD56-18C5-465C-AD04-7575F280AC93}" sibTransId="{155D2122-BF99-4AD8-8BDB-9DCD9CB6927D}"/>
+    <dgm:cxn modelId="{D3D160AC-2616-497C-95A7-C40065497917}" type="presOf" srcId="{A91E1B38-47E8-4617-83FA-B809FE15EC4B}" destId="{FE23A9C1-A76E-488D-B774-DD7B42FF910A}" srcOrd="0" destOrd="0" presId="urn:microsoft.com/office/officeart/2005/8/layout/lProcess2"/>
+    <dgm:cxn modelId="{2773F7BE-438D-44C6-99F1-65D3180A5062}" srcId="{68D1C401-DF17-42EB-8F32-CB92EDBA7007}" destId="{83C8A754-B822-4C27-9268-26FE57AF5D97}" srcOrd="7" destOrd="0" parTransId="{A280CD56-18C5-465C-AD04-7575F280AC93}" sibTransId="{155D2122-BF99-4AD8-8BDB-9DCD9CB6927D}"/>
     <dgm:cxn modelId="{3AF8B1C2-837C-460A-8AA0-1824D0FB3E13}" type="presOf" srcId="{C252FC51-5E1F-40A7-BC68-395DAB3BC9F4}" destId="{8D6D6A04-763C-4908-8FF2-39B3F47F9F35}" srcOrd="0" destOrd="0" presId="urn:microsoft.com/office/officeart/2005/8/layout/lProcess2"/>
     <dgm:cxn modelId="{C38D4348-32F1-4B0A-8A73-A03CD40BFD91}" srcId="{68D1C401-DF17-42EB-8F32-CB92EDBA7007}" destId="{5A812A78-3E5F-4B61-BCEF-2C4345424D82}" srcOrd="0" destOrd="0" parTransId="{00575E82-767A-4E34-AF13-4A6C499BB5EF}" sibTransId="{351D49FB-F048-4693-A7DC-EDA4A8DCE645}"/>
     <dgm:cxn modelId="{B5218934-1A9B-4774-9882-1DCCCAD38343}" type="presOf" srcId="{AF18FC50-02CA-4C7F-AAB4-B98DAC64CC0B}" destId="{78113A9F-FE14-4428-96CA-9A0C4D6C3ADA}" srcOrd="0" destOrd="0" presId="urn:microsoft.com/office/officeart/2005/8/layout/lProcess2"/>
+    <dgm:cxn modelId="{3DE05BDD-7EB3-4A34-B18E-51C9756F63B5}" srcId="{68D1C401-DF17-42EB-8F32-CB92EDBA7007}" destId="{A91E1B38-47E8-4617-83FA-B809FE15EC4B}" srcOrd="6" destOrd="0" parTransId="{E9296D2E-67C5-4A5F-991E-87DEEF1135B2}" sibTransId="{B9CC2752-2DF6-4320-AE39-E3C9DD7C2FB2}"/>
     <dgm:cxn modelId="{BEB4AD18-7319-4120-9639-8D5D5D1A63CF}" type="presOf" srcId="{3F14B24A-D8DC-46A9-8F24-5BEB8A497FD6}" destId="{4C68117D-1B78-4E72-B96B-76D4AAA8557F}" srcOrd="0" destOrd="0" presId="urn:microsoft.com/office/officeart/2005/8/layout/lProcess2"/>
     <dgm:cxn modelId="{7DCAB4A5-302A-4E48-90B2-02759C32BAD8}" srcId="{ABA6DD42-C577-4FA2-B745-CBC55F43B96D}" destId="{5993BDE7-0125-4E15-93F4-BB63E1ADBC8E}" srcOrd="0" destOrd="0" parTransId="{3F49B832-7DC9-4686-874F-5024F7913C35}" sibTransId="{5EB2ACE5-0BEC-4D1C-A0AB-78D532A40282}"/>
     <dgm:cxn modelId="{9FAC54C4-C4F9-4FB0-9E13-789A208C5525}" type="presOf" srcId="{ABA6DD42-C577-4FA2-B745-CBC55F43B96D}" destId="{A87CD1EF-3738-4FDC-A4C5-A253578E43C6}" srcOrd="1" destOrd="0" presId="urn:microsoft.com/office/officeart/2005/8/layout/lProcess2"/>
@@ -2889,7 +2925,9 @@
     <dgm:cxn modelId="{0D6F79AF-D155-4324-9826-EFA701CE147B}" type="presParOf" srcId="{F9559215-102B-4A8D-A9CC-1D39603F6CE8}" destId="{E9116E25-243B-474A-B1D0-C0489BC71CDF}" srcOrd="9" destOrd="0" presId="urn:microsoft.com/office/officeart/2005/8/layout/lProcess2"/>
     <dgm:cxn modelId="{B5596DC7-7364-464C-855B-0374D64686F0}" type="presParOf" srcId="{F9559215-102B-4A8D-A9CC-1D39603F6CE8}" destId="{8D6D6A04-763C-4908-8FF2-39B3F47F9F35}" srcOrd="10" destOrd="0" presId="urn:microsoft.com/office/officeart/2005/8/layout/lProcess2"/>
     <dgm:cxn modelId="{2197E001-D059-4B2A-B8D4-57E7C649E0E3}" type="presParOf" srcId="{F9559215-102B-4A8D-A9CC-1D39603F6CE8}" destId="{4858ABA2-2CF9-417D-B91D-77E1A546024B}" srcOrd="11" destOrd="0" presId="urn:microsoft.com/office/officeart/2005/8/layout/lProcess2"/>
-    <dgm:cxn modelId="{98AD3257-D906-4FBD-98B8-68DC5F21248B}" type="presParOf" srcId="{F9559215-102B-4A8D-A9CC-1D39603F6CE8}" destId="{F2B97C19-34EF-44C1-B5FD-49E61DD568E8}" srcOrd="12" destOrd="0" presId="urn:microsoft.com/office/officeart/2005/8/layout/lProcess2"/>
+    <dgm:cxn modelId="{62E72638-7025-4F94-9FA3-740A6DAF0C7D}" type="presParOf" srcId="{F9559215-102B-4A8D-A9CC-1D39603F6CE8}" destId="{FE23A9C1-A76E-488D-B774-DD7B42FF910A}" srcOrd="12" destOrd="0" presId="urn:microsoft.com/office/officeart/2005/8/layout/lProcess2"/>
+    <dgm:cxn modelId="{9F20A9FD-5E1E-4D5C-AFB0-0CB06A074196}" type="presParOf" srcId="{F9559215-102B-4A8D-A9CC-1D39603F6CE8}" destId="{90AB6924-BFD9-49F6-9C0F-A61DF6180CE7}" srcOrd="13" destOrd="0" presId="urn:microsoft.com/office/officeart/2005/8/layout/lProcess2"/>
+    <dgm:cxn modelId="{98AD3257-D906-4FBD-98B8-68DC5F21248B}" type="presParOf" srcId="{F9559215-102B-4A8D-A9CC-1D39603F6CE8}" destId="{F2B97C19-34EF-44C1-B5FD-49E61DD568E8}" srcOrd="14" destOrd="0" presId="urn:microsoft.com/office/officeart/2005/8/layout/lProcess2"/>
   </dgm:cxnLst>
   <dgm:bg/>
   <dgm:whole/>
@@ -3948,7 +3986,7 @@
             <a:buNone/>
           </a:pPr>
           <a:r>
-            <a:rPr lang="en-US" sz="2000" kern="1200" dirty="0"/>
+            <a:rPr lang="en-US" sz="2000" strike="sngStrike" kern="1200" baseline="0" dirty="0"/>
             <a:t>Connection Resiliency</a:t>
           </a:r>
         </a:p>
@@ -4041,8 +4079,8 @@
       </dsp:nvSpPr>
       <dsp:spPr>
         <a:xfrm>
-          <a:off x="4995156" y="1845246"/>
-          <a:ext cx="3397951" cy="502635"/>
+          <a:off x="4995156" y="1842623"/>
+          <a:ext cx="3397951" cy="439319"/>
         </a:xfrm>
         <a:prstGeom prst="roundRect">
           <a:avLst>
@@ -4138,8 +4176,8 @@
         </a:p>
       </dsp:txBody>
       <dsp:txXfrm>
-        <a:off x="5009878" y="1859968"/>
-        <a:ext cx="3368507" cy="473191"/>
+        <a:off x="5008023" y="1855490"/>
+        <a:ext cx="3372217" cy="413585"/>
       </dsp:txXfrm>
     </dsp:sp>
     <dsp:sp modelId="{4492ED30-DFB6-444B-9874-430B1F4733BE}">
@@ -4149,8 +4187,8 @@
       </dsp:nvSpPr>
       <dsp:spPr>
         <a:xfrm>
-          <a:off x="4995156" y="2425211"/>
-          <a:ext cx="3397951" cy="502635"/>
+          <a:off x="4995156" y="2349530"/>
+          <a:ext cx="3397951" cy="439319"/>
         </a:xfrm>
         <a:prstGeom prst="roundRect">
           <a:avLst>
@@ -4246,8 +4284,8 @@
         </a:p>
       </dsp:txBody>
       <dsp:txXfrm>
-        <a:off x="5009878" y="2439933"/>
-        <a:ext cx="3368507" cy="473191"/>
+        <a:off x="5008023" y="2362397"/>
+        <a:ext cx="3372217" cy="413585"/>
       </dsp:txXfrm>
     </dsp:sp>
     <dsp:sp modelId="{4C68117D-1B78-4E72-B96B-76D4AAA8557F}">
@@ -4257,8 +4295,8 @@
       </dsp:nvSpPr>
       <dsp:spPr>
         <a:xfrm>
-          <a:off x="4995156" y="3005175"/>
-          <a:ext cx="3397951" cy="502635"/>
+          <a:off x="4995156" y="2856437"/>
+          <a:ext cx="3397951" cy="439319"/>
         </a:xfrm>
         <a:prstGeom prst="roundRect">
           <a:avLst>
@@ -4354,8 +4392,8 @@
         </a:p>
       </dsp:txBody>
       <dsp:txXfrm>
-        <a:off x="5009878" y="3019897"/>
-        <a:ext cx="3368507" cy="473191"/>
+        <a:off x="5008023" y="2869304"/>
+        <a:ext cx="3372217" cy="413585"/>
       </dsp:txXfrm>
     </dsp:sp>
     <dsp:sp modelId="{90ADC1F3-502B-4014-A291-38CDEF5CE6EC}">
@@ -4365,8 +4403,8 @@
       </dsp:nvSpPr>
       <dsp:spPr>
         <a:xfrm>
-          <a:off x="4995156" y="3585140"/>
-          <a:ext cx="3397951" cy="502635"/>
+          <a:off x="4995156" y="3363344"/>
+          <a:ext cx="3397951" cy="439319"/>
         </a:xfrm>
         <a:prstGeom prst="roundRect">
           <a:avLst>
@@ -4462,8 +4500,8 @@
         </a:p>
       </dsp:txBody>
       <dsp:txXfrm>
-        <a:off x="5009878" y="3599862"/>
-        <a:ext cx="3368507" cy="473191"/>
+        <a:off x="5008023" y="3376211"/>
+        <a:ext cx="3372217" cy="413585"/>
       </dsp:txXfrm>
     </dsp:sp>
     <dsp:sp modelId="{4141599E-0812-496F-A28B-BD72EDF5B1FC}">
@@ -4473,8 +4511,8 @@
       </dsp:nvSpPr>
       <dsp:spPr>
         <a:xfrm>
-          <a:off x="4995156" y="4165104"/>
-          <a:ext cx="3397951" cy="502635"/>
+          <a:off x="4995156" y="3870251"/>
+          <a:ext cx="3397951" cy="439319"/>
         </a:xfrm>
         <a:prstGeom prst="roundRect">
           <a:avLst>
@@ -4570,8 +4608,8 @@
         </a:p>
       </dsp:txBody>
       <dsp:txXfrm>
-        <a:off x="5009878" y="4179826"/>
-        <a:ext cx="3368507" cy="473191"/>
+        <a:off x="5008023" y="3883118"/>
+        <a:ext cx="3372217" cy="413585"/>
       </dsp:txXfrm>
     </dsp:sp>
     <dsp:sp modelId="{8D6D6A04-763C-4908-8FF2-39B3F47F9F35}">
@@ -4581,8 +4619,8 @@
       </dsp:nvSpPr>
       <dsp:spPr>
         <a:xfrm>
-          <a:off x="4995156" y="4745069"/>
-          <a:ext cx="3397951" cy="502635"/>
+          <a:off x="4995156" y="4377158"/>
+          <a:ext cx="3397951" cy="439319"/>
         </a:xfrm>
         <a:prstGeom prst="roundRect">
           <a:avLst>
@@ -4678,8 +4716,116 @@
         </a:p>
       </dsp:txBody>
       <dsp:txXfrm>
-        <a:off x="5009878" y="4759791"/>
-        <a:ext cx="3368507" cy="473191"/>
+        <a:off x="5008023" y="4390025"/>
+        <a:ext cx="3372217" cy="413585"/>
+      </dsp:txXfrm>
+    </dsp:sp>
+    <dsp:sp modelId="{FE23A9C1-A76E-488D-B774-DD7B42FF910A}">
+      <dsp:nvSpPr>
+        <dsp:cNvPr id="0" name=""/>
+        <dsp:cNvSpPr/>
+      </dsp:nvSpPr>
+      <dsp:spPr>
+        <a:xfrm>
+          <a:off x="4995156" y="4884065"/>
+          <a:ext cx="3397951" cy="439319"/>
+        </a:xfrm>
+        <a:prstGeom prst="roundRect">
+          <a:avLst>
+            <a:gd name="adj" fmla="val 10000"/>
+          </a:avLst>
+        </a:prstGeom>
+        <a:gradFill rotWithShape="0">
+          <a:gsLst>
+            <a:gs pos="0">
+              <a:schemeClr val="dk2">
+                <a:hueOff val="0"/>
+                <a:satOff val="0"/>
+                <a:lumOff val="0"/>
+                <a:alphaOff val="0"/>
+                <a:tint val="85000"/>
+                <a:shade val="98000"/>
+                <a:satMod val="110000"/>
+                <a:lumMod val="103000"/>
+              </a:schemeClr>
+            </a:gs>
+            <a:gs pos="50000">
+              <a:schemeClr val="dk2">
+                <a:hueOff val="0"/>
+                <a:satOff val="0"/>
+                <a:lumOff val="0"/>
+                <a:alphaOff val="0"/>
+                <a:shade val="85000"/>
+                <a:satMod val="105000"/>
+                <a:lumMod val="100000"/>
+              </a:schemeClr>
+            </a:gs>
+            <a:gs pos="100000">
+              <a:schemeClr val="dk2">
+                <a:hueOff val="0"/>
+                <a:satOff val="0"/>
+                <a:lumOff val="0"/>
+                <a:alphaOff val="0"/>
+                <a:shade val="60000"/>
+                <a:satMod val="120000"/>
+                <a:lumMod val="100000"/>
+              </a:schemeClr>
+            </a:gs>
+          </a:gsLst>
+          <a:lin ang="5400000" scaled="0"/>
+        </a:gradFill>
+        <a:ln>
+          <a:noFill/>
+        </a:ln>
+        <a:effectLst>
+          <a:outerShdw blurRad="50800" dist="15875" dir="5400000" algn="ctr" rotWithShape="0">
+            <a:srgbClr val="000000">
+              <a:alpha val="68000"/>
+            </a:srgbClr>
+          </a:outerShdw>
+        </a:effectLst>
+      </dsp:spPr>
+      <dsp:style>
+        <a:lnRef idx="0">
+          <a:scrgbClr r="0" g="0" b="0"/>
+        </a:lnRef>
+        <a:fillRef idx="3">
+          <a:scrgbClr r="0" g="0" b="0"/>
+        </a:fillRef>
+        <a:effectRef idx="2">
+          <a:scrgbClr r="0" g="0" b="0"/>
+        </a:effectRef>
+        <a:fontRef idx="minor">
+          <a:schemeClr val="lt1"/>
+        </a:fontRef>
+      </dsp:style>
+      <dsp:txBody>
+        <a:bodyPr spcFirstLastPara="0" vert="horz" wrap="square" lIns="50800" tIns="38100" rIns="50800" bIns="38100" numCol="1" spcCol="1270" anchor="ctr" anchorCtr="0">
+          <a:noAutofit/>
+        </a:bodyPr>
+        <a:lstStyle/>
+        <a:p>
+          <a:pPr marL="0" lvl="0" indent="0" algn="ctr" defTabSz="889000">
+            <a:lnSpc>
+              <a:spcPct val="90000"/>
+            </a:lnSpc>
+            <a:spcBef>
+              <a:spcPct val="0"/>
+            </a:spcBef>
+            <a:spcAft>
+              <a:spcPct val="35000"/>
+            </a:spcAft>
+            <a:buNone/>
+          </a:pPr>
+          <a:r>
+            <a:rPr lang="en-US" sz="2000" kern="1200" dirty="0"/>
+            <a:t>Field mapping</a:t>
+          </a:r>
+        </a:p>
+      </dsp:txBody>
+      <dsp:txXfrm>
+        <a:off x="5008023" y="4896932"/>
+        <a:ext cx="3372217" cy="413585"/>
       </dsp:txXfrm>
     </dsp:sp>
     <dsp:sp modelId="{F2B97C19-34EF-44C1-B5FD-49E61DD568E8}">
@@ -4689,8 +4835,8 @@
       </dsp:nvSpPr>
       <dsp:spPr>
         <a:xfrm>
-          <a:off x="4995156" y="5325033"/>
-          <a:ext cx="3397951" cy="502635"/>
+          <a:off x="4995156" y="5390972"/>
+          <a:ext cx="3397951" cy="439319"/>
         </a:xfrm>
         <a:prstGeom prst="roundRect">
           <a:avLst>
@@ -4786,8 +4932,8 @@
         </a:p>
       </dsp:txBody>
       <dsp:txXfrm>
-        <a:off x="5009878" y="5339755"/>
-        <a:ext cx="3368507" cy="473191"/>
+        <a:off x="5008023" y="5403839"/>
+        <a:ext cx="3372217" cy="413585"/>
       </dsp:txXfrm>
     </dsp:sp>
   </dsp:spTree>
@@ -6137,7 +6283,7 @@
           <a:p>
             <a:fld id="{28763278-E906-4118-802D-5C795C8A9976}" type="datetimeFigureOut">
               <a:rPr lang="en-US" smtClean="0"/>
-              <a:t>9/29/2016</a:t>
+              <a:t>10/29/2016</a:t>
             </a:fld>
             <a:endParaRPr lang="en-US"/>
           </a:p>
@@ -6894,7 +7040,7 @@
           <a:p>
             <a:fld id="{F4E58F4B-C394-4BCA-8CBA-0EA8C6D27B86}" type="datetimeFigureOut">
               <a:rPr lang="en-US" smtClean="0"/>
-              <a:t>9/29/2016</a:t>
+              <a:t>10/29/2016</a:t>
             </a:fld>
             <a:endParaRPr lang="en-US"/>
           </a:p>
@@ -7064,7 +7210,7 @@
           <a:p>
             <a:fld id="{F4E58F4B-C394-4BCA-8CBA-0EA8C6D27B86}" type="datetimeFigureOut">
               <a:rPr lang="en-US" smtClean="0"/>
-              <a:t>9/29/2016</a:t>
+              <a:t>10/29/2016</a:t>
             </a:fld>
             <a:endParaRPr lang="en-US"/>
           </a:p>
@@ -7287,7 +7433,7 @@
           <a:p>
             <a:fld id="{F4E58F4B-C394-4BCA-8CBA-0EA8C6D27B86}" type="datetimeFigureOut">
               <a:rPr lang="en-US" smtClean="0"/>
-              <a:t>9/29/2016</a:t>
+              <a:t>10/29/2016</a:t>
             </a:fld>
             <a:endParaRPr lang="en-US"/>
           </a:p>
@@ -7467,7 +7613,7 @@
           <a:p>
             <a:fld id="{F4E58F4B-C394-4BCA-8CBA-0EA8C6D27B86}" type="datetimeFigureOut">
               <a:rPr lang="en-US" smtClean="0"/>
-              <a:t>9/29/2016</a:t>
+              <a:t>10/29/2016</a:t>
             </a:fld>
             <a:endParaRPr lang="en-US"/>
           </a:p>
@@ -7773,7 +7919,7 @@
           <a:p>
             <a:fld id="{F4E58F4B-C394-4BCA-8CBA-0EA8C6D27B86}" type="datetimeFigureOut">
               <a:rPr lang="en-US" smtClean="0"/>
-              <a:t>9/29/2016</a:t>
+              <a:t>10/29/2016</a:t>
             </a:fld>
             <a:endParaRPr lang="en-US"/>
           </a:p>
@@ -8077,7 +8223,7 @@
           <a:p>
             <a:fld id="{F4E58F4B-C394-4BCA-8CBA-0EA8C6D27B86}" type="datetimeFigureOut">
               <a:rPr lang="en-US" smtClean="0"/>
-              <a:t>9/29/2016</a:t>
+              <a:t>10/29/2016</a:t>
             </a:fld>
             <a:endParaRPr lang="en-US"/>
           </a:p>
@@ -8499,7 +8645,7 @@
           <a:p>
             <a:fld id="{F4E58F4B-C394-4BCA-8CBA-0EA8C6D27B86}" type="datetimeFigureOut">
               <a:rPr lang="en-US" smtClean="0"/>
-              <a:t>9/29/2016</a:t>
+              <a:t>10/29/2016</a:t>
             </a:fld>
             <a:endParaRPr lang="en-US"/>
           </a:p>
@@ -8617,7 +8763,7 @@
           <a:p>
             <a:fld id="{F4E58F4B-C394-4BCA-8CBA-0EA8C6D27B86}" type="datetimeFigureOut">
               <a:rPr lang="en-US" smtClean="0"/>
-              <a:t>9/29/2016</a:t>
+              <a:t>10/29/2016</a:t>
             </a:fld>
             <a:endParaRPr lang="en-US"/>
           </a:p>
@@ -8712,7 +8858,7 @@
           <a:p>
             <a:fld id="{F4E58F4B-C394-4BCA-8CBA-0EA8C6D27B86}" type="datetimeFigureOut">
               <a:rPr lang="en-US" smtClean="0"/>
-              <a:t>9/29/2016</a:t>
+              <a:t>10/29/2016</a:t>
             </a:fld>
             <a:endParaRPr lang="en-US"/>
           </a:p>
@@ -8985,7 +9131,7 @@
           <a:p>
             <a:fld id="{F4E58F4B-C394-4BCA-8CBA-0EA8C6D27B86}" type="datetimeFigureOut">
               <a:rPr lang="en-US" smtClean="0"/>
-              <a:t>9/29/2016</a:t>
+              <a:t>10/29/2016</a:t>
             </a:fld>
             <a:endParaRPr lang="en-US"/>
           </a:p>
@@ -9250,7 +9396,7 @@
           <a:p>
             <a:fld id="{F4E58F4B-C394-4BCA-8CBA-0EA8C6D27B86}" type="datetimeFigureOut">
               <a:rPr lang="en-US" smtClean="0"/>
-              <a:t>9/29/2016</a:t>
+              <a:t>10/29/2016</a:t>
             </a:fld>
             <a:endParaRPr lang="en-US"/>
           </a:p>
@@ -9499,7 +9645,7 @@
           <a:p>
             <a:fld id="{F4E58F4B-C394-4BCA-8CBA-0EA8C6D27B86}" type="datetimeFigureOut">
               <a:rPr lang="en-US" smtClean="0"/>
-              <a:t>9/29/2016</a:t>
+              <a:t>10/29/2016</a:t>
             </a:fld>
             <a:endParaRPr lang="en-US"/>
           </a:p>
@@ -10028,7 +10174,6 @@
           </a:bodyPr>
           <a:lstStyle/>
           <a:p>
-            <a:pPr algn="ctr"/>
             <a:r>
               <a:rPr lang="en-US" cap="small" dirty="0">
                 <a:solidFill>
@@ -10050,8 +10195,28 @@
                   <a:schemeClr val="tx1"/>
                 </a:solidFill>
               </a:rPr>
-              <a:t>https://github.com/jwooley</a:t>
-            </a:r>
+              <a:t>https://github.com/jwooley/EfCore</a:t>
+            </a:r>
+            <a:br>
+              <a:rPr lang="en-US" sz="3200" cap="small" dirty="0">
+                <a:solidFill>
+                  <a:schemeClr val="tx1"/>
+                </a:solidFill>
+              </a:rPr>
+            </a:br>
+            <a:r>
+              <a:rPr lang="en-US" sz="3200" dirty="0">
+                <a:solidFill>
+                  <a:schemeClr val="tx1"/>
+                </a:solidFill>
+              </a:rPr>
+              <a:t>https://jwooley.github.io/</a:t>
+            </a:r>
+            <a:endParaRPr lang="en-US" sz="3200" cap="small" dirty="0">
+              <a:solidFill>
+                <a:schemeClr val="tx1"/>
+              </a:solidFill>
+            </a:endParaRPr>
           </a:p>
         </p:txBody>
       </p:sp>
@@ -10147,8 +10312,8 @@
         </p:nvSpPr>
         <p:spPr>
           <a:xfrm>
-            <a:off x="0" y="5462187"/>
-            <a:ext cx="2895600" cy="1368798"/>
+            <a:off x="0" y="5267325"/>
+            <a:ext cx="3181350" cy="1563660"/>
           </a:xfrm>
           <a:prstGeom prst="rect">
             <a:avLst/>
@@ -10170,7 +10335,7 @@
         </p:style>
         <p:txBody>
           <a:bodyPr vert="horz" lIns="91440" tIns="45720" rIns="91440" bIns="45720" rtlCol="0">
-            <a:normAutofit/>
+            <a:normAutofit lnSpcReduction="10000"/>
           </a:bodyPr>
           <a:lstStyle>
             <a:lvl1pPr marL="0" indent="0" algn="l" defTabSz="914400" rtl="0" eaLnBrk="1" latinLnBrk="0" hangingPunct="1">
@@ -10370,6 +10535,13 @@
             <a:r>
               <a:rPr lang="en-US" dirty="0"/>
               <a:t>www.ThinqLinq.com</a:t>
+            </a:r>
+          </a:p>
+          <a:p>
+            <a:pPr algn="r"/>
+            <a:r>
+              <a:rPr lang="en-US" dirty="0"/>
+              <a:t>https://jwooley.github.io/</a:t>
             </a:r>
           </a:p>
           <a:p>
@@ -11013,7 +11185,7 @@
           <p:nvPr>
             <p:extLst>
               <p:ext uri="{D42A27DB-BD31-4B8C-83A1-F6EECF244321}">
-                <p14:modId xmlns:p14="http://schemas.microsoft.com/office/powerpoint/2010/main" val="2230024783"/>
+                <p14:modId xmlns:p14="http://schemas.microsoft.com/office/powerpoint/2010/main" val="1372157230"/>
               </p:ext>
             </p:extLst>
           </p:nvPr>
@@ -11160,7 +11332,17 @@
           <a:p>
             <a:r>
               <a:rPr lang="en-US" dirty="0"/>
-              <a:t>https://github.com/rowanmiller/Demo-EFCore </a:t>
+              <a:t>https://github.com/rowanmiller/Demo-EFCore</a:t>
+            </a:r>
+          </a:p>
+          <a:p>
+            <a:r>
+              <a:rPr lang="en-US" dirty="0"/>
+              <a:t>https://blogs.msdn.microsoft.com/dotnet/2016/10/25/announcing-entity-framework-core-1-1-preview-1/</a:t>
+            </a:r>
+            <a:r>
+              <a:rPr lang="en-US" dirty="0"/>
+              <a:t> </a:t>
             </a:r>
           </a:p>
         </p:txBody>
@@ -11269,7 +11451,6 @@
           </a:bodyPr>
           <a:lstStyle/>
           <a:p>
-            <a:pPr algn="ctr"/>
             <a:r>
               <a:rPr lang="en-US" cap="small" dirty="0">
                 <a:solidFill>
@@ -11291,7 +11472,7 @@
                   <a:schemeClr val="tx1"/>
                 </a:solidFill>
               </a:rPr>
-              <a:t>https://github.com/jwooley</a:t>
+              <a:t>https://github.com/jwooley/EfCore</a:t>
             </a:r>
           </a:p>
         </p:txBody>
@@ -11380,7 +11561,7 @@
       </p:pic>
       <p:sp>
         <p:nvSpPr>
-          <p:cNvPr id="7" name="Subtitle 2"/>
+          <p:cNvPr id="8" name="Subtitle 2"/>
           <p:cNvSpPr txBox="1">
             <a:spLocks/>
           </p:cNvSpPr>
@@ -11388,8 +11569,8 @@
         </p:nvSpPr>
         <p:spPr>
           <a:xfrm>
-            <a:off x="0" y="5462187"/>
-            <a:ext cx="2895600" cy="1368798"/>
+            <a:off x="0" y="5267325"/>
+            <a:ext cx="3181350" cy="1563660"/>
           </a:xfrm>
           <a:prstGeom prst="rect">
             <a:avLst/>
@@ -11411,7 +11592,7 @@
         </p:style>
         <p:txBody>
           <a:bodyPr vert="horz" lIns="91440" tIns="45720" rIns="91440" bIns="45720" rtlCol="0">
-            <a:normAutofit/>
+            <a:normAutofit lnSpcReduction="10000"/>
           </a:bodyPr>
           <a:lstStyle>
             <a:lvl1pPr marL="0" indent="0" algn="l" defTabSz="914400" rtl="0" eaLnBrk="1" latinLnBrk="0" hangingPunct="1">
@@ -11611,6 +11792,13 @@
             <a:r>
               <a:rPr lang="en-US" dirty="0"/>
               <a:t>www.ThinqLinq.com</a:t>
+            </a:r>
+          </a:p>
+          <a:p>
+            <a:pPr algn="r"/>
+            <a:r>
+              <a:rPr lang="en-US" dirty="0"/>
+              <a:t>https://jwooley.github.io/</a:t>
             </a:r>
           </a:p>
           <a:p>
@@ -11934,7 +12122,7 @@
         <p:spPr bwMode="auto">
           <a:xfrm>
             <a:off x="619760" y="2837527"/>
-            <a:ext cx="10367239" cy="2554545"/>
+            <a:ext cx="10943072" cy="2554545"/>
           </a:xfrm>
           <a:prstGeom prst="rect">
             <a:avLst/>
@@ -12561,6 +12749,706 @@
           </a:p>
         </p:txBody>
       </p:sp>
+      <p:sp>
+        <p:nvSpPr>
+          <p:cNvPr id="5" name="Rectangle 2"/>
+          <p:cNvSpPr txBox="1">
+            <a:spLocks noChangeArrowheads="1"/>
+          </p:cNvSpPr>
+          <p:nvPr/>
+        </p:nvSpPr>
+        <p:spPr bwMode="auto">
+          <a:xfrm>
+            <a:off x="627086" y="2837527"/>
+            <a:ext cx="10935746" cy="2554545"/>
+          </a:xfrm>
+          <a:prstGeom prst="rect">
+            <a:avLst/>
+          </a:prstGeom>
+          <a:solidFill>
+            <a:srgbClr val="FFFFFF"/>
+          </a:solidFill>
+          <a:ln>
+            <a:noFill/>
+          </a:ln>
+          <a:effectLst/>
+          <a:extLst>
+            <a:ext uri="{91240B29-F687-4F45-9708-019B960494DF}">
+              <a14:hiddenLine xmlns:a14="http://schemas.microsoft.com/office/drawing/2010/main" w="9525">
+                <a:solidFill>
+                  <a:schemeClr val="tx1"/>
+                </a:solidFill>
+                <a:miter lim="800000"/>
+                <a:headEnd/>
+                <a:tailEnd/>
+              </a14:hiddenLine>
+            </a:ext>
+            <a:ext uri="{AF507438-7753-43E0-B8FC-AC1667EBCBE1}">
+              <a14:hiddenEffects xmlns:a14="http://schemas.microsoft.com/office/drawing/2010/main">
+                <a:effectLst>
+                  <a:outerShdw dist="35921" dir="2700000" algn="ctr" rotWithShape="0">
+                    <a:schemeClr val="bg2"/>
+                  </a:outerShdw>
+                </a:effectLst>
+              </a14:hiddenEffects>
+            </a:ext>
+          </a:extLst>
+        </p:spPr>
+        <p:txBody>
+          <a:bodyPr vert="horz" wrap="square" lIns="91440" tIns="45720" rIns="91440" bIns="45720" numCol="1" rtlCol="0" anchor="ctr" anchorCtr="0" compatLnSpc="1">
+            <a:prstTxWarp prst="textNoShape">
+              <a:avLst/>
+            </a:prstTxWarp>
+            <a:spAutoFit/>
+          </a:bodyPr>
+          <a:lstStyle>
+            <a:lvl1pPr marL="182880" indent="-182880" algn="l" defTabSz="914400" rtl="0" eaLnBrk="1" latinLnBrk="0" hangingPunct="1">
+              <a:lnSpc>
+                <a:spcPct val="90000"/>
+              </a:lnSpc>
+              <a:spcBef>
+                <a:spcPts val="1200"/>
+              </a:spcBef>
+              <a:spcAft>
+                <a:spcPts val="200"/>
+              </a:spcAft>
+              <a:buClr>
+                <a:schemeClr val="tx1"/>
+              </a:buClr>
+              <a:buFont typeface="Wingdings" pitchFamily="2" charset="2"/>
+              <a:buChar char=""/>
+              <a:defRPr sz="2200" kern="1200">
+                <a:solidFill>
+                  <a:schemeClr val="tx1"/>
+                </a:solidFill>
+                <a:latin typeface="+mn-lt"/>
+                <a:ea typeface="+mn-ea"/>
+                <a:cs typeface="+mn-cs"/>
+              </a:defRPr>
+            </a:lvl1pPr>
+            <a:lvl2pPr marL="411480" indent="-182880" algn="l" defTabSz="914400" rtl="0" eaLnBrk="1" latinLnBrk="0" hangingPunct="1">
+              <a:lnSpc>
+                <a:spcPct val="90000"/>
+              </a:lnSpc>
+              <a:spcBef>
+                <a:spcPts val="200"/>
+              </a:spcBef>
+              <a:spcAft>
+                <a:spcPts val="400"/>
+              </a:spcAft>
+              <a:buClr>
+                <a:schemeClr val="tx1"/>
+              </a:buClr>
+              <a:buFont typeface="Wingdings" pitchFamily="2" charset="2"/>
+              <a:buChar char=""/>
+              <a:defRPr sz="2000" kern="1200">
+                <a:solidFill>
+                  <a:schemeClr val="tx1"/>
+                </a:solidFill>
+                <a:latin typeface="+mn-lt"/>
+                <a:ea typeface="+mn-ea"/>
+                <a:cs typeface="+mn-cs"/>
+              </a:defRPr>
+            </a:lvl2pPr>
+            <a:lvl3pPr marL="640080" indent="-182880" algn="l" defTabSz="914400" rtl="0" eaLnBrk="1" latinLnBrk="0" hangingPunct="1">
+              <a:lnSpc>
+                <a:spcPct val="90000"/>
+              </a:lnSpc>
+              <a:spcBef>
+                <a:spcPts val="200"/>
+              </a:spcBef>
+              <a:spcAft>
+                <a:spcPts val="400"/>
+              </a:spcAft>
+              <a:buClr>
+                <a:schemeClr val="tx1"/>
+              </a:buClr>
+              <a:buFont typeface="Wingdings" pitchFamily="2" charset="2"/>
+              <a:buChar char=""/>
+              <a:defRPr sz="1800" kern="1200">
+                <a:solidFill>
+                  <a:schemeClr val="tx1"/>
+                </a:solidFill>
+                <a:latin typeface="+mn-lt"/>
+                <a:ea typeface="+mn-ea"/>
+                <a:cs typeface="+mn-cs"/>
+              </a:defRPr>
+            </a:lvl3pPr>
+            <a:lvl4pPr marL="868680" indent="-182880" algn="l" defTabSz="914400" rtl="0" eaLnBrk="1" latinLnBrk="0" hangingPunct="1">
+              <a:lnSpc>
+                <a:spcPct val="90000"/>
+              </a:lnSpc>
+              <a:spcBef>
+                <a:spcPts val="200"/>
+              </a:spcBef>
+              <a:spcAft>
+                <a:spcPts val="400"/>
+              </a:spcAft>
+              <a:buClr>
+                <a:schemeClr val="tx1"/>
+              </a:buClr>
+              <a:buFont typeface="Wingdings" pitchFamily="2" charset="2"/>
+              <a:buChar char=""/>
+              <a:defRPr sz="1600" kern="1200">
+                <a:solidFill>
+                  <a:schemeClr val="tx1"/>
+                </a:solidFill>
+                <a:latin typeface="+mn-lt"/>
+                <a:ea typeface="+mn-ea"/>
+                <a:cs typeface="+mn-cs"/>
+              </a:defRPr>
+            </a:lvl4pPr>
+            <a:lvl5pPr marL="1097280" indent="-182880" algn="l" defTabSz="914400" rtl="0" eaLnBrk="1" latinLnBrk="0" hangingPunct="1">
+              <a:lnSpc>
+                <a:spcPct val="90000"/>
+              </a:lnSpc>
+              <a:spcBef>
+                <a:spcPts val="200"/>
+              </a:spcBef>
+              <a:spcAft>
+                <a:spcPts val="400"/>
+              </a:spcAft>
+              <a:buClr>
+                <a:schemeClr val="tx1"/>
+              </a:buClr>
+              <a:buFont typeface="Wingdings" pitchFamily="2" charset="2"/>
+              <a:buChar char=""/>
+              <a:defRPr sz="1600" kern="1200">
+                <a:solidFill>
+                  <a:schemeClr val="tx1"/>
+                </a:solidFill>
+                <a:latin typeface="+mn-lt"/>
+                <a:ea typeface="+mn-ea"/>
+                <a:cs typeface="+mn-cs"/>
+              </a:defRPr>
+            </a:lvl5pPr>
+            <a:lvl6pPr marL="1284600" indent="-228600" algn="l" defTabSz="914400" rtl="0" eaLnBrk="1" latinLnBrk="0" hangingPunct="1">
+              <a:lnSpc>
+                <a:spcPct val="90000"/>
+              </a:lnSpc>
+              <a:spcBef>
+                <a:spcPts val="200"/>
+              </a:spcBef>
+              <a:spcAft>
+                <a:spcPts val="400"/>
+              </a:spcAft>
+              <a:buClr>
+                <a:schemeClr val="tx1"/>
+              </a:buClr>
+              <a:buFont typeface="Wingdings" pitchFamily="2" charset="2"/>
+              <a:buChar char=""/>
+              <a:defRPr sz="1600" kern="1200">
+                <a:solidFill>
+                  <a:schemeClr val="tx1"/>
+                </a:solidFill>
+                <a:latin typeface="+mn-lt"/>
+                <a:ea typeface="+mn-ea"/>
+                <a:cs typeface="+mn-cs"/>
+              </a:defRPr>
+            </a:lvl6pPr>
+            <a:lvl7pPr marL="1471800" indent="-228600" algn="l" defTabSz="914400" rtl="0" eaLnBrk="1" latinLnBrk="0" hangingPunct="1">
+              <a:lnSpc>
+                <a:spcPct val="90000"/>
+              </a:lnSpc>
+              <a:spcBef>
+                <a:spcPts val="200"/>
+              </a:spcBef>
+              <a:spcAft>
+                <a:spcPts val="400"/>
+              </a:spcAft>
+              <a:buClr>
+                <a:schemeClr val="tx1"/>
+              </a:buClr>
+              <a:buFont typeface="Wingdings" pitchFamily="2" charset="2"/>
+              <a:buChar char=""/>
+              <a:defRPr sz="1600" kern="1200">
+                <a:solidFill>
+                  <a:schemeClr val="tx1"/>
+                </a:solidFill>
+                <a:latin typeface="+mn-lt"/>
+                <a:ea typeface="+mn-ea"/>
+                <a:cs typeface="+mn-cs"/>
+              </a:defRPr>
+            </a:lvl7pPr>
+            <a:lvl8pPr marL="1629000" indent="-228600" algn="l" defTabSz="914400" rtl="0" eaLnBrk="1" latinLnBrk="0" hangingPunct="1">
+              <a:lnSpc>
+                <a:spcPct val="90000"/>
+              </a:lnSpc>
+              <a:spcBef>
+                <a:spcPts val="200"/>
+              </a:spcBef>
+              <a:spcAft>
+                <a:spcPts val="400"/>
+              </a:spcAft>
+              <a:buClr>
+                <a:schemeClr val="tx1"/>
+              </a:buClr>
+              <a:buFont typeface="Wingdings" pitchFamily="2" charset="2"/>
+              <a:buChar char=""/>
+              <a:defRPr sz="1600" kern="1200">
+                <a:solidFill>
+                  <a:schemeClr val="tx1"/>
+                </a:solidFill>
+                <a:latin typeface="+mn-lt"/>
+                <a:ea typeface="+mn-ea"/>
+                <a:cs typeface="+mn-cs"/>
+              </a:defRPr>
+            </a:lvl8pPr>
+            <a:lvl9pPr marL="1806200" indent="-228600" algn="l" defTabSz="914400" rtl="0" eaLnBrk="1" latinLnBrk="0" hangingPunct="1">
+              <a:lnSpc>
+                <a:spcPct val="90000"/>
+              </a:lnSpc>
+              <a:spcBef>
+                <a:spcPts val="200"/>
+              </a:spcBef>
+              <a:spcAft>
+                <a:spcPts val="400"/>
+              </a:spcAft>
+              <a:buClr>
+                <a:schemeClr val="tx1"/>
+              </a:buClr>
+              <a:buFont typeface="Wingdings" pitchFamily="2" charset="2"/>
+              <a:buChar char=""/>
+              <a:defRPr sz="1600" kern="1200">
+                <a:solidFill>
+                  <a:schemeClr val="tx1"/>
+                </a:solidFill>
+                <a:latin typeface="+mn-lt"/>
+                <a:ea typeface="+mn-ea"/>
+                <a:cs typeface="+mn-cs"/>
+              </a:defRPr>
+            </a:lvl9pPr>
+          </a:lstStyle>
+          <a:p>
+            <a:pPr marL="0" indent="0" eaLnBrk="0" fontAlgn="base" hangingPunct="0">
+              <a:lnSpc>
+                <a:spcPct val="100000"/>
+              </a:lnSpc>
+              <a:spcBef>
+                <a:spcPct val="0"/>
+              </a:spcBef>
+              <a:spcAft>
+                <a:spcPct val="0"/>
+              </a:spcAft>
+              <a:buClrTx/>
+              <a:buFontTx/>
+              <a:buNone/>
+            </a:pPr>
+            <a:r>
+              <a:rPr lang="en-US" altLang="en-US" sz="2000" dirty="0">
+                <a:solidFill>
+                  <a:srgbClr val="2E75B6"/>
+                </a:solidFill>
+                <a:latin typeface="Consolas" panose="020B0609020204030204" pitchFamily="49" charset="0"/>
+              </a:rPr>
+              <a:t>"dependencies"</a:t>
+            </a:r>
+            <a:r>
+              <a:rPr lang="en-US" altLang="en-US" sz="2000" dirty="0">
+                <a:solidFill>
+                  <a:srgbClr val="000000"/>
+                </a:solidFill>
+                <a:latin typeface="Consolas" panose="020B0609020204030204" pitchFamily="49" charset="0"/>
+              </a:rPr>
+              <a:t>: {</a:t>
+            </a:r>
+          </a:p>
+          <a:p>
+            <a:pPr marL="0" indent="0" eaLnBrk="0" fontAlgn="base" hangingPunct="0">
+              <a:lnSpc>
+                <a:spcPct val="100000"/>
+              </a:lnSpc>
+              <a:spcBef>
+                <a:spcPct val="0"/>
+              </a:spcBef>
+              <a:spcAft>
+                <a:spcPct val="0"/>
+              </a:spcAft>
+              <a:buClrTx/>
+              <a:buFontTx/>
+              <a:buNone/>
+            </a:pPr>
+            <a:r>
+              <a:rPr lang="en-US" altLang="en-US" sz="2000" dirty="0">
+                <a:solidFill>
+                  <a:srgbClr val="000000"/>
+                </a:solidFill>
+                <a:latin typeface="Consolas" panose="020B0609020204030204" pitchFamily="49" charset="0"/>
+              </a:rPr>
+              <a:t>   </a:t>
+            </a:r>
+            <a:r>
+              <a:rPr lang="en-US" altLang="en-US" sz="2000" dirty="0">
+                <a:solidFill>
+                  <a:srgbClr val="2E75B6"/>
+                </a:solidFill>
+                <a:latin typeface="Consolas" panose="020B0609020204030204" pitchFamily="49" charset="0"/>
+              </a:rPr>
+              <a:t>"</a:t>
+            </a:r>
+            <a:r>
+              <a:rPr lang="en-US" altLang="en-US" sz="2000" dirty="0" err="1">
+                <a:solidFill>
+                  <a:srgbClr val="2E75B6"/>
+                </a:solidFill>
+                <a:latin typeface="Consolas" panose="020B0609020204030204" pitchFamily="49" charset="0"/>
+              </a:rPr>
+              <a:t>Microsoft.EntityFrameworkCore.Design</a:t>
+            </a:r>
+            <a:r>
+              <a:rPr lang="en-US" altLang="en-US" sz="2000" dirty="0">
+                <a:solidFill>
+                  <a:srgbClr val="2E75B6"/>
+                </a:solidFill>
+                <a:latin typeface="Consolas" panose="020B0609020204030204" pitchFamily="49" charset="0"/>
+              </a:rPr>
+              <a:t>"</a:t>
+            </a:r>
+            <a:r>
+              <a:rPr lang="en-US" altLang="en-US" sz="2000" dirty="0">
+                <a:solidFill>
+                  <a:srgbClr val="000000"/>
+                </a:solidFill>
+                <a:latin typeface="Consolas" panose="020B0609020204030204" pitchFamily="49" charset="0"/>
+              </a:rPr>
+              <a:t>: </a:t>
+            </a:r>
+            <a:r>
+              <a:rPr lang="en-US" altLang="en-US" sz="2000" dirty="0">
+                <a:solidFill>
+                  <a:srgbClr val="A31515"/>
+                </a:solidFill>
+                <a:latin typeface="Consolas" panose="020B0609020204030204" pitchFamily="49" charset="0"/>
+              </a:rPr>
+              <a:t>"1.1.0-preview1-final"</a:t>
+            </a:r>
+            <a:r>
+              <a:rPr lang="en-US" altLang="en-US" sz="2000" dirty="0">
+                <a:solidFill>
+                  <a:srgbClr val="000000"/>
+                </a:solidFill>
+                <a:latin typeface="Consolas" panose="020B0609020204030204" pitchFamily="49" charset="0"/>
+              </a:rPr>
+              <a:t>,</a:t>
+            </a:r>
+          </a:p>
+          <a:p>
+            <a:pPr marL="0" indent="0" eaLnBrk="0" fontAlgn="base" hangingPunct="0">
+              <a:lnSpc>
+                <a:spcPct val="100000"/>
+              </a:lnSpc>
+              <a:spcBef>
+                <a:spcPct val="0"/>
+              </a:spcBef>
+              <a:spcAft>
+                <a:spcPct val="0"/>
+              </a:spcAft>
+              <a:buClrTx/>
+              <a:buFontTx/>
+              <a:buNone/>
+            </a:pPr>
+            <a:r>
+              <a:rPr lang="en-US" altLang="en-US" sz="2000" dirty="0">
+                <a:solidFill>
+                  <a:srgbClr val="000000"/>
+                </a:solidFill>
+                <a:latin typeface="Consolas" panose="020B0609020204030204" pitchFamily="49" charset="0"/>
+              </a:rPr>
+              <a:t>   </a:t>
+            </a:r>
+            <a:r>
+              <a:rPr lang="en-US" altLang="en-US" sz="2000" dirty="0">
+                <a:solidFill>
+                  <a:srgbClr val="2E75B6"/>
+                </a:solidFill>
+                <a:latin typeface="Consolas" panose="020B0609020204030204" pitchFamily="49" charset="0"/>
+              </a:rPr>
+              <a:t>"</a:t>
+            </a:r>
+            <a:r>
+              <a:rPr lang="en-US" altLang="en-US" sz="2000" dirty="0" err="1">
+                <a:solidFill>
+                  <a:srgbClr val="2E75B6"/>
+                </a:solidFill>
+                <a:latin typeface="Consolas" panose="020B0609020204030204" pitchFamily="49" charset="0"/>
+              </a:rPr>
+              <a:t>Microsoft.EntityFrameworkCore.SqlServer</a:t>
+            </a:r>
+            <a:r>
+              <a:rPr lang="en-US" altLang="en-US" sz="2000" dirty="0">
+                <a:solidFill>
+                  <a:srgbClr val="2E75B6"/>
+                </a:solidFill>
+                <a:latin typeface="Consolas" panose="020B0609020204030204" pitchFamily="49" charset="0"/>
+              </a:rPr>
+              <a:t>"</a:t>
+            </a:r>
+            <a:r>
+              <a:rPr lang="en-US" altLang="en-US" sz="2000" dirty="0">
+                <a:solidFill>
+                  <a:srgbClr val="000000"/>
+                </a:solidFill>
+                <a:latin typeface="Consolas" panose="020B0609020204030204" pitchFamily="49" charset="0"/>
+              </a:rPr>
+              <a:t>: </a:t>
+            </a:r>
+            <a:r>
+              <a:rPr lang="en-US" altLang="en-US" sz="2000" dirty="0">
+                <a:solidFill>
+                  <a:srgbClr val="A31515"/>
+                </a:solidFill>
+                <a:latin typeface="Consolas" panose="020B0609020204030204" pitchFamily="49" charset="0"/>
+              </a:rPr>
+              <a:t>"1.1.0-preview1-final"</a:t>
+            </a:r>
+            <a:r>
+              <a:rPr lang="en-US" altLang="en-US" sz="2000" dirty="0">
+                <a:solidFill>
+                  <a:srgbClr val="000000"/>
+                </a:solidFill>
+                <a:latin typeface="Consolas" panose="020B0609020204030204" pitchFamily="49" charset="0"/>
+              </a:rPr>
+              <a:t>,</a:t>
+            </a:r>
+          </a:p>
+          <a:p>
+            <a:pPr marL="0" indent="0" eaLnBrk="0" fontAlgn="base" hangingPunct="0">
+              <a:lnSpc>
+                <a:spcPct val="100000"/>
+              </a:lnSpc>
+              <a:spcBef>
+                <a:spcPct val="0"/>
+              </a:spcBef>
+              <a:spcAft>
+                <a:spcPct val="0"/>
+              </a:spcAft>
+              <a:buClrTx/>
+              <a:buFontTx/>
+              <a:buNone/>
+            </a:pPr>
+            <a:r>
+              <a:rPr lang="en-US" altLang="en-US" sz="2000" dirty="0">
+                <a:solidFill>
+                  <a:srgbClr val="000000"/>
+                </a:solidFill>
+                <a:latin typeface="Consolas" panose="020B0609020204030204" pitchFamily="49" charset="0"/>
+              </a:rPr>
+              <a:t>   </a:t>
+            </a:r>
+            <a:r>
+              <a:rPr lang="en-US" altLang="en-US" sz="2000" dirty="0">
+                <a:solidFill>
+                  <a:srgbClr val="2E75B6"/>
+                </a:solidFill>
+                <a:latin typeface="Consolas" panose="020B0609020204030204" pitchFamily="49" charset="0"/>
+              </a:rPr>
+              <a:t>"</a:t>
+            </a:r>
+            <a:r>
+              <a:rPr lang="en-US" altLang="en-US" sz="2000" dirty="0" err="1">
+                <a:solidFill>
+                  <a:srgbClr val="2E75B6"/>
+                </a:solidFill>
+                <a:latin typeface="Consolas" panose="020B0609020204030204" pitchFamily="49" charset="0"/>
+              </a:rPr>
+              <a:t>Microsoft.EntityFrameworkCore.SqlServer.Design</a:t>
+            </a:r>
+            <a:r>
+              <a:rPr lang="en-US" altLang="en-US" sz="2000" dirty="0">
+                <a:solidFill>
+                  <a:srgbClr val="2E75B6"/>
+                </a:solidFill>
+                <a:latin typeface="Consolas" panose="020B0609020204030204" pitchFamily="49" charset="0"/>
+              </a:rPr>
+              <a:t>"</a:t>
+            </a:r>
+            <a:r>
+              <a:rPr lang="en-US" altLang="en-US" sz="2000" dirty="0">
+                <a:solidFill>
+                  <a:srgbClr val="000000"/>
+                </a:solidFill>
+                <a:latin typeface="Consolas" panose="020B0609020204030204" pitchFamily="49" charset="0"/>
+              </a:rPr>
+              <a:t>: </a:t>
+            </a:r>
+            <a:r>
+              <a:rPr lang="en-US" altLang="en-US" sz="2000" dirty="0">
+                <a:solidFill>
+                  <a:srgbClr val="A31515"/>
+                </a:solidFill>
+                <a:latin typeface="Consolas" panose="020B0609020204030204" pitchFamily="49" charset="0"/>
+              </a:rPr>
+              <a:t>"1.1.0-preview1-final"</a:t>
+            </a:r>
+            <a:r>
+              <a:rPr lang="en-US" altLang="en-US" sz="2000" dirty="0">
+                <a:solidFill>
+                  <a:srgbClr val="000000"/>
+                </a:solidFill>
+                <a:latin typeface="Consolas" panose="020B0609020204030204" pitchFamily="49" charset="0"/>
+              </a:rPr>
+              <a:t>,</a:t>
+            </a:r>
+          </a:p>
+          <a:p>
+            <a:pPr marL="0" indent="0" eaLnBrk="0" fontAlgn="base" hangingPunct="0">
+              <a:lnSpc>
+                <a:spcPct val="100000"/>
+              </a:lnSpc>
+              <a:spcBef>
+                <a:spcPct val="0"/>
+              </a:spcBef>
+              <a:spcAft>
+                <a:spcPct val="0"/>
+              </a:spcAft>
+              <a:buClrTx/>
+              <a:buFontTx/>
+              <a:buNone/>
+            </a:pPr>
+            <a:r>
+              <a:rPr lang="en-US" altLang="en-US" sz="2000" dirty="0">
+                <a:solidFill>
+                  <a:srgbClr val="000000"/>
+                </a:solidFill>
+                <a:latin typeface="Consolas" panose="020B0609020204030204" pitchFamily="49" charset="0"/>
+              </a:rPr>
+              <a:t>},</a:t>
+            </a:r>
+          </a:p>
+          <a:p>
+            <a:pPr marL="0" indent="0" eaLnBrk="0" fontAlgn="base" hangingPunct="0">
+              <a:lnSpc>
+                <a:spcPct val="100000"/>
+              </a:lnSpc>
+              <a:spcBef>
+                <a:spcPct val="0"/>
+              </a:spcBef>
+              <a:spcAft>
+                <a:spcPct val="0"/>
+              </a:spcAft>
+              <a:buClrTx/>
+              <a:buFontTx/>
+              <a:buNone/>
+            </a:pPr>
+            <a:r>
+              <a:rPr lang="en-US" altLang="en-US" sz="2000" dirty="0">
+                <a:solidFill>
+                  <a:srgbClr val="2E75B6"/>
+                </a:solidFill>
+                <a:latin typeface="Consolas" panose="020B0609020204030204" pitchFamily="49" charset="0"/>
+              </a:rPr>
+              <a:t>"tools"</a:t>
+            </a:r>
+            <a:r>
+              <a:rPr lang="en-US" altLang="en-US" sz="2000" dirty="0">
+                <a:solidFill>
+                  <a:srgbClr val="000000"/>
+                </a:solidFill>
+                <a:latin typeface="Consolas" panose="020B0609020204030204" pitchFamily="49" charset="0"/>
+              </a:rPr>
+              <a:t>: {</a:t>
+            </a:r>
+          </a:p>
+          <a:p>
+            <a:pPr marL="0" indent="0" eaLnBrk="0" fontAlgn="base" hangingPunct="0">
+              <a:lnSpc>
+                <a:spcPct val="100000"/>
+              </a:lnSpc>
+              <a:spcBef>
+                <a:spcPct val="0"/>
+              </a:spcBef>
+              <a:spcAft>
+                <a:spcPct val="0"/>
+              </a:spcAft>
+              <a:buClrTx/>
+              <a:buFontTx/>
+              <a:buNone/>
+            </a:pPr>
+            <a:r>
+              <a:rPr lang="en-US" altLang="en-US" sz="2000" dirty="0">
+                <a:solidFill>
+                  <a:srgbClr val="000000"/>
+                </a:solidFill>
+                <a:latin typeface="Consolas" panose="020B0609020204030204" pitchFamily="49" charset="0"/>
+              </a:rPr>
+              <a:t>   </a:t>
+            </a:r>
+            <a:r>
+              <a:rPr lang="en-US" altLang="en-US" sz="2000" dirty="0">
+                <a:solidFill>
+                  <a:srgbClr val="2E75B6"/>
+                </a:solidFill>
+                <a:latin typeface="Consolas" panose="020B0609020204030204" pitchFamily="49" charset="0"/>
+              </a:rPr>
+              <a:t>"</a:t>
+            </a:r>
+            <a:r>
+              <a:rPr lang="en-US" altLang="en-US" sz="2000" dirty="0" err="1">
+                <a:solidFill>
+                  <a:srgbClr val="2E75B6"/>
+                </a:solidFill>
+                <a:latin typeface="Consolas" panose="020B0609020204030204" pitchFamily="49" charset="0"/>
+              </a:rPr>
+              <a:t>Microsoft.EntityFrameworkCore.Tools.DotNet</a:t>
+            </a:r>
+            <a:r>
+              <a:rPr lang="en-US" altLang="en-US" sz="2000" dirty="0">
+                <a:solidFill>
+                  <a:srgbClr val="2E75B6"/>
+                </a:solidFill>
+                <a:latin typeface="Consolas" panose="020B0609020204030204" pitchFamily="49" charset="0"/>
+              </a:rPr>
+              <a:t>"</a:t>
+            </a:r>
+            <a:r>
+              <a:rPr lang="en-US" altLang="en-US" sz="2000" dirty="0">
+                <a:solidFill>
+                  <a:srgbClr val="000000"/>
+                </a:solidFill>
+                <a:latin typeface="Consolas" panose="020B0609020204030204" pitchFamily="49" charset="0"/>
+              </a:rPr>
+              <a:t>: </a:t>
+            </a:r>
+            <a:r>
+              <a:rPr lang="en-US" altLang="en-US" sz="2000" dirty="0">
+                <a:solidFill>
+                  <a:srgbClr val="A31515"/>
+                </a:solidFill>
+                <a:latin typeface="Consolas" panose="020B0609020204030204" pitchFamily="49" charset="0"/>
+              </a:rPr>
+              <a:t>"1.0.0-preview3-final“</a:t>
+            </a:r>
+          </a:p>
+          <a:p>
+            <a:pPr marL="0" indent="0" eaLnBrk="0" fontAlgn="base" hangingPunct="0">
+              <a:lnSpc>
+                <a:spcPct val="100000"/>
+              </a:lnSpc>
+              <a:spcBef>
+                <a:spcPct val="0"/>
+              </a:spcBef>
+              <a:spcAft>
+                <a:spcPct val="0"/>
+              </a:spcAft>
+              <a:buClrTx/>
+              <a:buFontTx/>
+              <a:buNone/>
+            </a:pPr>
+            <a:r>
+              <a:rPr lang="en-US" altLang="en-US" sz="2000" dirty="0">
+                <a:solidFill>
+                  <a:srgbClr val="000000"/>
+                </a:solidFill>
+                <a:latin typeface="Consolas" panose="020B0609020204030204" pitchFamily="49" charset="0"/>
+              </a:rPr>
+              <a:t>}, </a:t>
+            </a:r>
+            <a:endParaRPr lang="en-US" altLang="en-US" sz="2000" dirty="0">
+              <a:latin typeface="Arial" panose="020B0604020202020204" pitchFamily="34" charset="0"/>
+            </a:endParaRPr>
+          </a:p>
+        </p:txBody>
+      </p:sp>
     </p:spTree>
     <p:extLst>
       <p:ext uri="{BB962C8B-B14F-4D97-AF65-F5344CB8AC3E}">
@@ -12571,6 +13459,92 @@
   <p:clrMapOvr>
     <a:masterClrMapping/>
   </p:clrMapOvr>
+  <p:timing>
+    <p:tnLst>
+      <p:par>
+        <p:cTn id="1" dur="indefinite" restart="never" nodeType="tmRoot">
+          <p:childTnLst>
+            <p:seq concurrent="1" nextAc="seek">
+              <p:cTn id="2" dur="indefinite" nodeType="mainSeq">
+                <p:childTnLst>
+                  <p:par>
+                    <p:cTn id="3" fill="hold">
+                      <p:stCondLst>
+                        <p:cond delay="indefinite"/>
+                      </p:stCondLst>
+                      <p:childTnLst>
+                        <p:par>
+                          <p:cTn id="4" fill="hold">
+                            <p:stCondLst>
+                              <p:cond delay="0"/>
+                            </p:stCondLst>
+                            <p:childTnLst>
+                              <p:par>
+                                <p:cTn id="5" presetID="10" presetClass="entr" presetSubtype="0" fill="hold" grpId="0" nodeType="clickEffect">
+                                  <p:stCondLst>
+                                    <p:cond delay="0"/>
+                                  </p:stCondLst>
+                                  <p:childTnLst>
+                                    <p:set>
+                                      <p:cBhvr>
+                                        <p:cTn id="6" dur="1" fill="hold">
+                                          <p:stCondLst>
+                                            <p:cond delay="0"/>
+                                          </p:stCondLst>
+                                        </p:cTn>
+                                        <p:tgtEl>
+                                          <p:spTgt spid="5"/>
+                                        </p:tgtEl>
+                                        <p:attrNameLst>
+                                          <p:attrName>style.visibility</p:attrName>
+                                        </p:attrNameLst>
+                                      </p:cBhvr>
+                                      <p:to>
+                                        <p:strVal val="visible"/>
+                                      </p:to>
+                                    </p:set>
+                                    <p:animEffect transition="in" filter="fade">
+                                      <p:cBhvr>
+                                        <p:cTn id="7" dur="500"/>
+                                        <p:tgtEl>
+                                          <p:spTgt spid="5"/>
+                                        </p:tgtEl>
+                                      </p:cBhvr>
+                                    </p:animEffect>
+                                  </p:childTnLst>
+                                </p:cTn>
+                              </p:par>
+                            </p:childTnLst>
+                          </p:cTn>
+                        </p:par>
+                      </p:childTnLst>
+                    </p:cTn>
+                  </p:par>
+                </p:childTnLst>
+              </p:cTn>
+              <p:prevCondLst>
+                <p:cond evt="onPrev" delay="0">
+                  <p:tgtEl>
+                    <p:sldTgt/>
+                  </p:tgtEl>
+                </p:cond>
+              </p:prevCondLst>
+              <p:nextCondLst>
+                <p:cond evt="onNext" delay="0">
+                  <p:tgtEl>
+                    <p:sldTgt/>
+                  </p:tgtEl>
+                </p:cond>
+              </p:nextCondLst>
+            </p:seq>
+          </p:childTnLst>
+        </p:cTn>
+      </p:par>
+    </p:tnLst>
+    <p:bldLst>
+      <p:bldP spid="5" grpId="0" animBg="1"/>
+    </p:bldLst>
+  </p:timing>
 </p:sld>
 </file>
 
@@ -14755,6 +15729,75 @@
       </p:grpSpPr>
       <p:sp>
         <p:nvSpPr>
+          <p:cNvPr id="3" name="TextBox 2"/>
+          <p:cNvSpPr txBox="1"/>
+          <p:nvPr/>
+        </p:nvSpPr>
+        <p:spPr>
+          <a:xfrm>
+            <a:off x="2056002" y="3612948"/>
+            <a:ext cx="8477962" cy="954107"/>
+          </a:xfrm>
+          <a:prstGeom prst="rect">
+            <a:avLst/>
+          </a:prstGeom>
+          <a:solidFill>
+            <a:schemeClr val="tx1"/>
+          </a:solidFill>
+        </p:spPr>
+        <p:txBody>
+          <a:bodyPr wrap="none" rtlCol="0">
+            <a:spAutoFit/>
+          </a:bodyPr>
+          <a:lstStyle/>
+          <a:p>
+            <a:r>
+              <a:rPr lang="en-US" sz="2800" dirty="0">
+                <a:solidFill>
+                  <a:schemeClr val="bg1"/>
+                </a:solidFill>
+              </a:rPr>
+              <a:t>EF 6:</a:t>
+            </a:r>
+          </a:p>
+          <a:p>
+            <a:r>
+              <a:rPr lang="en-US" sz="2800" dirty="0" err="1">
+                <a:solidFill>
+                  <a:schemeClr val="bg1"/>
+                </a:solidFill>
+              </a:rPr>
+              <a:t>Context.Database.Log</a:t>
+            </a:r>
+            <a:r>
+              <a:rPr lang="en-US" sz="2800" dirty="0">
+                <a:solidFill>
+                  <a:schemeClr val="bg1"/>
+                </a:solidFill>
+              </a:rPr>
+              <a:t>(text =&gt; </a:t>
+            </a:r>
+            <a:r>
+              <a:rPr lang="en-US" sz="2800" dirty="0" err="1">
+                <a:solidFill>
+                  <a:schemeClr val="bg1"/>
+                </a:solidFill>
+              </a:rPr>
+              <a:t>Console.WriteLine</a:t>
+            </a:r>
+            <a:r>
+              <a:rPr lang="en-US" sz="2800" dirty="0">
+                <a:solidFill>
+                  <a:schemeClr val="bg1"/>
+                </a:solidFill>
+              </a:rPr>
+              <a:t>(text));</a:t>
+            </a:r>
+          </a:p>
+        </p:txBody>
+      </p:sp>
+      <p:sp>
+        <p:nvSpPr>
           <p:cNvPr id="2" name="Title 1"/>
           <p:cNvSpPr>
             <a:spLocks noGrp="1"/>
@@ -16886,6 +17929,2176 @@
   <p:clrMapOvr>
     <a:masterClrMapping/>
   </p:clrMapOvr>
+  <p:timing>
+    <p:tnLst>
+      <p:par>
+        <p:cTn id="1" dur="indefinite" restart="never" nodeType="tmRoot">
+          <p:childTnLst>
+            <p:seq concurrent="1" nextAc="seek">
+              <p:cTn id="2" dur="indefinite" nodeType="mainSeq">
+                <p:childTnLst>
+                  <p:par>
+                    <p:cTn id="3" fill="hold">
+                      <p:stCondLst>
+                        <p:cond delay="indefinite"/>
+                      </p:stCondLst>
+                      <p:childTnLst>
+                        <p:par>
+                          <p:cTn id="4" fill="hold">
+                            <p:stCondLst>
+                              <p:cond delay="0"/>
+                            </p:stCondLst>
+                            <p:childTnLst>
+                              <p:par>
+                                <p:cTn id="5" presetID="2" presetClass="entr" presetSubtype="4" fill="hold" grpId="0" nodeType="clickEffect">
+                                  <p:stCondLst>
+                                    <p:cond delay="0"/>
+                                  </p:stCondLst>
+                                  <p:childTnLst>
+                                    <p:set>
+                                      <p:cBhvr>
+                                        <p:cTn id="6" dur="1" fill="hold">
+                                          <p:stCondLst>
+                                            <p:cond delay="0"/>
+                                          </p:stCondLst>
+                                        </p:cTn>
+                                        <p:tgtEl>
+                                          <p:spTgt spid="5">
+                                            <p:bg/>
+                                          </p:spTgt>
+                                        </p:tgtEl>
+                                        <p:attrNameLst>
+                                          <p:attrName>style.visibility</p:attrName>
+                                        </p:attrNameLst>
+                                      </p:cBhvr>
+                                      <p:to>
+                                        <p:strVal val="visible"/>
+                                      </p:to>
+                                    </p:set>
+                                    <p:anim calcmode="lin" valueType="num">
+                                      <p:cBhvr additive="base">
+                                        <p:cTn id="7" dur="500" fill="hold"/>
+                                        <p:tgtEl>
+                                          <p:spTgt spid="5">
+                                            <p:bg/>
+                                          </p:spTgt>
+                                        </p:tgtEl>
+                                        <p:attrNameLst>
+                                          <p:attrName>ppt_x</p:attrName>
+                                        </p:attrNameLst>
+                                      </p:cBhvr>
+                                      <p:tavLst>
+                                        <p:tav tm="0">
+                                          <p:val>
+                                            <p:strVal val="#ppt_x"/>
+                                          </p:val>
+                                        </p:tav>
+                                        <p:tav tm="100000">
+                                          <p:val>
+                                            <p:strVal val="#ppt_x"/>
+                                          </p:val>
+                                        </p:tav>
+                                      </p:tavLst>
+                                    </p:anim>
+                                    <p:anim calcmode="lin" valueType="num">
+                                      <p:cBhvr additive="base">
+                                        <p:cTn id="8" dur="500" fill="hold"/>
+                                        <p:tgtEl>
+                                          <p:spTgt spid="5">
+                                            <p:bg/>
+                                          </p:spTgt>
+                                        </p:tgtEl>
+                                        <p:attrNameLst>
+                                          <p:attrName>ppt_y</p:attrName>
+                                        </p:attrNameLst>
+                                      </p:cBhvr>
+                                      <p:tavLst>
+                                        <p:tav tm="0">
+                                          <p:val>
+                                            <p:strVal val="1+#ppt_h/2"/>
+                                          </p:val>
+                                        </p:tav>
+                                        <p:tav tm="100000">
+                                          <p:val>
+                                            <p:strVal val="#ppt_y"/>
+                                          </p:val>
+                                        </p:tav>
+                                      </p:tavLst>
+                                    </p:anim>
+                                  </p:childTnLst>
+                                </p:cTn>
+                              </p:par>
+                              <p:par>
+                                <p:cTn id="9" presetID="2" presetClass="entr" presetSubtype="4" fill="hold" grpId="0" nodeType="withEffect">
+                                  <p:stCondLst>
+                                    <p:cond delay="0"/>
+                                  </p:stCondLst>
+                                  <p:childTnLst>
+                                    <p:set>
+                                      <p:cBhvr>
+                                        <p:cTn id="10" dur="1" fill="hold">
+                                          <p:stCondLst>
+                                            <p:cond delay="0"/>
+                                          </p:stCondLst>
+                                        </p:cTn>
+                                        <p:tgtEl>
+                                          <p:spTgt spid="5">
+                                            <p:txEl>
+                                              <p:pRg st="0" end="0"/>
+                                            </p:txEl>
+                                          </p:spTgt>
+                                        </p:tgtEl>
+                                        <p:attrNameLst>
+                                          <p:attrName>style.visibility</p:attrName>
+                                        </p:attrNameLst>
+                                      </p:cBhvr>
+                                      <p:to>
+                                        <p:strVal val="visible"/>
+                                      </p:to>
+                                    </p:set>
+                                    <p:anim calcmode="lin" valueType="num">
+                                      <p:cBhvr additive="base">
+                                        <p:cTn id="11" dur="500" fill="hold"/>
+                                        <p:tgtEl>
+                                          <p:spTgt spid="5">
+                                            <p:txEl>
+                                              <p:pRg st="0" end="0"/>
+                                            </p:txEl>
+                                          </p:spTgt>
+                                        </p:tgtEl>
+                                        <p:attrNameLst>
+                                          <p:attrName>ppt_x</p:attrName>
+                                        </p:attrNameLst>
+                                      </p:cBhvr>
+                                      <p:tavLst>
+                                        <p:tav tm="0">
+                                          <p:val>
+                                            <p:strVal val="#ppt_x"/>
+                                          </p:val>
+                                        </p:tav>
+                                        <p:tav tm="100000">
+                                          <p:val>
+                                            <p:strVal val="#ppt_x"/>
+                                          </p:val>
+                                        </p:tav>
+                                      </p:tavLst>
+                                    </p:anim>
+                                    <p:anim calcmode="lin" valueType="num">
+                                      <p:cBhvr additive="base">
+                                        <p:cTn id="12" dur="500" fill="hold"/>
+                                        <p:tgtEl>
+                                          <p:spTgt spid="5">
+                                            <p:txEl>
+                                              <p:pRg st="0" end="0"/>
+                                            </p:txEl>
+                                          </p:spTgt>
+                                        </p:tgtEl>
+                                        <p:attrNameLst>
+                                          <p:attrName>ppt_y</p:attrName>
+                                        </p:attrNameLst>
+                                      </p:cBhvr>
+                                      <p:tavLst>
+                                        <p:tav tm="0">
+                                          <p:val>
+                                            <p:strVal val="1+#ppt_h/2"/>
+                                          </p:val>
+                                        </p:tav>
+                                        <p:tav tm="100000">
+                                          <p:val>
+                                            <p:strVal val="#ppt_y"/>
+                                          </p:val>
+                                        </p:tav>
+                                      </p:tavLst>
+                                    </p:anim>
+                                  </p:childTnLst>
+                                </p:cTn>
+                              </p:par>
+                              <p:par>
+                                <p:cTn id="13" presetID="2" presetClass="entr" presetSubtype="4" fill="hold" grpId="0" nodeType="withEffect">
+                                  <p:stCondLst>
+                                    <p:cond delay="0"/>
+                                  </p:stCondLst>
+                                  <p:childTnLst>
+                                    <p:set>
+                                      <p:cBhvr>
+                                        <p:cTn id="14" dur="1" fill="hold">
+                                          <p:stCondLst>
+                                            <p:cond delay="0"/>
+                                          </p:stCondLst>
+                                        </p:cTn>
+                                        <p:tgtEl>
+                                          <p:spTgt spid="5">
+                                            <p:txEl>
+                                              <p:pRg st="1" end="1"/>
+                                            </p:txEl>
+                                          </p:spTgt>
+                                        </p:tgtEl>
+                                        <p:attrNameLst>
+                                          <p:attrName>style.visibility</p:attrName>
+                                        </p:attrNameLst>
+                                      </p:cBhvr>
+                                      <p:to>
+                                        <p:strVal val="visible"/>
+                                      </p:to>
+                                    </p:set>
+                                    <p:anim calcmode="lin" valueType="num">
+                                      <p:cBhvr additive="base">
+                                        <p:cTn id="15" dur="500" fill="hold"/>
+                                        <p:tgtEl>
+                                          <p:spTgt spid="5">
+                                            <p:txEl>
+                                              <p:pRg st="1" end="1"/>
+                                            </p:txEl>
+                                          </p:spTgt>
+                                        </p:tgtEl>
+                                        <p:attrNameLst>
+                                          <p:attrName>ppt_x</p:attrName>
+                                        </p:attrNameLst>
+                                      </p:cBhvr>
+                                      <p:tavLst>
+                                        <p:tav tm="0">
+                                          <p:val>
+                                            <p:strVal val="#ppt_x"/>
+                                          </p:val>
+                                        </p:tav>
+                                        <p:tav tm="100000">
+                                          <p:val>
+                                            <p:strVal val="#ppt_x"/>
+                                          </p:val>
+                                        </p:tav>
+                                      </p:tavLst>
+                                    </p:anim>
+                                    <p:anim calcmode="lin" valueType="num">
+                                      <p:cBhvr additive="base">
+                                        <p:cTn id="16" dur="500" fill="hold"/>
+                                        <p:tgtEl>
+                                          <p:spTgt spid="5">
+                                            <p:txEl>
+                                              <p:pRg st="1" end="1"/>
+                                            </p:txEl>
+                                          </p:spTgt>
+                                        </p:tgtEl>
+                                        <p:attrNameLst>
+                                          <p:attrName>ppt_y</p:attrName>
+                                        </p:attrNameLst>
+                                      </p:cBhvr>
+                                      <p:tavLst>
+                                        <p:tav tm="0">
+                                          <p:val>
+                                            <p:strVal val="1+#ppt_h/2"/>
+                                          </p:val>
+                                        </p:tav>
+                                        <p:tav tm="100000">
+                                          <p:val>
+                                            <p:strVal val="#ppt_y"/>
+                                          </p:val>
+                                        </p:tav>
+                                      </p:tavLst>
+                                    </p:anim>
+                                  </p:childTnLst>
+                                </p:cTn>
+                              </p:par>
+                              <p:par>
+                                <p:cTn id="17" presetID="2" presetClass="entr" presetSubtype="4" fill="hold" grpId="0" nodeType="withEffect">
+                                  <p:stCondLst>
+                                    <p:cond delay="0"/>
+                                  </p:stCondLst>
+                                  <p:childTnLst>
+                                    <p:set>
+                                      <p:cBhvr>
+                                        <p:cTn id="18" dur="1" fill="hold">
+                                          <p:stCondLst>
+                                            <p:cond delay="0"/>
+                                          </p:stCondLst>
+                                        </p:cTn>
+                                        <p:tgtEl>
+                                          <p:spTgt spid="5">
+                                            <p:txEl>
+                                              <p:pRg st="2" end="2"/>
+                                            </p:txEl>
+                                          </p:spTgt>
+                                        </p:tgtEl>
+                                        <p:attrNameLst>
+                                          <p:attrName>style.visibility</p:attrName>
+                                        </p:attrNameLst>
+                                      </p:cBhvr>
+                                      <p:to>
+                                        <p:strVal val="visible"/>
+                                      </p:to>
+                                    </p:set>
+                                    <p:anim calcmode="lin" valueType="num">
+                                      <p:cBhvr additive="base">
+                                        <p:cTn id="19" dur="500" fill="hold"/>
+                                        <p:tgtEl>
+                                          <p:spTgt spid="5">
+                                            <p:txEl>
+                                              <p:pRg st="2" end="2"/>
+                                            </p:txEl>
+                                          </p:spTgt>
+                                        </p:tgtEl>
+                                        <p:attrNameLst>
+                                          <p:attrName>ppt_x</p:attrName>
+                                        </p:attrNameLst>
+                                      </p:cBhvr>
+                                      <p:tavLst>
+                                        <p:tav tm="0">
+                                          <p:val>
+                                            <p:strVal val="#ppt_x"/>
+                                          </p:val>
+                                        </p:tav>
+                                        <p:tav tm="100000">
+                                          <p:val>
+                                            <p:strVal val="#ppt_x"/>
+                                          </p:val>
+                                        </p:tav>
+                                      </p:tavLst>
+                                    </p:anim>
+                                    <p:anim calcmode="lin" valueType="num">
+                                      <p:cBhvr additive="base">
+                                        <p:cTn id="20" dur="500" fill="hold"/>
+                                        <p:tgtEl>
+                                          <p:spTgt spid="5">
+                                            <p:txEl>
+                                              <p:pRg st="2" end="2"/>
+                                            </p:txEl>
+                                          </p:spTgt>
+                                        </p:tgtEl>
+                                        <p:attrNameLst>
+                                          <p:attrName>ppt_y</p:attrName>
+                                        </p:attrNameLst>
+                                      </p:cBhvr>
+                                      <p:tavLst>
+                                        <p:tav tm="0">
+                                          <p:val>
+                                            <p:strVal val="1+#ppt_h/2"/>
+                                          </p:val>
+                                        </p:tav>
+                                        <p:tav tm="100000">
+                                          <p:val>
+                                            <p:strVal val="#ppt_y"/>
+                                          </p:val>
+                                        </p:tav>
+                                      </p:tavLst>
+                                    </p:anim>
+                                  </p:childTnLst>
+                                </p:cTn>
+                              </p:par>
+                              <p:par>
+                                <p:cTn id="21" presetID="2" presetClass="entr" presetSubtype="4" fill="hold" grpId="0" nodeType="withEffect">
+                                  <p:stCondLst>
+                                    <p:cond delay="0"/>
+                                  </p:stCondLst>
+                                  <p:childTnLst>
+                                    <p:set>
+                                      <p:cBhvr>
+                                        <p:cTn id="22" dur="1" fill="hold">
+                                          <p:stCondLst>
+                                            <p:cond delay="0"/>
+                                          </p:stCondLst>
+                                        </p:cTn>
+                                        <p:tgtEl>
+                                          <p:spTgt spid="5">
+                                            <p:txEl>
+                                              <p:pRg st="3" end="3"/>
+                                            </p:txEl>
+                                          </p:spTgt>
+                                        </p:tgtEl>
+                                        <p:attrNameLst>
+                                          <p:attrName>style.visibility</p:attrName>
+                                        </p:attrNameLst>
+                                      </p:cBhvr>
+                                      <p:to>
+                                        <p:strVal val="visible"/>
+                                      </p:to>
+                                    </p:set>
+                                    <p:anim calcmode="lin" valueType="num">
+                                      <p:cBhvr additive="base">
+                                        <p:cTn id="23" dur="500" fill="hold"/>
+                                        <p:tgtEl>
+                                          <p:spTgt spid="5">
+                                            <p:txEl>
+                                              <p:pRg st="3" end="3"/>
+                                            </p:txEl>
+                                          </p:spTgt>
+                                        </p:tgtEl>
+                                        <p:attrNameLst>
+                                          <p:attrName>ppt_x</p:attrName>
+                                        </p:attrNameLst>
+                                      </p:cBhvr>
+                                      <p:tavLst>
+                                        <p:tav tm="0">
+                                          <p:val>
+                                            <p:strVal val="#ppt_x"/>
+                                          </p:val>
+                                        </p:tav>
+                                        <p:tav tm="100000">
+                                          <p:val>
+                                            <p:strVal val="#ppt_x"/>
+                                          </p:val>
+                                        </p:tav>
+                                      </p:tavLst>
+                                    </p:anim>
+                                    <p:anim calcmode="lin" valueType="num">
+                                      <p:cBhvr additive="base">
+                                        <p:cTn id="24" dur="500" fill="hold"/>
+                                        <p:tgtEl>
+                                          <p:spTgt spid="5">
+                                            <p:txEl>
+                                              <p:pRg st="3" end="3"/>
+                                            </p:txEl>
+                                          </p:spTgt>
+                                        </p:tgtEl>
+                                        <p:attrNameLst>
+                                          <p:attrName>ppt_y</p:attrName>
+                                        </p:attrNameLst>
+                                      </p:cBhvr>
+                                      <p:tavLst>
+                                        <p:tav tm="0">
+                                          <p:val>
+                                            <p:strVal val="1+#ppt_h/2"/>
+                                          </p:val>
+                                        </p:tav>
+                                        <p:tav tm="100000">
+                                          <p:val>
+                                            <p:strVal val="#ppt_y"/>
+                                          </p:val>
+                                        </p:tav>
+                                      </p:tavLst>
+                                    </p:anim>
+                                  </p:childTnLst>
+                                </p:cTn>
+                              </p:par>
+                              <p:par>
+                                <p:cTn id="25" presetID="2" presetClass="entr" presetSubtype="4" fill="hold" grpId="0" nodeType="withEffect">
+                                  <p:stCondLst>
+                                    <p:cond delay="0"/>
+                                  </p:stCondLst>
+                                  <p:childTnLst>
+                                    <p:set>
+                                      <p:cBhvr>
+                                        <p:cTn id="26" dur="1" fill="hold">
+                                          <p:stCondLst>
+                                            <p:cond delay="0"/>
+                                          </p:stCondLst>
+                                        </p:cTn>
+                                        <p:tgtEl>
+                                          <p:spTgt spid="5">
+                                            <p:txEl>
+                                              <p:pRg st="4" end="4"/>
+                                            </p:txEl>
+                                          </p:spTgt>
+                                        </p:tgtEl>
+                                        <p:attrNameLst>
+                                          <p:attrName>style.visibility</p:attrName>
+                                        </p:attrNameLst>
+                                      </p:cBhvr>
+                                      <p:to>
+                                        <p:strVal val="visible"/>
+                                      </p:to>
+                                    </p:set>
+                                    <p:anim calcmode="lin" valueType="num">
+                                      <p:cBhvr additive="base">
+                                        <p:cTn id="27" dur="500" fill="hold"/>
+                                        <p:tgtEl>
+                                          <p:spTgt spid="5">
+                                            <p:txEl>
+                                              <p:pRg st="4" end="4"/>
+                                            </p:txEl>
+                                          </p:spTgt>
+                                        </p:tgtEl>
+                                        <p:attrNameLst>
+                                          <p:attrName>ppt_x</p:attrName>
+                                        </p:attrNameLst>
+                                      </p:cBhvr>
+                                      <p:tavLst>
+                                        <p:tav tm="0">
+                                          <p:val>
+                                            <p:strVal val="#ppt_x"/>
+                                          </p:val>
+                                        </p:tav>
+                                        <p:tav tm="100000">
+                                          <p:val>
+                                            <p:strVal val="#ppt_x"/>
+                                          </p:val>
+                                        </p:tav>
+                                      </p:tavLst>
+                                    </p:anim>
+                                    <p:anim calcmode="lin" valueType="num">
+                                      <p:cBhvr additive="base">
+                                        <p:cTn id="28" dur="500" fill="hold"/>
+                                        <p:tgtEl>
+                                          <p:spTgt spid="5">
+                                            <p:txEl>
+                                              <p:pRg st="4" end="4"/>
+                                            </p:txEl>
+                                          </p:spTgt>
+                                        </p:tgtEl>
+                                        <p:attrNameLst>
+                                          <p:attrName>ppt_y</p:attrName>
+                                        </p:attrNameLst>
+                                      </p:cBhvr>
+                                      <p:tavLst>
+                                        <p:tav tm="0">
+                                          <p:val>
+                                            <p:strVal val="1+#ppt_h/2"/>
+                                          </p:val>
+                                        </p:tav>
+                                        <p:tav tm="100000">
+                                          <p:val>
+                                            <p:strVal val="#ppt_y"/>
+                                          </p:val>
+                                        </p:tav>
+                                      </p:tavLst>
+                                    </p:anim>
+                                  </p:childTnLst>
+                                </p:cTn>
+                              </p:par>
+                              <p:par>
+                                <p:cTn id="29" presetID="2" presetClass="entr" presetSubtype="4" fill="hold" grpId="0" nodeType="withEffect">
+                                  <p:stCondLst>
+                                    <p:cond delay="0"/>
+                                  </p:stCondLst>
+                                  <p:childTnLst>
+                                    <p:set>
+                                      <p:cBhvr>
+                                        <p:cTn id="30" dur="1" fill="hold">
+                                          <p:stCondLst>
+                                            <p:cond delay="0"/>
+                                          </p:stCondLst>
+                                        </p:cTn>
+                                        <p:tgtEl>
+                                          <p:spTgt spid="5">
+                                            <p:txEl>
+                                              <p:pRg st="5" end="5"/>
+                                            </p:txEl>
+                                          </p:spTgt>
+                                        </p:tgtEl>
+                                        <p:attrNameLst>
+                                          <p:attrName>style.visibility</p:attrName>
+                                        </p:attrNameLst>
+                                      </p:cBhvr>
+                                      <p:to>
+                                        <p:strVal val="visible"/>
+                                      </p:to>
+                                    </p:set>
+                                    <p:anim calcmode="lin" valueType="num">
+                                      <p:cBhvr additive="base">
+                                        <p:cTn id="31" dur="500" fill="hold"/>
+                                        <p:tgtEl>
+                                          <p:spTgt spid="5">
+                                            <p:txEl>
+                                              <p:pRg st="5" end="5"/>
+                                            </p:txEl>
+                                          </p:spTgt>
+                                        </p:tgtEl>
+                                        <p:attrNameLst>
+                                          <p:attrName>ppt_x</p:attrName>
+                                        </p:attrNameLst>
+                                      </p:cBhvr>
+                                      <p:tavLst>
+                                        <p:tav tm="0">
+                                          <p:val>
+                                            <p:strVal val="#ppt_x"/>
+                                          </p:val>
+                                        </p:tav>
+                                        <p:tav tm="100000">
+                                          <p:val>
+                                            <p:strVal val="#ppt_x"/>
+                                          </p:val>
+                                        </p:tav>
+                                      </p:tavLst>
+                                    </p:anim>
+                                    <p:anim calcmode="lin" valueType="num">
+                                      <p:cBhvr additive="base">
+                                        <p:cTn id="32" dur="500" fill="hold"/>
+                                        <p:tgtEl>
+                                          <p:spTgt spid="5">
+                                            <p:txEl>
+                                              <p:pRg st="5" end="5"/>
+                                            </p:txEl>
+                                          </p:spTgt>
+                                        </p:tgtEl>
+                                        <p:attrNameLst>
+                                          <p:attrName>ppt_y</p:attrName>
+                                        </p:attrNameLst>
+                                      </p:cBhvr>
+                                      <p:tavLst>
+                                        <p:tav tm="0">
+                                          <p:val>
+                                            <p:strVal val="1+#ppt_h/2"/>
+                                          </p:val>
+                                        </p:tav>
+                                        <p:tav tm="100000">
+                                          <p:val>
+                                            <p:strVal val="#ppt_y"/>
+                                          </p:val>
+                                        </p:tav>
+                                      </p:tavLst>
+                                    </p:anim>
+                                  </p:childTnLst>
+                                </p:cTn>
+                              </p:par>
+                              <p:par>
+                                <p:cTn id="33" presetID="2" presetClass="entr" presetSubtype="4" fill="hold" grpId="0" nodeType="withEffect">
+                                  <p:stCondLst>
+                                    <p:cond delay="0"/>
+                                  </p:stCondLst>
+                                  <p:childTnLst>
+                                    <p:set>
+                                      <p:cBhvr>
+                                        <p:cTn id="34" dur="1" fill="hold">
+                                          <p:stCondLst>
+                                            <p:cond delay="0"/>
+                                          </p:stCondLst>
+                                        </p:cTn>
+                                        <p:tgtEl>
+                                          <p:spTgt spid="5">
+                                            <p:txEl>
+                                              <p:pRg st="6" end="6"/>
+                                            </p:txEl>
+                                          </p:spTgt>
+                                        </p:tgtEl>
+                                        <p:attrNameLst>
+                                          <p:attrName>style.visibility</p:attrName>
+                                        </p:attrNameLst>
+                                      </p:cBhvr>
+                                      <p:to>
+                                        <p:strVal val="visible"/>
+                                      </p:to>
+                                    </p:set>
+                                    <p:anim calcmode="lin" valueType="num">
+                                      <p:cBhvr additive="base">
+                                        <p:cTn id="35" dur="500" fill="hold"/>
+                                        <p:tgtEl>
+                                          <p:spTgt spid="5">
+                                            <p:txEl>
+                                              <p:pRg st="6" end="6"/>
+                                            </p:txEl>
+                                          </p:spTgt>
+                                        </p:tgtEl>
+                                        <p:attrNameLst>
+                                          <p:attrName>ppt_x</p:attrName>
+                                        </p:attrNameLst>
+                                      </p:cBhvr>
+                                      <p:tavLst>
+                                        <p:tav tm="0">
+                                          <p:val>
+                                            <p:strVal val="#ppt_x"/>
+                                          </p:val>
+                                        </p:tav>
+                                        <p:tav tm="100000">
+                                          <p:val>
+                                            <p:strVal val="#ppt_x"/>
+                                          </p:val>
+                                        </p:tav>
+                                      </p:tavLst>
+                                    </p:anim>
+                                    <p:anim calcmode="lin" valueType="num">
+                                      <p:cBhvr additive="base">
+                                        <p:cTn id="36" dur="500" fill="hold"/>
+                                        <p:tgtEl>
+                                          <p:spTgt spid="5">
+                                            <p:txEl>
+                                              <p:pRg st="6" end="6"/>
+                                            </p:txEl>
+                                          </p:spTgt>
+                                        </p:tgtEl>
+                                        <p:attrNameLst>
+                                          <p:attrName>ppt_y</p:attrName>
+                                        </p:attrNameLst>
+                                      </p:cBhvr>
+                                      <p:tavLst>
+                                        <p:tav tm="0">
+                                          <p:val>
+                                            <p:strVal val="1+#ppt_h/2"/>
+                                          </p:val>
+                                        </p:tav>
+                                        <p:tav tm="100000">
+                                          <p:val>
+                                            <p:strVal val="#ppt_y"/>
+                                          </p:val>
+                                        </p:tav>
+                                      </p:tavLst>
+                                    </p:anim>
+                                  </p:childTnLst>
+                                </p:cTn>
+                              </p:par>
+                              <p:par>
+                                <p:cTn id="37" presetID="2" presetClass="entr" presetSubtype="4" fill="hold" grpId="0" nodeType="withEffect">
+                                  <p:stCondLst>
+                                    <p:cond delay="0"/>
+                                  </p:stCondLst>
+                                  <p:childTnLst>
+                                    <p:set>
+                                      <p:cBhvr>
+                                        <p:cTn id="38" dur="1" fill="hold">
+                                          <p:stCondLst>
+                                            <p:cond delay="0"/>
+                                          </p:stCondLst>
+                                        </p:cTn>
+                                        <p:tgtEl>
+                                          <p:spTgt spid="5">
+                                            <p:txEl>
+                                              <p:pRg st="7" end="7"/>
+                                            </p:txEl>
+                                          </p:spTgt>
+                                        </p:tgtEl>
+                                        <p:attrNameLst>
+                                          <p:attrName>style.visibility</p:attrName>
+                                        </p:attrNameLst>
+                                      </p:cBhvr>
+                                      <p:to>
+                                        <p:strVal val="visible"/>
+                                      </p:to>
+                                    </p:set>
+                                    <p:anim calcmode="lin" valueType="num">
+                                      <p:cBhvr additive="base">
+                                        <p:cTn id="39" dur="500" fill="hold"/>
+                                        <p:tgtEl>
+                                          <p:spTgt spid="5">
+                                            <p:txEl>
+                                              <p:pRg st="7" end="7"/>
+                                            </p:txEl>
+                                          </p:spTgt>
+                                        </p:tgtEl>
+                                        <p:attrNameLst>
+                                          <p:attrName>ppt_x</p:attrName>
+                                        </p:attrNameLst>
+                                      </p:cBhvr>
+                                      <p:tavLst>
+                                        <p:tav tm="0">
+                                          <p:val>
+                                            <p:strVal val="#ppt_x"/>
+                                          </p:val>
+                                        </p:tav>
+                                        <p:tav tm="100000">
+                                          <p:val>
+                                            <p:strVal val="#ppt_x"/>
+                                          </p:val>
+                                        </p:tav>
+                                      </p:tavLst>
+                                    </p:anim>
+                                    <p:anim calcmode="lin" valueType="num">
+                                      <p:cBhvr additive="base">
+                                        <p:cTn id="40" dur="500" fill="hold"/>
+                                        <p:tgtEl>
+                                          <p:spTgt spid="5">
+                                            <p:txEl>
+                                              <p:pRg st="7" end="7"/>
+                                            </p:txEl>
+                                          </p:spTgt>
+                                        </p:tgtEl>
+                                        <p:attrNameLst>
+                                          <p:attrName>ppt_y</p:attrName>
+                                        </p:attrNameLst>
+                                      </p:cBhvr>
+                                      <p:tavLst>
+                                        <p:tav tm="0">
+                                          <p:val>
+                                            <p:strVal val="1+#ppt_h/2"/>
+                                          </p:val>
+                                        </p:tav>
+                                        <p:tav tm="100000">
+                                          <p:val>
+                                            <p:strVal val="#ppt_y"/>
+                                          </p:val>
+                                        </p:tav>
+                                      </p:tavLst>
+                                    </p:anim>
+                                  </p:childTnLst>
+                                </p:cTn>
+                              </p:par>
+                              <p:par>
+                                <p:cTn id="41" presetID="2" presetClass="entr" presetSubtype="4" fill="hold" grpId="0" nodeType="withEffect">
+                                  <p:stCondLst>
+                                    <p:cond delay="0"/>
+                                  </p:stCondLst>
+                                  <p:childTnLst>
+                                    <p:set>
+                                      <p:cBhvr>
+                                        <p:cTn id="42" dur="1" fill="hold">
+                                          <p:stCondLst>
+                                            <p:cond delay="0"/>
+                                          </p:stCondLst>
+                                        </p:cTn>
+                                        <p:tgtEl>
+                                          <p:spTgt spid="5">
+                                            <p:txEl>
+                                              <p:pRg st="8" end="8"/>
+                                            </p:txEl>
+                                          </p:spTgt>
+                                        </p:tgtEl>
+                                        <p:attrNameLst>
+                                          <p:attrName>style.visibility</p:attrName>
+                                        </p:attrNameLst>
+                                      </p:cBhvr>
+                                      <p:to>
+                                        <p:strVal val="visible"/>
+                                      </p:to>
+                                    </p:set>
+                                    <p:anim calcmode="lin" valueType="num">
+                                      <p:cBhvr additive="base">
+                                        <p:cTn id="43" dur="500" fill="hold"/>
+                                        <p:tgtEl>
+                                          <p:spTgt spid="5">
+                                            <p:txEl>
+                                              <p:pRg st="8" end="8"/>
+                                            </p:txEl>
+                                          </p:spTgt>
+                                        </p:tgtEl>
+                                        <p:attrNameLst>
+                                          <p:attrName>ppt_x</p:attrName>
+                                        </p:attrNameLst>
+                                      </p:cBhvr>
+                                      <p:tavLst>
+                                        <p:tav tm="0">
+                                          <p:val>
+                                            <p:strVal val="#ppt_x"/>
+                                          </p:val>
+                                        </p:tav>
+                                        <p:tav tm="100000">
+                                          <p:val>
+                                            <p:strVal val="#ppt_x"/>
+                                          </p:val>
+                                        </p:tav>
+                                      </p:tavLst>
+                                    </p:anim>
+                                    <p:anim calcmode="lin" valueType="num">
+                                      <p:cBhvr additive="base">
+                                        <p:cTn id="44" dur="500" fill="hold"/>
+                                        <p:tgtEl>
+                                          <p:spTgt spid="5">
+                                            <p:txEl>
+                                              <p:pRg st="8" end="8"/>
+                                            </p:txEl>
+                                          </p:spTgt>
+                                        </p:tgtEl>
+                                        <p:attrNameLst>
+                                          <p:attrName>ppt_y</p:attrName>
+                                        </p:attrNameLst>
+                                      </p:cBhvr>
+                                      <p:tavLst>
+                                        <p:tav tm="0">
+                                          <p:val>
+                                            <p:strVal val="1+#ppt_h/2"/>
+                                          </p:val>
+                                        </p:tav>
+                                        <p:tav tm="100000">
+                                          <p:val>
+                                            <p:strVal val="#ppt_y"/>
+                                          </p:val>
+                                        </p:tav>
+                                      </p:tavLst>
+                                    </p:anim>
+                                  </p:childTnLst>
+                                </p:cTn>
+                              </p:par>
+                              <p:par>
+                                <p:cTn id="45" presetID="2" presetClass="entr" presetSubtype="4" fill="hold" grpId="0" nodeType="withEffect">
+                                  <p:stCondLst>
+                                    <p:cond delay="0"/>
+                                  </p:stCondLst>
+                                  <p:childTnLst>
+                                    <p:set>
+                                      <p:cBhvr>
+                                        <p:cTn id="46" dur="1" fill="hold">
+                                          <p:stCondLst>
+                                            <p:cond delay="0"/>
+                                          </p:stCondLst>
+                                        </p:cTn>
+                                        <p:tgtEl>
+                                          <p:spTgt spid="5">
+                                            <p:txEl>
+                                              <p:pRg st="9" end="9"/>
+                                            </p:txEl>
+                                          </p:spTgt>
+                                        </p:tgtEl>
+                                        <p:attrNameLst>
+                                          <p:attrName>style.visibility</p:attrName>
+                                        </p:attrNameLst>
+                                      </p:cBhvr>
+                                      <p:to>
+                                        <p:strVal val="visible"/>
+                                      </p:to>
+                                    </p:set>
+                                    <p:anim calcmode="lin" valueType="num">
+                                      <p:cBhvr additive="base">
+                                        <p:cTn id="47" dur="500" fill="hold"/>
+                                        <p:tgtEl>
+                                          <p:spTgt spid="5">
+                                            <p:txEl>
+                                              <p:pRg st="9" end="9"/>
+                                            </p:txEl>
+                                          </p:spTgt>
+                                        </p:tgtEl>
+                                        <p:attrNameLst>
+                                          <p:attrName>ppt_x</p:attrName>
+                                        </p:attrNameLst>
+                                      </p:cBhvr>
+                                      <p:tavLst>
+                                        <p:tav tm="0">
+                                          <p:val>
+                                            <p:strVal val="#ppt_x"/>
+                                          </p:val>
+                                        </p:tav>
+                                        <p:tav tm="100000">
+                                          <p:val>
+                                            <p:strVal val="#ppt_x"/>
+                                          </p:val>
+                                        </p:tav>
+                                      </p:tavLst>
+                                    </p:anim>
+                                    <p:anim calcmode="lin" valueType="num">
+                                      <p:cBhvr additive="base">
+                                        <p:cTn id="48" dur="500" fill="hold"/>
+                                        <p:tgtEl>
+                                          <p:spTgt spid="5">
+                                            <p:txEl>
+                                              <p:pRg st="9" end="9"/>
+                                            </p:txEl>
+                                          </p:spTgt>
+                                        </p:tgtEl>
+                                        <p:attrNameLst>
+                                          <p:attrName>ppt_y</p:attrName>
+                                        </p:attrNameLst>
+                                      </p:cBhvr>
+                                      <p:tavLst>
+                                        <p:tav tm="0">
+                                          <p:val>
+                                            <p:strVal val="1+#ppt_h/2"/>
+                                          </p:val>
+                                        </p:tav>
+                                        <p:tav tm="100000">
+                                          <p:val>
+                                            <p:strVal val="#ppt_y"/>
+                                          </p:val>
+                                        </p:tav>
+                                      </p:tavLst>
+                                    </p:anim>
+                                  </p:childTnLst>
+                                </p:cTn>
+                              </p:par>
+                              <p:par>
+                                <p:cTn id="49" presetID="2" presetClass="entr" presetSubtype="4" fill="hold" grpId="0" nodeType="withEffect">
+                                  <p:stCondLst>
+                                    <p:cond delay="0"/>
+                                  </p:stCondLst>
+                                  <p:childTnLst>
+                                    <p:set>
+                                      <p:cBhvr>
+                                        <p:cTn id="50" dur="1" fill="hold">
+                                          <p:stCondLst>
+                                            <p:cond delay="0"/>
+                                          </p:stCondLst>
+                                        </p:cTn>
+                                        <p:tgtEl>
+                                          <p:spTgt spid="5">
+                                            <p:txEl>
+                                              <p:pRg st="10" end="10"/>
+                                            </p:txEl>
+                                          </p:spTgt>
+                                        </p:tgtEl>
+                                        <p:attrNameLst>
+                                          <p:attrName>style.visibility</p:attrName>
+                                        </p:attrNameLst>
+                                      </p:cBhvr>
+                                      <p:to>
+                                        <p:strVal val="visible"/>
+                                      </p:to>
+                                    </p:set>
+                                    <p:anim calcmode="lin" valueType="num">
+                                      <p:cBhvr additive="base">
+                                        <p:cTn id="51" dur="500" fill="hold"/>
+                                        <p:tgtEl>
+                                          <p:spTgt spid="5">
+                                            <p:txEl>
+                                              <p:pRg st="10" end="10"/>
+                                            </p:txEl>
+                                          </p:spTgt>
+                                        </p:tgtEl>
+                                        <p:attrNameLst>
+                                          <p:attrName>ppt_x</p:attrName>
+                                        </p:attrNameLst>
+                                      </p:cBhvr>
+                                      <p:tavLst>
+                                        <p:tav tm="0">
+                                          <p:val>
+                                            <p:strVal val="#ppt_x"/>
+                                          </p:val>
+                                        </p:tav>
+                                        <p:tav tm="100000">
+                                          <p:val>
+                                            <p:strVal val="#ppt_x"/>
+                                          </p:val>
+                                        </p:tav>
+                                      </p:tavLst>
+                                    </p:anim>
+                                    <p:anim calcmode="lin" valueType="num">
+                                      <p:cBhvr additive="base">
+                                        <p:cTn id="52" dur="500" fill="hold"/>
+                                        <p:tgtEl>
+                                          <p:spTgt spid="5">
+                                            <p:txEl>
+                                              <p:pRg st="10" end="10"/>
+                                            </p:txEl>
+                                          </p:spTgt>
+                                        </p:tgtEl>
+                                        <p:attrNameLst>
+                                          <p:attrName>ppt_y</p:attrName>
+                                        </p:attrNameLst>
+                                      </p:cBhvr>
+                                      <p:tavLst>
+                                        <p:tav tm="0">
+                                          <p:val>
+                                            <p:strVal val="1+#ppt_h/2"/>
+                                          </p:val>
+                                        </p:tav>
+                                        <p:tav tm="100000">
+                                          <p:val>
+                                            <p:strVal val="#ppt_y"/>
+                                          </p:val>
+                                        </p:tav>
+                                      </p:tavLst>
+                                    </p:anim>
+                                  </p:childTnLst>
+                                </p:cTn>
+                              </p:par>
+                              <p:par>
+                                <p:cTn id="53" presetID="2" presetClass="entr" presetSubtype="4" fill="hold" grpId="0" nodeType="withEffect">
+                                  <p:stCondLst>
+                                    <p:cond delay="0"/>
+                                  </p:stCondLst>
+                                  <p:childTnLst>
+                                    <p:set>
+                                      <p:cBhvr>
+                                        <p:cTn id="54" dur="1" fill="hold">
+                                          <p:stCondLst>
+                                            <p:cond delay="0"/>
+                                          </p:stCondLst>
+                                        </p:cTn>
+                                        <p:tgtEl>
+                                          <p:spTgt spid="5">
+                                            <p:txEl>
+                                              <p:pRg st="11" end="11"/>
+                                            </p:txEl>
+                                          </p:spTgt>
+                                        </p:tgtEl>
+                                        <p:attrNameLst>
+                                          <p:attrName>style.visibility</p:attrName>
+                                        </p:attrNameLst>
+                                      </p:cBhvr>
+                                      <p:to>
+                                        <p:strVal val="visible"/>
+                                      </p:to>
+                                    </p:set>
+                                    <p:anim calcmode="lin" valueType="num">
+                                      <p:cBhvr additive="base">
+                                        <p:cTn id="55" dur="500" fill="hold"/>
+                                        <p:tgtEl>
+                                          <p:spTgt spid="5">
+                                            <p:txEl>
+                                              <p:pRg st="11" end="11"/>
+                                            </p:txEl>
+                                          </p:spTgt>
+                                        </p:tgtEl>
+                                        <p:attrNameLst>
+                                          <p:attrName>ppt_x</p:attrName>
+                                        </p:attrNameLst>
+                                      </p:cBhvr>
+                                      <p:tavLst>
+                                        <p:tav tm="0">
+                                          <p:val>
+                                            <p:strVal val="#ppt_x"/>
+                                          </p:val>
+                                        </p:tav>
+                                        <p:tav tm="100000">
+                                          <p:val>
+                                            <p:strVal val="#ppt_x"/>
+                                          </p:val>
+                                        </p:tav>
+                                      </p:tavLst>
+                                    </p:anim>
+                                    <p:anim calcmode="lin" valueType="num">
+                                      <p:cBhvr additive="base">
+                                        <p:cTn id="56" dur="500" fill="hold"/>
+                                        <p:tgtEl>
+                                          <p:spTgt spid="5">
+                                            <p:txEl>
+                                              <p:pRg st="11" end="11"/>
+                                            </p:txEl>
+                                          </p:spTgt>
+                                        </p:tgtEl>
+                                        <p:attrNameLst>
+                                          <p:attrName>ppt_y</p:attrName>
+                                        </p:attrNameLst>
+                                      </p:cBhvr>
+                                      <p:tavLst>
+                                        <p:tav tm="0">
+                                          <p:val>
+                                            <p:strVal val="1+#ppt_h/2"/>
+                                          </p:val>
+                                        </p:tav>
+                                        <p:tav tm="100000">
+                                          <p:val>
+                                            <p:strVal val="#ppt_y"/>
+                                          </p:val>
+                                        </p:tav>
+                                      </p:tavLst>
+                                    </p:anim>
+                                  </p:childTnLst>
+                                </p:cTn>
+                              </p:par>
+                              <p:par>
+                                <p:cTn id="57" presetID="2" presetClass="entr" presetSubtype="4" fill="hold" grpId="0" nodeType="withEffect">
+                                  <p:stCondLst>
+                                    <p:cond delay="0"/>
+                                  </p:stCondLst>
+                                  <p:childTnLst>
+                                    <p:set>
+                                      <p:cBhvr>
+                                        <p:cTn id="58" dur="1" fill="hold">
+                                          <p:stCondLst>
+                                            <p:cond delay="0"/>
+                                          </p:stCondLst>
+                                        </p:cTn>
+                                        <p:tgtEl>
+                                          <p:spTgt spid="5">
+                                            <p:txEl>
+                                              <p:pRg st="12" end="12"/>
+                                            </p:txEl>
+                                          </p:spTgt>
+                                        </p:tgtEl>
+                                        <p:attrNameLst>
+                                          <p:attrName>style.visibility</p:attrName>
+                                        </p:attrNameLst>
+                                      </p:cBhvr>
+                                      <p:to>
+                                        <p:strVal val="visible"/>
+                                      </p:to>
+                                    </p:set>
+                                    <p:anim calcmode="lin" valueType="num">
+                                      <p:cBhvr additive="base">
+                                        <p:cTn id="59" dur="500" fill="hold"/>
+                                        <p:tgtEl>
+                                          <p:spTgt spid="5">
+                                            <p:txEl>
+                                              <p:pRg st="12" end="12"/>
+                                            </p:txEl>
+                                          </p:spTgt>
+                                        </p:tgtEl>
+                                        <p:attrNameLst>
+                                          <p:attrName>ppt_x</p:attrName>
+                                        </p:attrNameLst>
+                                      </p:cBhvr>
+                                      <p:tavLst>
+                                        <p:tav tm="0">
+                                          <p:val>
+                                            <p:strVal val="#ppt_x"/>
+                                          </p:val>
+                                        </p:tav>
+                                        <p:tav tm="100000">
+                                          <p:val>
+                                            <p:strVal val="#ppt_x"/>
+                                          </p:val>
+                                        </p:tav>
+                                      </p:tavLst>
+                                    </p:anim>
+                                    <p:anim calcmode="lin" valueType="num">
+                                      <p:cBhvr additive="base">
+                                        <p:cTn id="60" dur="500" fill="hold"/>
+                                        <p:tgtEl>
+                                          <p:spTgt spid="5">
+                                            <p:txEl>
+                                              <p:pRg st="12" end="12"/>
+                                            </p:txEl>
+                                          </p:spTgt>
+                                        </p:tgtEl>
+                                        <p:attrNameLst>
+                                          <p:attrName>ppt_y</p:attrName>
+                                        </p:attrNameLst>
+                                      </p:cBhvr>
+                                      <p:tavLst>
+                                        <p:tav tm="0">
+                                          <p:val>
+                                            <p:strVal val="1+#ppt_h/2"/>
+                                          </p:val>
+                                        </p:tav>
+                                        <p:tav tm="100000">
+                                          <p:val>
+                                            <p:strVal val="#ppt_y"/>
+                                          </p:val>
+                                        </p:tav>
+                                      </p:tavLst>
+                                    </p:anim>
+                                  </p:childTnLst>
+                                </p:cTn>
+                              </p:par>
+                              <p:par>
+                                <p:cTn id="61" presetID="2" presetClass="entr" presetSubtype="4" fill="hold" grpId="0" nodeType="withEffect">
+                                  <p:stCondLst>
+                                    <p:cond delay="0"/>
+                                  </p:stCondLst>
+                                  <p:childTnLst>
+                                    <p:set>
+                                      <p:cBhvr>
+                                        <p:cTn id="62" dur="1" fill="hold">
+                                          <p:stCondLst>
+                                            <p:cond delay="0"/>
+                                          </p:stCondLst>
+                                        </p:cTn>
+                                        <p:tgtEl>
+                                          <p:spTgt spid="5">
+                                            <p:txEl>
+                                              <p:pRg st="13" end="13"/>
+                                            </p:txEl>
+                                          </p:spTgt>
+                                        </p:tgtEl>
+                                        <p:attrNameLst>
+                                          <p:attrName>style.visibility</p:attrName>
+                                        </p:attrNameLst>
+                                      </p:cBhvr>
+                                      <p:to>
+                                        <p:strVal val="visible"/>
+                                      </p:to>
+                                    </p:set>
+                                    <p:anim calcmode="lin" valueType="num">
+                                      <p:cBhvr additive="base">
+                                        <p:cTn id="63" dur="500" fill="hold"/>
+                                        <p:tgtEl>
+                                          <p:spTgt spid="5">
+                                            <p:txEl>
+                                              <p:pRg st="13" end="13"/>
+                                            </p:txEl>
+                                          </p:spTgt>
+                                        </p:tgtEl>
+                                        <p:attrNameLst>
+                                          <p:attrName>ppt_x</p:attrName>
+                                        </p:attrNameLst>
+                                      </p:cBhvr>
+                                      <p:tavLst>
+                                        <p:tav tm="0">
+                                          <p:val>
+                                            <p:strVal val="#ppt_x"/>
+                                          </p:val>
+                                        </p:tav>
+                                        <p:tav tm="100000">
+                                          <p:val>
+                                            <p:strVal val="#ppt_x"/>
+                                          </p:val>
+                                        </p:tav>
+                                      </p:tavLst>
+                                    </p:anim>
+                                    <p:anim calcmode="lin" valueType="num">
+                                      <p:cBhvr additive="base">
+                                        <p:cTn id="64" dur="500" fill="hold"/>
+                                        <p:tgtEl>
+                                          <p:spTgt spid="5">
+                                            <p:txEl>
+                                              <p:pRg st="13" end="13"/>
+                                            </p:txEl>
+                                          </p:spTgt>
+                                        </p:tgtEl>
+                                        <p:attrNameLst>
+                                          <p:attrName>ppt_y</p:attrName>
+                                        </p:attrNameLst>
+                                      </p:cBhvr>
+                                      <p:tavLst>
+                                        <p:tav tm="0">
+                                          <p:val>
+                                            <p:strVal val="1+#ppt_h/2"/>
+                                          </p:val>
+                                        </p:tav>
+                                        <p:tav tm="100000">
+                                          <p:val>
+                                            <p:strVal val="#ppt_y"/>
+                                          </p:val>
+                                        </p:tav>
+                                      </p:tavLst>
+                                    </p:anim>
+                                  </p:childTnLst>
+                                </p:cTn>
+                              </p:par>
+                              <p:par>
+                                <p:cTn id="65" presetID="2" presetClass="entr" presetSubtype="4" fill="hold" grpId="0" nodeType="withEffect">
+                                  <p:stCondLst>
+                                    <p:cond delay="0"/>
+                                  </p:stCondLst>
+                                  <p:childTnLst>
+                                    <p:set>
+                                      <p:cBhvr>
+                                        <p:cTn id="66" dur="1" fill="hold">
+                                          <p:stCondLst>
+                                            <p:cond delay="0"/>
+                                          </p:stCondLst>
+                                        </p:cTn>
+                                        <p:tgtEl>
+                                          <p:spTgt spid="5">
+                                            <p:txEl>
+                                              <p:pRg st="14" end="14"/>
+                                            </p:txEl>
+                                          </p:spTgt>
+                                        </p:tgtEl>
+                                        <p:attrNameLst>
+                                          <p:attrName>style.visibility</p:attrName>
+                                        </p:attrNameLst>
+                                      </p:cBhvr>
+                                      <p:to>
+                                        <p:strVal val="visible"/>
+                                      </p:to>
+                                    </p:set>
+                                    <p:anim calcmode="lin" valueType="num">
+                                      <p:cBhvr additive="base">
+                                        <p:cTn id="67" dur="500" fill="hold"/>
+                                        <p:tgtEl>
+                                          <p:spTgt spid="5">
+                                            <p:txEl>
+                                              <p:pRg st="14" end="14"/>
+                                            </p:txEl>
+                                          </p:spTgt>
+                                        </p:tgtEl>
+                                        <p:attrNameLst>
+                                          <p:attrName>ppt_x</p:attrName>
+                                        </p:attrNameLst>
+                                      </p:cBhvr>
+                                      <p:tavLst>
+                                        <p:tav tm="0">
+                                          <p:val>
+                                            <p:strVal val="#ppt_x"/>
+                                          </p:val>
+                                        </p:tav>
+                                        <p:tav tm="100000">
+                                          <p:val>
+                                            <p:strVal val="#ppt_x"/>
+                                          </p:val>
+                                        </p:tav>
+                                      </p:tavLst>
+                                    </p:anim>
+                                    <p:anim calcmode="lin" valueType="num">
+                                      <p:cBhvr additive="base">
+                                        <p:cTn id="68" dur="500" fill="hold"/>
+                                        <p:tgtEl>
+                                          <p:spTgt spid="5">
+                                            <p:txEl>
+                                              <p:pRg st="14" end="14"/>
+                                            </p:txEl>
+                                          </p:spTgt>
+                                        </p:tgtEl>
+                                        <p:attrNameLst>
+                                          <p:attrName>ppt_y</p:attrName>
+                                        </p:attrNameLst>
+                                      </p:cBhvr>
+                                      <p:tavLst>
+                                        <p:tav tm="0">
+                                          <p:val>
+                                            <p:strVal val="1+#ppt_h/2"/>
+                                          </p:val>
+                                        </p:tav>
+                                        <p:tav tm="100000">
+                                          <p:val>
+                                            <p:strVal val="#ppt_y"/>
+                                          </p:val>
+                                        </p:tav>
+                                      </p:tavLst>
+                                    </p:anim>
+                                  </p:childTnLst>
+                                </p:cTn>
+                              </p:par>
+                              <p:par>
+                                <p:cTn id="69" presetID="2" presetClass="entr" presetSubtype="4" fill="hold" grpId="0" nodeType="withEffect">
+                                  <p:stCondLst>
+                                    <p:cond delay="0"/>
+                                  </p:stCondLst>
+                                  <p:childTnLst>
+                                    <p:set>
+                                      <p:cBhvr>
+                                        <p:cTn id="70" dur="1" fill="hold">
+                                          <p:stCondLst>
+                                            <p:cond delay="0"/>
+                                          </p:stCondLst>
+                                        </p:cTn>
+                                        <p:tgtEl>
+                                          <p:spTgt spid="5">
+                                            <p:txEl>
+                                              <p:pRg st="15" end="15"/>
+                                            </p:txEl>
+                                          </p:spTgt>
+                                        </p:tgtEl>
+                                        <p:attrNameLst>
+                                          <p:attrName>style.visibility</p:attrName>
+                                        </p:attrNameLst>
+                                      </p:cBhvr>
+                                      <p:to>
+                                        <p:strVal val="visible"/>
+                                      </p:to>
+                                    </p:set>
+                                    <p:anim calcmode="lin" valueType="num">
+                                      <p:cBhvr additive="base">
+                                        <p:cTn id="71" dur="500" fill="hold"/>
+                                        <p:tgtEl>
+                                          <p:spTgt spid="5">
+                                            <p:txEl>
+                                              <p:pRg st="15" end="15"/>
+                                            </p:txEl>
+                                          </p:spTgt>
+                                        </p:tgtEl>
+                                        <p:attrNameLst>
+                                          <p:attrName>ppt_x</p:attrName>
+                                        </p:attrNameLst>
+                                      </p:cBhvr>
+                                      <p:tavLst>
+                                        <p:tav tm="0">
+                                          <p:val>
+                                            <p:strVal val="#ppt_x"/>
+                                          </p:val>
+                                        </p:tav>
+                                        <p:tav tm="100000">
+                                          <p:val>
+                                            <p:strVal val="#ppt_x"/>
+                                          </p:val>
+                                        </p:tav>
+                                      </p:tavLst>
+                                    </p:anim>
+                                    <p:anim calcmode="lin" valueType="num">
+                                      <p:cBhvr additive="base">
+                                        <p:cTn id="72" dur="500" fill="hold"/>
+                                        <p:tgtEl>
+                                          <p:spTgt spid="5">
+                                            <p:txEl>
+                                              <p:pRg st="15" end="15"/>
+                                            </p:txEl>
+                                          </p:spTgt>
+                                        </p:tgtEl>
+                                        <p:attrNameLst>
+                                          <p:attrName>ppt_y</p:attrName>
+                                        </p:attrNameLst>
+                                      </p:cBhvr>
+                                      <p:tavLst>
+                                        <p:tav tm="0">
+                                          <p:val>
+                                            <p:strVal val="1+#ppt_h/2"/>
+                                          </p:val>
+                                        </p:tav>
+                                        <p:tav tm="100000">
+                                          <p:val>
+                                            <p:strVal val="#ppt_y"/>
+                                          </p:val>
+                                        </p:tav>
+                                      </p:tavLst>
+                                    </p:anim>
+                                  </p:childTnLst>
+                                </p:cTn>
+                              </p:par>
+                              <p:par>
+                                <p:cTn id="73" presetID="2" presetClass="entr" presetSubtype="4" fill="hold" grpId="0" nodeType="withEffect">
+                                  <p:stCondLst>
+                                    <p:cond delay="0"/>
+                                  </p:stCondLst>
+                                  <p:childTnLst>
+                                    <p:set>
+                                      <p:cBhvr>
+                                        <p:cTn id="74" dur="1" fill="hold">
+                                          <p:stCondLst>
+                                            <p:cond delay="0"/>
+                                          </p:stCondLst>
+                                        </p:cTn>
+                                        <p:tgtEl>
+                                          <p:spTgt spid="5">
+                                            <p:txEl>
+                                              <p:pRg st="16" end="16"/>
+                                            </p:txEl>
+                                          </p:spTgt>
+                                        </p:tgtEl>
+                                        <p:attrNameLst>
+                                          <p:attrName>style.visibility</p:attrName>
+                                        </p:attrNameLst>
+                                      </p:cBhvr>
+                                      <p:to>
+                                        <p:strVal val="visible"/>
+                                      </p:to>
+                                    </p:set>
+                                    <p:anim calcmode="lin" valueType="num">
+                                      <p:cBhvr additive="base">
+                                        <p:cTn id="75" dur="500" fill="hold"/>
+                                        <p:tgtEl>
+                                          <p:spTgt spid="5">
+                                            <p:txEl>
+                                              <p:pRg st="16" end="16"/>
+                                            </p:txEl>
+                                          </p:spTgt>
+                                        </p:tgtEl>
+                                        <p:attrNameLst>
+                                          <p:attrName>ppt_x</p:attrName>
+                                        </p:attrNameLst>
+                                      </p:cBhvr>
+                                      <p:tavLst>
+                                        <p:tav tm="0">
+                                          <p:val>
+                                            <p:strVal val="#ppt_x"/>
+                                          </p:val>
+                                        </p:tav>
+                                        <p:tav tm="100000">
+                                          <p:val>
+                                            <p:strVal val="#ppt_x"/>
+                                          </p:val>
+                                        </p:tav>
+                                      </p:tavLst>
+                                    </p:anim>
+                                    <p:anim calcmode="lin" valueType="num">
+                                      <p:cBhvr additive="base">
+                                        <p:cTn id="76" dur="500" fill="hold"/>
+                                        <p:tgtEl>
+                                          <p:spTgt spid="5">
+                                            <p:txEl>
+                                              <p:pRg st="16" end="16"/>
+                                            </p:txEl>
+                                          </p:spTgt>
+                                        </p:tgtEl>
+                                        <p:attrNameLst>
+                                          <p:attrName>ppt_y</p:attrName>
+                                        </p:attrNameLst>
+                                      </p:cBhvr>
+                                      <p:tavLst>
+                                        <p:tav tm="0">
+                                          <p:val>
+                                            <p:strVal val="1+#ppt_h/2"/>
+                                          </p:val>
+                                        </p:tav>
+                                        <p:tav tm="100000">
+                                          <p:val>
+                                            <p:strVal val="#ppt_y"/>
+                                          </p:val>
+                                        </p:tav>
+                                      </p:tavLst>
+                                    </p:anim>
+                                  </p:childTnLst>
+                                </p:cTn>
+                              </p:par>
+                              <p:par>
+                                <p:cTn id="77" presetID="2" presetClass="entr" presetSubtype="4" fill="hold" grpId="0" nodeType="withEffect">
+                                  <p:stCondLst>
+                                    <p:cond delay="0"/>
+                                  </p:stCondLst>
+                                  <p:childTnLst>
+                                    <p:set>
+                                      <p:cBhvr>
+                                        <p:cTn id="78" dur="1" fill="hold">
+                                          <p:stCondLst>
+                                            <p:cond delay="0"/>
+                                          </p:stCondLst>
+                                        </p:cTn>
+                                        <p:tgtEl>
+                                          <p:spTgt spid="5">
+                                            <p:txEl>
+                                              <p:pRg st="17" end="17"/>
+                                            </p:txEl>
+                                          </p:spTgt>
+                                        </p:tgtEl>
+                                        <p:attrNameLst>
+                                          <p:attrName>style.visibility</p:attrName>
+                                        </p:attrNameLst>
+                                      </p:cBhvr>
+                                      <p:to>
+                                        <p:strVal val="visible"/>
+                                      </p:to>
+                                    </p:set>
+                                    <p:anim calcmode="lin" valueType="num">
+                                      <p:cBhvr additive="base">
+                                        <p:cTn id="79" dur="500" fill="hold"/>
+                                        <p:tgtEl>
+                                          <p:spTgt spid="5">
+                                            <p:txEl>
+                                              <p:pRg st="17" end="17"/>
+                                            </p:txEl>
+                                          </p:spTgt>
+                                        </p:tgtEl>
+                                        <p:attrNameLst>
+                                          <p:attrName>ppt_x</p:attrName>
+                                        </p:attrNameLst>
+                                      </p:cBhvr>
+                                      <p:tavLst>
+                                        <p:tav tm="0">
+                                          <p:val>
+                                            <p:strVal val="#ppt_x"/>
+                                          </p:val>
+                                        </p:tav>
+                                        <p:tav tm="100000">
+                                          <p:val>
+                                            <p:strVal val="#ppt_x"/>
+                                          </p:val>
+                                        </p:tav>
+                                      </p:tavLst>
+                                    </p:anim>
+                                    <p:anim calcmode="lin" valueType="num">
+                                      <p:cBhvr additive="base">
+                                        <p:cTn id="80" dur="500" fill="hold"/>
+                                        <p:tgtEl>
+                                          <p:spTgt spid="5">
+                                            <p:txEl>
+                                              <p:pRg st="17" end="17"/>
+                                            </p:txEl>
+                                          </p:spTgt>
+                                        </p:tgtEl>
+                                        <p:attrNameLst>
+                                          <p:attrName>ppt_y</p:attrName>
+                                        </p:attrNameLst>
+                                      </p:cBhvr>
+                                      <p:tavLst>
+                                        <p:tav tm="0">
+                                          <p:val>
+                                            <p:strVal val="1+#ppt_h/2"/>
+                                          </p:val>
+                                        </p:tav>
+                                        <p:tav tm="100000">
+                                          <p:val>
+                                            <p:strVal val="#ppt_y"/>
+                                          </p:val>
+                                        </p:tav>
+                                      </p:tavLst>
+                                    </p:anim>
+                                  </p:childTnLst>
+                                </p:cTn>
+                              </p:par>
+                              <p:par>
+                                <p:cTn id="81" presetID="2" presetClass="entr" presetSubtype="4" fill="hold" grpId="0" nodeType="withEffect">
+                                  <p:stCondLst>
+                                    <p:cond delay="0"/>
+                                  </p:stCondLst>
+                                  <p:childTnLst>
+                                    <p:set>
+                                      <p:cBhvr>
+                                        <p:cTn id="82" dur="1" fill="hold">
+                                          <p:stCondLst>
+                                            <p:cond delay="0"/>
+                                          </p:stCondLst>
+                                        </p:cTn>
+                                        <p:tgtEl>
+                                          <p:spTgt spid="5">
+                                            <p:txEl>
+                                              <p:pRg st="18" end="18"/>
+                                            </p:txEl>
+                                          </p:spTgt>
+                                        </p:tgtEl>
+                                        <p:attrNameLst>
+                                          <p:attrName>style.visibility</p:attrName>
+                                        </p:attrNameLst>
+                                      </p:cBhvr>
+                                      <p:to>
+                                        <p:strVal val="visible"/>
+                                      </p:to>
+                                    </p:set>
+                                    <p:anim calcmode="lin" valueType="num">
+                                      <p:cBhvr additive="base">
+                                        <p:cTn id="83" dur="500" fill="hold"/>
+                                        <p:tgtEl>
+                                          <p:spTgt spid="5">
+                                            <p:txEl>
+                                              <p:pRg st="18" end="18"/>
+                                            </p:txEl>
+                                          </p:spTgt>
+                                        </p:tgtEl>
+                                        <p:attrNameLst>
+                                          <p:attrName>ppt_x</p:attrName>
+                                        </p:attrNameLst>
+                                      </p:cBhvr>
+                                      <p:tavLst>
+                                        <p:tav tm="0">
+                                          <p:val>
+                                            <p:strVal val="#ppt_x"/>
+                                          </p:val>
+                                        </p:tav>
+                                        <p:tav tm="100000">
+                                          <p:val>
+                                            <p:strVal val="#ppt_x"/>
+                                          </p:val>
+                                        </p:tav>
+                                      </p:tavLst>
+                                    </p:anim>
+                                    <p:anim calcmode="lin" valueType="num">
+                                      <p:cBhvr additive="base">
+                                        <p:cTn id="84" dur="500" fill="hold"/>
+                                        <p:tgtEl>
+                                          <p:spTgt spid="5">
+                                            <p:txEl>
+                                              <p:pRg st="18" end="18"/>
+                                            </p:txEl>
+                                          </p:spTgt>
+                                        </p:tgtEl>
+                                        <p:attrNameLst>
+                                          <p:attrName>ppt_y</p:attrName>
+                                        </p:attrNameLst>
+                                      </p:cBhvr>
+                                      <p:tavLst>
+                                        <p:tav tm="0">
+                                          <p:val>
+                                            <p:strVal val="1+#ppt_h/2"/>
+                                          </p:val>
+                                        </p:tav>
+                                        <p:tav tm="100000">
+                                          <p:val>
+                                            <p:strVal val="#ppt_y"/>
+                                          </p:val>
+                                        </p:tav>
+                                      </p:tavLst>
+                                    </p:anim>
+                                  </p:childTnLst>
+                                </p:cTn>
+                              </p:par>
+                              <p:par>
+                                <p:cTn id="85" presetID="2" presetClass="entr" presetSubtype="4" fill="hold" grpId="0" nodeType="withEffect">
+                                  <p:stCondLst>
+                                    <p:cond delay="0"/>
+                                  </p:stCondLst>
+                                  <p:childTnLst>
+                                    <p:set>
+                                      <p:cBhvr>
+                                        <p:cTn id="86" dur="1" fill="hold">
+                                          <p:stCondLst>
+                                            <p:cond delay="0"/>
+                                          </p:stCondLst>
+                                        </p:cTn>
+                                        <p:tgtEl>
+                                          <p:spTgt spid="5">
+                                            <p:txEl>
+                                              <p:pRg st="19" end="19"/>
+                                            </p:txEl>
+                                          </p:spTgt>
+                                        </p:tgtEl>
+                                        <p:attrNameLst>
+                                          <p:attrName>style.visibility</p:attrName>
+                                        </p:attrNameLst>
+                                      </p:cBhvr>
+                                      <p:to>
+                                        <p:strVal val="visible"/>
+                                      </p:to>
+                                    </p:set>
+                                    <p:anim calcmode="lin" valueType="num">
+                                      <p:cBhvr additive="base">
+                                        <p:cTn id="87" dur="500" fill="hold"/>
+                                        <p:tgtEl>
+                                          <p:spTgt spid="5">
+                                            <p:txEl>
+                                              <p:pRg st="19" end="19"/>
+                                            </p:txEl>
+                                          </p:spTgt>
+                                        </p:tgtEl>
+                                        <p:attrNameLst>
+                                          <p:attrName>ppt_x</p:attrName>
+                                        </p:attrNameLst>
+                                      </p:cBhvr>
+                                      <p:tavLst>
+                                        <p:tav tm="0">
+                                          <p:val>
+                                            <p:strVal val="#ppt_x"/>
+                                          </p:val>
+                                        </p:tav>
+                                        <p:tav tm="100000">
+                                          <p:val>
+                                            <p:strVal val="#ppt_x"/>
+                                          </p:val>
+                                        </p:tav>
+                                      </p:tavLst>
+                                    </p:anim>
+                                    <p:anim calcmode="lin" valueType="num">
+                                      <p:cBhvr additive="base">
+                                        <p:cTn id="88" dur="500" fill="hold"/>
+                                        <p:tgtEl>
+                                          <p:spTgt spid="5">
+                                            <p:txEl>
+                                              <p:pRg st="19" end="19"/>
+                                            </p:txEl>
+                                          </p:spTgt>
+                                        </p:tgtEl>
+                                        <p:attrNameLst>
+                                          <p:attrName>ppt_y</p:attrName>
+                                        </p:attrNameLst>
+                                      </p:cBhvr>
+                                      <p:tavLst>
+                                        <p:tav tm="0">
+                                          <p:val>
+                                            <p:strVal val="1+#ppt_h/2"/>
+                                          </p:val>
+                                        </p:tav>
+                                        <p:tav tm="100000">
+                                          <p:val>
+                                            <p:strVal val="#ppt_y"/>
+                                          </p:val>
+                                        </p:tav>
+                                      </p:tavLst>
+                                    </p:anim>
+                                  </p:childTnLst>
+                                </p:cTn>
+                              </p:par>
+                              <p:par>
+                                <p:cTn id="89" presetID="2" presetClass="entr" presetSubtype="4" fill="hold" grpId="0" nodeType="withEffect">
+                                  <p:stCondLst>
+                                    <p:cond delay="0"/>
+                                  </p:stCondLst>
+                                  <p:childTnLst>
+                                    <p:set>
+                                      <p:cBhvr>
+                                        <p:cTn id="90" dur="1" fill="hold">
+                                          <p:stCondLst>
+                                            <p:cond delay="0"/>
+                                          </p:stCondLst>
+                                        </p:cTn>
+                                        <p:tgtEl>
+                                          <p:spTgt spid="5">
+                                            <p:txEl>
+                                              <p:pRg st="20" end="20"/>
+                                            </p:txEl>
+                                          </p:spTgt>
+                                        </p:tgtEl>
+                                        <p:attrNameLst>
+                                          <p:attrName>style.visibility</p:attrName>
+                                        </p:attrNameLst>
+                                      </p:cBhvr>
+                                      <p:to>
+                                        <p:strVal val="visible"/>
+                                      </p:to>
+                                    </p:set>
+                                    <p:anim calcmode="lin" valueType="num">
+                                      <p:cBhvr additive="base">
+                                        <p:cTn id="91" dur="500" fill="hold"/>
+                                        <p:tgtEl>
+                                          <p:spTgt spid="5">
+                                            <p:txEl>
+                                              <p:pRg st="20" end="20"/>
+                                            </p:txEl>
+                                          </p:spTgt>
+                                        </p:tgtEl>
+                                        <p:attrNameLst>
+                                          <p:attrName>ppt_x</p:attrName>
+                                        </p:attrNameLst>
+                                      </p:cBhvr>
+                                      <p:tavLst>
+                                        <p:tav tm="0">
+                                          <p:val>
+                                            <p:strVal val="#ppt_x"/>
+                                          </p:val>
+                                        </p:tav>
+                                        <p:tav tm="100000">
+                                          <p:val>
+                                            <p:strVal val="#ppt_x"/>
+                                          </p:val>
+                                        </p:tav>
+                                      </p:tavLst>
+                                    </p:anim>
+                                    <p:anim calcmode="lin" valueType="num">
+                                      <p:cBhvr additive="base">
+                                        <p:cTn id="92" dur="500" fill="hold"/>
+                                        <p:tgtEl>
+                                          <p:spTgt spid="5">
+                                            <p:txEl>
+                                              <p:pRg st="20" end="20"/>
+                                            </p:txEl>
+                                          </p:spTgt>
+                                        </p:tgtEl>
+                                        <p:attrNameLst>
+                                          <p:attrName>ppt_y</p:attrName>
+                                        </p:attrNameLst>
+                                      </p:cBhvr>
+                                      <p:tavLst>
+                                        <p:tav tm="0">
+                                          <p:val>
+                                            <p:strVal val="1+#ppt_h/2"/>
+                                          </p:val>
+                                        </p:tav>
+                                        <p:tav tm="100000">
+                                          <p:val>
+                                            <p:strVal val="#ppt_y"/>
+                                          </p:val>
+                                        </p:tav>
+                                      </p:tavLst>
+                                    </p:anim>
+                                  </p:childTnLst>
+                                </p:cTn>
+                              </p:par>
+                              <p:par>
+                                <p:cTn id="93" presetID="2" presetClass="entr" presetSubtype="4" fill="hold" grpId="0" nodeType="withEffect">
+                                  <p:stCondLst>
+                                    <p:cond delay="0"/>
+                                  </p:stCondLst>
+                                  <p:childTnLst>
+                                    <p:set>
+                                      <p:cBhvr>
+                                        <p:cTn id="94" dur="1" fill="hold">
+                                          <p:stCondLst>
+                                            <p:cond delay="0"/>
+                                          </p:stCondLst>
+                                        </p:cTn>
+                                        <p:tgtEl>
+                                          <p:spTgt spid="5">
+                                            <p:txEl>
+                                              <p:pRg st="21" end="21"/>
+                                            </p:txEl>
+                                          </p:spTgt>
+                                        </p:tgtEl>
+                                        <p:attrNameLst>
+                                          <p:attrName>style.visibility</p:attrName>
+                                        </p:attrNameLst>
+                                      </p:cBhvr>
+                                      <p:to>
+                                        <p:strVal val="visible"/>
+                                      </p:to>
+                                    </p:set>
+                                    <p:anim calcmode="lin" valueType="num">
+                                      <p:cBhvr additive="base">
+                                        <p:cTn id="95" dur="500" fill="hold"/>
+                                        <p:tgtEl>
+                                          <p:spTgt spid="5">
+                                            <p:txEl>
+                                              <p:pRg st="21" end="21"/>
+                                            </p:txEl>
+                                          </p:spTgt>
+                                        </p:tgtEl>
+                                        <p:attrNameLst>
+                                          <p:attrName>ppt_x</p:attrName>
+                                        </p:attrNameLst>
+                                      </p:cBhvr>
+                                      <p:tavLst>
+                                        <p:tav tm="0">
+                                          <p:val>
+                                            <p:strVal val="#ppt_x"/>
+                                          </p:val>
+                                        </p:tav>
+                                        <p:tav tm="100000">
+                                          <p:val>
+                                            <p:strVal val="#ppt_x"/>
+                                          </p:val>
+                                        </p:tav>
+                                      </p:tavLst>
+                                    </p:anim>
+                                    <p:anim calcmode="lin" valueType="num">
+                                      <p:cBhvr additive="base">
+                                        <p:cTn id="96" dur="500" fill="hold"/>
+                                        <p:tgtEl>
+                                          <p:spTgt spid="5">
+                                            <p:txEl>
+                                              <p:pRg st="21" end="21"/>
+                                            </p:txEl>
+                                          </p:spTgt>
+                                        </p:tgtEl>
+                                        <p:attrNameLst>
+                                          <p:attrName>ppt_y</p:attrName>
+                                        </p:attrNameLst>
+                                      </p:cBhvr>
+                                      <p:tavLst>
+                                        <p:tav tm="0">
+                                          <p:val>
+                                            <p:strVal val="1+#ppt_h/2"/>
+                                          </p:val>
+                                        </p:tav>
+                                        <p:tav tm="100000">
+                                          <p:val>
+                                            <p:strVal val="#ppt_y"/>
+                                          </p:val>
+                                        </p:tav>
+                                      </p:tavLst>
+                                    </p:anim>
+                                  </p:childTnLst>
+                                </p:cTn>
+                              </p:par>
+                              <p:par>
+                                <p:cTn id="97" presetID="2" presetClass="entr" presetSubtype="4" fill="hold" grpId="0" nodeType="withEffect">
+                                  <p:stCondLst>
+                                    <p:cond delay="0"/>
+                                  </p:stCondLst>
+                                  <p:childTnLst>
+                                    <p:set>
+                                      <p:cBhvr>
+                                        <p:cTn id="98" dur="1" fill="hold">
+                                          <p:stCondLst>
+                                            <p:cond delay="0"/>
+                                          </p:stCondLst>
+                                        </p:cTn>
+                                        <p:tgtEl>
+                                          <p:spTgt spid="5">
+                                            <p:txEl>
+                                              <p:pRg st="22" end="22"/>
+                                            </p:txEl>
+                                          </p:spTgt>
+                                        </p:tgtEl>
+                                        <p:attrNameLst>
+                                          <p:attrName>style.visibility</p:attrName>
+                                        </p:attrNameLst>
+                                      </p:cBhvr>
+                                      <p:to>
+                                        <p:strVal val="visible"/>
+                                      </p:to>
+                                    </p:set>
+                                    <p:anim calcmode="lin" valueType="num">
+                                      <p:cBhvr additive="base">
+                                        <p:cTn id="99" dur="500" fill="hold"/>
+                                        <p:tgtEl>
+                                          <p:spTgt spid="5">
+                                            <p:txEl>
+                                              <p:pRg st="22" end="22"/>
+                                            </p:txEl>
+                                          </p:spTgt>
+                                        </p:tgtEl>
+                                        <p:attrNameLst>
+                                          <p:attrName>ppt_x</p:attrName>
+                                        </p:attrNameLst>
+                                      </p:cBhvr>
+                                      <p:tavLst>
+                                        <p:tav tm="0">
+                                          <p:val>
+                                            <p:strVal val="#ppt_x"/>
+                                          </p:val>
+                                        </p:tav>
+                                        <p:tav tm="100000">
+                                          <p:val>
+                                            <p:strVal val="#ppt_x"/>
+                                          </p:val>
+                                        </p:tav>
+                                      </p:tavLst>
+                                    </p:anim>
+                                    <p:anim calcmode="lin" valueType="num">
+                                      <p:cBhvr additive="base">
+                                        <p:cTn id="100" dur="500" fill="hold"/>
+                                        <p:tgtEl>
+                                          <p:spTgt spid="5">
+                                            <p:txEl>
+                                              <p:pRg st="22" end="22"/>
+                                            </p:txEl>
+                                          </p:spTgt>
+                                        </p:tgtEl>
+                                        <p:attrNameLst>
+                                          <p:attrName>ppt_y</p:attrName>
+                                        </p:attrNameLst>
+                                      </p:cBhvr>
+                                      <p:tavLst>
+                                        <p:tav tm="0">
+                                          <p:val>
+                                            <p:strVal val="1+#ppt_h/2"/>
+                                          </p:val>
+                                        </p:tav>
+                                        <p:tav tm="100000">
+                                          <p:val>
+                                            <p:strVal val="#ppt_y"/>
+                                          </p:val>
+                                        </p:tav>
+                                      </p:tavLst>
+                                    </p:anim>
+                                  </p:childTnLst>
+                                </p:cTn>
+                              </p:par>
+                              <p:par>
+                                <p:cTn id="101" presetID="2" presetClass="entr" presetSubtype="4" fill="hold" grpId="0" nodeType="withEffect">
+                                  <p:stCondLst>
+                                    <p:cond delay="0"/>
+                                  </p:stCondLst>
+                                  <p:childTnLst>
+                                    <p:set>
+                                      <p:cBhvr>
+                                        <p:cTn id="102" dur="1" fill="hold">
+                                          <p:stCondLst>
+                                            <p:cond delay="0"/>
+                                          </p:stCondLst>
+                                        </p:cTn>
+                                        <p:tgtEl>
+                                          <p:spTgt spid="5">
+                                            <p:txEl>
+                                              <p:pRg st="23" end="23"/>
+                                            </p:txEl>
+                                          </p:spTgt>
+                                        </p:tgtEl>
+                                        <p:attrNameLst>
+                                          <p:attrName>style.visibility</p:attrName>
+                                        </p:attrNameLst>
+                                      </p:cBhvr>
+                                      <p:to>
+                                        <p:strVal val="visible"/>
+                                      </p:to>
+                                    </p:set>
+                                    <p:anim calcmode="lin" valueType="num">
+                                      <p:cBhvr additive="base">
+                                        <p:cTn id="103" dur="500" fill="hold"/>
+                                        <p:tgtEl>
+                                          <p:spTgt spid="5">
+                                            <p:txEl>
+                                              <p:pRg st="23" end="23"/>
+                                            </p:txEl>
+                                          </p:spTgt>
+                                        </p:tgtEl>
+                                        <p:attrNameLst>
+                                          <p:attrName>ppt_x</p:attrName>
+                                        </p:attrNameLst>
+                                      </p:cBhvr>
+                                      <p:tavLst>
+                                        <p:tav tm="0">
+                                          <p:val>
+                                            <p:strVal val="#ppt_x"/>
+                                          </p:val>
+                                        </p:tav>
+                                        <p:tav tm="100000">
+                                          <p:val>
+                                            <p:strVal val="#ppt_x"/>
+                                          </p:val>
+                                        </p:tav>
+                                      </p:tavLst>
+                                    </p:anim>
+                                    <p:anim calcmode="lin" valueType="num">
+                                      <p:cBhvr additive="base">
+                                        <p:cTn id="104" dur="500" fill="hold"/>
+                                        <p:tgtEl>
+                                          <p:spTgt spid="5">
+                                            <p:txEl>
+                                              <p:pRg st="23" end="23"/>
+                                            </p:txEl>
+                                          </p:spTgt>
+                                        </p:tgtEl>
+                                        <p:attrNameLst>
+                                          <p:attrName>ppt_y</p:attrName>
+                                        </p:attrNameLst>
+                                      </p:cBhvr>
+                                      <p:tavLst>
+                                        <p:tav tm="0">
+                                          <p:val>
+                                            <p:strVal val="1+#ppt_h/2"/>
+                                          </p:val>
+                                        </p:tav>
+                                        <p:tav tm="100000">
+                                          <p:val>
+                                            <p:strVal val="#ppt_y"/>
+                                          </p:val>
+                                        </p:tav>
+                                      </p:tavLst>
+                                    </p:anim>
+                                  </p:childTnLst>
+                                </p:cTn>
+                              </p:par>
+                            </p:childTnLst>
+                          </p:cTn>
+                        </p:par>
+                      </p:childTnLst>
+                    </p:cTn>
+                  </p:par>
+                </p:childTnLst>
+              </p:cTn>
+              <p:prevCondLst>
+                <p:cond evt="onPrev" delay="0">
+                  <p:tgtEl>
+                    <p:sldTgt/>
+                  </p:tgtEl>
+                </p:cond>
+              </p:prevCondLst>
+              <p:nextCondLst>
+                <p:cond evt="onNext" delay="0">
+                  <p:tgtEl>
+                    <p:sldTgt/>
+                  </p:tgtEl>
+                </p:cond>
+              </p:nextCondLst>
+            </p:seq>
+          </p:childTnLst>
+        </p:cTn>
+      </p:par>
+    </p:tnLst>
+    <p:bldLst>
+      <p:bldP spid="5" grpId="0" build="allAtOnce" animBg="1"/>
+    </p:bldLst>
+  </p:timing>
 </p:sld>
 </file>
 

</xml_diff>

<commit_message>
Update slide deck for VS 2017RC3 updates
</commit_message>
<xml_diff>
--- a/EfCoreGettingStarted.pptx
+++ b/EfCoreGettingStarted.pptx
@@ -143,6 +143,31 @@
   </mc:AlternateContent>
   <c:chart>
     <c:title>
+      <c:tx>
+        <c:rich>
+          <a:bodyPr rot="0" spcFirstLastPara="1" vertOverflow="ellipsis" vert="horz" wrap="square" anchor="ctr" anchorCtr="1"/>
+          <a:lstStyle/>
+          <a:p>
+            <a:pPr>
+              <a:defRPr sz="1862" b="0" i="0" u="none" strike="noStrike" kern="1200" spc="0" baseline="0">
+                <a:solidFill>
+                  <a:schemeClr val="tx1">
+                    <a:lumMod val="65000"/>
+                    <a:lumOff val="35000"/>
+                  </a:schemeClr>
+                </a:solidFill>
+                <a:latin typeface="+mn-lt"/>
+                <a:ea typeface="+mn-ea"/>
+                <a:cs typeface="+mn-cs"/>
+              </a:defRPr>
+            </a:pPr>
+            <a:r>
+              <a:rPr lang="en-US" dirty="0"/>
+              <a:t>EF 6 vs EF Core performance</a:t>
+            </a:r>
+          </a:p>
+        </c:rich>
+      </c:tx>
       <c:overlay val="0"/>
       <c:spPr>
         <a:noFill/>
@@ -2875,8 +2900,8 @@
     <dgm:cxn modelId="{2773F7BE-438D-44C6-99F1-65D3180A5062}" srcId="{68D1C401-DF17-42EB-8F32-CB92EDBA7007}" destId="{83C8A754-B822-4C27-9268-26FE57AF5D97}" srcOrd="7" destOrd="0" parTransId="{A280CD56-18C5-465C-AD04-7575F280AC93}" sibTransId="{155D2122-BF99-4AD8-8BDB-9DCD9CB6927D}"/>
     <dgm:cxn modelId="{3AF8B1C2-837C-460A-8AA0-1824D0FB3E13}" type="presOf" srcId="{C252FC51-5E1F-40A7-BC68-395DAB3BC9F4}" destId="{8D6D6A04-763C-4908-8FF2-39B3F47F9F35}" srcOrd="0" destOrd="0" presId="urn:microsoft.com/office/officeart/2005/8/layout/lProcess2"/>
     <dgm:cxn modelId="{C38D4348-32F1-4B0A-8A73-A03CD40BFD91}" srcId="{68D1C401-DF17-42EB-8F32-CB92EDBA7007}" destId="{5A812A78-3E5F-4B61-BCEF-2C4345424D82}" srcOrd="0" destOrd="0" parTransId="{00575E82-767A-4E34-AF13-4A6C499BB5EF}" sibTransId="{351D49FB-F048-4693-A7DC-EDA4A8DCE645}"/>
+    <dgm:cxn modelId="{3DE05BDD-7EB3-4A34-B18E-51C9756F63B5}" srcId="{68D1C401-DF17-42EB-8F32-CB92EDBA7007}" destId="{A91E1B38-47E8-4617-83FA-B809FE15EC4B}" srcOrd="6" destOrd="0" parTransId="{E9296D2E-67C5-4A5F-991E-87DEEF1135B2}" sibTransId="{B9CC2752-2DF6-4320-AE39-E3C9DD7C2FB2}"/>
     <dgm:cxn modelId="{B5218934-1A9B-4774-9882-1DCCCAD38343}" type="presOf" srcId="{AF18FC50-02CA-4C7F-AAB4-B98DAC64CC0B}" destId="{78113A9F-FE14-4428-96CA-9A0C4D6C3ADA}" srcOrd="0" destOrd="0" presId="urn:microsoft.com/office/officeart/2005/8/layout/lProcess2"/>
-    <dgm:cxn modelId="{3DE05BDD-7EB3-4A34-B18E-51C9756F63B5}" srcId="{68D1C401-DF17-42EB-8F32-CB92EDBA7007}" destId="{A91E1B38-47E8-4617-83FA-B809FE15EC4B}" srcOrd="6" destOrd="0" parTransId="{E9296D2E-67C5-4A5F-991E-87DEEF1135B2}" sibTransId="{B9CC2752-2DF6-4320-AE39-E3C9DD7C2FB2}"/>
     <dgm:cxn modelId="{BEB4AD18-7319-4120-9639-8D5D5D1A63CF}" type="presOf" srcId="{3F14B24A-D8DC-46A9-8F24-5BEB8A497FD6}" destId="{4C68117D-1B78-4E72-B96B-76D4AAA8557F}" srcOrd="0" destOrd="0" presId="urn:microsoft.com/office/officeart/2005/8/layout/lProcess2"/>
     <dgm:cxn modelId="{7DCAB4A5-302A-4E48-90B2-02759C32BAD8}" srcId="{ABA6DD42-C577-4FA2-B745-CBC55F43B96D}" destId="{5993BDE7-0125-4E15-93F4-BB63E1ADBC8E}" srcOrd="0" destOrd="0" parTransId="{3F49B832-7DC9-4686-874F-5024F7913C35}" sibTransId="{5EB2ACE5-0BEC-4D1C-A0AB-78D532A40282}"/>
     <dgm:cxn modelId="{9FAC54C4-C4F9-4FB0-9E13-789A208C5525}" type="presOf" srcId="{ABA6DD42-C577-4FA2-B745-CBC55F43B96D}" destId="{A87CD1EF-3738-4FDC-A4C5-A253578E43C6}" srcOrd="1" destOrd="0" presId="urn:microsoft.com/office/officeart/2005/8/layout/lProcess2"/>
@@ -6283,7 +6308,7 @@
           <a:p>
             <a:fld id="{28763278-E906-4118-802D-5C795C8A9976}" type="datetimeFigureOut">
               <a:rPr lang="en-US" smtClean="0"/>
-              <a:t>10/29/2016</a:t>
+              <a:t>2/8/2017</a:t>
             </a:fld>
             <a:endParaRPr lang="en-US"/>
           </a:p>
@@ -7040,7 +7065,7 @@
           <a:p>
             <a:fld id="{F4E58F4B-C394-4BCA-8CBA-0EA8C6D27B86}" type="datetimeFigureOut">
               <a:rPr lang="en-US" smtClean="0"/>
-              <a:t>10/29/2016</a:t>
+              <a:t>2/8/2017</a:t>
             </a:fld>
             <a:endParaRPr lang="en-US"/>
           </a:p>
@@ -7210,7 +7235,7 @@
           <a:p>
             <a:fld id="{F4E58F4B-C394-4BCA-8CBA-0EA8C6D27B86}" type="datetimeFigureOut">
               <a:rPr lang="en-US" smtClean="0"/>
-              <a:t>10/29/2016</a:t>
+              <a:t>2/8/2017</a:t>
             </a:fld>
             <a:endParaRPr lang="en-US"/>
           </a:p>
@@ -7433,7 +7458,7 @@
           <a:p>
             <a:fld id="{F4E58F4B-C394-4BCA-8CBA-0EA8C6D27B86}" type="datetimeFigureOut">
               <a:rPr lang="en-US" smtClean="0"/>
-              <a:t>10/29/2016</a:t>
+              <a:t>2/8/2017</a:t>
             </a:fld>
             <a:endParaRPr lang="en-US"/>
           </a:p>
@@ -7613,7 +7638,7 @@
           <a:p>
             <a:fld id="{F4E58F4B-C394-4BCA-8CBA-0EA8C6D27B86}" type="datetimeFigureOut">
               <a:rPr lang="en-US" smtClean="0"/>
-              <a:t>10/29/2016</a:t>
+              <a:t>2/8/2017</a:t>
             </a:fld>
             <a:endParaRPr lang="en-US"/>
           </a:p>
@@ -7919,7 +7944,7 @@
           <a:p>
             <a:fld id="{F4E58F4B-C394-4BCA-8CBA-0EA8C6D27B86}" type="datetimeFigureOut">
               <a:rPr lang="en-US" smtClean="0"/>
-              <a:t>10/29/2016</a:t>
+              <a:t>2/8/2017</a:t>
             </a:fld>
             <a:endParaRPr lang="en-US"/>
           </a:p>
@@ -8223,7 +8248,7 @@
           <a:p>
             <a:fld id="{F4E58F4B-C394-4BCA-8CBA-0EA8C6D27B86}" type="datetimeFigureOut">
               <a:rPr lang="en-US" smtClean="0"/>
-              <a:t>10/29/2016</a:t>
+              <a:t>2/8/2017</a:t>
             </a:fld>
             <a:endParaRPr lang="en-US"/>
           </a:p>
@@ -8645,7 +8670,7 @@
           <a:p>
             <a:fld id="{F4E58F4B-C394-4BCA-8CBA-0EA8C6D27B86}" type="datetimeFigureOut">
               <a:rPr lang="en-US" smtClean="0"/>
-              <a:t>10/29/2016</a:t>
+              <a:t>2/8/2017</a:t>
             </a:fld>
             <a:endParaRPr lang="en-US"/>
           </a:p>
@@ -8763,7 +8788,7 @@
           <a:p>
             <a:fld id="{F4E58F4B-C394-4BCA-8CBA-0EA8C6D27B86}" type="datetimeFigureOut">
               <a:rPr lang="en-US" smtClean="0"/>
-              <a:t>10/29/2016</a:t>
+              <a:t>2/8/2017</a:t>
             </a:fld>
             <a:endParaRPr lang="en-US"/>
           </a:p>
@@ -8858,7 +8883,7 @@
           <a:p>
             <a:fld id="{F4E58F4B-C394-4BCA-8CBA-0EA8C6D27B86}" type="datetimeFigureOut">
               <a:rPr lang="en-US" smtClean="0"/>
-              <a:t>10/29/2016</a:t>
+              <a:t>2/8/2017</a:t>
             </a:fld>
             <a:endParaRPr lang="en-US"/>
           </a:p>
@@ -9131,7 +9156,7 @@
           <a:p>
             <a:fld id="{F4E58F4B-C394-4BCA-8CBA-0EA8C6D27B86}" type="datetimeFigureOut">
               <a:rPr lang="en-US" smtClean="0"/>
-              <a:t>10/29/2016</a:t>
+              <a:t>2/8/2017</a:t>
             </a:fld>
             <a:endParaRPr lang="en-US"/>
           </a:p>
@@ -9396,7 +9421,7 @@
           <a:p>
             <a:fld id="{F4E58F4B-C394-4BCA-8CBA-0EA8C6D27B86}" type="datetimeFigureOut">
               <a:rPr lang="en-US" smtClean="0"/>
-              <a:t>10/29/2016</a:t>
+              <a:t>2/8/2017</a:t>
             </a:fld>
             <a:endParaRPr lang="en-US"/>
           </a:p>
@@ -9645,7 +9670,7 @@
           <a:p>
             <a:fld id="{F4E58F4B-C394-4BCA-8CBA-0EA8C6D27B86}" type="datetimeFigureOut">
               <a:rPr lang="en-US" smtClean="0"/>
-              <a:t>10/29/2016</a:t>
+              <a:t>2/8/2017</a:t>
             </a:fld>
             <a:endParaRPr lang="en-US"/>
           </a:p>
@@ -11338,12 +11363,9 @@
           <a:p>
             <a:r>
               <a:rPr lang="en-US" dirty="0"/>
-              <a:t>https://blogs.msdn.microsoft.com/dotnet/2016/10/25/announcing-entity-framework-core-1-1-preview-1/</a:t>
-            </a:r>
-            <a:r>
-              <a:rPr lang="en-US" dirty="0"/>
-              <a:t> </a:t>
-            </a:r>
+              <a:t>https://blogs.msdn.microsoft.com/dotnet/2016/11/16/announcing-entity-framework-core-1-1/</a:t>
+            </a:r>
+            <a:endParaRPr lang="en-US" dirty="0"/>
           </a:p>
         </p:txBody>
       </p:sp>
@@ -12111,646 +12133,6 @@
       </p:sp>
       <p:sp>
         <p:nvSpPr>
-          <p:cNvPr id="4" name="Rectangle 2"/>
-          <p:cNvSpPr>
-            <a:spLocks noGrp="1" noChangeArrowheads="1"/>
-          </p:cNvSpPr>
-          <p:nvPr>
-            <p:ph idx="1"/>
-          </p:nvPr>
-        </p:nvSpPr>
-        <p:spPr bwMode="auto">
-          <a:xfrm>
-            <a:off x="619760" y="2837527"/>
-            <a:ext cx="10943072" cy="2554545"/>
-          </a:xfrm>
-          <a:prstGeom prst="rect">
-            <a:avLst/>
-          </a:prstGeom>
-          <a:solidFill>
-            <a:srgbClr val="FFFFFF"/>
-          </a:solidFill>
-          <a:ln>
-            <a:noFill/>
-          </a:ln>
-          <a:effectLst/>
-          <a:extLst>
-            <a:ext uri="{91240B29-F687-4F45-9708-019B960494DF}">
-              <a14:hiddenLine xmlns:a14="http://schemas.microsoft.com/office/drawing/2010/main" w="9525">
-                <a:solidFill>
-                  <a:schemeClr val="tx1"/>
-                </a:solidFill>
-                <a:miter lim="800000"/>
-                <a:headEnd/>
-                <a:tailEnd/>
-              </a14:hiddenLine>
-            </a:ext>
-            <a:ext uri="{AF507438-7753-43E0-B8FC-AC1667EBCBE1}">
-              <a14:hiddenEffects xmlns:a14="http://schemas.microsoft.com/office/drawing/2010/main">
-                <a:effectLst>
-                  <a:outerShdw dist="35921" dir="2700000" algn="ctr" rotWithShape="0">
-                    <a:schemeClr val="bg2"/>
-                  </a:outerShdw>
-                </a:effectLst>
-              </a14:hiddenEffects>
-            </a:ext>
-          </a:extLst>
-        </p:spPr>
-        <p:txBody>
-          <a:bodyPr vert="horz" wrap="square" lIns="91440" tIns="45720" rIns="91440" bIns="45720" numCol="1" anchor="ctr" anchorCtr="0" compatLnSpc="1">
-            <a:prstTxWarp prst="textNoShape">
-              <a:avLst/>
-            </a:prstTxWarp>
-            <a:spAutoFit/>
-          </a:bodyPr>
-          <a:lstStyle/>
-          <a:p>
-            <a:pPr marL="0" marR="0" lvl="0" indent="0" algn="l" defTabSz="914400" rtl="0" eaLnBrk="0" fontAlgn="base" latinLnBrk="0" hangingPunct="0">
-              <a:lnSpc>
-                <a:spcPct val="100000"/>
-              </a:lnSpc>
-              <a:spcBef>
-                <a:spcPct val="0"/>
-              </a:spcBef>
-              <a:spcAft>
-                <a:spcPct val="0"/>
-              </a:spcAft>
-              <a:buClrTx/>
-              <a:buSzTx/>
-              <a:buFontTx/>
-              <a:buNone/>
-              <a:tabLst/>
-            </a:pPr>
-            <a:r>
-              <a:rPr kumimoji="0" lang="en-US" altLang="en-US" sz="2000" b="0" i="0" u="none" strike="noStrike" cap="none" normalizeH="0" baseline="0" dirty="0">
-                <a:ln>
-                  <a:noFill/>
-                </a:ln>
-                <a:solidFill>
-                  <a:srgbClr val="2E75B6"/>
-                </a:solidFill>
-                <a:effectLst/>
-                <a:latin typeface="Consolas" panose="020B0609020204030204" pitchFamily="49" charset="0"/>
-              </a:rPr>
-              <a:t>"dependencies"</a:t>
-            </a:r>
-            <a:r>
-              <a:rPr kumimoji="0" lang="en-US" altLang="en-US" sz="2000" b="0" i="0" u="none" strike="noStrike" cap="none" normalizeH="0" baseline="0" dirty="0">
-                <a:ln>
-                  <a:noFill/>
-                </a:ln>
-                <a:solidFill>
-                  <a:srgbClr val="000000"/>
-                </a:solidFill>
-                <a:effectLst/>
-                <a:latin typeface="Consolas" panose="020B0609020204030204" pitchFamily="49" charset="0"/>
-              </a:rPr>
-              <a:t>: {</a:t>
-            </a:r>
-          </a:p>
-          <a:p>
-            <a:pPr marL="0" marR="0" lvl="0" indent="0" algn="l" defTabSz="914400" rtl="0" eaLnBrk="0" fontAlgn="base" latinLnBrk="0" hangingPunct="0">
-              <a:lnSpc>
-                <a:spcPct val="100000"/>
-              </a:lnSpc>
-              <a:spcBef>
-                <a:spcPct val="0"/>
-              </a:spcBef>
-              <a:spcAft>
-                <a:spcPct val="0"/>
-              </a:spcAft>
-              <a:buClrTx/>
-              <a:buSzTx/>
-              <a:buFontTx/>
-              <a:buNone/>
-              <a:tabLst/>
-            </a:pPr>
-            <a:r>
-              <a:rPr kumimoji="0" lang="en-US" altLang="en-US" sz="2000" b="0" i="0" u="none" strike="noStrike" cap="none" normalizeH="0" baseline="0" dirty="0">
-                <a:ln>
-                  <a:noFill/>
-                </a:ln>
-                <a:solidFill>
-                  <a:srgbClr val="000000"/>
-                </a:solidFill>
-                <a:effectLst/>
-                <a:latin typeface="Consolas" panose="020B0609020204030204" pitchFamily="49" charset="0"/>
-              </a:rPr>
-              <a:t>   </a:t>
-            </a:r>
-            <a:r>
-              <a:rPr kumimoji="0" lang="en-US" altLang="en-US" sz="2000" b="0" i="0" u="none" strike="noStrike" cap="none" normalizeH="0" baseline="0" dirty="0">
-                <a:ln>
-                  <a:noFill/>
-                </a:ln>
-                <a:solidFill>
-                  <a:srgbClr val="2E75B6"/>
-                </a:solidFill>
-                <a:effectLst/>
-                <a:latin typeface="Consolas" panose="020B0609020204030204" pitchFamily="49" charset="0"/>
-              </a:rPr>
-              <a:t>"</a:t>
-            </a:r>
-            <a:r>
-              <a:rPr kumimoji="0" lang="en-US" altLang="en-US" sz="2000" b="0" i="0" u="none" strike="noStrike" cap="none" normalizeH="0" baseline="0" dirty="0" err="1">
-                <a:ln>
-                  <a:noFill/>
-                </a:ln>
-                <a:solidFill>
-                  <a:srgbClr val="2E75B6"/>
-                </a:solidFill>
-                <a:effectLst/>
-                <a:latin typeface="Consolas" panose="020B0609020204030204" pitchFamily="49" charset="0"/>
-              </a:rPr>
-              <a:t>Microsoft.EntityFrameworkCore.Design</a:t>
-            </a:r>
-            <a:r>
-              <a:rPr kumimoji="0" lang="en-US" altLang="en-US" sz="2000" b="0" i="0" u="none" strike="noStrike" cap="none" normalizeH="0" baseline="0" dirty="0">
-                <a:ln>
-                  <a:noFill/>
-                </a:ln>
-                <a:solidFill>
-                  <a:srgbClr val="2E75B6"/>
-                </a:solidFill>
-                <a:effectLst/>
-                <a:latin typeface="Consolas" panose="020B0609020204030204" pitchFamily="49" charset="0"/>
-              </a:rPr>
-              <a:t>"</a:t>
-            </a:r>
-            <a:r>
-              <a:rPr kumimoji="0" lang="en-US" altLang="en-US" sz="2000" b="0" i="0" u="none" strike="noStrike" cap="none" normalizeH="0" baseline="0" dirty="0">
-                <a:ln>
-                  <a:noFill/>
-                </a:ln>
-                <a:solidFill>
-                  <a:srgbClr val="000000"/>
-                </a:solidFill>
-                <a:effectLst/>
-                <a:latin typeface="Consolas" panose="020B0609020204030204" pitchFamily="49" charset="0"/>
-              </a:rPr>
-              <a:t>: </a:t>
-            </a:r>
-            <a:r>
-              <a:rPr kumimoji="0" lang="en-US" altLang="en-US" sz="2000" b="0" i="0" u="none" strike="noStrike" cap="none" normalizeH="0" baseline="0" dirty="0">
-                <a:ln>
-                  <a:noFill/>
-                </a:ln>
-                <a:solidFill>
-                  <a:srgbClr val="A31515"/>
-                </a:solidFill>
-                <a:effectLst/>
-                <a:latin typeface="Consolas" panose="020B0609020204030204" pitchFamily="49" charset="0"/>
-              </a:rPr>
-              <a:t>"1.0.0-preview2-final"</a:t>
-            </a:r>
-            <a:r>
-              <a:rPr kumimoji="0" lang="en-US" altLang="en-US" sz="2000" b="0" i="0" u="none" strike="noStrike" cap="none" normalizeH="0" baseline="0" dirty="0">
-                <a:ln>
-                  <a:noFill/>
-                </a:ln>
-                <a:solidFill>
-                  <a:srgbClr val="000000"/>
-                </a:solidFill>
-                <a:effectLst/>
-                <a:latin typeface="Consolas" panose="020B0609020204030204" pitchFamily="49" charset="0"/>
-              </a:rPr>
-              <a:t>,</a:t>
-            </a:r>
-          </a:p>
-          <a:p>
-            <a:pPr marL="0" marR="0" lvl="0" indent="0" algn="l" defTabSz="914400" rtl="0" eaLnBrk="0" fontAlgn="base" latinLnBrk="0" hangingPunct="0">
-              <a:lnSpc>
-                <a:spcPct val="100000"/>
-              </a:lnSpc>
-              <a:spcBef>
-                <a:spcPct val="0"/>
-              </a:spcBef>
-              <a:spcAft>
-                <a:spcPct val="0"/>
-              </a:spcAft>
-              <a:buClrTx/>
-              <a:buSzTx/>
-              <a:buFontTx/>
-              <a:buNone/>
-              <a:tabLst/>
-            </a:pPr>
-            <a:r>
-              <a:rPr kumimoji="0" lang="en-US" altLang="en-US" sz="2000" b="0" i="0" u="none" strike="noStrike" cap="none" normalizeH="0" baseline="0" dirty="0">
-                <a:ln>
-                  <a:noFill/>
-                </a:ln>
-                <a:solidFill>
-                  <a:srgbClr val="000000"/>
-                </a:solidFill>
-                <a:effectLst/>
-                <a:latin typeface="Consolas" panose="020B0609020204030204" pitchFamily="49" charset="0"/>
-              </a:rPr>
-              <a:t>   </a:t>
-            </a:r>
-            <a:r>
-              <a:rPr kumimoji="0" lang="en-US" altLang="en-US" sz="2000" b="0" i="0" u="none" strike="noStrike" cap="none" normalizeH="0" baseline="0" dirty="0">
-                <a:ln>
-                  <a:noFill/>
-                </a:ln>
-                <a:solidFill>
-                  <a:srgbClr val="2E75B6"/>
-                </a:solidFill>
-                <a:effectLst/>
-                <a:latin typeface="Consolas" panose="020B0609020204030204" pitchFamily="49" charset="0"/>
-              </a:rPr>
-              <a:t>"</a:t>
-            </a:r>
-            <a:r>
-              <a:rPr kumimoji="0" lang="en-US" altLang="en-US" sz="2000" b="0" i="0" u="none" strike="noStrike" cap="none" normalizeH="0" baseline="0" dirty="0" err="1">
-                <a:ln>
-                  <a:noFill/>
-                </a:ln>
-                <a:solidFill>
-                  <a:srgbClr val="2E75B6"/>
-                </a:solidFill>
-                <a:effectLst/>
-                <a:latin typeface="Consolas" panose="020B0609020204030204" pitchFamily="49" charset="0"/>
-              </a:rPr>
-              <a:t>Microsoft.EntityFrameworkCore.SqlServer</a:t>
-            </a:r>
-            <a:r>
-              <a:rPr kumimoji="0" lang="en-US" altLang="en-US" sz="2000" b="0" i="0" u="none" strike="noStrike" cap="none" normalizeH="0" baseline="0" dirty="0">
-                <a:ln>
-                  <a:noFill/>
-                </a:ln>
-                <a:solidFill>
-                  <a:srgbClr val="2E75B6"/>
-                </a:solidFill>
-                <a:effectLst/>
-                <a:latin typeface="Consolas" panose="020B0609020204030204" pitchFamily="49" charset="0"/>
-              </a:rPr>
-              <a:t>"</a:t>
-            </a:r>
-            <a:r>
-              <a:rPr kumimoji="0" lang="en-US" altLang="en-US" sz="2000" b="0" i="0" u="none" strike="noStrike" cap="none" normalizeH="0" baseline="0" dirty="0">
-                <a:ln>
-                  <a:noFill/>
-                </a:ln>
-                <a:solidFill>
-                  <a:srgbClr val="000000"/>
-                </a:solidFill>
-                <a:effectLst/>
-                <a:latin typeface="Consolas" panose="020B0609020204030204" pitchFamily="49" charset="0"/>
-              </a:rPr>
-              <a:t>: </a:t>
-            </a:r>
-            <a:r>
-              <a:rPr kumimoji="0" lang="en-US" altLang="en-US" sz="2000" b="0" i="0" u="none" strike="noStrike" cap="none" normalizeH="0" baseline="0" dirty="0">
-                <a:ln>
-                  <a:noFill/>
-                </a:ln>
-                <a:solidFill>
-                  <a:srgbClr val="A31515"/>
-                </a:solidFill>
-                <a:effectLst/>
-                <a:latin typeface="Consolas" panose="020B0609020204030204" pitchFamily="49" charset="0"/>
-              </a:rPr>
-              <a:t>"1.0.0"</a:t>
-            </a:r>
-            <a:r>
-              <a:rPr kumimoji="0" lang="en-US" altLang="en-US" sz="2000" b="0" i="0" u="none" strike="noStrike" cap="none" normalizeH="0" baseline="0" dirty="0">
-                <a:ln>
-                  <a:noFill/>
-                </a:ln>
-                <a:solidFill>
-                  <a:srgbClr val="000000"/>
-                </a:solidFill>
-                <a:effectLst/>
-                <a:latin typeface="Consolas" panose="020B0609020204030204" pitchFamily="49" charset="0"/>
-              </a:rPr>
-              <a:t>,</a:t>
-            </a:r>
-          </a:p>
-          <a:p>
-            <a:pPr marL="0" marR="0" lvl="0" indent="0" algn="l" defTabSz="914400" rtl="0" eaLnBrk="0" fontAlgn="base" latinLnBrk="0" hangingPunct="0">
-              <a:lnSpc>
-                <a:spcPct val="100000"/>
-              </a:lnSpc>
-              <a:spcBef>
-                <a:spcPct val="0"/>
-              </a:spcBef>
-              <a:spcAft>
-                <a:spcPct val="0"/>
-              </a:spcAft>
-              <a:buClrTx/>
-              <a:buSzTx/>
-              <a:buFontTx/>
-              <a:buNone/>
-              <a:tabLst/>
-            </a:pPr>
-            <a:r>
-              <a:rPr kumimoji="0" lang="en-US" altLang="en-US" sz="2000" b="0" i="0" u="none" strike="noStrike" cap="none" normalizeH="0" baseline="0" dirty="0">
-                <a:ln>
-                  <a:noFill/>
-                </a:ln>
-                <a:solidFill>
-                  <a:srgbClr val="000000"/>
-                </a:solidFill>
-                <a:effectLst/>
-                <a:latin typeface="Consolas" panose="020B0609020204030204" pitchFamily="49" charset="0"/>
-              </a:rPr>
-              <a:t>   </a:t>
-            </a:r>
-            <a:r>
-              <a:rPr kumimoji="0" lang="en-US" altLang="en-US" sz="2000" b="0" i="0" u="none" strike="noStrike" cap="none" normalizeH="0" baseline="0" dirty="0">
-                <a:ln>
-                  <a:noFill/>
-                </a:ln>
-                <a:solidFill>
-                  <a:srgbClr val="2E75B6"/>
-                </a:solidFill>
-                <a:effectLst/>
-                <a:latin typeface="Consolas" panose="020B0609020204030204" pitchFamily="49" charset="0"/>
-              </a:rPr>
-              <a:t>"</a:t>
-            </a:r>
-            <a:r>
-              <a:rPr kumimoji="0" lang="en-US" altLang="en-US" sz="2000" b="0" i="0" u="none" strike="noStrike" cap="none" normalizeH="0" baseline="0" dirty="0" err="1">
-                <a:ln>
-                  <a:noFill/>
-                </a:ln>
-                <a:solidFill>
-                  <a:srgbClr val="2E75B6"/>
-                </a:solidFill>
-                <a:effectLst/>
-                <a:latin typeface="Consolas" panose="020B0609020204030204" pitchFamily="49" charset="0"/>
-              </a:rPr>
-              <a:t>Microsoft.EntityFrameworkCore.SqlServer.Design</a:t>
-            </a:r>
-            <a:r>
-              <a:rPr kumimoji="0" lang="en-US" altLang="en-US" sz="2000" b="0" i="0" u="none" strike="noStrike" cap="none" normalizeH="0" baseline="0" dirty="0">
-                <a:ln>
-                  <a:noFill/>
-                </a:ln>
-                <a:solidFill>
-                  <a:srgbClr val="2E75B6"/>
-                </a:solidFill>
-                <a:effectLst/>
-                <a:latin typeface="Consolas" panose="020B0609020204030204" pitchFamily="49" charset="0"/>
-              </a:rPr>
-              <a:t>"</a:t>
-            </a:r>
-            <a:r>
-              <a:rPr kumimoji="0" lang="en-US" altLang="en-US" sz="2000" b="0" i="0" u="none" strike="noStrike" cap="none" normalizeH="0" baseline="0" dirty="0">
-                <a:ln>
-                  <a:noFill/>
-                </a:ln>
-                <a:solidFill>
-                  <a:srgbClr val="000000"/>
-                </a:solidFill>
-                <a:effectLst/>
-                <a:latin typeface="Consolas" panose="020B0609020204030204" pitchFamily="49" charset="0"/>
-              </a:rPr>
-              <a:t>: </a:t>
-            </a:r>
-            <a:r>
-              <a:rPr kumimoji="0" lang="en-US" altLang="en-US" sz="2000" b="0" i="0" u="none" strike="noStrike" cap="none" normalizeH="0" baseline="0" dirty="0">
-                <a:ln>
-                  <a:noFill/>
-                </a:ln>
-                <a:solidFill>
-                  <a:srgbClr val="A31515"/>
-                </a:solidFill>
-                <a:effectLst/>
-                <a:latin typeface="Consolas" panose="020B0609020204030204" pitchFamily="49" charset="0"/>
-              </a:rPr>
-              <a:t>"1.0.0"</a:t>
-            </a:r>
-            <a:r>
-              <a:rPr kumimoji="0" lang="en-US" altLang="en-US" sz="2000" b="0" i="0" u="none" strike="noStrike" cap="none" normalizeH="0" baseline="0" dirty="0">
-                <a:ln>
-                  <a:noFill/>
-                </a:ln>
-                <a:solidFill>
-                  <a:srgbClr val="000000"/>
-                </a:solidFill>
-                <a:effectLst/>
-                <a:latin typeface="Consolas" panose="020B0609020204030204" pitchFamily="49" charset="0"/>
-              </a:rPr>
-              <a:t>,</a:t>
-            </a:r>
-          </a:p>
-          <a:p>
-            <a:pPr marL="0" marR="0" lvl="0" indent="0" algn="l" defTabSz="914400" rtl="0" eaLnBrk="0" fontAlgn="base" latinLnBrk="0" hangingPunct="0">
-              <a:lnSpc>
-                <a:spcPct val="100000"/>
-              </a:lnSpc>
-              <a:spcBef>
-                <a:spcPct val="0"/>
-              </a:spcBef>
-              <a:spcAft>
-                <a:spcPct val="0"/>
-              </a:spcAft>
-              <a:buClrTx/>
-              <a:buSzTx/>
-              <a:buFontTx/>
-              <a:buNone/>
-              <a:tabLst/>
-            </a:pPr>
-            <a:r>
-              <a:rPr kumimoji="0" lang="en-US" altLang="en-US" sz="2000" b="0" i="0" u="none" strike="noStrike" cap="none" normalizeH="0" baseline="0" dirty="0">
-                <a:ln>
-                  <a:noFill/>
-                </a:ln>
-                <a:solidFill>
-                  <a:srgbClr val="000000"/>
-                </a:solidFill>
-                <a:effectLst/>
-                <a:latin typeface="Consolas" panose="020B0609020204030204" pitchFamily="49" charset="0"/>
-              </a:rPr>
-              <a:t>},</a:t>
-            </a:r>
-          </a:p>
-          <a:p>
-            <a:pPr marL="0" marR="0" lvl="0" indent="0" algn="l" defTabSz="914400" rtl="0" eaLnBrk="0" fontAlgn="base" latinLnBrk="0" hangingPunct="0">
-              <a:lnSpc>
-                <a:spcPct val="100000"/>
-              </a:lnSpc>
-              <a:spcBef>
-                <a:spcPct val="0"/>
-              </a:spcBef>
-              <a:spcAft>
-                <a:spcPct val="0"/>
-              </a:spcAft>
-              <a:buClrTx/>
-              <a:buSzTx/>
-              <a:buFontTx/>
-              <a:buNone/>
-              <a:tabLst/>
-            </a:pPr>
-            <a:r>
-              <a:rPr kumimoji="0" lang="en-US" altLang="en-US" sz="2000" b="0" i="0" u="none" strike="noStrike" cap="none" normalizeH="0" baseline="0" dirty="0">
-                <a:ln>
-                  <a:noFill/>
-                </a:ln>
-                <a:solidFill>
-                  <a:srgbClr val="2E75B6"/>
-                </a:solidFill>
-                <a:effectLst/>
-                <a:latin typeface="Consolas" panose="020B0609020204030204" pitchFamily="49" charset="0"/>
-              </a:rPr>
-              <a:t>"tools"</a:t>
-            </a:r>
-            <a:r>
-              <a:rPr kumimoji="0" lang="en-US" altLang="en-US" sz="2000" b="0" i="0" u="none" strike="noStrike" cap="none" normalizeH="0" baseline="0" dirty="0">
-                <a:ln>
-                  <a:noFill/>
-                </a:ln>
-                <a:solidFill>
-                  <a:srgbClr val="000000"/>
-                </a:solidFill>
-                <a:effectLst/>
-                <a:latin typeface="Consolas" panose="020B0609020204030204" pitchFamily="49" charset="0"/>
-              </a:rPr>
-              <a:t>: {</a:t>
-            </a:r>
-          </a:p>
-          <a:p>
-            <a:pPr marL="0" marR="0" lvl="0" indent="0" algn="l" defTabSz="914400" rtl="0" eaLnBrk="0" fontAlgn="base" latinLnBrk="0" hangingPunct="0">
-              <a:lnSpc>
-                <a:spcPct val="100000"/>
-              </a:lnSpc>
-              <a:spcBef>
-                <a:spcPct val="0"/>
-              </a:spcBef>
-              <a:spcAft>
-                <a:spcPct val="0"/>
-              </a:spcAft>
-              <a:buClrTx/>
-              <a:buSzTx/>
-              <a:buFontTx/>
-              <a:buNone/>
-              <a:tabLst/>
-            </a:pPr>
-            <a:r>
-              <a:rPr kumimoji="0" lang="en-US" altLang="en-US" sz="2000" b="0" i="0" u="none" strike="noStrike" cap="none" normalizeH="0" baseline="0" dirty="0">
-                <a:ln>
-                  <a:noFill/>
-                </a:ln>
-                <a:solidFill>
-                  <a:srgbClr val="000000"/>
-                </a:solidFill>
-                <a:effectLst/>
-                <a:latin typeface="Consolas" panose="020B0609020204030204" pitchFamily="49" charset="0"/>
-              </a:rPr>
-              <a:t>   </a:t>
-            </a:r>
-            <a:r>
-              <a:rPr kumimoji="0" lang="en-US" altLang="en-US" sz="2000" b="0" i="0" u="none" strike="noStrike" cap="none" normalizeH="0" baseline="0" dirty="0">
-                <a:ln>
-                  <a:noFill/>
-                </a:ln>
-                <a:solidFill>
-                  <a:srgbClr val="2E75B6"/>
-                </a:solidFill>
-                <a:effectLst/>
-                <a:latin typeface="Consolas" panose="020B0609020204030204" pitchFamily="49" charset="0"/>
-              </a:rPr>
-              <a:t>"</a:t>
-            </a:r>
-            <a:r>
-              <a:rPr kumimoji="0" lang="en-US" altLang="en-US" sz="2000" b="0" i="0" u="none" strike="noStrike" cap="none" normalizeH="0" baseline="0" dirty="0" err="1">
-                <a:ln>
-                  <a:noFill/>
-                </a:ln>
-                <a:solidFill>
-                  <a:srgbClr val="2E75B6"/>
-                </a:solidFill>
-                <a:effectLst/>
-                <a:latin typeface="Consolas" panose="020B0609020204030204" pitchFamily="49" charset="0"/>
-              </a:rPr>
-              <a:t>Microsoft.EntityFrameworkCore.Tools</a:t>
-            </a:r>
-            <a:r>
-              <a:rPr kumimoji="0" lang="en-US" altLang="en-US" sz="2000" b="0" i="0" u="none" strike="noStrike" cap="none" normalizeH="0" baseline="0" dirty="0">
-                <a:ln>
-                  <a:noFill/>
-                </a:ln>
-                <a:solidFill>
-                  <a:srgbClr val="2E75B6"/>
-                </a:solidFill>
-                <a:effectLst/>
-                <a:latin typeface="Consolas" panose="020B0609020204030204" pitchFamily="49" charset="0"/>
-              </a:rPr>
-              <a:t>"</a:t>
-            </a:r>
-            <a:r>
-              <a:rPr kumimoji="0" lang="en-US" altLang="en-US" sz="2000" b="0" i="0" u="none" strike="noStrike" cap="none" normalizeH="0" baseline="0" dirty="0">
-                <a:ln>
-                  <a:noFill/>
-                </a:ln>
-                <a:solidFill>
-                  <a:srgbClr val="000000"/>
-                </a:solidFill>
-                <a:effectLst/>
-                <a:latin typeface="Consolas" panose="020B0609020204030204" pitchFamily="49" charset="0"/>
-              </a:rPr>
-              <a:t>: </a:t>
-            </a:r>
-            <a:r>
-              <a:rPr kumimoji="0" lang="en-US" altLang="en-US" sz="2000" b="0" i="0" u="none" strike="noStrike" cap="none" normalizeH="0" baseline="0" dirty="0">
-                <a:ln>
-                  <a:noFill/>
-                </a:ln>
-                <a:solidFill>
-                  <a:srgbClr val="A31515"/>
-                </a:solidFill>
-                <a:effectLst/>
-                <a:latin typeface="Consolas" panose="020B0609020204030204" pitchFamily="49" charset="0"/>
-              </a:rPr>
-              <a:t>"1.0.0-preview2-final“</a:t>
-            </a:r>
-          </a:p>
-          <a:p>
-            <a:pPr marL="0" marR="0" lvl="0" indent="0" algn="l" defTabSz="914400" rtl="0" eaLnBrk="0" fontAlgn="base" latinLnBrk="0" hangingPunct="0">
-              <a:lnSpc>
-                <a:spcPct val="100000"/>
-              </a:lnSpc>
-              <a:spcBef>
-                <a:spcPct val="0"/>
-              </a:spcBef>
-              <a:spcAft>
-                <a:spcPct val="0"/>
-              </a:spcAft>
-              <a:buClrTx/>
-              <a:buSzTx/>
-              <a:buFontTx/>
-              <a:buNone/>
-              <a:tabLst/>
-            </a:pPr>
-            <a:r>
-              <a:rPr kumimoji="0" lang="en-US" altLang="en-US" sz="2000" b="0" i="0" u="none" strike="noStrike" cap="none" normalizeH="0" baseline="0" dirty="0">
-                <a:ln>
-                  <a:noFill/>
-                </a:ln>
-                <a:solidFill>
-                  <a:srgbClr val="000000"/>
-                </a:solidFill>
-                <a:effectLst/>
-                <a:latin typeface="Consolas" panose="020B0609020204030204" pitchFamily="49" charset="0"/>
-              </a:rPr>
-              <a:t>}, </a:t>
-            </a:r>
-            <a:endParaRPr kumimoji="0" lang="en-US" altLang="en-US" sz="2000" b="0" i="0" u="none" strike="noStrike" cap="none" normalizeH="0" baseline="0" dirty="0">
-              <a:ln>
-                <a:noFill/>
-              </a:ln>
-              <a:solidFill>
-                <a:schemeClr val="tx1"/>
-              </a:solidFill>
-              <a:effectLst/>
-              <a:latin typeface="Arial" panose="020B0604020202020204" pitchFamily="34" charset="0"/>
-            </a:endParaRPr>
-          </a:p>
-        </p:txBody>
-      </p:sp>
-      <p:sp>
-        <p:nvSpPr>
           <p:cNvPr id="5" name="Rectangle 2"/>
           <p:cNvSpPr txBox="1">
             <a:spLocks noChangeArrowheads="1"/>
@@ -12759,8 +12141,8 @@
         </p:nvSpPr>
         <p:spPr bwMode="auto">
           <a:xfrm>
-            <a:off x="627086" y="2837527"/>
-            <a:ext cx="10935746" cy="2554545"/>
+            <a:off x="194221" y="2484026"/>
+            <a:ext cx="11801475" cy="3477875"/>
           </a:xfrm>
           <a:prstGeom prst="rect">
             <a:avLst/>
@@ -13041,16 +12423,25 @@
                 </a:solidFill>
                 <a:latin typeface="Consolas" panose="020B0609020204030204" pitchFamily="49" charset="0"/>
               </a:rPr>
-              <a:t>"dependencies"</a:t>
+              <a:t> &lt;</a:t>
+            </a:r>
+            <a:r>
+              <a:rPr lang="en-US" altLang="en-US" sz="2000" dirty="0" err="1">
+                <a:solidFill>
+                  <a:srgbClr val="2E75B6"/>
+                </a:solidFill>
+                <a:latin typeface="Consolas" panose="020B0609020204030204" pitchFamily="49" charset="0"/>
+              </a:rPr>
+              <a:t>ItemGroup</a:t>
             </a:r>
             <a:r>
               <a:rPr lang="en-US" altLang="en-US" sz="2000" dirty="0">
                 <a:solidFill>
-                  <a:srgbClr val="000000"/>
-                </a:solidFill>
-                <a:latin typeface="Consolas" panose="020B0609020204030204" pitchFamily="49" charset="0"/>
-              </a:rPr>
-              <a:t>: {</a:t>
+                  <a:srgbClr val="2E75B6"/>
+                </a:solidFill>
+                <a:latin typeface="Consolas" panose="020B0609020204030204" pitchFamily="49" charset="0"/>
+              </a:rPr>
+              <a:t>&gt;</a:t>
             </a:r>
           </a:p>
           <a:p>
@@ -13071,11 +12462,20 @@
             <a:r>
               <a:rPr lang="en-US" altLang="en-US" sz="2000" dirty="0">
                 <a:solidFill>
-                  <a:srgbClr val="000000"/>
-                </a:solidFill>
-                <a:latin typeface="Consolas" panose="020B0609020204030204" pitchFamily="49" charset="0"/>
-              </a:rPr>
-              <a:t>   </a:t>
+                  <a:srgbClr val="2E75B6"/>
+                </a:solidFill>
+                <a:latin typeface="Consolas" panose="020B0609020204030204" pitchFamily="49" charset="0"/>
+              </a:rPr>
+              <a:t>    &lt;</a:t>
+            </a:r>
+            <a:r>
+              <a:rPr lang="en-US" altLang="en-US" sz="2000" dirty="0" err="1">
+                <a:solidFill>
+                  <a:srgbClr val="2E75B6"/>
+                </a:solidFill>
+                <a:latin typeface="Consolas" panose="020B0609020204030204" pitchFamily="49" charset="0"/>
+              </a:rPr>
+              <a:t>PackageReference</a:t>
             </a:r>
             <a:r>
               <a:rPr lang="en-US" altLang="en-US" sz="2000" dirty="0">
@@ -13084,52 +12484,7 @@
                 </a:solidFill>
                 <a:latin typeface="Consolas" panose="020B0609020204030204" pitchFamily="49" charset="0"/>
               </a:rPr>
-              <a:t>"</a:t>
-            </a:r>
-            <a:r>
-              <a:rPr lang="en-US" altLang="en-US" sz="2000" dirty="0" err="1">
-                <a:solidFill>
-                  <a:srgbClr val="2E75B6"/>
-                </a:solidFill>
-                <a:latin typeface="Consolas" panose="020B0609020204030204" pitchFamily="49" charset="0"/>
-              </a:rPr>
-              <a:t>Microsoft.EntityFrameworkCore.Design</a:t>
-            </a:r>
-            <a:r>
-              <a:rPr lang="en-US" altLang="en-US" sz="2000" dirty="0">
-                <a:solidFill>
-                  <a:srgbClr val="2E75B6"/>
-                </a:solidFill>
-                <a:latin typeface="Consolas" panose="020B0609020204030204" pitchFamily="49" charset="0"/>
-              </a:rPr>
-              <a:t>"</a:t>
-            </a:r>
-            <a:r>
-              <a:rPr lang="en-US" altLang="en-US" sz="2000" dirty="0">
-                <a:solidFill>
-                  <a:srgbClr val="000000"/>
-                </a:solidFill>
-                <a:latin typeface="Consolas" panose="020B0609020204030204" pitchFamily="49" charset="0"/>
-              </a:rPr>
-              <a:t>: </a:t>
-            </a:r>
-            <a:r>
-              <a:rPr lang="en-US" altLang="en-US" sz="2000" dirty="0">
-                <a:solidFill>
-                  <a:srgbClr val="A31515"/>
-                </a:solidFill>
-                <a:latin typeface="Consolas" panose="020B0609020204030204" pitchFamily="49" charset="0"/>
-              </a:rPr>
-              <a:t>"1.1.0-preview1-final"</a:t>
-            </a:r>
-            <a:r>
-              <a:rPr lang="en-US" altLang="en-US" sz="2000" dirty="0">
-                <a:solidFill>
-                  <a:srgbClr val="000000"/>
-                </a:solidFill>
-                <a:latin typeface="Consolas" panose="020B0609020204030204" pitchFamily="49" charset="0"/>
-              </a:rPr>
-              <a:t>,</a:t>
+              <a:t> </a:t>
             </a:r>
           </a:p>
           <a:p>
@@ -13150,11 +12505,20 @@
             <a:r>
               <a:rPr lang="en-US" altLang="en-US" sz="2000" dirty="0">
                 <a:solidFill>
-                  <a:srgbClr val="000000"/>
-                </a:solidFill>
-                <a:latin typeface="Consolas" panose="020B0609020204030204" pitchFamily="49" charset="0"/>
-              </a:rPr>
-              <a:t>   </a:t>
+                  <a:srgbClr val="2E75B6"/>
+                </a:solidFill>
+                <a:latin typeface="Consolas" panose="020B0609020204030204" pitchFamily="49" charset="0"/>
+              </a:rPr>
+              <a:t>        Include="</a:t>
+            </a:r>
+            <a:r>
+              <a:rPr lang="en-US" altLang="en-US" sz="2000" dirty="0" err="1">
+                <a:solidFill>
+                  <a:srgbClr val="2E75B6"/>
+                </a:solidFill>
+                <a:latin typeface="Consolas" panose="020B0609020204030204" pitchFamily="49" charset="0"/>
+              </a:rPr>
+              <a:t>Microsoft.EntityFrameworkCore.SqlServer.Design</a:t>
             </a:r>
             <a:r>
               <a:rPr lang="en-US" altLang="en-US" sz="2000" dirty="0">
@@ -13163,52 +12527,7 @@
                 </a:solidFill>
                 <a:latin typeface="Consolas" panose="020B0609020204030204" pitchFamily="49" charset="0"/>
               </a:rPr>
-              <a:t>"</a:t>
-            </a:r>
-            <a:r>
-              <a:rPr lang="en-US" altLang="en-US" sz="2000" dirty="0" err="1">
-                <a:solidFill>
-                  <a:srgbClr val="2E75B6"/>
-                </a:solidFill>
-                <a:latin typeface="Consolas" panose="020B0609020204030204" pitchFamily="49" charset="0"/>
-              </a:rPr>
-              <a:t>Microsoft.EntityFrameworkCore.SqlServer</a:t>
-            </a:r>
-            <a:r>
-              <a:rPr lang="en-US" altLang="en-US" sz="2000" dirty="0">
-                <a:solidFill>
-                  <a:srgbClr val="2E75B6"/>
-                </a:solidFill>
-                <a:latin typeface="Consolas" panose="020B0609020204030204" pitchFamily="49" charset="0"/>
-              </a:rPr>
-              <a:t>"</a:t>
-            </a:r>
-            <a:r>
-              <a:rPr lang="en-US" altLang="en-US" sz="2000" dirty="0">
-                <a:solidFill>
-                  <a:srgbClr val="000000"/>
-                </a:solidFill>
-                <a:latin typeface="Consolas" panose="020B0609020204030204" pitchFamily="49" charset="0"/>
-              </a:rPr>
-              <a:t>: </a:t>
-            </a:r>
-            <a:r>
-              <a:rPr lang="en-US" altLang="en-US" sz="2000" dirty="0">
-                <a:solidFill>
-                  <a:srgbClr val="A31515"/>
-                </a:solidFill>
-                <a:latin typeface="Consolas" panose="020B0609020204030204" pitchFamily="49" charset="0"/>
-              </a:rPr>
-              <a:t>"1.1.0-preview1-final"</a:t>
-            </a:r>
-            <a:r>
-              <a:rPr lang="en-US" altLang="en-US" sz="2000" dirty="0">
-                <a:solidFill>
-                  <a:srgbClr val="000000"/>
-                </a:solidFill>
-                <a:latin typeface="Consolas" panose="020B0609020204030204" pitchFamily="49" charset="0"/>
-              </a:rPr>
-              <a:t>,</a:t>
+              <a:t>" Version="1.1.0" /&gt;</a:t>
             </a:r>
           </a:p>
           <a:p>
@@ -13229,11 +12548,20 @@
             <a:r>
               <a:rPr lang="en-US" altLang="en-US" sz="2000" dirty="0">
                 <a:solidFill>
-                  <a:srgbClr val="000000"/>
-                </a:solidFill>
-                <a:latin typeface="Consolas" panose="020B0609020204030204" pitchFamily="49" charset="0"/>
-              </a:rPr>
-              <a:t>   </a:t>
+                  <a:srgbClr val="2E75B6"/>
+                </a:solidFill>
+                <a:latin typeface="Consolas" panose="020B0609020204030204" pitchFamily="49" charset="0"/>
+              </a:rPr>
+              <a:t>    &lt;</a:t>
+            </a:r>
+            <a:r>
+              <a:rPr lang="en-US" altLang="en-US" sz="2000" dirty="0" err="1">
+                <a:solidFill>
+                  <a:srgbClr val="2E75B6"/>
+                </a:solidFill>
+                <a:latin typeface="Consolas" panose="020B0609020204030204" pitchFamily="49" charset="0"/>
+              </a:rPr>
+              <a:t>PackageReference</a:t>
             </a:r>
             <a:r>
               <a:rPr lang="en-US" altLang="en-US" sz="2000" dirty="0">
@@ -13242,52 +12570,7 @@
                 </a:solidFill>
                 <a:latin typeface="Consolas" panose="020B0609020204030204" pitchFamily="49" charset="0"/>
               </a:rPr>
-              <a:t>"</a:t>
-            </a:r>
-            <a:r>
-              <a:rPr lang="en-US" altLang="en-US" sz="2000" dirty="0" err="1">
-                <a:solidFill>
-                  <a:srgbClr val="2E75B6"/>
-                </a:solidFill>
-                <a:latin typeface="Consolas" panose="020B0609020204030204" pitchFamily="49" charset="0"/>
-              </a:rPr>
-              <a:t>Microsoft.EntityFrameworkCore.SqlServer.Design</a:t>
-            </a:r>
-            <a:r>
-              <a:rPr lang="en-US" altLang="en-US" sz="2000" dirty="0">
-                <a:solidFill>
-                  <a:srgbClr val="2E75B6"/>
-                </a:solidFill>
-                <a:latin typeface="Consolas" panose="020B0609020204030204" pitchFamily="49" charset="0"/>
-              </a:rPr>
-              <a:t>"</a:t>
-            </a:r>
-            <a:r>
-              <a:rPr lang="en-US" altLang="en-US" sz="2000" dirty="0">
-                <a:solidFill>
-                  <a:srgbClr val="000000"/>
-                </a:solidFill>
-                <a:latin typeface="Consolas" panose="020B0609020204030204" pitchFamily="49" charset="0"/>
-              </a:rPr>
-              <a:t>: </a:t>
-            </a:r>
-            <a:r>
-              <a:rPr lang="en-US" altLang="en-US" sz="2000" dirty="0">
-                <a:solidFill>
-                  <a:srgbClr val="A31515"/>
-                </a:solidFill>
-                <a:latin typeface="Consolas" panose="020B0609020204030204" pitchFamily="49" charset="0"/>
-              </a:rPr>
-              <a:t>"1.1.0-preview1-final"</a:t>
-            </a:r>
-            <a:r>
-              <a:rPr lang="en-US" altLang="en-US" sz="2000" dirty="0">
-                <a:solidFill>
-                  <a:srgbClr val="000000"/>
-                </a:solidFill>
-                <a:latin typeface="Consolas" panose="020B0609020204030204" pitchFamily="49" charset="0"/>
-              </a:rPr>
-              <a:t>,</a:t>
+              <a:t> </a:t>
             </a:r>
           </a:p>
           <a:p>
@@ -13308,11 +12591,29 @@
             <a:r>
               <a:rPr lang="en-US" altLang="en-US" sz="2000" dirty="0">
                 <a:solidFill>
-                  <a:srgbClr val="000000"/>
-                </a:solidFill>
-                <a:latin typeface="Consolas" panose="020B0609020204030204" pitchFamily="49" charset="0"/>
-              </a:rPr>
-              <a:t>},</a:t>
+                  <a:srgbClr val="2E75B6"/>
+                </a:solidFill>
+                <a:latin typeface="Consolas" panose="020B0609020204030204" pitchFamily="49" charset="0"/>
+              </a:rPr>
+              <a:t>        Include="</a:t>
+            </a:r>
+            <a:r>
+              <a:rPr lang="en-US" altLang="en-US" sz="2000" dirty="0" err="1">
+                <a:solidFill>
+                  <a:srgbClr val="2E75B6"/>
+                </a:solidFill>
+                <a:latin typeface="Consolas" panose="020B0609020204030204" pitchFamily="49" charset="0"/>
+              </a:rPr>
+              <a:t>Microsoft.EntityFrameworkCore.Design</a:t>
+            </a:r>
+            <a:r>
+              <a:rPr lang="en-US" altLang="en-US" sz="2000" dirty="0">
+                <a:solidFill>
+                  <a:srgbClr val="2E75B6"/>
+                </a:solidFill>
+                <a:latin typeface="Consolas" panose="020B0609020204030204" pitchFamily="49" charset="0"/>
+              </a:rPr>
+              <a:t>" Version="1.1.0" /&gt;</a:t>
             </a:r>
           </a:p>
           <a:p>
@@ -13337,16 +12638,25 @@
                 </a:solidFill>
                 <a:latin typeface="Consolas" panose="020B0609020204030204" pitchFamily="49" charset="0"/>
               </a:rPr>
-              <a:t>"tools"</a:t>
+              <a:t>  &lt;/</a:t>
+            </a:r>
+            <a:r>
+              <a:rPr lang="en-US" altLang="en-US" sz="2000" dirty="0" err="1">
+                <a:solidFill>
+                  <a:srgbClr val="2E75B6"/>
+                </a:solidFill>
+                <a:latin typeface="Consolas" panose="020B0609020204030204" pitchFamily="49" charset="0"/>
+              </a:rPr>
+              <a:t>ItemGroup</a:t>
             </a:r>
             <a:r>
               <a:rPr lang="en-US" altLang="en-US" sz="2000" dirty="0">
                 <a:solidFill>
-                  <a:srgbClr val="000000"/>
-                </a:solidFill>
-                <a:latin typeface="Consolas" panose="020B0609020204030204" pitchFamily="49" charset="0"/>
-              </a:rPr>
-              <a:t>: {</a:t>
+                  <a:srgbClr val="2E75B6"/>
+                </a:solidFill>
+                <a:latin typeface="Consolas" panose="020B0609020204030204" pitchFamily="49" charset="0"/>
+              </a:rPr>
+              <a:t>&gt;</a:t>
             </a:r>
           </a:p>
           <a:p>
@@ -13367,11 +12677,20 @@
             <a:r>
               <a:rPr lang="en-US" altLang="en-US" sz="2000" dirty="0">
                 <a:solidFill>
-                  <a:srgbClr val="000000"/>
-                </a:solidFill>
-                <a:latin typeface="Consolas" panose="020B0609020204030204" pitchFamily="49" charset="0"/>
-              </a:rPr>
-              <a:t>   </a:t>
+                  <a:srgbClr val="2E75B6"/>
+                </a:solidFill>
+                <a:latin typeface="Consolas" panose="020B0609020204030204" pitchFamily="49" charset="0"/>
+              </a:rPr>
+              <a:t>  &lt;</a:t>
+            </a:r>
+            <a:r>
+              <a:rPr lang="en-US" altLang="en-US" sz="2000" dirty="0" err="1">
+                <a:solidFill>
+                  <a:srgbClr val="2E75B6"/>
+                </a:solidFill>
+                <a:latin typeface="Consolas" panose="020B0609020204030204" pitchFamily="49" charset="0"/>
+              </a:rPr>
+              <a:t>ItemGroup</a:t>
             </a:r>
             <a:r>
               <a:rPr lang="en-US" altLang="en-US" sz="2000" dirty="0">
@@ -13380,43 +12699,7 @@
                 </a:solidFill>
                 <a:latin typeface="Consolas" panose="020B0609020204030204" pitchFamily="49" charset="0"/>
               </a:rPr>
-              <a:t>"</a:t>
-            </a:r>
-            <a:r>
-              <a:rPr lang="en-US" altLang="en-US" sz="2000" dirty="0" err="1">
-                <a:solidFill>
-                  <a:srgbClr val="2E75B6"/>
-                </a:solidFill>
-                <a:latin typeface="Consolas" panose="020B0609020204030204" pitchFamily="49" charset="0"/>
-              </a:rPr>
-              <a:t>Microsoft.EntityFrameworkCore.Tools.DotNet</a:t>
-            </a:r>
-            <a:r>
-              <a:rPr lang="en-US" altLang="en-US" sz="2000" dirty="0">
-                <a:solidFill>
-                  <a:srgbClr val="2E75B6"/>
-                </a:solidFill>
-                <a:latin typeface="Consolas" panose="020B0609020204030204" pitchFamily="49" charset="0"/>
-              </a:rPr>
-              <a:t>"</a:t>
-            </a:r>
-            <a:r>
-              <a:rPr lang="en-US" altLang="en-US" sz="2000" dirty="0">
-                <a:solidFill>
-                  <a:srgbClr val="000000"/>
-                </a:solidFill>
-                <a:latin typeface="Consolas" panose="020B0609020204030204" pitchFamily="49" charset="0"/>
-              </a:rPr>
-              <a:t>: </a:t>
-            </a:r>
-            <a:r>
-              <a:rPr lang="en-US" altLang="en-US" sz="2000" dirty="0">
-                <a:solidFill>
-                  <a:srgbClr val="A31515"/>
-                </a:solidFill>
-                <a:latin typeface="Consolas" panose="020B0609020204030204" pitchFamily="49" charset="0"/>
-              </a:rPr>
-              <a:t>"1.0.0-preview3-final“</a:t>
+              <a:t>&gt;</a:t>
             </a:r>
           </a:p>
           <a:p>
@@ -13437,11 +12720,140 @@
             <a:r>
               <a:rPr lang="en-US" altLang="en-US" sz="2000" dirty="0">
                 <a:solidFill>
-                  <a:srgbClr val="000000"/>
-                </a:solidFill>
-                <a:latin typeface="Consolas" panose="020B0609020204030204" pitchFamily="49" charset="0"/>
-              </a:rPr>
-              <a:t>}, </a:t>
+                  <a:srgbClr val="2E75B6"/>
+                </a:solidFill>
+                <a:latin typeface="Consolas" panose="020B0609020204030204" pitchFamily="49" charset="0"/>
+              </a:rPr>
+              <a:t>    &lt;</a:t>
+            </a:r>
+            <a:r>
+              <a:rPr lang="en-US" altLang="en-US" sz="2000" dirty="0" err="1">
+                <a:solidFill>
+                  <a:srgbClr val="2E75B6"/>
+                </a:solidFill>
+                <a:latin typeface="Consolas" panose="020B0609020204030204" pitchFamily="49" charset="0"/>
+              </a:rPr>
+              <a:t>DotNetCliToolReference</a:t>
+            </a:r>
+            <a:r>
+              <a:rPr lang="en-US" altLang="en-US" sz="2000" dirty="0">
+                <a:solidFill>
+                  <a:srgbClr val="2E75B6"/>
+                </a:solidFill>
+                <a:latin typeface="Consolas" panose="020B0609020204030204" pitchFamily="49" charset="0"/>
+              </a:rPr>
+              <a:t> </a:t>
+            </a:r>
+          </a:p>
+          <a:p>
+            <a:pPr marL="0" indent="0" eaLnBrk="0" fontAlgn="base" hangingPunct="0">
+              <a:lnSpc>
+                <a:spcPct val="100000"/>
+              </a:lnSpc>
+              <a:spcBef>
+                <a:spcPct val="0"/>
+              </a:spcBef>
+              <a:spcAft>
+                <a:spcPct val="0"/>
+              </a:spcAft>
+              <a:buClrTx/>
+              <a:buFontTx/>
+              <a:buNone/>
+            </a:pPr>
+            <a:r>
+              <a:rPr lang="en-US" altLang="en-US" sz="2000" dirty="0">
+                <a:solidFill>
+                  <a:srgbClr val="2E75B6"/>
+                </a:solidFill>
+                <a:latin typeface="Consolas" panose="020B0609020204030204" pitchFamily="49" charset="0"/>
+              </a:rPr>
+              <a:t>        Include="</a:t>
+            </a:r>
+            <a:r>
+              <a:rPr lang="en-US" altLang="en-US" sz="2000" dirty="0" err="1">
+                <a:solidFill>
+                  <a:srgbClr val="2E75B6"/>
+                </a:solidFill>
+                <a:latin typeface="Consolas" panose="020B0609020204030204" pitchFamily="49" charset="0"/>
+              </a:rPr>
+              <a:t>Microsoft.EntityFrameworkCore.Tools.DotNet</a:t>
+            </a:r>
+            <a:r>
+              <a:rPr lang="en-US" altLang="en-US" sz="2000" dirty="0">
+                <a:solidFill>
+                  <a:srgbClr val="2E75B6"/>
+                </a:solidFill>
+                <a:latin typeface="Consolas" panose="020B0609020204030204" pitchFamily="49" charset="0"/>
+              </a:rPr>
+              <a:t>" </a:t>
+            </a:r>
+          </a:p>
+          <a:p>
+            <a:pPr marL="0" indent="0" eaLnBrk="0" fontAlgn="base" hangingPunct="0">
+              <a:lnSpc>
+                <a:spcPct val="100000"/>
+              </a:lnSpc>
+              <a:spcBef>
+                <a:spcPct val="0"/>
+              </a:spcBef>
+              <a:spcAft>
+                <a:spcPct val="0"/>
+              </a:spcAft>
+              <a:buClrTx/>
+              <a:buFontTx/>
+              <a:buNone/>
+            </a:pPr>
+            <a:r>
+              <a:rPr lang="en-US" altLang="en-US" sz="2000" dirty="0">
+                <a:solidFill>
+                  <a:srgbClr val="2E75B6"/>
+                </a:solidFill>
+                <a:latin typeface="Consolas" panose="020B0609020204030204" pitchFamily="49" charset="0"/>
+              </a:rPr>
+              <a:t>        Version="1.0.0-msbuild3-final" /&gt;</a:t>
+            </a:r>
+          </a:p>
+          <a:p>
+            <a:pPr marL="0" indent="0" eaLnBrk="0" fontAlgn="base" hangingPunct="0">
+              <a:lnSpc>
+                <a:spcPct val="100000"/>
+              </a:lnSpc>
+              <a:spcBef>
+                <a:spcPct val="0"/>
+              </a:spcBef>
+              <a:spcAft>
+                <a:spcPct val="0"/>
+              </a:spcAft>
+              <a:buClrTx/>
+              <a:buFontTx/>
+              <a:buNone/>
+            </a:pPr>
+            <a:r>
+              <a:rPr lang="en-US" altLang="en-US" sz="2000" dirty="0">
+                <a:solidFill>
+                  <a:srgbClr val="2E75B6"/>
+                </a:solidFill>
+                <a:latin typeface="Consolas" panose="020B0609020204030204" pitchFamily="49" charset="0"/>
+              </a:rPr>
+              <a:t>  &lt;/</a:t>
+            </a:r>
+            <a:r>
+              <a:rPr lang="en-US" altLang="en-US" sz="2000" dirty="0" err="1">
+                <a:solidFill>
+                  <a:srgbClr val="2E75B6"/>
+                </a:solidFill>
+                <a:latin typeface="Consolas" panose="020B0609020204030204" pitchFamily="49" charset="0"/>
+              </a:rPr>
+              <a:t>ItemGroup</a:t>
+            </a:r>
+            <a:r>
+              <a:rPr lang="en-US" altLang="en-US" sz="2000" dirty="0">
+                <a:solidFill>
+                  <a:srgbClr val="2E75B6"/>
+                </a:solidFill>
+                <a:latin typeface="Consolas" panose="020B0609020204030204" pitchFamily="49" charset="0"/>
+              </a:rPr>
+              <a:t>&gt;</a:t>
             </a:r>
             <a:endParaRPr lang="en-US" altLang="en-US" sz="2000" dirty="0">
               <a:latin typeface="Arial" panose="020B0604020202020204" pitchFamily="34" charset="0"/>
@@ -13459,92 +12871,6 @@
   <p:clrMapOvr>
     <a:masterClrMapping/>
   </p:clrMapOvr>
-  <p:timing>
-    <p:tnLst>
-      <p:par>
-        <p:cTn id="1" dur="indefinite" restart="never" nodeType="tmRoot">
-          <p:childTnLst>
-            <p:seq concurrent="1" nextAc="seek">
-              <p:cTn id="2" dur="indefinite" nodeType="mainSeq">
-                <p:childTnLst>
-                  <p:par>
-                    <p:cTn id="3" fill="hold">
-                      <p:stCondLst>
-                        <p:cond delay="indefinite"/>
-                      </p:stCondLst>
-                      <p:childTnLst>
-                        <p:par>
-                          <p:cTn id="4" fill="hold">
-                            <p:stCondLst>
-                              <p:cond delay="0"/>
-                            </p:stCondLst>
-                            <p:childTnLst>
-                              <p:par>
-                                <p:cTn id="5" presetID="10" presetClass="entr" presetSubtype="0" fill="hold" grpId="0" nodeType="clickEffect">
-                                  <p:stCondLst>
-                                    <p:cond delay="0"/>
-                                  </p:stCondLst>
-                                  <p:childTnLst>
-                                    <p:set>
-                                      <p:cBhvr>
-                                        <p:cTn id="6" dur="1" fill="hold">
-                                          <p:stCondLst>
-                                            <p:cond delay="0"/>
-                                          </p:stCondLst>
-                                        </p:cTn>
-                                        <p:tgtEl>
-                                          <p:spTgt spid="5"/>
-                                        </p:tgtEl>
-                                        <p:attrNameLst>
-                                          <p:attrName>style.visibility</p:attrName>
-                                        </p:attrNameLst>
-                                      </p:cBhvr>
-                                      <p:to>
-                                        <p:strVal val="visible"/>
-                                      </p:to>
-                                    </p:set>
-                                    <p:animEffect transition="in" filter="fade">
-                                      <p:cBhvr>
-                                        <p:cTn id="7" dur="500"/>
-                                        <p:tgtEl>
-                                          <p:spTgt spid="5"/>
-                                        </p:tgtEl>
-                                      </p:cBhvr>
-                                    </p:animEffect>
-                                  </p:childTnLst>
-                                </p:cTn>
-                              </p:par>
-                            </p:childTnLst>
-                          </p:cTn>
-                        </p:par>
-                      </p:childTnLst>
-                    </p:cTn>
-                  </p:par>
-                </p:childTnLst>
-              </p:cTn>
-              <p:prevCondLst>
-                <p:cond evt="onPrev" delay="0">
-                  <p:tgtEl>
-                    <p:sldTgt/>
-                  </p:tgtEl>
-                </p:cond>
-              </p:prevCondLst>
-              <p:nextCondLst>
-                <p:cond evt="onNext" delay="0">
-                  <p:tgtEl>
-                    <p:sldTgt/>
-                  </p:tgtEl>
-                </p:cond>
-              </p:nextCondLst>
-            </p:seq>
-          </p:childTnLst>
-        </p:cTn>
-      </p:par>
-    </p:tnLst>
-    <p:bldLst>
-      <p:bldP spid="5" grpId="0" animBg="1"/>
-    </p:bldLst>
-  </p:timing>
 </p:sld>
 </file>
 
@@ -15430,7 +14756,7 @@
             <p:ph idx="1"/>
             <p:extLst>
               <p:ext uri="{D42A27DB-BD31-4B8C-83A1-F6EECF244321}">
-                <p14:modId xmlns:p14="http://schemas.microsoft.com/office/powerpoint/2010/main" val="1487476726"/>
+                <p14:modId xmlns:p14="http://schemas.microsoft.com/office/powerpoint/2010/main" val="1353829757"/>
               </p:ext>
             </p:extLst>
           </p:nvPr>
@@ -15445,6 +14771,250 @@
           </a:graphicData>
         </a:graphic>
       </p:graphicFrame>
+      <p:sp>
+        <p:nvSpPr>
+          <p:cNvPr id="3" name="TextBox 2"/>
+          <p:cNvSpPr txBox="1"/>
+          <p:nvPr/>
+        </p:nvSpPr>
+        <p:spPr>
+          <a:xfrm>
+            <a:off x="6271084" y="0"/>
+            <a:ext cx="5920916" cy="2308324"/>
+          </a:xfrm>
+          <a:prstGeom prst="rect">
+            <a:avLst/>
+          </a:prstGeom>
+          <a:solidFill>
+            <a:schemeClr val="accent1"/>
+          </a:solidFill>
+        </p:spPr>
+        <p:txBody>
+          <a:bodyPr wrap="none" rtlCol="0">
+            <a:spAutoFit/>
+          </a:bodyPr>
+          <a:lstStyle/>
+          <a:p>
+            <a:pPr algn="ctr"/>
+            <a:r>
+              <a:rPr lang="en-US" dirty="0">
+                <a:solidFill>
+                  <a:schemeClr val="bg1"/>
+                </a:solidFill>
+              </a:rPr>
+              <a:t>“Complex Query” </a:t>
+            </a:r>
+          </a:p>
+          <a:p>
+            <a:r>
+              <a:rPr lang="en-US" dirty="0" err="1">
+                <a:solidFill>
+                  <a:schemeClr val="bg1"/>
+                </a:solidFill>
+              </a:rPr>
+              <a:t>db.Customers</a:t>
+            </a:r>
+            <a:endParaRPr lang="en-US" dirty="0">
+              <a:solidFill>
+                <a:schemeClr val="bg1"/>
+              </a:solidFill>
+            </a:endParaRPr>
+          </a:p>
+          <a:p>
+            <a:r>
+              <a:rPr lang="en-US" dirty="0">
+                <a:solidFill>
+                  <a:schemeClr val="bg1"/>
+                </a:solidFill>
+              </a:rPr>
+              <a:t>                            .Where(c =&gt; !</a:t>
+            </a:r>
+            <a:r>
+              <a:rPr lang="en-US" dirty="0" err="1">
+                <a:solidFill>
+                  <a:schemeClr val="bg1"/>
+                </a:solidFill>
+              </a:rPr>
+              <a:t>c.AccountNumber.EndsWith</a:t>
+            </a:r>
+            <a:r>
+              <a:rPr lang="en-US" dirty="0">
+                <a:solidFill>
+                  <a:schemeClr val="bg1"/>
+                </a:solidFill>
+              </a:rPr>
+              <a:t>("1"))</a:t>
+            </a:r>
+          </a:p>
+          <a:p>
+            <a:r>
+              <a:rPr lang="en-US" dirty="0">
+                <a:solidFill>
+                  <a:schemeClr val="bg1"/>
+                </a:solidFill>
+              </a:rPr>
+              <a:t>                            .</a:t>
+            </a:r>
+            <a:r>
+              <a:rPr lang="en-US" dirty="0" err="1">
+                <a:solidFill>
+                  <a:schemeClr val="bg1"/>
+                </a:solidFill>
+              </a:rPr>
+              <a:t>OrderBy</a:t>
+            </a:r>
+            <a:r>
+              <a:rPr lang="en-US" dirty="0">
+                <a:solidFill>
+                  <a:schemeClr val="bg1"/>
+                </a:solidFill>
+              </a:rPr>
+              <a:t>(c =&gt; </a:t>
+            </a:r>
+            <a:r>
+              <a:rPr lang="en-US" dirty="0" err="1">
+                <a:solidFill>
+                  <a:schemeClr val="bg1"/>
+                </a:solidFill>
+              </a:rPr>
+              <a:t>c.AccountNumber</a:t>
+            </a:r>
+            <a:r>
+              <a:rPr lang="en-US" dirty="0">
+                <a:solidFill>
+                  <a:schemeClr val="bg1"/>
+                </a:solidFill>
+              </a:rPr>
+              <a:t>)</a:t>
+            </a:r>
+          </a:p>
+          <a:p>
+            <a:r>
+              <a:rPr lang="en-US" dirty="0">
+                <a:solidFill>
+                  <a:schemeClr val="bg1"/>
+                </a:solidFill>
+              </a:rPr>
+              <a:t>                            .</a:t>
+            </a:r>
+            <a:r>
+              <a:rPr lang="en-US" dirty="0" err="1">
+                <a:solidFill>
+                  <a:schemeClr val="bg1"/>
+                </a:solidFill>
+              </a:rPr>
+              <a:t>ThenBy</a:t>
+            </a:r>
+            <a:r>
+              <a:rPr lang="en-US" dirty="0">
+                <a:solidFill>
+                  <a:schemeClr val="bg1"/>
+                </a:solidFill>
+              </a:rPr>
+              <a:t>(c =&gt; </a:t>
+            </a:r>
+            <a:r>
+              <a:rPr lang="en-US" dirty="0" err="1">
+                <a:solidFill>
+                  <a:schemeClr val="bg1"/>
+                </a:solidFill>
+              </a:rPr>
+              <a:t>c.ModifiedDate</a:t>
+            </a:r>
+            <a:r>
+              <a:rPr lang="en-US" dirty="0">
+                <a:solidFill>
+                  <a:schemeClr val="bg1"/>
+                </a:solidFill>
+              </a:rPr>
+              <a:t>)</a:t>
+            </a:r>
+          </a:p>
+          <a:p>
+            <a:r>
+              <a:rPr lang="en-US" dirty="0">
+                <a:solidFill>
+                  <a:schemeClr val="bg1"/>
+                </a:solidFill>
+              </a:rPr>
+              <a:t>                            .Skip(100)</a:t>
+            </a:r>
+          </a:p>
+          <a:p>
+            <a:r>
+              <a:rPr lang="en-US" dirty="0">
+                <a:solidFill>
+                  <a:schemeClr val="bg1"/>
+                </a:solidFill>
+              </a:rPr>
+              <a:t>                            .</a:t>
+            </a:r>
+            <a:r>
+              <a:rPr lang="en-US" dirty="0" err="1">
+                <a:solidFill>
+                  <a:schemeClr val="bg1"/>
+                </a:solidFill>
+              </a:rPr>
+              <a:t>GroupBy</a:t>
+            </a:r>
+            <a:r>
+              <a:rPr lang="en-US" dirty="0">
+                <a:solidFill>
+                  <a:schemeClr val="bg1"/>
+                </a:solidFill>
+              </a:rPr>
+              <a:t>(c =&gt; </a:t>
+            </a:r>
+            <a:r>
+              <a:rPr lang="en-US" dirty="0" err="1">
+                <a:solidFill>
+                  <a:schemeClr val="bg1"/>
+                </a:solidFill>
+              </a:rPr>
+              <a:t>c.TerritoryID</a:t>
+            </a:r>
+            <a:r>
+              <a:rPr lang="en-US" dirty="0">
+                <a:solidFill>
+                  <a:schemeClr val="bg1"/>
+                </a:solidFill>
+              </a:rPr>
+              <a:t>)</a:t>
+            </a:r>
+          </a:p>
+          <a:p>
+            <a:r>
+              <a:rPr lang="en-US" dirty="0">
+                <a:solidFill>
+                  <a:schemeClr val="bg1"/>
+                </a:solidFill>
+              </a:rPr>
+              <a:t>                            .</a:t>
+            </a:r>
+            <a:r>
+              <a:rPr lang="en-US" dirty="0" err="1">
+                <a:solidFill>
+                  <a:schemeClr val="bg1"/>
+                </a:solidFill>
+              </a:rPr>
+              <a:t>ToList</a:t>
+            </a:r>
+            <a:r>
+              <a:rPr lang="en-US" dirty="0">
+                <a:solidFill>
+                  <a:schemeClr val="bg1"/>
+                </a:solidFill>
+              </a:rPr>
+              <a:t>();</a:t>
+            </a:r>
+            <a:endParaRPr lang="en-US" dirty="0">
+              <a:solidFill>
+                <a:schemeClr val="bg1"/>
+              </a:solidFill>
+            </a:endParaRPr>
+          </a:p>
+        </p:txBody>
+      </p:sp>
     </p:spTree>
     <p:extLst>
       <p:ext uri="{BB962C8B-B14F-4D97-AF65-F5344CB8AC3E}">
@@ -15455,6 +15025,130 @@
   <p:clrMapOvr>
     <a:masterClrMapping/>
   </p:clrMapOvr>
+  <p:timing>
+    <p:tnLst>
+      <p:par>
+        <p:cTn id="1" dur="indefinite" restart="never" nodeType="tmRoot">
+          <p:childTnLst>
+            <p:seq concurrent="1" nextAc="seek">
+              <p:cTn id="2" dur="indefinite" nodeType="mainSeq">
+                <p:childTnLst>
+                  <p:par>
+                    <p:cTn id="3" fill="hold">
+                      <p:stCondLst>
+                        <p:cond delay="indefinite"/>
+                      </p:stCondLst>
+                      <p:childTnLst>
+                        <p:par>
+                          <p:cTn id="4" fill="hold">
+                            <p:stCondLst>
+                              <p:cond delay="0"/>
+                            </p:stCondLst>
+                            <p:childTnLst>
+                              <p:par>
+                                <p:cTn id="5" presetID="2" presetClass="entr" presetSubtype="2" fill="hold" grpId="0" nodeType="clickEffect">
+                                  <p:stCondLst>
+                                    <p:cond delay="0"/>
+                                  </p:stCondLst>
+                                  <p:childTnLst>
+                                    <p:set>
+                                      <p:cBhvr>
+                                        <p:cTn id="6" dur="1" fill="hold">
+                                          <p:stCondLst>
+                                            <p:cond delay="0"/>
+                                          </p:stCondLst>
+                                        </p:cTn>
+                                        <p:tgtEl>
+                                          <p:spTgt spid="3"/>
+                                        </p:tgtEl>
+                                        <p:attrNameLst>
+                                          <p:attrName>style.visibility</p:attrName>
+                                        </p:attrNameLst>
+                                      </p:cBhvr>
+                                      <p:to>
+                                        <p:strVal val="visible"/>
+                                      </p:to>
+                                    </p:set>
+                                    <p:anim calcmode="lin" valueType="num">
+                                      <p:cBhvr additive="base">
+                                        <p:cTn id="7" dur="500" fill="hold"/>
+                                        <p:tgtEl>
+                                          <p:spTgt spid="3"/>
+                                        </p:tgtEl>
+                                        <p:attrNameLst>
+                                          <p:attrName>ppt_x</p:attrName>
+                                        </p:attrNameLst>
+                                      </p:cBhvr>
+                                      <p:tavLst>
+                                        <p:tav tm="0">
+                                          <p:val>
+                                            <p:strVal val="1+#ppt_w/2"/>
+                                          </p:val>
+                                        </p:tav>
+                                        <p:tav tm="100000">
+                                          <p:val>
+                                            <p:strVal val="#ppt_x"/>
+                                          </p:val>
+                                        </p:tav>
+                                      </p:tavLst>
+                                    </p:anim>
+                                    <p:anim calcmode="lin" valueType="num">
+                                      <p:cBhvr additive="base">
+                                        <p:cTn id="8" dur="500" fill="hold"/>
+                                        <p:tgtEl>
+                                          <p:spTgt spid="3"/>
+                                        </p:tgtEl>
+                                        <p:attrNameLst>
+                                          <p:attrName>ppt_y</p:attrName>
+                                        </p:attrNameLst>
+                                      </p:cBhvr>
+                                      <p:tavLst>
+                                        <p:tav tm="0">
+                                          <p:val>
+                                            <p:strVal val="#ppt_y"/>
+                                          </p:val>
+                                        </p:tav>
+                                        <p:tav tm="100000">
+                                          <p:val>
+                                            <p:strVal val="#ppt_y"/>
+                                          </p:val>
+                                        </p:tav>
+                                      </p:tavLst>
+                                    </p:anim>
+                                  </p:childTnLst>
+                                </p:cTn>
+                              </p:par>
+                            </p:childTnLst>
+                          </p:cTn>
+                        </p:par>
+                      </p:childTnLst>
+                    </p:cTn>
+                  </p:par>
+                </p:childTnLst>
+              </p:cTn>
+              <p:prevCondLst>
+                <p:cond evt="onPrev" delay="0">
+                  <p:tgtEl>
+                    <p:sldTgt/>
+                  </p:tgtEl>
+                </p:cond>
+              </p:prevCondLst>
+              <p:nextCondLst>
+                <p:cond evt="onNext" delay="0">
+                  <p:tgtEl>
+                    <p:sldTgt/>
+                  </p:tgtEl>
+                </p:cond>
+              </p:nextCondLst>
+            </p:seq>
+          </p:childTnLst>
+        </p:cTn>
+      </p:par>
+    </p:tnLst>
+    <p:bldLst>
+      <p:bldP spid="3" grpId="0" animBg="1"/>
+    </p:bldLst>
+  </p:timing>
 </p:sld>
 </file>
 

</xml_diff>

<commit_message>
Exclude eager projections test
</commit_message>
<xml_diff>
--- a/EfCoreGettingStarted.pptx
+++ b/EfCoreGettingStarted.pptx
@@ -6285,7 +6285,7 @@
           <a:p>
             <a:fld id="{28763278-E906-4118-802D-5C795C8A9976}" type="datetimeFigureOut">
               <a:rPr lang="en-US" smtClean="0"/>
-              <a:t>3/18/2017</a:t>
+              <a:t>4/8/2017</a:t>
             </a:fld>
             <a:endParaRPr lang="en-US"/>
           </a:p>
@@ -7042,7 +7042,7 @@
           <a:p>
             <a:fld id="{F4E58F4B-C394-4BCA-8CBA-0EA8C6D27B86}" type="datetimeFigureOut">
               <a:rPr lang="en-US" smtClean="0"/>
-              <a:t>3/18/2017</a:t>
+              <a:t>4/8/2017</a:t>
             </a:fld>
             <a:endParaRPr lang="en-US"/>
           </a:p>
@@ -7212,7 +7212,7 @@
           <a:p>
             <a:fld id="{F4E58F4B-C394-4BCA-8CBA-0EA8C6D27B86}" type="datetimeFigureOut">
               <a:rPr lang="en-US" smtClean="0"/>
-              <a:t>3/18/2017</a:t>
+              <a:t>4/8/2017</a:t>
             </a:fld>
             <a:endParaRPr lang="en-US"/>
           </a:p>
@@ -7435,7 +7435,7 @@
           <a:p>
             <a:fld id="{F4E58F4B-C394-4BCA-8CBA-0EA8C6D27B86}" type="datetimeFigureOut">
               <a:rPr lang="en-US" smtClean="0"/>
-              <a:t>3/18/2017</a:t>
+              <a:t>4/8/2017</a:t>
             </a:fld>
             <a:endParaRPr lang="en-US"/>
           </a:p>
@@ -7615,7 +7615,7 @@
           <a:p>
             <a:fld id="{F4E58F4B-C394-4BCA-8CBA-0EA8C6D27B86}" type="datetimeFigureOut">
               <a:rPr lang="en-US" smtClean="0"/>
-              <a:t>3/18/2017</a:t>
+              <a:t>4/8/2017</a:t>
             </a:fld>
             <a:endParaRPr lang="en-US"/>
           </a:p>
@@ -7921,7 +7921,7 @@
           <a:p>
             <a:fld id="{F4E58F4B-C394-4BCA-8CBA-0EA8C6D27B86}" type="datetimeFigureOut">
               <a:rPr lang="en-US" smtClean="0"/>
-              <a:t>3/18/2017</a:t>
+              <a:t>4/8/2017</a:t>
             </a:fld>
             <a:endParaRPr lang="en-US"/>
           </a:p>
@@ -8225,7 +8225,7 @@
           <a:p>
             <a:fld id="{F4E58F4B-C394-4BCA-8CBA-0EA8C6D27B86}" type="datetimeFigureOut">
               <a:rPr lang="en-US" smtClean="0"/>
-              <a:t>3/18/2017</a:t>
+              <a:t>4/8/2017</a:t>
             </a:fld>
             <a:endParaRPr lang="en-US"/>
           </a:p>
@@ -8647,7 +8647,7 @@
           <a:p>
             <a:fld id="{F4E58F4B-C394-4BCA-8CBA-0EA8C6D27B86}" type="datetimeFigureOut">
               <a:rPr lang="en-US" smtClean="0"/>
-              <a:t>3/18/2017</a:t>
+              <a:t>4/8/2017</a:t>
             </a:fld>
             <a:endParaRPr lang="en-US"/>
           </a:p>
@@ -8765,7 +8765,7 @@
           <a:p>
             <a:fld id="{F4E58F4B-C394-4BCA-8CBA-0EA8C6D27B86}" type="datetimeFigureOut">
               <a:rPr lang="en-US" smtClean="0"/>
-              <a:t>3/18/2017</a:t>
+              <a:t>4/8/2017</a:t>
             </a:fld>
             <a:endParaRPr lang="en-US"/>
           </a:p>
@@ -8860,7 +8860,7 @@
           <a:p>
             <a:fld id="{F4E58F4B-C394-4BCA-8CBA-0EA8C6D27B86}" type="datetimeFigureOut">
               <a:rPr lang="en-US" smtClean="0"/>
-              <a:t>3/18/2017</a:t>
+              <a:t>4/8/2017</a:t>
             </a:fld>
             <a:endParaRPr lang="en-US"/>
           </a:p>
@@ -9133,7 +9133,7 @@
           <a:p>
             <a:fld id="{F4E58F4B-C394-4BCA-8CBA-0EA8C6D27B86}" type="datetimeFigureOut">
               <a:rPr lang="en-US" smtClean="0"/>
-              <a:t>3/18/2017</a:t>
+              <a:t>4/8/2017</a:t>
             </a:fld>
             <a:endParaRPr lang="en-US"/>
           </a:p>
@@ -9398,7 +9398,7 @@
           <a:p>
             <a:fld id="{F4E58F4B-C394-4BCA-8CBA-0EA8C6D27B86}" type="datetimeFigureOut">
               <a:rPr lang="en-US" smtClean="0"/>
-              <a:t>3/18/2017</a:t>
+              <a:t>4/8/2017</a:t>
             </a:fld>
             <a:endParaRPr lang="en-US"/>
           </a:p>
@@ -9647,7 +9647,7 @@
           <a:p>
             <a:fld id="{F4E58F4B-C394-4BCA-8CBA-0EA8C6D27B86}" type="datetimeFigureOut">
               <a:rPr lang="en-US" smtClean="0"/>
-              <a:t>3/18/2017</a:t>
+              <a:t>4/8/2017</a:t>
             </a:fld>
             <a:endParaRPr lang="en-US"/>
           </a:p>
@@ -16837,8 +16837,8 @@
         </p:nvSpPr>
         <p:spPr bwMode="auto">
           <a:xfrm>
-            <a:off x="619760" y="2837527"/>
-            <a:ext cx="10943072" cy="2554545"/>
+            <a:off x="219456" y="2754426"/>
+            <a:ext cx="11859768" cy="2720745"/>
           </a:xfrm>
           <a:prstGeom prst="rect">
             <a:avLst/>
@@ -16881,1286 +16881,546 @@
           </a:bodyPr>
           <a:lstStyle/>
           <a:p>
-            <a:pPr marL="0" marR="0" lvl="0" indent="0" algn="l" defTabSz="914400" rtl="0" eaLnBrk="0" fontAlgn="base" latinLnBrk="0" hangingPunct="0">
-              <a:lnSpc>
-                <a:spcPct val="100000"/>
-              </a:lnSpc>
-              <a:spcBef>
-                <a:spcPct val="0"/>
-              </a:spcBef>
-              <a:spcAft>
-                <a:spcPct val="0"/>
-              </a:spcAft>
-              <a:buClrTx/>
-              <a:buSzTx/>
-              <a:buFontTx/>
-              <a:buNone/>
-              <a:tabLst/>
-            </a:pPr>
-            <a:r>
-              <a:rPr kumimoji="0" lang="en-US" altLang="en-US" sz="2000" b="0" i="0" u="none" strike="noStrike" cap="none" normalizeH="0" baseline="0" dirty="0">
-                <a:ln>
-                  <a:noFill/>
-                </a:ln>
-                <a:solidFill>
-                  <a:srgbClr val="2E75B6"/>
-                </a:solidFill>
-                <a:effectLst/>
-                <a:latin typeface="Consolas" panose="020B0609020204030204" pitchFamily="49" charset="0"/>
-              </a:rPr>
-              <a:t>"dependencies"</a:t>
-            </a:r>
-            <a:r>
-              <a:rPr kumimoji="0" lang="en-US" altLang="en-US" sz="2000" b="0" i="0" u="none" strike="noStrike" cap="none" normalizeH="0" baseline="0" dirty="0">
-                <a:ln>
-                  <a:noFill/>
-                </a:ln>
+            <a:r>
+              <a:rPr lang="en-US" sz="1600" dirty="0">
+                <a:solidFill>
+                  <a:srgbClr val="800000"/>
+                </a:solidFill>
+                <a:latin typeface="Consolas" panose="020B0609020204030204" pitchFamily="49" charset="0"/>
+              </a:rPr>
+              <a:t>&lt;</a:t>
+            </a:r>
+            <a:r>
+              <a:rPr lang="en-US" sz="1600" dirty="0" err="1">
+                <a:solidFill>
+                  <a:srgbClr val="800000"/>
+                </a:solidFill>
+                <a:latin typeface="Consolas" panose="020B0609020204030204" pitchFamily="49" charset="0"/>
+              </a:rPr>
+              <a:t>ItemGroup</a:t>
+            </a:r>
+            <a:r>
+              <a:rPr lang="en-US" sz="1600" dirty="0">
+                <a:solidFill>
+                  <a:srgbClr val="800000"/>
+                </a:solidFill>
+                <a:latin typeface="Consolas" panose="020B0609020204030204" pitchFamily="49" charset="0"/>
+              </a:rPr>
+              <a:t>&gt;</a:t>
+            </a:r>
+            <a:endParaRPr lang="en-US" sz="1600" dirty="0">
+              <a:solidFill>
+                <a:srgbClr val="000000"/>
+              </a:solidFill>
+              <a:latin typeface="Consolas" panose="020B0609020204030204" pitchFamily="49" charset="0"/>
+            </a:endParaRPr>
+          </a:p>
+          <a:p>
+            <a:r>
+              <a:rPr lang="en-US" sz="1600" dirty="0">
+                <a:solidFill>
+                  <a:srgbClr val="800000"/>
+                </a:solidFill>
+                <a:latin typeface="Consolas" panose="020B0609020204030204" pitchFamily="49" charset="0"/>
+              </a:rPr>
+              <a:t>  &lt;</a:t>
+            </a:r>
+            <a:r>
+              <a:rPr lang="en-US" sz="1600" dirty="0" err="1">
+                <a:solidFill>
+                  <a:srgbClr val="800000"/>
+                </a:solidFill>
+                <a:latin typeface="Consolas" panose="020B0609020204030204" pitchFamily="49" charset="0"/>
+              </a:rPr>
+              <a:t>PackageReference</a:t>
+            </a:r>
+            <a:r>
+              <a:rPr lang="en-US" sz="1600" dirty="0">
                 <a:solidFill>
                   <a:srgbClr val="000000"/>
                 </a:solidFill>
-                <a:effectLst/>
-                <a:latin typeface="Consolas" panose="020B0609020204030204" pitchFamily="49" charset="0"/>
-              </a:rPr>
-              <a:t>: {</a:t>
-            </a:r>
-          </a:p>
-          <a:p>
-            <a:pPr marL="0" marR="0" lvl="0" indent="0" algn="l" defTabSz="914400" rtl="0" eaLnBrk="0" fontAlgn="base" latinLnBrk="0" hangingPunct="0">
-              <a:lnSpc>
-                <a:spcPct val="100000"/>
-              </a:lnSpc>
-              <a:spcBef>
-                <a:spcPct val="0"/>
-              </a:spcBef>
-              <a:spcAft>
-                <a:spcPct val="0"/>
-              </a:spcAft>
-              <a:buClrTx/>
-              <a:buSzTx/>
-              <a:buFontTx/>
-              <a:buNone/>
-              <a:tabLst/>
-            </a:pPr>
-            <a:r>
-              <a:rPr kumimoji="0" lang="en-US" altLang="en-US" sz="2000" b="0" i="0" u="none" strike="noStrike" cap="none" normalizeH="0" baseline="0" dirty="0">
-                <a:ln>
-                  <a:noFill/>
-                </a:ln>
+                <a:latin typeface="Consolas" panose="020B0609020204030204" pitchFamily="49" charset="0"/>
+              </a:rPr>
+              <a:t> </a:t>
+            </a:r>
+            <a:r>
+              <a:rPr lang="en-US" sz="1600" dirty="0">
+                <a:solidFill>
+                  <a:srgbClr val="FF0000"/>
+                </a:solidFill>
+                <a:latin typeface="Consolas" panose="020B0609020204030204" pitchFamily="49" charset="0"/>
+              </a:rPr>
+              <a:t>Include</a:t>
+            </a:r>
+            <a:r>
+              <a:rPr lang="en-US" sz="1600" dirty="0">
                 <a:solidFill>
                   <a:srgbClr val="000000"/>
                 </a:solidFill>
-                <a:effectLst/>
-                <a:latin typeface="Consolas" panose="020B0609020204030204" pitchFamily="49" charset="0"/>
-              </a:rPr>
-              <a:t>   </a:t>
-            </a:r>
-            <a:r>
-              <a:rPr kumimoji="0" lang="en-US" altLang="en-US" sz="2000" b="0" i="0" u="none" strike="noStrike" cap="none" normalizeH="0" baseline="0" dirty="0">
-                <a:ln>
-                  <a:noFill/>
-                </a:ln>
-                <a:solidFill>
-                  <a:srgbClr val="2E75B6"/>
-                </a:solidFill>
-                <a:effectLst/>
+                <a:latin typeface="Consolas" panose="020B0609020204030204" pitchFamily="49" charset="0"/>
+              </a:rPr>
+              <a:t>=</a:t>
+            </a:r>
+            <a:r>
+              <a:rPr lang="en-US" sz="1600" dirty="0">
+                <a:solidFill>
+                  <a:srgbClr val="0000FF"/>
+                </a:solidFill>
                 <a:latin typeface="Consolas" panose="020B0609020204030204" pitchFamily="49" charset="0"/>
               </a:rPr>
               <a:t>"</a:t>
             </a:r>
             <a:r>
-              <a:rPr kumimoji="0" lang="en-US" altLang="en-US" sz="2000" b="0" i="0" u="none" strike="noStrike" cap="none" normalizeH="0" baseline="0" dirty="0" err="1">
-                <a:ln>
-                  <a:noFill/>
-                </a:ln>
-                <a:solidFill>
-                  <a:srgbClr val="2E75B6"/>
-                </a:solidFill>
-                <a:effectLst/>
+              <a:rPr lang="en-US" sz="1600" dirty="0" err="1">
+                <a:solidFill>
+                  <a:srgbClr val="0000FF"/>
+                </a:solidFill>
                 <a:latin typeface="Consolas" panose="020B0609020204030204" pitchFamily="49" charset="0"/>
               </a:rPr>
               <a:t>Microsoft.EntityFrameworkCore.Design</a:t>
             </a:r>
             <a:r>
-              <a:rPr kumimoji="0" lang="en-US" altLang="en-US" sz="2000" b="0" i="0" u="none" strike="noStrike" cap="none" normalizeH="0" baseline="0" dirty="0">
-                <a:ln>
-                  <a:noFill/>
-                </a:ln>
-                <a:solidFill>
-                  <a:srgbClr val="2E75B6"/>
-                </a:solidFill>
-                <a:effectLst/>
+              <a:rPr lang="en-US" sz="1600" dirty="0">
+                <a:solidFill>
+                  <a:srgbClr val="0000FF"/>
+                </a:solidFill>
                 <a:latin typeface="Consolas" panose="020B0609020204030204" pitchFamily="49" charset="0"/>
               </a:rPr>
               <a:t>"</a:t>
             </a:r>
             <a:r>
-              <a:rPr kumimoji="0" lang="en-US" altLang="en-US" sz="2000" b="0" i="0" u="none" strike="noStrike" cap="none" normalizeH="0" baseline="0" dirty="0">
-                <a:ln>
-                  <a:noFill/>
-                </a:ln>
+              <a:rPr lang="en-US" sz="1600" dirty="0">
                 <a:solidFill>
                   <a:srgbClr val="000000"/>
                 </a:solidFill>
-                <a:effectLst/>
-                <a:latin typeface="Consolas" panose="020B0609020204030204" pitchFamily="49" charset="0"/>
-              </a:rPr>
-              <a:t>: </a:t>
-            </a:r>
-            <a:r>
-              <a:rPr kumimoji="0" lang="en-US" altLang="en-US" sz="2000" b="0" i="0" u="none" strike="noStrike" cap="none" normalizeH="0" baseline="0" dirty="0">
-                <a:ln>
-                  <a:noFill/>
-                </a:ln>
-                <a:solidFill>
-                  <a:srgbClr val="A31515"/>
-                </a:solidFill>
-                <a:effectLst/>
-                <a:latin typeface="Consolas" panose="020B0609020204030204" pitchFamily="49" charset="0"/>
-              </a:rPr>
-              <a:t>"1.0.0-preview2-final"</a:t>
-            </a:r>
-            <a:r>
-              <a:rPr kumimoji="0" lang="en-US" altLang="en-US" sz="2000" b="0" i="0" u="none" strike="noStrike" cap="none" normalizeH="0" baseline="0" dirty="0">
-                <a:ln>
-                  <a:noFill/>
-                </a:ln>
+                <a:latin typeface="Consolas" panose="020B0609020204030204" pitchFamily="49" charset="0"/>
+              </a:rPr>
+              <a:t> </a:t>
+            </a:r>
+            <a:r>
+              <a:rPr lang="en-US" sz="1600" dirty="0">
+                <a:solidFill>
+                  <a:srgbClr val="FF0000"/>
+                </a:solidFill>
+                <a:latin typeface="Consolas" panose="020B0609020204030204" pitchFamily="49" charset="0"/>
+              </a:rPr>
+              <a:t>Version</a:t>
+            </a:r>
+            <a:r>
+              <a:rPr lang="en-US" sz="1600" dirty="0">
                 <a:solidFill>
                   <a:srgbClr val="000000"/>
                 </a:solidFill>
-                <a:effectLst/>
-                <a:latin typeface="Consolas" panose="020B0609020204030204" pitchFamily="49" charset="0"/>
-              </a:rPr>
-              <a:t>,</a:t>
-            </a:r>
-          </a:p>
-          <a:p>
-            <a:pPr marL="0" marR="0" lvl="0" indent="0" algn="l" defTabSz="914400" rtl="0" eaLnBrk="0" fontAlgn="base" latinLnBrk="0" hangingPunct="0">
-              <a:lnSpc>
-                <a:spcPct val="100000"/>
-              </a:lnSpc>
-              <a:spcBef>
-                <a:spcPct val="0"/>
-              </a:spcBef>
-              <a:spcAft>
-                <a:spcPct val="0"/>
-              </a:spcAft>
-              <a:buClrTx/>
-              <a:buSzTx/>
-              <a:buFontTx/>
-              <a:buNone/>
-              <a:tabLst/>
-            </a:pPr>
-            <a:r>
-              <a:rPr kumimoji="0" lang="en-US" altLang="en-US" sz="2000" b="0" i="0" u="none" strike="noStrike" cap="none" normalizeH="0" baseline="0" dirty="0">
-                <a:ln>
-                  <a:noFill/>
-                </a:ln>
+                <a:latin typeface="Consolas" panose="020B0609020204030204" pitchFamily="49" charset="0"/>
+              </a:rPr>
+              <a:t>=</a:t>
+            </a:r>
+            <a:r>
+              <a:rPr lang="en-US" sz="1600" dirty="0">
+                <a:solidFill>
+                  <a:srgbClr val="0000FF"/>
+                </a:solidFill>
+                <a:latin typeface="Consolas" panose="020B0609020204030204" pitchFamily="49" charset="0"/>
+              </a:rPr>
+              <a:t>"1.1.1"</a:t>
+            </a:r>
+            <a:r>
+              <a:rPr lang="en-US" sz="1600" dirty="0">
                 <a:solidFill>
                   <a:srgbClr val="000000"/>
                 </a:solidFill>
-                <a:effectLst/>
-                <a:latin typeface="Consolas" panose="020B0609020204030204" pitchFamily="49" charset="0"/>
-              </a:rPr>
-              <a:t>   </a:t>
-            </a:r>
-            <a:r>
-              <a:rPr kumimoji="0" lang="en-US" altLang="en-US" sz="2000" b="0" i="0" u="none" strike="noStrike" cap="none" normalizeH="0" baseline="0" dirty="0">
-                <a:ln>
-                  <a:noFill/>
-                </a:ln>
-                <a:solidFill>
-                  <a:srgbClr val="2E75B6"/>
-                </a:solidFill>
-                <a:effectLst/>
+                <a:latin typeface="Consolas" panose="020B0609020204030204" pitchFamily="49" charset="0"/>
+              </a:rPr>
+              <a:t> </a:t>
+            </a:r>
+            <a:r>
+              <a:rPr lang="en-US" sz="1600" dirty="0">
+                <a:solidFill>
+                  <a:srgbClr val="800000"/>
+                </a:solidFill>
+                <a:latin typeface="Consolas" panose="020B0609020204030204" pitchFamily="49" charset="0"/>
+              </a:rPr>
+              <a:t>/&gt;</a:t>
+            </a:r>
+            <a:endParaRPr lang="en-US" sz="1600" dirty="0">
+              <a:solidFill>
+                <a:srgbClr val="000000"/>
+              </a:solidFill>
+              <a:latin typeface="Consolas" panose="020B0609020204030204" pitchFamily="49" charset="0"/>
+            </a:endParaRPr>
+          </a:p>
+          <a:p>
+            <a:r>
+              <a:rPr lang="en-US" sz="1600" dirty="0">
+                <a:solidFill>
+                  <a:srgbClr val="800000"/>
+                </a:solidFill>
+                <a:latin typeface="Consolas" panose="020B0609020204030204" pitchFamily="49" charset="0"/>
+              </a:rPr>
+              <a:t>  &lt;</a:t>
+            </a:r>
+            <a:r>
+              <a:rPr lang="en-US" sz="1600" dirty="0" err="1">
+                <a:solidFill>
+                  <a:srgbClr val="800000"/>
+                </a:solidFill>
+                <a:latin typeface="Consolas" panose="020B0609020204030204" pitchFamily="49" charset="0"/>
+              </a:rPr>
+              <a:t>PackageReference</a:t>
+            </a:r>
+            <a:r>
+              <a:rPr lang="en-US" sz="1600" dirty="0">
+                <a:solidFill>
+                  <a:srgbClr val="000000"/>
+                </a:solidFill>
+                <a:latin typeface="Consolas" panose="020B0609020204030204" pitchFamily="49" charset="0"/>
+              </a:rPr>
+              <a:t> </a:t>
+            </a:r>
+            <a:r>
+              <a:rPr lang="en-US" sz="1600" dirty="0">
+                <a:solidFill>
+                  <a:srgbClr val="FF0000"/>
+                </a:solidFill>
+                <a:latin typeface="Consolas" panose="020B0609020204030204" pitchFamily="49" charset="0"/>
+              </a:rPr>
+              <a:t>Include</a:t>
+            </a:r>
+            <a:r>
+              <a:rPr lang="en-US" sz="1600" dirty="0">
+                <a:solidFill>
+                  <a:srgbClr val="000000"/>
+                </a:solidFill>
+                <a:latin typeface="Consolas" panose="020B0609020204030204" pitchFamily="49" charset="0"/>
+              </a:rPr>
+              <a:t>=</a:t>
+            </a:r>
+            <a:r>
+              <a:rPr lang="en-US" sz="1600" dirty="0">
+                <a:solidFill>
+                  <a:srgbClr val="0000FF"/>
+                </a:solidFill>
                 <a:latin typeface="Consolas" panose="020B0609020204030204" pitchFamily="49" charset="0"/>
               </a:rPr>
               <a:t>"</a:t>
             </a:r>
             <a:r>
-              <a:rPr kumimoji="0" lang="en-US" altLang="en-US" sz="2000" b="0" i="0" u="none" strike="noStrike" cap="none" normalizeH="0" baseline="0" dirty="0" err="1">
-                <a:ln>
-                  <a:noFill/>
-                </a:ln>
-                <a:solidFill>
-                  <a:srgbClr val="2E75B6"/>
-                </a:solidFill>
-                <a:effectLst/>
-                <a:latin typeface="Consolas" panose="020B0609020204030204" pitchFamily="49" charset="0"/>
-              </a:rPr>
-              <a:t>Microsoft.EntityFrameworkCore.SqlServer</a:t>
-            </a:r>
-            <a:r>
-              <a:rPr kumimoji="0" lang="en-US" altLang="en-US" sz="2000" b="0" i="0" u="none" strike="noStrike" cap="none" normalizeH="0" baseline="0" dirty="0">
-                <a:ln>
-                  <a:noFill/>
-                </a:ln>
-                <a:solidFill>
-                  <a:srgbClr val="2E75B6"/>
-                </a:solidFill>
-                <a:effectLst/>
+              <a:rPr lang="en-US" sz="1600" dirty="0" err="1">
+                <a:solidFill>
+                  <a:srgbClr val="0000FF"/>
+                </a:solidFill>
+                <a:latin typeface="Consolas" panose="020B0609020204030204" pitchFamily="49" charset="0"/>
+              </a:rPr>
+              <a:t>Microsoft.EntityFrameworkCore.SqlServer.Design</a:t>
+            </a:r>
+            <a:r>
+              <a:rPr lang="en-US" sz="1600" dirty="0">
+                <a:solidFill>
+                  <a:srgbClr val="0000FF"/>
+                </a:solidFill>
                 <a:latin typeface="Consolas" panose="020B0609020204030204" pitchFamily="49" charset="0"/>
               </a:rPr>
               <a:t>"</a:t>
             </a:r>
             <a:r>
-              <a:rPr kumimoji="0" lang="en-US" altLang="en-US" sz="2000" b="0" i="0" u="none" strike="noStrike" cap="none" normalizeH="0" baseline="0" dirty="0">
-                <a:ln>
-                  <a:noFill/>
-                </a:ln>
+              <a:rPr lang="en-US" sz="1600" dirty="0">
                 <a:solidFill>
                   <a:srgbClr val="000000"/>
                 </a:solidFill>
-                <a:effectLst/>
-                <a:latin typeface="Consolas" panose="020B0609020204030204" pitchFamily="49" charset="0"/>
-              </a:rPr>
-              <a:t>: </a:t>
-            </a:r>
-            <a:r>
-              <a:rPr kumimoji="0" lang="en-US" altLang="en-US" sz="2000" b="0" i="0" u="none" strike="noStrike" cap="none" normalizeH="0" baseline="0" dirty="0">
-                <a:ln>
-                  <a:noFill/>
-                </a:ln>
-                <a:solidFill>
-                  <a:srgbClr val="A31515"/>
-                </a:solidFill>
-                <a:effectLst/>
+                <a:latin typeface="Consolas" panose="020B0609020204030204" pitchFamily="49" charset="0"/>
+              </a:rPr>
+              <a:t> </a:t>
+            </a:r>
+            <a:r>
+              <a:rPr lang="en-US" sz="1600" dirty="0">
+                <a:solidFill>
+                  <a:srgbClr val="FF0000"/>
+                </a:solidFill>
+                <a:latin typeface="Consolas" panose="020B0609020204030204" pitchFamily="49" charset="0"/>
+              </a:rPr>
+              <a:t>Version</a:t>
+            </a:r>
+            <a:r>
+              <a:rPr lang="en-US" sz="1600" dirty="0">
+                <a:solidFill>
+                  <a:srgbClr val="000000"/>
+                </a:solidFill>
+                <a:latin typeface="Consolas" panose="020B0609020204030204" pitchFamily="49" charset="0"/>
+              </a:rPr>
+              <a:t>=</a:t>
+            </a:r>
+            <a:r>
+              <a:rPr lang="en-US" sz="1600" dirty="0">
+                <a:solidFill>
+                  <a:srgbClr val="0000FF"/>
+                </a:solidFill>
+                <a:latin typeface="Consolas" panose="020B0609020204030204" pitchFamily="49" charset="0"/>
+              </a:rPr>
+              <a:t>"1.1.1"</a:t>
+            </a:r>
+            <a:r>
+              <a:rPr lang="en-US" sz="1600" dirty="0">
+                <a:solidFill>
+                  <a:srgbClr val="000000"/>
+                </a:solidFill>
+                <a:latin typeface="Consolas" panose="020B0609020204030204" pitchFamily="49" charset="0"/>
+              </a:rPr>
+              <a:t> </a:t>
+            </a:r>
+            <a:r>
+              <a:rPr lang="en-US" sz="1600" dirty="0">
+                <a:solidFill>
+                  <a:srgbClr val="800000"/>
+                </a:solidFill>
+                <a:latin typeface="Consolas" panose="020B0609020204030204" pitchFamily="49" charset="0"/>
+              </a:rPr>
+              <a:t>/&gt;</a:t>
+            </a:r>
+            <a:endParaRPr lang="en-US" sz="1600" dirty="0">
+              <a:solidFill>
+                <a:srgbClr val="000000"/>
+              </a:solidFill>
+              <a:latin typeface="Consolas" panose="020B0609020204030204" pitchFamily="49" charset="0"/>
+            </a:endParaRPr>
+          </a:p>
+          <a:p>
+            <a:r>
+              <a:rPr lang="en-US" sz="1600" dirty="0">
+                <a:solidFill>
+                  <a:srgbClr val="800000"/>
+                </a:solidFill>
+                <a:latin typeface="Consolas" panose="020B0609020204030204" pitchFamily="49" charset="0"/>
+              </a:rPr>
+              <a:t>&lt;/</a:t>
+            </a:r>
+            <a:r>
+              <a:rPr lang="en-US" sz="1600" dirty="0" err="1">
+                <a:solidFill>
+                  <a:srgbClr val="800000"/>
+                </a:solidFill>
+                <a:latin typeface="Consolas" panose="020B0609020204030204" pitchFamily="49" charset="0"/>
+              </a:rPr>
+              <a:t>ItemGroup</a:t>
+            </a:r>
+            <a:r>
+              <a:rPr lang="en-US" sz="1600" dirty="0">
+                <a:solidFill>
+                  <a:srgbClr val="800000"/>
+                </a:solidFill>
+                <a:latin typeface="Consolas" panose="020B0609020204030204" pitchFamily="49" charset="0"/>
+              </a:rPr>
+              <a:t>&gt;</a:t>
+            </a:r>
+            <a:endParaRPr lang="en-US" sz="1600" dirty="0">
+              <a:solidFill>
+                <a:srgbClr val="000000"/>
+              </a:solidFill>
+              <a:latin typeface="Consolas" panose="020B0609020204030204" pitchFamily="49" charset="0"/>
+            </a:endParaRPr>
+          </a:p>
+          <a:p>
+            <a:r>
+              <a:rPr lang="en-US" sz="1600" dirty="0">
+                <a:solidFill>
+                  <a:srgbClr val="800000"/>
+                </a:solidFill>
+                <a:latin typeface="Consolas" panose="020B0609020204030204" pitchFamily="49" charset="0"/>
+              </a:rPr>
+              <a:t>&lt;</a:t>
+            </a:r>
+            <a:r>
+              <a:rPr lang="en-US" sz="1600" dirty="0" err="1">
+                <a:solidFill>
+                  <a:srgbClr val="800000"/>
+                </a:solidFill>
+                <a:latin typeface="Consolas" panose="020B0609020204030204" pitchFamily="49" charset="0"/>
+              </a:rPr>
+              <a:t>ItemGroup</a:t>
+            </a:r>
+            <a:r>
+              <a:rPr lang="en-US" sz="1600" dirty="0">
+                <a:solidFill>
+                  <a:srgbClr val="800000"/>
+                </a:solidFill>
+                <a:latin typeface="Consolas" panose="020B0609020204030204" pitchFamily="49" charset="0"/>
+              </a:rPr>
+              <a:t>&gt;</a:t>
+            </a:r>
+            <a:endParaRPr lang="en-US" sz="1600" dirty="0">
+              <a:solidFill>
+                <a:srgbClr val="000000"/>
+              </a:solidFill>
+              <a:latin typeface="Consolas" panose="020B0609020204030204" pitchFamily="49" charset="0"/>
+            </a:endParaRPr>
+          </a:p>
+          <a:p>
+            <a:r>
+              <a:rPr lang="en-US" sz="1600" dirty="0">
+                <a:solidFill>
+                  <a:srgbClr val="800000"/>
+                </a:solidFill>
+                <a:latin typeface="Consolas" panose="020B0609020204030204" pitchFamily="49" charset="0"/>
+              </a:rPr>
+              <a:t>  &lt;</a:t>
+            </a:r>
+            <a:r>
+              <a:rPr lang="en-US" sz="1600" dirty="0" err="1">
+                <a:solidFill>
+                  <a:srgbClr val="800000"/>
+                </a:solidFill>
+                <a:latin typeface="Consolas" panose="020B0609020204030204" pitchFamily="49" charset="0"/>
+              </a:rPr>
+              <a:t>DotNetCliToolReference</a:t>
+            </a:r>
+            <a:r>
+              <a:rPr lang="en-US" sz="1600" dirty="0">
+                <a:solidFill>
+                  <a:srgbClr val="000000"/>
+                </a:solidFill>
+                <a:latin typeface="Consolas" panose="020B0609020204030204" pitchFamily="49" charset="0"/>
+              </a:rPr>
+              <a:t> </a:t>
+            </a:r>
+            <a:r>
+              <a:rPr lang="en-US" sz="1600" dirty="0">
+                <a:solidFill>
+                  <a:srgbClr val="FF0000"/>
+                </a:solidFill>
+                <a:latin typeface="Consolas" panose="020B0609020204030204" pitchFamily="49" charset="0"/>
+              </a:rPr>
+              <a:t>Include</a:t>
+            </a:r>
+            <a:r>
+              <a:rPr lang="en-US" sz="1600" dirty="0">
+                <a:solidFill>
+                  <a:srgbClr val="000000"/>
+                </a:solidFill>
+                <a:latin typeface="Consolas" panose="020B0609020204030204" pitchFamily="49" charset="0"/>
+              </a:rPr>
+              <a:t>=</a:t>
+            </a:r>
+            <a:r>
+              <a:rPr lang="en-US" sz="1600" dirty="0">
+                <a:solidFill>
+                  <a:srgbClr val="0000FF"/>
+                </a:solidFill>
+                <a:latin typeface="Consolas" panose="020B0609020204030204" pitchFamily="49" charset="0"/>
+              </a:rPr>
+              <a:t>"</a:t>
+            </a:r>
+            <a:r>
+              <a:rPr lang="en-US" sz="1600" dirty="0" err="1">
+                <a:solidFill>
+                  <a:srgbClr val="0000FF"/>
+                </a:solidFill>
+                <a:latin typeface="Consolas" panose="020B0609020204030204" pitchFamily="49" charset="0"/>
+              </a:rPr>
+              <a:t>Microsoft.EntityFrameworkCore.Tools.DotNet</a:t>
+            </a:r>
+            <a:r>
+              <a:rPr lang="en-US" sz="1600" dirty="0">
+                <a:solidFill>
+                  <a:srgbClr val="0000FF"/>
+                </a:solidFill>
+                <a:latin typeface="Consolas" panose="020B0609020204030204" pitchFamily="49" charset="0"/>
+              </a:rPr>
+              <a:t>"</a:t>
+            </a:r>
+            <a:r>
+              <a:rPr lang="en-US" sz="1600" dirty="0">
+                <a:solidFill>
+                  <a:srgbClr val="000000"/>
+                </a:solidFill>
+                <a:latin typeface="Consolas" panose="020B0609020204030204" pitchFamily="49" charset="0"/>
+              </a:rPr>
+              <a:t> </a:t>
+            </a:r>
+            <a:r>
+              <a:rPr lang="en-US" sz="1600" dirty="0">
+                <a:solidFill>
+                  <a:srgbClr val="FF0000"/>
+                </a:solidFill>
+                <a:latin typeface="Consolas" panose="020B0609020204030204" pitchFamily="49" charset="0"/>
+              </a:rPr>
+              <a:t>Version</a:t>
+            </a:r>
+            <a:r>
+              <a:rPr lang="en-US" sz="1600" dirty="0">
+                <a:solidFill>
+                  <a:srgbClr val="000000"/>
+                </a:solidFill>
+                <a:latin typeface="Consolas" panose="020B0609020204030204" pitchFamily="49" charset="0"/>
+              </a:rPr>
+              <a:t>=</a:t>
+            </a:r>
+            <a:r>
+              <a:rPr lang="en-US" sz="1600" dirty="0">
+                <a:solidFill>
+                  <a:srgbClr val="0000FF"/>
+                </a:solidFill>
                 <a:latin typeface="Consolas" panose="020B0609020204030204" pitchFamily="49" charset="0"/>
               </a:rPr>
               <a:t>"1.0.0"</a:t>
             </a:r>
             <a:r>
-              <a:rPr kumimoji="0" lang="en-US" altLang="en-US" sz="2000" b="0" i="0" u="none" strike="noStrike" cap="none" normalizeH="0" baseline="0" dirty="0">
-                <a:ln>
-                  <a:noFill/>
-                </a:ln>
+              <a:rPr lang="en-US" sz="1600" dirty="0">
                 <a:solidFill>
                   <a:srgbClr val="000000"/>
                 </a:solidFill>
-                <a:effectLst/>
-                <a:latin typeface="Consolas" panose="020B0609020204030204" pitchFamily="49" charset="0"/>
-              </a:rPr>
-              <a:t>,</a:t>
-            </a:r>
-          </a:p>
-          <a:p>
-            <a:pPr marL="0" marR="0" lvl="0" indent="0" algn="l" defTabSz="914400" rtl="0" eaLnBrk="0" fontAlgn="base" latinLnBrk="0" hangingPunct="0">
-              <a:lnSpc>
-                <a:spcPct val="100000"/>
-              </a:lnSpc>
-              <a:spcBef>
-                <a:spcPct val="0"/>
-              </a:spcBef>
-              <a:spcAft>
-                <a:spcPct val="0"/>
-              </a:spcAft>
-              <a:buClrTx/>
-              <a:buSzTx/>
-              <a:buFontTx/>
-              <a:buNone/>
-              <a:tabLst/>
-            </a:pPr>
-            <a:r>
-              <a:rPr kumimoji="0" lang="en-US" altLang="en-US" sz="2000" b="0" i="0" u="none" strike="noStrike" cap="none" normalizeH="0" baseline="0" dirty="0">
-                <a:ln>
-                  <a:noFill/>
-                </a:ln>
-                <a:solidFill>
-                  <a:srgbClr val="000000"/>
-                </a:solidFill>
-                <a:effectLst/>
-                <a:latin typeface="Consolas" panose="020B0609020204030204" pitchFamily="49" charset="0"/>
-              </a:rPr>
-              <a:t>   </a:t>
-            </a:r>
-            <a:r>
-              <a:rPr kumimoji="0" lang="en-US" altLang="en-US" sz="2000" b="0" i="0" u="none" strike="noStrike" cap="none" normalizeH="0" baseline="0" dirty="0">
-                <a:ln>
-                  <a:noFill/>
-                </a:ln>
-                <a:solidFill>
-                  <a:srgbClr val="2E75B6"/>
-                </a:solidFill>
-                <a:effectLst/>
-                <a:latin typeface="Consolas" panose="020B0609020204030204" pitchFamily="49" charset="0"/>
-              </a:rPr>
-              <a:t>"</a:t>
-            </a:r>
-            <a:r>
-              <a:rPr kumimoji="0" lang="en-US" altLang="en-US" sz="2000" b="0" i="0" u="none" strike="noStrike" cap="none" normalizeH="0" baseline="0" dirty="0" err="1">
-                <a:ln>
-                  <a:noFill/>
-                </a:ln>
-                <a:solidFill>
-                  <a:srgbClr val="2E75B6"/>
-                </a:solidFill>
-                <a:effectLst/>
-                <a:latin typeface="Consolas" panose="020B0609020204030204" pitchFamily="49" charset="0"/>
-              </a:rPr>
-              <a:t>Microsoft.EntityFrameworkCore.SqlServer.Design</a:t>
-            </a:r>
-            <a:r>
-              <a:rPr kumimoji="0" lang="en-US" altLang="en-US" sz="2000" b="0" i="0" u="none" strike="noStrike" cap="none" normalizeH="0" baseline="0" dirty="0">
-                <a:ln>
-                  <a:noFill/>
-                </a:ln>
-                <a:solidFill>
-                  <a:srgbClr val="2E75B6"/>
-                </a:solidFill>
-                <a:effectLst/>
-                <a:latin typeface="Consolas" panose="020B0609020204030204" pitchFamily="49" charset="0"/>
-              </a:rPr>
-              <a:t>"</a:t>
-            </a:r>
-            <a:r>
-              <a:rPr kumimoji="0" lang="en-US" altLang="en-US" sz="2000" b="0" i="0" u="none" strike="noStrike" cap="none" normalizeH="0" baseline="0" dirty="0">
-                <a:ln>
-                  <a:noFill/>
-                </a:ln>
-                <a:solidFill>
-                  <a:srgbClr val="000000"/>
-                </a:solidFill>
-                <a:effectLst/>
-                <a:latin typeface="Consolas" panose="020B0609020204030204" pitchFamily="49" charset="0"/>
-              </a:rPr>
-              <a:t>: </a:t>
-            </a:r>
-            <a:r>
-              <a:rPr kumimoji="0" lang="en-US" altLang="en-US" sz="2000" b="0" i="0" u="none" strike="noStrike" cap="none" normalizeH="0" baseline="0" dirty="0">
-                <a:ln>
-                  <a:noFill/>
-                </a:ln>
-                <a:solidFill>
-                  <a:srgbClr val="A31515"/>
-                </a:solidFill>
-                <a:effectLst/>
-                <a:latin typeface="Consolas" panose="020B0609020204030204" pitchFamily="49" charset="0"/>
-              </a:rPr>
-              <a:t>"1.0.0"</a:t>
-            </a:r>
-            <a:r>
-              <a:rPr kumimoji="0" lang="en-US" altLang="en-US" sz="2000" b="0" i="0" u="none" strike="noStrike" cap="none" normalizeH="0" baseline="0" dirty="0">
-                <a:ln>
-                  <a:noFill/>
-                </a:ln>
-                <a:solidFill>
-                  <a:srgbClr val="000000"/>
-                </a:solidFill>
-                <a:effectLst/>
-                <a:latin typeface="Consolas" panose="020B0609020204030204" pitchFamily="49" charset="0"/>
-              </a:rPr>
-              <a:t>,</a:t>
-            </a:r>
-          </a:p>
-          <a:p>
-            <a:pPr marL="0" marR="0" lvl="0" indent="0" algn="l" defTabSz="914400" rtl="0" eaLnBrk="0" fontAlgn="base" latinLnBrk="0" hangingPunct="0">
-              <a:lnSpc>
-                <a:spcPct val="100000"/>
-              </a:lnSpc>
-              <a:spcBef>
-                <a:spcPct val="0"/>
-              </a:spcBef>
-              <a:spcAft>
-                <a:spcPct val="0"/>
-              </a:spcAft>
-              <a:buClrTx/>
-              <a:buSzTx/>
-              <a:buFontTx/>
-              <a:buNone/>
-              <a:tabLst/>
-            </a:pPr>
-            <a:r>
-              <a:rPr kumimoji="0" lang="en-US" altLang="en-US" sz="2000" b="0" i="0" u="none" strike="noStrike" cap="none" normalizeH="0" baseline="0" dirty="0">
-                <a:ln>
-                  <a:noFill/>
-                </a:ln>
-                <a:solidFill>
-                  <a:srgbClr val="000000"/>
-                </a:solidFill>
-                <a:effectLst/>
-                <a:latin typeface="Consolas" panose="020B0609020204030204" pitchFamily="49" charset="0"/>
-              </a:rPr>
-              <a:t>},</a:t>
-            </a:r>
-          </a:p>
-          <a:p>
-            <a:pPr marL="0" marR="0" lvl="0" indent="0" algn="l" defTabSz="914400" rtl="0" eaLnBrk="0" fontAlgn="base" latinLnBrk="0" hangingPunct="0">
-              <a:lnSpc>
-                <a:spcPct val="100000"/>
-              </a:lnSpc>
-              <a:spcBef>
-                <a:spcPct val="0"/>
-              </a:spcBef>
-              <a:spcAft>
-                <a:spcPct val="0"/>
-              </a:spcAft>
-              <a:buClrTx/>
-              <a:buSzTx/>
-              <a:buFontTx/>
-              <a:buNone/>
-              <a:tabLst/>
-            </a:pPr>
-            <a:r>
-              <a:rPr kumimoji="0" lang="en-US" altLang="en-US" sz="2000" b="0" i="0" u="none" strike="noStrike" cap="none" normalizeH="0" baseline="0" dirty="0">
-                <a:ln>
-                  <a:noFill/>
-                </a:ln>
-                <a:solidFill>
-                  <a:srgbClr val="2E75B6"/>
-                </a:solidFill>
-                <a:effectLst/>
-                <a:latin typeface="Consolas" panose="020B0609020204030204" pitchFamily="49" charset="0"/>
-              </a:rPr>
-              <a:t>"tools"</a:t>
-            </a:r>
-            <a:r>
-              <a:rPr kumimoji="0" lang="en-US" altLang="en-US" sz="2000" b="0" i="0" u="none" strike="noStrike" cap="none" normalizeH="0" baseline="0" dirty="0">
-                <a:ln>
-                  <a:noFill/>
-                </a:ln>
-                <a:solidFill>
-                  <a:srgbClr val="000000"/>
-                </a:solidFill>
-                <a:effectLst/>
-                <a:latin typeface="Consolas" panose="020B0609020204030204" pitchFamily="49" charset="0"/>
-              </a:rPr>
-              <a:t>: {</a:t>
-            </a:r>
-          </a:p>
-          <a:p>
-            <a:pPr marL="0" marR="0" lvl="0" indent="0" algn="l" defTabSz="914400" rtl="0" eaLnBrk="0" fontAlgn="base" latinLnBrk="0" hangingPunct="0">
-              <a:lnSpc>
-                <a:spcPct val="100000"/>
-              </a:lnSpc>
-              <a:spcBef>
-                <a:spcPct val="0"/>
-              </a:spcBef>
-              <a:spcAft>
-                <a:spcPct val="0"/>
-              </a:spcAft>
-              <a:buClrTx/>
-              <a:buSzTx/>
-              <a:buFontTx/>
-              <a:buNone/>
-              <a:tabLst/>
-            </a:pPr>
-            <a:r>
-              <a:rPr kumimoji="0" lang="en-US" altLang="en-US" sz="2000" b="0" i="0" u="none" strike="noStrike" cap="none" normalizeH="0" baseline="0" dirty="0">
-                <a:ln>
-                  <a:noFill/>
-                </a:ln>
-                <a:solidFill>
-                  <a:srgbClr val="000000"/>
-                </a:solidFill>
-                <a:effectLst/>
-                <a:latin typeface="Consolas" panose="020B0609020204030204" pitchFamily="49" charset="0"/>
-              </a:rPr>
-              <a:t>   </a:t>
-            </a:r>
-            <a:r>
-              <a:rPr kumimoji="0" lang="en-US" altLang="en-US" sz="2000" b="0" i="0" u="none" strike="noStrike" cap="none" normalizeH="0" baseline="0" dirty="0">
-                <a:ln>
-                  <a:noFill/>
-                </a:ln>
-                <a:solidFill>
-                  <a:srgbClr val="2E75B6"/>
-                </a:solidFill>
-                <a:effectLst/>
-                <a:latin typeface="Consolas" panose="020B0609020204030204" pitchFamily="49" charset="0"/>
-              </a:rPr>
-              <a:t>"</a:t>
-            </a:r>
-            <a:r>
-              <a:rPr kumimoji="0" lang="en-US" altLang="en-US" sz="2000" b="0" i="0" u="none" strike="noStrike" cap="none" normalizeH="0" baseline="0" dirty="0" err="1">
-                <a:ln>
-                  <a:noFill/>
-                </a:ln>
-                <a:solidFill>
-                  <a:srgbClr val="2E75B6"/>
-                </a:solidFill>
-                <a:effectLst/>
-                <a:latin typeface="Consolas" panose="020B0609020204030204" pitchFamily="49" charset="0"/>
-              </a:rPr>
-              <a:t>Microsoft.EntityFrameworkCore.Tools</a:t>
-            </a:r>
-            <a:r>
-              <a:rPr kumimoji="0" lang="en-US" altLang="en-US" sz="2000" b="0" i="0" u="none" strike="noStrike" cap="none" normalizeH="0" baseline="0" dirty="0">
-                <a:ln>
-                  <a:noFill/>
-                </a:ln>
-                <a:solidFill>
-                  <a:srgbClr val="2E75B6"/>
-                </a:solidFill>
-                <a:effectLst/>
-                <a:latin typeface="Consolas" panose="020B0609020204030204" pitchFamily="49" charset="0"/>
-              </a:rPr>
-              <a:t>"</a:t>
-            </a:r>
-            <a:r>
-              <a:rPr kumimoji="0" lang="en-US" altLang="en-US" sz="2000" b="0" i="0" u="none" strike="noStrike" cap="none" normalizeH="0" baseline="0" dirty="0">
-                <a:ln>
-                  <a:noFill/>
-                </a:ln>
-                <a:solidFill>
-                  <a:srgbClr val="000000"/>
-                </a:solidFill>
-                <a:effectLst/>
-                <a:latin typeface="Consolas" panose="020B0609020204030204" pitchFamily="49" charset="0"/>
-              </a:rPr>
-              <a:t>: </a:t>
-            </a:r>
-            <a:r>
-              <a:rPr kumimoji="0" lang="en-US" altLang="en-US" sz="2000" b="0" i="0" u="none" strike="noStrike" cap="none" normalizeH="0" baseline="0" dirty="0">
-                <a:ln>
-                  <a:noFill/>
-                </a:ln>
-                <a:solidFill>
-                  <a:srgbClr val="A31515"/>
-                </a:solidFill>
-                <a:effectLst/>
-                <a:latin typeface="Consolas" panose="020B0609020204030204" pitchFamily="49" charset="0"/>
-              </a:rPr>
-              <a:t>"1.0.0-preview2-final“</a:t>
-            </a:r>
-          </a:p>
-          <a:p>
-            <a:pPr marL="0" marR="0" lvl="0" indent="0" algn="l" defTabSz="914400" rtl="0" eaLnBrk="0" fontAlgn="base" latinLnBrk="0" hangingPunct="0">
-              <a:lnSpc>
-                <a:spcPct val="100000"/>
-              </a:lnSpc>
-              <a:spcBef>
-                <a:spcPct val="0"/>
-              </a:spcBef>
-              <a:spcAft>
-                <a:spcPct val="0"/>
-              </a:spcAft>
-              <a:buClrTx/>
-              <a:buSzTx/>
-              <a:buFontTx/>
-              <a:buNone/>
-              <a:tabLst/>
-            </a:pPr>
-            <a:r>
-              <a:rPr kumimoji="0" lang="en-US" altLang="en-US" sz="2000" b="0" i="0" u="none" strike="noStrike" cap="none" normalizeH="0" baseline="0" dirty="0">
-                <a:ln>
-                  <a:noFill/>
-                </a:ln>
-                <a:solidFill>
-                  <a:srgbClr val="000000"/>
-                </a:solidFill>
-                <a:effectLst/>
-                <a:latin typeface="Consolas" panose="020B0609020204030204" pitchFamily="49" charset="0"/>
-              </a:rPr>
-              <a:t>}, </a:t>
-            </a:r>
-            <a:endParaRPr kumimoji="0" lang="en-US" altLang="en-US" sz="2000" b="0" i="0" u="none" strike="noStrike" cap="none" normalizeH="0" baseline="0" dirty="0">
-              <a:ln>
-                <a:noFill/>
-              </a:ln>
+                <a:latin typeface="Consolas" panose="020B0609020204030204" pitchFamily="49" charset="0"/>
+              </a:rPr>
+              <a:t> </a:t>
+            </a:r>
+            <a:r>
+              <a:rPr lang="en-US" sz="1600" dirty="0">
+                <a:solidFill>
+                  <a:srgbClr val="800000"/>
+                </a:solidFill>
+                <a:latin typeface="Consolas" panose="020B0609020204030204" pitchFamily="49" charset="0"/>
+              </a:rPr>
+              <a:t>/&gt;</a:t>
+            </a:r>
+            <a:endParaRPr lang="en-US" sz="1600" dirty="0">
               <a:solidFill>
-                <a:schemeClr val="tx1"/>
+                <a:srgbClr val="000000"/>
+              </a:solidFill>
+              <a:latin typeface="Consolas" panose="020B0609020204030204" pitchFamily="49" charset="0"/>
+            </a:endParaRPr>
+          </a:p>
+          <a:p>
+            <a:r>
+              <a:rPr lang="en-US" sz="1600" dirty="0">
+                <a:solidFill>
+                  <a:srgbClr val="800000"/>
+                </a:solidFill>
+                <a:latin typeface="Consolas" panose="020B0609020204030204" pitchFamily="49" charset="0"/>
+              </a:rPr>
+              <a:t>&lt;/</a:t>
+            </a:r>
+            <a:r>
+              <a:rPr lang="en-US" sz="1600" dirty="0" err="1">
+                <a:solidFill>
+                  <a:srgbClr val="800000"/>
+                </a:solidFill>
+                <a:latin typeface="Consolas" panose="020B0609020204030204" pitchFamily="49" charset="0"/>
+              </a:rPr>
+              <a:t>ItemGroup</a:t>
+            </a:r>
+            <a:r>
+              <a:rPr lang="en-US" sz="1600" dirty="0">
+                <a:solidFill>
+                  <a:srgbClr val="800000"/>
+                </a:solidFill>
+                <a:latin typeface="Consolas" panose="020B0609020204030204" pitchFamily="49" charset="0"/>
+              </a:rPr>
+              <a:t>&gt;</a:t>
+            </a:r>
+            <a:endParaRPr lang="en-US" sz="1600" b="0" dirty="0">
+              <a:solidFill>
+                <a:srgbClr val="000000"/>
               </a:solidFill>
               <a:effectLst/>
-              <a:latin typeface="Arial" panose="020B0604020202020204" pitchFamily="34" charset="0"/>
-            </a:endParaRPr>
-          </a:p>
-        </p:txBody>
-      </p:sp>
-      <p:sp>
-        <p:nvSpPr>
-          <p:cNvPr id="5" name="Rectangle 2"/>
-          <p:cNvSpPr txBox="1">
-            <a:spLocks noChangeArrowheads="1"/>
-          </p:cNvSpPr>
-          <p:nvPr/>
-        </p:nvSpPr>
-        <p:spPr bwMode="auto">
-          <a:xfrm>
-            <a:off x="627086" y="2837527"/>
-            <a:ext cx="10935746" cy="2554545"/>
-          </a:xfrm>
-          <a:prstGeom prst="rect">
-            <a:avLst/>
-          </a:prstGeom>
-          <a:solidFill>
-            <a:srgbClr val="FFFFFF"/>
-          </a:solidFill>
-          <a:ln>
-            <a:noFill/>
-          </a:ln>
-          <a:effectLst/>
-          <a:extLst>
-            <a:ext uri="{91240B29-F687-4F45-9708-019B960494DF}">
-              <a14:hiddenLine xmlns:a14="http://schemas.microsoft.com/office/drawing/2010/main" w="9525">
-                <a:solidFill>
-                  <a:schemeClr val="tx1"/>
-                </a:solidFill>
-                <a:miter lim="800000"/>
-                <a:headEnd/>
-                <a:tailEnd/>
-              </a14:hiddenLine>
-            </a:ext>
-            <a:ext uri="{AF507438-7753-43E0-B8FC-AC1667EBCBE1}">
-              <a14:hiddenEffects xmlns:a14="http://schemas.microsoft.com/office/drawing/2010/main">
-                <a:effectLst>
-                  <a:outerShdw dist="35921" dir="2700000" algn="ctr" rotWithShape="0">
-                    <a:schemeClr val="bg2"/>
-                  </a:outerShdw>
-                </a:effectLst>
-              </a14:hiddenEffects>
-            </a:ext>
-          </a:extLst>
-        </p:spPr>
-        <p:txBody>
-          <a:bodyPr vert="horz" wrap="square" lIns="91440" tIns="45720" rIns="91440" bIns="45720" numCol="1" rtlCol="0" anchor="ctr" anchorCtr="0" compatLnSpc="1">
-            <a:prstTxWarp prst="textNoShape">
-              <a:avLst/>
-            </a:prstTxWarp>
-            <a:spAutoFit/>
-          </a:bodyPr>
-          <a:lstStyle>
-            <a:lvl1pPr marL="182880" indent="-182880" algn="l" defTabSz="914400" rtl="0" eaLnBrk="1" latinLnBrk="0" hangingPunct="1">
-              <a:lnSpc>
-                <a:spcPct val="90000"/>
-              </a:lnSpc>
-              <a:spcBef>
-                <a:spcPts val="1200"/>
-              </a:spcBef>
-              <a:spcAft>
-                <a:spcPts val="200"/>
-              </a:spcAft>
-              <a:buClr>
-                <a:schemeClr val="tx1"/>
-              </a:buClr>
-              <a:buFont typeface="Wingdings" pitchFamily="2" charset="2"/>
-              <a:buChar char=""/>
-              <a:defRPr sz="2200" kern="1200">
-                <a:solidFill>
-                  <a:schemeClr val="tx1"/>
-                </a:solidFill>
-                <a:latin typeface="+mn-lt"/>
-                <a:ea typeface="+mn-ea"/>
-                <a:cs typeface="+mn-cs"/>
-              </a:defRPr>
-            </a:lvl1pPr>
-            <a:lvl2pPr marL="411480" indent="-182880" algn="l" defTabSz="914400" rtl="0" eaLnBrk="1" latinLnBrk="0" hangingPunct="1">
-              <a:lnSpc>
-                <a:spcPct val="90000"/>
-              </a:lnSpc>
-              <a:spcBef>
-                <a:spcPts val="200"/>
-              </a:spcBef>
-              <a:spcAft>
-                <a:spcPts val="400"/>
-              </a:spcAft>
-              <a:buClr>
-                <a:schemeClr val="tx1"/>
-              </a:buClr>
-              <a:buFont typeface="Wingdings" pitchFamily="2" charset="2"/>
-              <a:buChar char=""/>
-              <a:defRPr sz="2000" kern="1200">
-                <a:solidFill>
-                  <a:schemeClr val="tx1"/>
-                </a:solidFill>
-                <a:latin typeface="+mn-lt"/>
-                <a:ea typeface="+mn-ea"/>
-                <a:cs typeface="+mn-cs"/>
-              </a:defRPr>
-            </a:lvl2pPr>
-            <a:lvl3pPr marL="640080" indent="-182880" algn="l" defTabSz="914400" rtl="0" eaLnBrk="1" latinLnBrk="0" hangingPunct="1">
-              <a:lnSpc>
-                <a:spcPct val="90000"/>
-              </a:lnSpc>
-              <a:spcBef>
-                <a:spcPts val="200"/>
-              </a:spcBef>
-              <a:spcAft>
-                <a:spcPts val="400"/>
-              </a:spcAft>
-              <a:buClr>
-                <a:schemeClr val="tx1"/>
-              </a:buClr>
-              <a:buFont typeface="Wingdings" pitchFamily="2" charset="2"/>
-              <a:buChar char=""/>
-              <a:defRPr sz="1800" kern="1200">
-                <a:solidFill>
-                  <a:schemeClr val="tx1"/>
-                </a:solidFill>
-                <a:latin typeface="+mn-lt"/>
-                <a:ea typeface="+mn-ea"/>
-                <a:cs typeface="+mn-cs"/>
-              </a:defRPr>
-            </a:lvl3pPr>
-            <a:lvl4pPr marL="868680" indent="-182880" algn="l" defTabSz="914400" rtl="0" eaLnBrk="1" latinLnBrk="0" hangingPunct="1">
-              <a:lnSpc>
-                <a:spcPct val="90000"/>
-              </a:lnSpc>
-              <a:spcBef>
-                <a:spcPts val="200"/>
-              </a:spcBef>
-              <a:spcAft>
-                <a:spcPts val="400"/>
-              </a:spcAft>
-              <a:buClr>
-                <a:schemeClr val="tx1"/>
-              </a:buClr>
-              <a:buFont typeface="Wingdings" pitchFamily="2" charset="2"/>
-              <a:buChar char=""/>
-              <a:defRPr sz="1600" kern="1200">
-                <a:solidFill>
-                  <a:schemeClr val="tx1"/>
-                </a:solidFill>
-                <a:latin typeface="+mn-lt"/>
-                <a:ea typeface="+mn-ea"/>
-                <a:cs typeface="+mn-cs"/>
-              </a:defRPr>
-            </a:lvl4pPr>
-            <a:lvl5pPr marL="1097280" indent="-182880" algn="l" defTabSz="914400" rtl="0" eaLnBrk="1" latinLnBrk="0" hangingPunct="1">
-              <a:lnSpc>
-                <a:spcPct val="90000"/>
-              </a:lnSpc>
-              <a:spcBef>
-                <a:spcPts val="200"/>
-              </a:spcBef>
-              <a:spcAft>
-                <a:spcPts val="400"/>
-              </a:spcAft>
-              <a:buClr>
-                <a:schemeClr val="tx1"/>
-              </a:buClr>
-              <a:buFont typeface="Wingdings" pitchFamily="2" charset="2"/>
-              <a:buChar char=""/>
-              <a:defRPr sz="1600" kern="1200">
-                <a:solidFill>
-                  <a:schemeClr val="tx1"/>
-                </a:solidFill>
-                <a:latin typeface="+mn-lt"/>
-                <a:ea typeface="+mn-ea"/>
-                <a:cs typeface="+mn-cs"/>
-              </a:defRPr>
-            </a:lvl5pPr>
-            <a:lvl6pPr marL="1284600" indent="-228600" algn="l" defTabSz="914400" rtl="0" eaLnBrk="1" latinLnBrk="0" hangingPunct="1">
-              <a:lnSpc>
-                <a:spcPct val="90000"/>
-              </a:lnSpc>
-              <a:spcBef>
-                <a:spcPts val="200"/>
-              </a:spcBef>
-              <a:spcAft>
-                <a:spcPts val="400"/>
-              </a:spcAft>
-              <a:buClr>
-                <a:schemeClr val="tx1"/>
-              </a:buClr>
-              <a:buFont typeface="Wingdings" pitchFamily="2" charset="2"/>
-              <a:buChar char=""/>
-              <a:defRPr sz="1600" kern="1200">
-                <a:solidFill>
-                  <a:schemeClr val="tx1"/>
-                </a:solidFill>
-                <a:latin typeface="+mn-lt"/>
-                <a:ea typeface="+mn-ea"/>
-                <a:cs typeface="+mn-cs"/>
-              </a:defRPr>
-            </a:lvl6pPr>
-            <a:lvl7pPr marL="1471800" indent="-228600" algn="l" defTabSz="914400" rtl="0" eaLnBrk="1" latinLnBrk="0" hangingPunct="1">
-              <a:lnSpc>
-                <a:spcPct val="90000"/>
-              </a:lnSpc>
-              <a:spcBef>
-                <a:spcPts val="200"/>
-              </a:spcBef>
-              <a:spcAft>
-                <a:spcPts val="400"/>
-              </a:spcAft>
-              <a:buClr>
-                <a:schemeClr val="tx1"/>
-              </a:buClr>
-              <a:buFont typeface="Wingdings" pitchFamily="2" charset="2"/>
-              <a:buChar char=""/>
-              <a:defRPr sz="1600" kern="1200">
-                <a:solidFill>
-                  <a:schemeClr val="tx1"/>
-                </a:solidFill>
-                <a:latin typeface="+mn-lt"/>
-                <a:ea typeface="+mn-ea"/>
-                <a:cs typeface="+mn-cs"/>
-              </a:defRPr>
-            </a:lvl7pPr>
-            <a:lvl8pPr marL="1629000" indent="-228600" algn="l" defTabSz="914400" rtl="0" eaLnBrk="1" latinLnBrk="0" hangingPunct="1">
-              <a:lnSpc>
-                <a:spcPct val="90000"/>
-              </a:lnSpc>
-              <a:spcBef>
-                <a:spcPts val="200"/>
-              </a:spcBef>
-              <a:spcAft>
-                <a:spcPts val="400"/>
-              </a:spcAft>
-              <a:buClr>
-                <a:schemeClr val="tx1"/>
-              </a:buClr>
-              <a:buFont typeface="Wingdings" pitchFamily="2" charset="2"/>
-              <a:buChar char=""/>
-              <a:defRPr sz="1600" kern="1200">
-                <a:solidFill>
-                  <a:schemeClr val="tx1"/>
-                </a:solidFill>
-                <a:latin typeface="+mn-lt"/>
-                <a:ea typeface="+mn-ea"/>
-                <a:cs typeface="+mn-cs"/>
-              </a:defRPr>
-            </a:lvl8pPr>
-            <a:lvl9pPr marL="1806200" indent="-228600" algn="l" defTabSz="914400" rtl="0" eaLnBrk="1" latinLnBrk="0" hangingPunct="1">
-              <a:lnSpc>
-                <a:spcPct val="90000"/>
-              </a:lnSpc>
-              <a:spcBef>
-                <a:spcPts val="200"/>
-              </a:spcBef>
-              <a:spcAft>
-                <a:spcPts val="400"/>
-              </a:spcAft>
-              <a:buClr>
-                <a:schemeClr val="tx1"/>
-              </a:buClr>
-              <a:buFont typeface="Wingdings" pitchFamily="2" charset="2"/>
-              <a:buChar char=""/>
-              <a:defRPr sz="1600" kern="1200">
-                <a:solidFill>
-                  <a:schemeClr val="tx1"/>
-                </a:solidFill>
-                <a:latin typeface="+mn-lt"/>
-                <a:ea typeface="+mn-ea"/>
-                <a:cs typeface="+mn-cs"/>
-              </a:defRPr>
-            </a:lvl9pPr>
-          </a:lstStyle>
-          <a:p>
-            <a:pPr marL="0" indent="0" eaLnBrk="0" fontAlgn="base" hangingPunct="0">
-              <a:lnSpc>
-                <a:spcPct val="100000"/>
-              </a:lnSpc>
-              <a:spcBef>
-                <a:spcPct val="0"/>
-              </a:spcBef>
-              <a:spcAft>
-                <a:spcPct val="0"/>
-              </a:spcAft>
-              <a:buClrTx/>
-              <a:buFontTx/>
-              <a:buNone/>
-            </a:pPr>
-            <a:r>
-              <a:rPr lang="en-US" altLang="en-US" sz="2000" dirty="0">
-                <a:solidFill>
-                  <a:srgbClr val="2E75B6"/>
-                </a:solidFill>
-                <a:latin typeface="Consolas" panose="020B0609020204030204" pitchFamily="49" charset="0"/>
-              </a:rPr>
-              <a:t>"dependencies"</a:t>
-            </a:r>
-            <a:r>
-              <a:rPr lang="en-US" altLang="en-US" sz="2000" dirty="0">
-                <a:solidFill>
-                  <a:srgbClr val="000000"/>
-                </a:solidFill>
-                <a:latin typeface="Consolas" panose="020B0609020204030204" pitchFamily="49" charset="0"/>
-              </a:rPr>
-              <a:t>: {</a:t>
-            </a:r>
-          </a:p>
-          <a:p>
-            <a:pPr marL="0" indent="0" eaLnBrk="0" fontAlgn="base" hangingPunct="0">
-              <a:lnSpc>
-                <a:spcPct val="100000"/>
-              </a:lnSpc>
-              <a:spcBef>
-                <a:spcPct val="0"/>
-              </a:spcBef>
-              <a:spcAft>
-                <a:spcPct val="0"/>
-              </a:spcAft>
-              <a:buClrTx/>
-              <a:buFontTx/>
-              <a:buNone/>
-            </a:pPr>
-            <a:r>
-              <a:rPr lang="en-US" altLang="en-US" sz="2000" dirty="0">
-                <a:solidFill>
-                  <a:srgbClr val="000000"/>
-                </a:solidFill>
-                <a:latin typeface="Consolas" panose="020B0609020204030204" pitchFamily="49" charset="0"/>
-              </a:rPr>
-              <a:t>   </a:t>
-            </a:r>
-            <a:r>
-              <a:rPr lang="en-US" altLang="en-US" sz="2000" dirty="0">
-                <a:solidFill>
-                  <a:srgbClr val="2E75B6"/>
-                </a:solidFill>
-                <a:latin typeface="Consolas" panose="020B0609020204030204" pitchFamily="49" charset="0"/>
-              </a:rPr>
-              <a:t>"</a:t>
-            </a:r>
-            <a:r>
-              <a:rPr lang="en-US" altLang="en-US" sz="2000" dirty="0" err="1">
-                <a:solidFill>
-                  <a:srgbClr val="2E75B6"/>
-                </a:solidFill>
-                <a:latin typeface="Consolas" panose="020B0609020204030204" pitchFamily="49" charset="0"/>
-              </a:rPr>
-              <a:t>Microsoft.EntityFrameworkCore.Design</a:t>
-            </a:r>
-            <a:r>
-              <a:rPr lang="en-US" altLang="en-US" sz="2000" dirty="0">
-                <a:solidFill>
-                  <a:srgbClr val="2E75B6"/>
-                </a:solidFill>
-                <a:latin typeface="Consolas" panose="020B0609020204030204" pitchFamily="49" charset="0"/>
-              </a:rPr>
-              <a:t>"</a:t>
-            </a:r>
-            <a:r>
-              <a:rPr lang="en-US" altLang="en-US" sz="2000" dirty="0">
-                <a:solidFill>
-                  <a:srgbClr val="000000"/>
-                </a:solidFill>
-                <a:latin typeface="Consolas" panose="020B0609020204030204" pitchFamily="49" charset="0"/>
-              </a:rPr>
-              <a:t>: </a:t>
-            </a:r>
-            <a:r>
-              <a:rPr lang="en-US" altLang="en-US" sz="2000" dirty="0">
-                <a:solidFill>
-                  <a:srgbClr val="A31515"/>
-                </a:solidFill>
-                <a:latin typeface="Consolas" panose="020B0609020204030204" pitchFamily="49" charset="0"/>
-              </a:rPr>
-              <a:t>"1.1.0-preview1-final"</a:t>
-            </a:r>
-            <a:r>
-              <a:rPr lang="en-US" altLang="en-US" sz="2000" dirty="0">
-                <a:solidFill>
-                  <a:srgbClr val="000000"/>
-                </a:solidFill>
-                <a:latin typeface="Consolas" panose="020B0609020204030204" pitchFamily="49" charset="0"/>
-              </a:rPr>
-              <a:t>,</a:t>
-            </a:r>
-          </a:p>
-          <a:p>
-            <a:pPr marL="0" indent="0" eaLnBrk="0" fontAlgn="base" hangingPunct="0">
-              <a:lnSpc>
-                <a:spcPct val="100000"/>
-              </a:lnSpc>
-              <a:spcBef>
-                <a:spcPct val="0"/>
-              </a:spcBef>
-              <a:spcAft>
-                <a:spcPct val="0"/>
-              </a:spcAft>
-              <a:buClrTx/>
-              <a:buFontTx/>
-              <a:buNone/>
-            </a:pPr>
-            <a:r>
-              <a:rPr lang="en-US" altLang="en-US" sz="2000" dirty="0">
-                <a:solidFill>
-                  <a:srgbClr val="000000"/>
-                </a:solidFill>
-                <a:latin typeface="Consolas" panose="020B0609020204030204" pitchFamily="49" charset="0"/>
-              </a:rPr>
-              <a:t>   </a:t>
-            </a:r>
-            <a:r>
-              <a:rPr lang="en-US" altLang="en-US" sz="2000" dirty="0">
-                <a:solidFill>
-                  <a:srgbClr val="2E75B6"/>
-                </a:solidFill>
-                <a:latin typeface="Consolas" panose="020B0609020204030204" pitchFamily="49" charset="0"/>
-              </a:rPr>
-              <a:t>"</a:t>
-            </a:r>
-            <a:r>
-              <a:rPr lang="en-US" altLang="en-US" sz="2000" dirty="0" err="1">
-                <a:solidFill>
-                  <a:srgbClr val="2E75B6"/>
-                </a:solidFill>
-                <a:latin typeface="Consolas" panose="020B0609020204030204" pitchFamily="49" charset="0"/>
-              </a:rPr>
-              <a:t>Microsoft.EntityFrameworkCore.SqlServer</a:t>
-            </a:r>
-            <a:r>
-              <a:rPr lang="en-US" altLang="en-US" sz="2000" dirty="0">
-                <a:solidFill>
-                  <a:srgbClr val="2E75B6"/>
-                </a:solidFill>
-                <a:latin typeface="Consolas" panose="020B0609020204030204" pitchFamily="49" charset="0"/>
-              </a:rPr>
-              <a:t>"</a:t>
-            </a:r>
-            <a:r>
-              <a:rPr lang="en-US" altLang="en-US" sz="2000" dirty="0">
-                <a:solidFill>
-                  <a:srgbClr val="000000"/>
-                </a:solidFill>
-                <a:latin typeface="Consolas" panose="020B0609020204030204" pitchFamily="49" charset="0"/>
-              </a:rPr>
-              <a:t>: </a:t>
-            </a:r>
-            <a:r>
-              <a:rPr lang="en-US" altLang="en-US" sz="2000" dirty="0">
-                <a:solidFill>
-                  <a:srgbClr val="A31515"/>
-                </a:solidFill>
-                <a:latin typeface="Consolas" panose="020B0609020204030204" pitchFamily="49" charset="0"/>
-              </a:rPr>
-              <a:t>"1.1.0-preview1-final"</a:t>
-            </a:r>
-            <a:r>
-              <a:rPr lang="en-US" altLang="en-US" sz="2000" dirty="0">
-                <a:solidFill>
-                  <a:srgbClr val="000000"/>
-                </a:solidFill>
-                <a:latin typeface="Consolas" panose="020B0609020204030204" pitchFamily="49" charset="0"/>
-              </a:rPr>
-              <a:t>,</a:t>
-            </a:r>
-          </a:p>
-          <a:p>
-            <a:pPr marL="0" indent="0" eaLnBrk="0" fontAlgn="base" hangingPunct="0">
-              <a:lnSpc>
-                <a:spcPct val="100000"/>
-              </a:lnSpc>
-              <a:spcBef>
-                <a:spcPct val="0"/>
-              </a:spcBef>
-              <a:spcAft>
-                <a:spcPct val="0"/>
-              </a:spcAft>
-              <a:buClrTx/>
-              <a:buFontTx/>
-              <a:buNone/>
-            </a:pPr>
-            <a:r>
-              <a:rPr lang="en-US" altLang="en-US" sz="2000" dirty="0">
-                <a:solidFill>
-                  <a:srgbClr val="000000"/>
-                </a:solidFill>
-                <a:latin typeface="Consolas" panose="020B0609020204030204" pitchFamily="49" charset="0"/>
-              </a:rPr>
-              <a:t>   </a:t>
-            </a:r>
-            <a:r>
-              <a:rPr lang="en-US" altLang="en-US" sz="2000" dirty="0">
-                <a:solidFill>
-                  <a:srgbClr val="2E75B6"/>
-                </a:solidFill>
-                <a:latin typeface="Consolas" panose="020B0609020204030204" pitchFamily="49" charset="0"/>
-              </a:rPr>
-              <a:t>"</a:t>
-            </a:r>
-            <a:r>
-              <a:rPr lang="en-US" altLang="en-US" sz="2000" dirty="0" err="1">
-                <a:solidFill>
-                  <a:srgbClr val="2E75B6"/>
-                </a:solidFill>
-                <a:latin typeface="Consolas" panose="020B0609020204030204" pitchFamily="49" charset="0"/>
-              </a:rPr>
-              <a:t>Microsoft.EntityFrameworkCore.SqlServer.Design</a:t>
-            </a:r>
-            <a:r>
-              <a:rPr lang="en-US" altLang="en-US" sz="2000" dirty="0">
-                <a:solidFill>
-                  <a:srgbClr val="2E75B6"/>
-                </a:solidFill>
-                <a:latin typeface="Consolas" panose="020B0609020204030204" pitchFamily="49" charset="0"/>
-              </a:rPr>
-              <a:t>"</a:t>
-            </a:r>
-            <a:r>
-              <a:rPr lang="en-US" altLang="en-US" sz="2000" dirty="0">
-                <a:solidFill>
-                  <a:srgbClr val="000000"/>
-                </a:solidFill>
-                <a:latin typeface="Consolas" panose="020B0609020204030204" pitchFamily="49" charset="0"/>
-              </a:rPr>
-              <a:t>: </a:t>
-            </a:r>
-            <a:r>
-              <a:rPr lang="en-US" altLang="en-US" sz="2000" dirty="0">
-                <a:solidFill>
-                  <a:srgbClr val="A31515"/>
-                </a:solidFill>
-                <a:latin typeface="Consolas" panose="020B0609020204030204" pitchFamily="49" charset="0"/>
-              </a:rPr>
-              <a:t>"1.1.0-preview1-final"</a:t>
-            </a:r>
-            <a:r>
-              <a:rPr lang="en-US" altLang="en-US" sz="2000" dirty="0">
-                <a:solidFill>
-                  <a:srgbClr val="000000"/>
-                </a:solidFill>
-                <a:latin typeface="Consolas" panose="020B0609020204030204" pitchFamily="49" charset="0"/>
-              </a:rPr>
-              <a:t>,</a:t>
-            </a:r>
-          </a:p>
-          <a:p>
-            <a:pPr marL="0" indent="0" eaLnBrk="0" fontAlgn="base" hangingPunct="0">
-              <a:lnSpc>
-                <a:spcPct val="100000"/>
-              </a:lnSpc>
-              <a:spcBef>
-                <a:spcPct val="0"/>
-              </a:spcBef>
-              <a:spcAft>
-                <a:spcPct val="0"/>
-              </a:spcAft>
-              <a:buClrTx/>
-              <a:buFontTx/>
-              <a:buNone/>
-            </a:pPr>
-            <a:r>
-              <a:rPr lang="en-US" altLang="en-US" sz="2000" dirty="0">
-                <a:solidFill>
-                  <a:srgbClr val="000000"/>
-                </a:solidFill>
-                <a:latin typeface="Consolas" panose="020B0609020204030204" pitchFamily="49" charset="0"/>
-              </a:rPr>
-              <a:t>},</a:t>
-            </a:r>
-          </a:p>
-          <a:p>
-            <a:pPr marL="0" indent="0" eaLnBrk="0" fontAlgn="base" hangingPunct="0">
-              <a:lnSpc>
-                <a:spcPct val="100000"/>
-              </a:lnSpc>
-              <a:spcBef>
-                <a:spcPct val="0"/>
-              </a:spcBef>
-              <a:spcAft>
-                <a:spcPct val="0"/>
-              </a:spcAft>
-              <a:buClrTx/>
-              <a:buFontTx/>
-              <a:buNone/>
-            </a:pPr>
-            <a:r>
-              <a:rPr lang="en-US" altLang="en-US" sz="2000" dirty="0">
-                <a:solidFill>
-                  <a:srgbClr val="2E75B6"/>
-                </a:solidFill>
-                <a:latin typeface="Consolas" panose="020B0609020204030204" pitchFamily="49" charset="0"/>
-              </a:rPr>
-              <a:t>"tools"</a:t>
-            </a:r>
-            <a:r>
-              <a:rPr lang="en-US" altLang="en-US" sz="2000" dirty="0">
-                <a:solidFill>
-                  <a:srgbClr val="000000"/>
-                </a:solidFill>
-                <a:latin typeface="Consolas" panose="020B0609020204030204" pitchFamily="49" charset="0"/>
-              </a:rPr>
-              <a:t>: {</a:t>
-            </a:r>
-          </a:p>
-          <a:p>
-            <a:pPr marL="0" indent="0" eaLnBrk="0" fontAlgn="base" hangingPunct="0">
-              <a:lnSpc>
-                <a:spcPct val="100000"/>
-              </a:lnSpc>
-              <a:spcBef>
-                <a:spcPct val="0"/>
-              </a:spcBef>
-              <a:spcAft>
-                <a:spcPct val="0"/>
-              </a:spcAft>
-              <a:buClrTx/>
-              <a:buFontTx/>
-              <a:buNone/>
-            </a:pPr>
-            <a:r>
-              <a:rPr lang="en-US" altLang="en-US" sz="2000" dirty="0">
-                <a:solidFill>
-                  <a:srgbClr val="000000"/>
-                </a:solidFill>
-                <a:latin typeface="Consolas" panose="020B0609020204030204" pitchFamily="49" charset="0"/>
-              </a:rPr>
-              <a:t>   </a:t>
-            </a:r>
-            <a:r>
-              <a:rPr lang="en-US" altLang="en-US" sz="2000" dirty="0">
-                <a:solidFill>
-                  <a:srgbClr val="2E75B6"/>
-                </a:solidFill>
-                <a:latin typeface="Consolas" panose="020B0609020204030204" pitchFamily="49" charset="0"/>
-              </a:rPr>
-              <a:t>"</a:t>
-            </a:r>
-            <a:r>
-              <a:rPr lang="en-US" altLang="en-US" sz="2000" dirty="0" err="1">
-                <a:solidFill>
-                  <a:srgbClr val="2E75B6"/>
-                </a:solidFill>
-                <a:latin typeface="Consolas" panose="020B0609020204030204" pitchFamily="49" charset="0"/>
-              </a:rPr>
-              <a:t>Microsoft.EntityFrameworkCore.Tools.DotNet</a:t>
-            </a:r>
-            <a:r>
-              <a:rPr lang="en-US" altLang="en-US" sz="2000" dirty="0">
-                <a:solidFill>
-                  <a:srgbClr val="2E75B6"/>
-                </a:solidFill>
-                <a:latin typeface="Consolas" panose="020B0609020204030204" pitchFamily="49" charset="0"/>
-              </a:rPr>
-              <a:t>"</a:t>
-            </a:r>
-            <a:r>
-              <a:rPr lang="en-US" altLang="en-US" sz="2000" dirty="0">
-                <a:solidFill>
-                  <a:srgbClr val="000000"/>
-                </a:solidFill>
-                <a:latin typeface="Consolas" panose="020B0609020204030204" pitchFamily="49" charset="0"/>
-              </a:rPr>
-              <a:t>: </a:t>
-            </a:r>
-            <a:r>
-              <a:rPr lang="en-US" altLang="en-US" sz="2000" dirty="0">
-                <a:solidFill>
-                  <a:srgbClr val="A31515"/>
-                </a:solidFill>
-                <a:latin typeface="Consolas" panose="020B0609020204030204" pitchFamily="49" charset="0"/>
-              </a:rPr>
-              <a:t>"1.0.0-preview3-final“</a:t>
-            </a:r>
-          </a:p>
-          <a:p>
-            <a:pPr marL="0" indent="0" eaLnBrk="0" fontAlgn="base" hangingPunct="0">
-              <a:lnSpc>
-                <a:spcPct val="100000"/>
-              </a:lnSpc>
-              <a:spcBef>
-                <a:spcPct val="0"/>
-              </a:spcBef>
-              <a:spcAft>
-                <a:spcPct val="0"/>
-              </a:spcAft>
-              <a:buClrTx/>
-              <a:buFontTx/>
-              <a:buNone/>
-            </a:pPr>
-            <a:r>
-              <a:rPr lang="en-US" altLang="en-US" sz="2000" dirty="0">
-                <a:solidFill>
-                  <a:srgbClr val="000000"/>
-                </a:solidFill>
-                <a:latin typeface="Consolas" panose="020B0609020204030204" pitchFamily="49" charset="0"/>
-              </a:rPr>
-              <a:t>}, </a:t>
-            </a:r>
-            <a:endParaRPr lang="en-US" altLang="en-US" sz="2000" dirty="0">
-              <a:latin typeface="Arial" panose="020B0604020202020204" pitchFamily="34" charset="0"/>
+              <a:latin typeface="Consolas" panose="020B0609020204030204" pitchFamily="49" charset="0"/>
             </a:endParaRPr>
           </a:p>
         </p:txBody>
@@ -18175,92 +17435,6 @@
   <p:clrMapOvr>
     <a:masterClrMapping/>
   </p:clrMapOvr>
-  <p:timing>
-    <p:tnLst>
-      <p:par>
-        <p:cTn id="1" dur="indefinite" restart="never" nodeType="tmRoot">
-          <p:childTnLst>
-            <p:seq concurrent="1" nextAc="seek">
-              <p:cTn id="2" dur="indefinite" nodeType="mainSeq">
-                <p:childTnLst>
-                  <p:par>
-                    <p:cTn id="3" fill="hold">
-                      <p:stCondLst>
-                        <p:cond delay="indefinite"/>
-                      </p:stCondLst>
-                      <p:childTnLst>
-                        <p:par>
-                          <p:cTn id="4" fill="hold">
-                            <p:stCondLst>
-                              <p:cond delay="0"/>
-                            </p:stCondLst>
-                            <p:childTnLst>
-                              <p:par>
-                                <p:cTn id="5" presetID="10" presetClass="entr" presetSubtype="0" fill="hold" grpId="0" nodeType="clickEffect">
-                                  <p:stCondLst>
-                                    <p:cond delay="0"/>
-                                  </p:stCondLst>
-                                  <p:childTnLst>
-                                    <p:set>
-                                      <p:cBhvr>
-                                        <p:cTn id="6" dur="1" fill="hold">
-                                          <p:stCondLst>
-                                            <p:cond delay="0"/>
-                                          </p:stCondLst>
-                                        </p:cTn>
-                                        <p:tgtEl>
-                                          <p:spTgt spid="5"/>
-                                        </p:tgtEl>
-                                        <p:attrNameLst>
-                                          <p:attrName>style.visibility</p:attrName>
-                                        </p:attrNameLst>
-                                      </p:cBhvr>
-                                      <p:to>
-                                        <p:strVal val="visible"/>
-                                      </p:to>
-                                    </p:set>
-                                    <p:animEffect transition="in" filter="fade">
-                                      <p:cBhvr>
-                                        <p:cTn id="7" dur="500"/>
-                                        <p:tgtEl>
-                                          <p:spTgt spid="5"/>
-                                        </p:tgtEl>
-                                      </p:cBhvr>
-                                    </p:animEffect>
-                                  </p:childTnLst>
-                                </p:cTn>
-                              </p:par>
-                            </p:childTnLst>
-                          </p:cTn>
-                        </p:par>
-                      </p:childTnLst>
-                    </p:cTn>
-                  </p:par>
-                </p:childTnLst>
-              </p:cTn>
-              <p:prevCondLst>
-                <p:cond evt="onPrev" delay="0">
-                  <p:tgtEl>
-                    <p:sldTgt/>
-                  </p:tgtEl>
-                </p:cond>
-              </p:prevCondLst>
-              <p:nextCondLst>
-                <p:cond evt="onNext" delay="0">
-                  <p:tgtEl>
-                    <p:sldTgt/>
-                  </p:tgtEl>
-                </p:cond>
-              </p:nextCondLst>
-            </p:seq>
-          </p:childTnLst>
-        </p:cTn>
-      </p:par>
-    </p:tnLst>
-    <p:bldLst>
-      <p:bldP spid="5" grpId="0" animBg="1"/>
-    </p:bldLst>
-  </p:timing>
 </p:sld>
 </file>
 

</xml_diff>

<commit_message>
Remove example hasqueryoptions for nonexistant property
</commit_message>
<xml_diff>
--- a/EfCoreGettingStarted.pptx
+++ b/EfCoreGettingStarted.pptx
@@ -17494,6 +17494,15 @@
               <a:t>https://blogs.msdn.microsoft.com/dotnet/2016/10/25/announcing-entity-framework-core-1-1-preview-1/ </a:t>
             </a:r>
           </a:p>
+          <a:p>
+            <a:r>
+              <a:rPr lang="en-US" dirty="0"/>
+              <a:t>https://github.com/aspnet/EntityFramework/wiki/Roadmap#ef-core-20 </a:t>
+            </a:r>
+          </a:p>
+          <a:p>
+            <a:endParaRPr lang="en-US" dirty="0"/>
+          </a:p>
         </p:txBody>
       </p:sp>
     </p:spTree>
@@ -18344,8 +18353,8 @@
         </p:nvSpPr>
         <p:spPr bwMode="auto">
           <a:xfrm>
-            <a:off x="219456" y="2754426"/>
-            <a:ext cx="11859768" cy="2720745"/>
+            <a:off x="219456" y="2733394"/>
+            <a:ext cx="11859768" cy="2762808"/>
           </a:xfrm>
           <a:prstGeom prst="rect">
             <a:avLst/>
@@ -18391,16 +18400,16 @@
             <a:r>
               <a:rPr lang="en-US" sz="1600" dirty="0">
                 <a:solidFill>
-                  <a:srgbClr val="800000"/>
-                </a:solidFill>
-                <a:latin typeface="Consolas" panose="020B0609020204030204" pitchFamily="49" charset="0"/>
-              </a:rPr>
-              <a:t>&lt;</a:t>
+                  <a:srgbClr val="0000FF"/>
+                </a:solidFill>
+                <a:latin typeface="Consolas" panose="020B0609020204030204" pitchFamily="49" charset="0"/>
+              </a:rPr>
+              <a:t> &lt;</a:t>
             </a:r>
             <a:r>
               <a:rPr lang="en-US" sz="1600" dirty="0" err="1">
                 <a:solidFill>
-                  <a:srgbClr val="800000"/>
+                  <a:srgbClr val="A31515"/>
                 </a:solidFill>
                 <a:latin typeface="Consolas" panose="020B0609020204030204" pitchFamily="49" charset="0"/>
               </a:rPr>
@@ -18409,7 +18418,7 @@
             <a:r>
               <a:rPr lang="en-US" sz="1600" dirty="0">
                 <a:solidFill>
-                  <a:srgbClr val="800000"/>
+                  <a:srgbClr val="0000FF"/>
                 </a:solidFill>
                 <a:latin typeface="Consolas" panose="020B0609020204030204" pitchFamily="49" charset="0"/>
               </a:rPr>
@@ -18426,16 +18435,16 @@
             <a:r>
               <a:rPr lang="en-US" sz="1600" dirty="0">
                 <a:solidFill>
-                  <a:srgbClr val="800000"/>
-                </a:solidFill>
-                <a:latin typeface="Consolas" panose="020B0609020204030204" pitchFamily="49" charset="0"/>
-              </a:rPr>
-              <a:t>  &lt;</a:t>
+                  <a:srgbClr val="0000FF"/>
+                </a:solidFill>
+                <a:latin typeface="Consolas" panose="020B0609020204030204" pitchFamily="49" charset="0"/>
+              </a:rPr>
+              <a:t>    &lt;</a:t>
             </a:r>
             <a:r>
               <a:rPr lang="en-US" sz="1600" dirty="0" err="1">
                 <a:solidFill>
-                  <a:srgbClr val="800000"/>
+                  <a:srgbClr val="A31515"/>
                 </a:solidFill>
                 <a:latin typeface="Consolas" panose="020B0609020204030204" pitchFamily="49" charset="0"/>
               </a:rPr>
@@ -18444,29 +18453,109 @@
             <a:r>
               <a:rPr lang="en-US" sz="1600" dirty="0">
                 <a:solidFill>
+                  <a:srgbClr val="0000FF"/>
+                </a:solidFill>
+                <a:latin typeface="Consolas" panose="020B0609020204030204" pitchFamily="49" charset="0"/>
+              </a:rPr>
+              <a:t> </a:t>
+            </a:r>
+            <a:r>
+              <a:rPr lang="en-US" sz="1600" dirty="0">
+                <a:solidFill>
+                  <a:srgbClr val="FF0000"/>
+                </a:solidFill>
+                <a:latin typeface="Consolas" panose="020B0609020204030204" pitchFamily="49" charset="0"/>
+              </a:rPr>
+              <a:t>Include</a:t>
+            </a:r>
+            <a:r>
+              <a:rPr lang="en-US" sz="1600" dirty="0">
+                <a:solidFill>
+                  <a:srgbClr val="0000FF"/>
+                </a:solidFill>
+                <a:latin typeface="Consolas" panose="020B0609020204030204" pitchFamily="49" charset="0"/>
+              </a:rPr>
+              <a:t>=</a:t>
+            </a:r>
+            <a:r>
+              <a:rPr lang="en-US" sz="1600" dirty="0">
+                <a:solidFill>
                   <a:srgbClr val="000000"/>
                 </a:solidFill>
                 <a:latin typeface="Consolas" panose="020B0609020204030204" pitchFamily="49" charset="0"/>
               </a:rPr>
+              <a:t>"</a:t>
+            </a:r>
+            <a:r>
+              <a:rPr lang="en-US" sz="1600" dirty="0" err="1">
+                <a:solidFill>
+                  <a:srgbClr val="0000FF"/>
+                </a:solidFill>
+                <a:latin typeface="Consolas" panose="020B0609020204030204" pitchFamily="49" charset="0"/>
+              </a:rPr>
+              <a:t>Microsoft.EntityFrameworkCore.SqlServer.Design</a:t>
+            </a:r>
+            <a:r>
+              <a:rPr lang="en-US" sz="1600" dirty="0">
+                <a:solidFill>
+                  <a:srgbClr val="000000"/>
+                </a:solidFill>
+                <a:latin typeface="Consolas" panose="020B0609020204030204" pitchFamily="49" charset="0"/>
+              </a:rPr>
+              <a:t>"</a:t>
+            </a:r>
+            <a:r>
+              <a:rPr lang="en-US" sz="1600" dirty="0">
+                <a:solidFill>
+                  <a:srgbClr val="0000FF"/>
+                </a:solidFill>
+                <a:latin typeface="Consolas" panose="020B0609020204030204" pitchFamily="49" charset="0"/>
+              </a:rPr>
               <a:t> </a:t>
             </a:r>
-            <a:r>
+            <a:br>
               <a:rPr lang="en-US" sz="1600" dirty="0">
                 <a:solidFill>
+                  <a:srgbClr val="0000FF"/>
+                </a:solidFill>
+                <a:latin typeface="Consolas" panose="020B0609020204030204" pitchFamily="49" charset="0"/>
+              </a:rPr>
+            </a:br>
+            <a:r>
+              <a:rPr lang="en-US" sz="1600" dirty="0">
+                <a:solidFill>
+                  <a:srgbClr val="0000FF"/>
+                </a:solidFill>
+                <a:latin typeface="Consolas" panose="020B0609020204030204" pitchFamily="49" charset="0"/>
+              </a:rPr>
+              <a:t>	</a:t>
+            </a:r>
+            <a:r>
+              <a:rPr lang="en-US" sz="1600" dirty="0">
+                <a:solidFill>
                   <a:srgbClr val="FF0000"/>
                 </a:solidFill>
                 <a:latin typeface="Consolas" panose="020B0609020204030204" pitchFamily="49" charset="0"/>
               </a:rPr>
-              <a:t>Include</a:t>
+              <a:t>Version</a:t>
             </a:r>
             <a:r>
               <a:rPr lang="en-US" sz="1600" dirty="0">
                 <a:solidFill>
+                  <a:srgbClr val="0000FF"/>
+                </a:solidFill>
+                <a:latin typeface="Consolas" panose="020B0609020204030204" pitchFamily="49" charset="0"/>
+              </a:rPr>
+              <a:t>=</a:t>
+            </a:r>
+            <a:r>
+              <a:rPr lang="en-US" sz="1600" dirty="0">
+                <a:solidFill>
                   <a:srgbClr val="000000"/>
                 </a:solidFill>
                 <a:latin typeface="Consolas" panose="020B0609020204030204" pitchFamily="49" charset="0"/>
               </a:rPr>
-              <a:t>=</a:t>
+              <a:t>"</a:t>
             </a:r>
             <a:r>
               <a:rPr lang="en-US" sz="1600" dirty="0">
@@ -18475,79 +18564,25 @@
                 </a:solidFill>
                 <a:latin typeface="Consolas" panose="020B0609020204030204" pitchFamily="49" charset="0"/>
               </a:rPr>
+              <a:t>2.0.0-preview1-final</a:t>
+            </a:r>
+            <a:r>
+              <a:rPr lang="en-US" sz="1600" dirty="0">
+                <a:solidFill>
+                  <a:srgbClr val="000000"/>
+                </a:solidFill>
+                <a:latin typeface="Consolas" panose="020B0609020204030204" pitchFamily="49" charset="0"/>
+              </a:rPr>
               <a:t>"</a:t>
             </a:r>
             <a:r>
-              <a:rPr lang="en-US" sz="1600" dirty="0" err="1">
+              <a:rPr lang="en-US" sz="1600" dirty="0">
                 <a:solidFill>
                   <a:srgbClr val="0000FF"/>
                 </a:solidFill>
                 <a:latin typeface="Consolas" panose="020B0609020204030204" pitchFamily="49" charset="0"/>
               </a:rPr>
-              <a:t>Microsoft.EntityFrameworkCore.Design</a:t>
-            </a:r>
-            <a:r>
-              <a:rPr lang="en-US" sz="1600" dirty="0">
-                <a:solidFill>
-                  <a:srgbClr val="0000FF"/>
-                </a:solidFill>
-                <a:latin typeface="Consolas" panose="020B0609020204030204" pitchFamily="49" charset="0"/>
-              </a:rPr>
-              <a:t>"</a:t>
-            </a:r>
-            <a:r>
-              <a:rPr lang="en-US" sz="1600" dirty="0">
-                <a:solidFill>
-                  <a:srgbClr val="000000"/>
-                </a:solidFill>
-                <a:latin typeface="Consolas" panose="020B0609020204030204" pitchFamily="49" charset="0"/>
-              </a:rPr>
-              <a:t> </a:t>
-            </a:r>
-            <a:r>
-              <a:rPr lang="en-US" sz="1600" dirty="0">
-                <a:solidFill>
-                  <a:srgbClr val="FF0000"/>
-                </a:solidFill>
-                <a:latin typeface="Consolas" panose="020B0609020204030204" pitchFamily="49" charset="0"/>
-              </a:rPr>
-              <a:t>Version</a:t>
-            </a:r>
-            <a:r>
-              <a:rPr lang="en-US" sz="1600" dirty="0">
-                <a:solidFill>
-                  <a:srgbClr val="000000"/>
-                </a:solidFill>
-                <a:latin typeface="Consolas" panose="020B0609020204030204" pitchFamily="49" charset="0"/>
-              </a:rPr>
-              <a:t>=</a:t>
-            </a:r>
-            <a:r>
-              <a:rPr lang="en-US" sz="1600" dirty="0">
-                <a:solidFill>
-                  <a:srgbClr val="0000FF"/>
-                </a:solidFill>
-                <a:latin typeface="Consolas" panose="020B0609020204030204" pitchFamily="49" charset="0"/>
-              </a:rPr>
-              <a:t>"1.1.1"</a:t>
-            </a:r>
-            <a:r>
-              <a:rPr lang="en-US" sz="1600" dirty="0">
-                <a:solidFill>
-                  <a:srgbClr val="000000"/>
-                </a:solidFill>
-                <a:latin typeface="Consolas" panose="020B0609020204030204" pitchFamily="49" charset="0"/>
-              </a:rPr>
-              <a:t> </a:t>
-            </a:r>
-            <a:r>
-              <a:rPr lang="en-US" sz="1600" dirty="0">
-                <a:solidFill>
-                  <a:srgbClr val="800000"/>
-                </a:solidFill>
-                <a:latin typeface="Consolas" panose="020B0609020204030204" pitchFamily="49" charset="0"/>
-              </a:rPr>
-              <a:t>/&gt;</a:t>
+              <a:t> /&gt;</a:t>
             </a:r>
             <a:endParaRPr lang="en-US" sz="1600" dirty="0">
               <a:solidFill>
@@ -18560,128 +18595,29 @@
             <a:r>
               <a:rPr lang="en-US" sz="1600" dirty="0">
                 <a:solidFill>
-                  <a:srgbClr val="800000"/>
-                </a:solidFill>
-                <a:latin typeface="Consolas" panose="020B0609020204030204" pitchFamily="49" charset="0"/>
-              </a:rPr>
-              <a:t>  &lt;</a:t>
+                  <a:srgbClr val="0000FF"/>
+                </a:solidFill>
+                <a:latin typeface="Consolas" panose="020B0609020204030204" pitchFamily="49" charset="0"/>
+              </a:rPr>
+              <a:t>  &lt;/</a:t>
             </a:r>
             <a:r>
               <a:rPr lang="en-US" sz="1600" dirty="0" err="1">
                 <a:solidFill>
-                  <a:srgbClr val="800000"/>
-                </a:solidFill>
-                <a:latin typeface="Consolas" panose="020B0609020204030204" pitchFamily="49" charset="0"/>
-              </a:rPr>
-              <a:t>PackageReference</a:t>
+                  <a:srgbClr val="A31515"/>
+                </a:solidFill>
+                <a:latin typeface="Consolas" panose="020B0609020204030204" pitchFamily="49" charset="0"/>
+              </a:rPr>
+              <a:t>ItemGroup</a:t>
             </a:r>
             <a:r>
               <a:rPr lang="en-US" sz="1600" dirty="0">
                 <a:solidFill>
-                  <a:srgbClr val="000000"/>
-                </a:solidFill>
-                <a:latin typeface="Consolas" panose="020B0609020204030204" pitchFamily="49" charset="0"/>
-              </a:rPr>
-              <a:t> </a:t>
-            </a:r>
-            <a:r>
-              <a:rPr lang="en-US" sz="1600" dirty="0">
-                <a:solidFill>
-                  <a:srgbClr val="FF0000"/>
-                </a:solidFill>
-                <a:latin typeface="Consolas" panose="020B0609020204030204" pitchFamily="49" charset="0"/>
-              </a:rPr>
-              <a:t>Include</a:t>
-            </a:r>
-            <a:r>
-              <a:rPr lang="en-US" sz="1600" dirty="0">
-                <a:solidFill>
-                  <a:srgbClr val="000000"/>
-                </a:solidFill>
-                <a:latin typeface="Consolas" panose="020B0609020204030204" pitchFamily="49" charset="0"/>
-              </a:rPr>
-              <a:t>=</a:t>
-            </a:r>
-            <a:r>
-              <a:rPr lang="en-US" sz="1600" dirty="0">
-                <a:solidFill>
                   <a:srgbClr val="0000FF"/>
                 </a:solidFill>
                 <a:latin typeface="Consolas" panose="020B0609020204030204" pitchFamily="49" charset="0"/>
               </a:rPr>
-              <a:t>"</a:t>
-            </a:r>
-            <a:r>
-              <a:rPr lang="en-US" sz="1600" dirty="0" err="1">
-                <a:solidFill>
-                  <a:srgbClr val="0000FF"/>
-                </a:solidFill>
-                <a:latin typeface="Consolas" panose="020B0609020204030204" pitchFamily="49" charset="0"/>
-              </a:rPr>
-              <a:t>Microsoft.EntityFrameworkCore.SqlServer.Design</a:t>
-            </a:r>
-            <a:r>
-              <a:rPr lang="en-US" sz="1600" dirty="0">
-                <a:solidFill>
-                  <a:srgbClr val="0000FF"/>
-                </a:solidFill>
-                <a:latin typeface="Consolas" panose="020B0609020204030204" pitchFamily="49" charset="0"/>
-              </a:rPr>
-              <a:t>"</a:t>
-            </a:r>
-            <a:r>
-              <a:rPr lang="en-US" sz="1600" dirty="0">
-                <a:solidFill>
-                  <a:srgbClr val="000000"/>
-                </a:solidFill>
-                <a:latin typeface="Consolas" panose="020B0609020204030204" pitchFamily="49" charset="0"/>
-              </a:rPr>
-              <a:t> </a:t>
-            </a:r>
-            <a:r>
-              <a:rPr lang="en-US" sz="1600" dirty="0">
-                <a:solidFill>
-                  <a:srgbClr val="FF0000"/>
-                </a:solidFill>
-                <a:latin typeface="Consolas" panose="020B0609020204030204" pitchFamily="49" charset="0"/>
-              </a:rPr>
-              <a:t>Version</a:t>
-            </a:r>
-            <a:r>
-              <a:rPr lang="en-US" sz="1600" dirty="0">
-                <a:solidFill>
-                  <a:srgbClr val="000000"/>
-                </a:solidFill>
-                <a:latin typeface="Consolas" panose="020B0609020204030204" pitchFamily="49" charset="0"/>
-              </a:rPr>
-              <a:t>=</a:t>
-            </a:r>
-            <a:r>
-              <a:rPr lang="en-US" sz="1600" dirty="0">
-                <a:solidFill>
-                  <a:srgbClr val="0000FF"/>
-                </a:solidFill>
-                <a:latin typeface="Consolas" panose="020B0609020204030204" pitchFamily="49" charset="0"/>
-              </a:rPr>
-              <a:t>"1.1.1"</a:t>
-            </a:r>
-            <a:r>
-              <a:rPr lang="en-US" sz="1600" dirty="0">
-                <a:solidFill>
-                  <a:srgbClr val="000000"/>
-                </a:solidFill>
-                <a:latin typeface="Consolas" panose="020B0609020204030204" pitchFamily="49" charset="0"/>
-              </a:rPr>
-              <a:t> </a:t>
-            </a:r>
-            <a:r>
-              <a:rPr lang="en-US" sz="1600" dirty="0">
-                <a:solidFill>
-                  <a:srgbClr val="800000"/>
-                </a:solidFill>
-                <a:latin typeface="Consolas" panose="020B0609020204030204" pitchFamily="49" charset="0"/>
-              </a:rPr>
-              <a:t>/&gt;</a:t>
+              <a:t>&gt;</a:t>
             </a:r>
             <a:endParaRPr lang="en-US" sz="1600" dirty="0">
               <a:solidFill>
@@ -18694,16 +18630,16 @@
             <a:r>
               <a:rPr lang="en-US" sz="1600" dirty="0">
                 <a:solidFill>
-                  <a:srgbClr val="800000"/>
-                </a:solidFill>
-                <a:latin typeface="Consolas" panose="020B0609020204030204" pitchFamily="49" charset="0"/>
-              </a:rPr>
-              <a:t>&lt;/</a:t>
+                  <a:srgbClr val="0000FF"/>
+                </a:solidFill>
+                <a:latin typeface="Consolas" panose="020B0609020204030204" pitchFamily="49" charset="0"/>
+              </a:rPr>
+              <a:t>  &lt;</a:t>
             </a:r>
             <a:r>
               <a:rPr lang="en-US" sz="1600" dirty="0" err="1">
                 <a:solidFill>
-                  <a:srgbClr val="800000"/>
+                  <a:srgbClr val="A31515"/>
                 </a:solidFill>
                 <a:latin typeface="Consolas" panose="020B0609020204030204" pitchFamily="49" charset="0"/>
               </a:rPr>
@@ -18712,7 +18648,7 @@
             <a:r>
               <a:rPr lang="en-US" sz="1600" dirty="0">
                 <a:solidFill>
-                  <a:srgbClr val="800000"/>
+                  <a:srgbClr val="0000FF"/>
                 </a:solidFill>
                 <a:latin typeface="Consolas" panose="020B0609020204030204" pitchFamily="49" charset="0"/>
               </a:rPr>
@@ -18729,29 +18665,154 @@
             <a:r>
               <a:rPr lang="en-US" sz="1600" dirty="0">
                 <a:solidFill>
-                  <a:srgbClr val="800000"/>
-                </a:solidFill>
-                <a:latin typeface="Consolas" panose="020B0609020204030204" pitchFamily="49" charset="0"/>
-              </a:rPr>
-              <a:t>&lt;</a:t>
+                  <a:srgbClr val="0000FF"/>
+                </a:solidFill>
+                <a:latin typeface="Consolas" panose="020B0609020204030204" pitchFamily="49" charset="0"/>
+              </a:rPr>
+              <a:t>    &lt;</a:t>
             </a:r>
             <a:r>
               <a:rPr lang="en-US" sz="1600" dirty="0" err="1">
                 <a:solidFill>
-                  <a:srgbClr val="800000"/>
-                </a:solidFill>
-                <a:latin typeface="Consolas" panose="020B0609020204030204" pitchFamily="49" charset="0"/>
-              </a:rPr>
-              <a:t>ItemGroup</a:t>
+                  <a:srgbClr val="A31515"/>
+                </a:solidFill>
+                <a:latin typeface="Consolas" panose="020B0609020204030204" pitchFamily="49" charset="0"/>
+              </a:rPr>
+              <a:t>DotNetCliToolReference</a:t>
             </a:r>
             <a:r>
               <a:rPr lang="en-US" sz="1600" dirty="0">
                 <a:solidFill>
-                  <a:srgbClr val="800000"/>
-                </a:solidFill>
-                <a:latin typeface="Consolas" panose="020B0609020204030204" pitchFamily="49" charset="0"/>
-              </a:rPr>
-              <a:t>&gt;</a:t>
+                  <a:srgbClr val="0000FF"/>
+                </a:solidFill>
+                <a:latin typeface="Consolas" panose="020B0609020204030204" pitchFamily="49" charset="0"/>
+              </a:rPr>
+              <a:t> </a:t>
+            </a:r>
+            <a:r>
+              <a:rPr lang="en-US" sz="1600" dirty="0">
+                <a:solidFill>
+                  <a:srgbClr val="FF0000"/>
+                </a:solidFill>
+                <a:latin typeface="Consolas" panose="020B0609020204030204" pitchFamily="49" charset="0"/>
+              </a:rPr>
+              <a:t>Include</a:t>
+            </a:r>
+            <a:r>
+              <a:rPr lang="en-US" sz="1600" dirty="0">
+                <a:solidFill>
+                  <a:srgbClr val="0000FF"/>
+                </a:solidFill>
+                <a:latin typeface="Consolas" panose="020B0609020204030204" pitchFamily="49" charset="0"/>
+              </a:rPr>
+              <a:t>=</a:t>
+            </a:r>
+            <a:r>
+              <a:rPr lang="en-US" sz="1600" dirty="0">
+                <a:solidFill>
+                  <a:srgbClr val="000000"/>
+                </a:solidFill>
+                <a:latin typeface="Consolas" panose="020B0609020204030204" pitchFamily="49" charset="0"/>
+              </a:rPr>
+              <a:t>"</a:t>
+            </a:r>
+            <a:r>
+              <a:rPr lang="en-US" sz="1600" dirty="0" err="1">
+                <a:solidFill>
+                  <a:srgbClr val="0000FF"/>
+                </a:solidFill>
+                <a:latin typeface="Consolas" panose="020B0609020204030204" pitchFamily="49" charset="0"/>
+              </a:rPr>
+              <a:t>Microsoft.EntityFrameworkCore.Tools.DotNet</a:t>
+            </a:r>
+            <a:r>
+              <a:rPr lang="en-US" sz="1600" dirty="0">
+                <a:solidFill>
+                  <a:srgbClr val="000000"/>
+                </a:solidFill>
+                <a:latin typeface="Consolas" panose="020B0609020204030204" pitchFamily="49" charset="0"/>
+              </a:rPr>
+              <a:t>“</a:t>
+            </a:r>
+            <a:br>
+              <a:rPr lang="en-US" sz="1600" dirty="0">
+                <a:solidFill>
+                  <a:srgbClr val="000000"/>
+                </a:solidFill>
+                <a:latin typeface="Consolas" panose="020B0609020204030204" pitchFamily="49" charset="0"/>
+              </a:rPr>
+            </a:br>
+            <a:r>
+              <a:rPr lang="en-US" sz="1600" dirty="0">
+                <a:solidFill>
+                  <a:srgbClr val="000000"/>
+                </a:solidFill>
+                <a:latin typeface="Consolas" panose="020B0609020204030204" pitchFamily="49" charset="0"/>
+              </a:rPr>
+              <a:t>	</a:t>
+            </a:r>
+            <a:r>
+              <a:rPr lang="en-US" sz="1600" dirty="0">
+                <a:solidFill>
+                  <a:srgbClr val="0000FF"/>
+                </a:solidFill>
+                <a:latin typeface="Consolas" panose="020B0609020204030204" pitchFamily="49" charset="0"/>
+              </a:rPr>
+              <a:t> </a:t>
+            </a:r>
+            <a:r>
+              <a:rPr lang="en-US" sz="1600" dirty="0">
+                <a:solidFill>
+                  <a:srgbClr val="FF0000"/>
+                </a:solidFill>
+                <a:latin typeface="Consolas" panose="020B0609020204030204" pitchFamily="49" charset="0"/>
+              </a:rPr>
+              <a:t>Version</a:t>
+            </a:r>
+            <a:r>
+              <a:rPr lang="en-US" sz="1600" dirty="0">
+                <a:solidFill>
+                  <a:srgbClr val="0000FF"/>
+                </a:solidFill>
+                <a:latin typeface="Consolas" panose="020B0609020204030204" pitchFamily="49" charset="0"/>
+              </a:rPr>
+              <a:t>=</a:t>
+            </a:r>
+            <a:r>
+              <a:rPr lang="en-US" sz="1600" dirty="0">
+                <a:solidFill>
+                  <a:srgbClr val="000000"/>
+                </a:solidFill>
+                <a:latin typeface="Consolas" panose="020B0609020204030204" pitchFamily="49" charset="0"/>
+              </a:rPr>
+              <a:t>"</a:t>
+            </a:r>
+            <a:r>
+              <a:rPr lang="en-US" sz="1600" dirty="0">
+                <a:solidFill>
+                  <a:srgbClr val="0000FF"/>
+                </a:solidFill>
+                <a:latin typeface="Consolas" panose="020B0609020204030204" pitchFamily="49" charset="0"/>
+              </a:rPr>
+              <a:t>2.0.0-preview1-final</a:t>
+            </a:r>
+            <a:r>
+              <a:rPr lang="en-US" sz="1600" dirty="0">
+                <a:solidFill>
+                  <a:srgbClr val="000000"/>
+                </a:solidFill>
+                <a:latin typeface="Consolas" panose="020B0609020204030204" pitchFamily="49" charset="0"/>
+              </a:rPr>
+              <a:t>"</a:t>
+            </a:r>
+            <a:r>
+              <a:rPr lang="en-US" sz="1600" dirty="0">
+                <a:solidFill>
+                  <a:srgbClr val="0000FF"/>
+                </a:solidFill>
+                <a:latin typeface="Consolas" panose="020B0609020204030204" pitchFamily="49" charset="0"/>
+              </a:rPr>
+              <a:t> /&gt;</a:t>
             </a:r>
             <a:endParaRPr lang="en-US" sz="1600" dirty="0">
               <a:solidFill>
@@ -18764,159 +18825,25 @@
             <a:r>
               <a:rPr lang="en-US" sz="1600" dirty="0">
                 <a:solidFill>
-                  <a:srgbClr val="800000"/>
-                </a:solidFill>
-                <a:latin typeface="Consolas" panose="020B0609020204030204" pitchFamily="49" charset="0"/>
-              </a:rPr>
-              <a:t>  &lt;</a:t>
+                  <a:srgbClr val="0000FF"/>
+                </a:solidFill>
+                <a:latin typeface="Consolas" panose="020B0609020204030204" pitchFamily="49" charset="0"/>
+              </a:rPr>
+              <a:t>  &lt;/</a:t>
             </a:r>
             <a:r>
               <a:rPr lang="en-US" sz="1600" dirty="0" err="1">
                 <a:solidFill>
-                  <a:srgbClr val="800000"/>
-                </a:solidFill>
-                <a:latin typeface="Consolas" panose="020B0609020204030204" pitchFamily="49" charset="0"/>
-              </a:rPr>
-              <a:t>DotNetCliToolReference</a:t>
+                  <a:srgbClr val="A31515"/>
+                </a:solidFill>
+                <a:latin typeface="Consolas" panose="020B0609020204030204" pitchFamily="49" charset="0"/>
+              </a:rPr>
+              <a:t>ItemGroup</a:t>
             </a:r>
             <a:r>
               <a:rPr lang="en-US" sz="1600" dirty="0">
                 <a:solidFill>
-                  <a:srgbClr val="000000"/>
-                </a:solidFill>
-                <a:latin typeface="Consolas" panose="020B0609020204030204" pitchFamily="49" charset="0"/>
-              </a:rPr>
-              <a:t> </a:t>
-            </a:r>
-            <a:r>
-              <a:rPr lang="en-US" sz="1600" dirty="0">
-                <a:solidFill>
-                  <a:srgbClr val="FF0000"/>
-                </a:solidFill>
-                <a:latin typeface="Consolas" panose="020B0609020204030204" pitchFamily="49" charset="0"/>
-              </a:rPr>
-              <a:t>Include</a:t>
-            </a:r>
-            <a:r>
-              <a:rPr lang="en-US" sz="1600" dirty="0">
-                <a:solidFill>
-                  <a:srgbClr val="000000"/>
-                </a:solidFill>
-                <a:latin typeface="Consolas" panose="020B0609020204030204" pitchFamily="49" charset="0"/>
-              </a:rPr>
-              <a:t>=</a:t>
-            </a:r>
-            <a:r>
-              <a:rPr lang="en-US" sz="1600" dirty="0">
-                <a:solidFill>
                   <a:srgbClr val="0000FF"/>
-                </a:solidFill>
-                <a:latin typeface="Consolas" panose="020B0609020204030204" pitchFamily="49" charset="0"/>
-              </a:rPr>
-              <a:t>"</a:t>
-            </a:r>
-            <a:r>
-              <a:rPr lang="en-US" sz="1600" dirty="0" err="1">
-                <a:solidFill>
-                  <a:srgbClr val="0000FF"/>
-                </a:solidFill>
-                <a:latin typeface="Consolas" panose="020B0609020204030204" pitchFamily="49" charset="0"/>
-              </a:rPr>
-              <a:t>Microsoft.EntityFrameworkCore.Tools.DotNet</a:t>
-            </a:r>
-            <a:r>
-              <a:rPr lang="en-US" sz="1600" dirty="0">
-                <a:solidFill>
-                  <a:srgbClr val="0000FF"/>
-                </a:solidFill>
-                <a:latin typeface="Consolas" panose="020B0609020204030204" pitchFamily="49" charset="0"/>
-              </a:rPr>
-              <a:t>"</a:t>
-            </a:r>
-            <a:r>
-              <a:rPr lang="en-US" sz="1600" dirty="0">
-                <a:solidFill>
-                  <a:srgbClr val="000000"/>
-                </a:solidFill>
-                <a:latin typeface="Consolas" panose="020B0609020204030204" pitchFamily="49" charset="0"/>
-              </a:rPr>
-              <a:t> </a:t>
-            </a:r>
-            <a:r>
-              <a:rPr lang="en-US" sz="1600" dirty="0">
-                <a:solidFill>
-                  <a:srgbClr val="FF0000"/>
-                </a:solidFill>
-                <a:latin typeface="Consolas" panose="020B0609020204030204" pitchFamily="49" charset="0"/>
-              </a:rPr>
-              <a:t>Version</a:t>
-            </a:r>
-            <a:r>
-              <a:rPr lang="en-US" sz="1600" dirty="0">
-                <a:solidFill>
-                  <a:srgbClr val="000000"/>
-                </a:solidFill>
-                <a:latin typeface="Consolas" panose="020B0609020204030204" pitchFamily="49" charset="0"/>
-              </a:rPr>
-              <a:t>=</a:t>
-            </a:r>
-            <a:r>
-              <a:rPr lang="en-US" sz="1600" dirty="0">
-                <a:solidFill>
-                  <a:srgbClr val="0000FF"/>
-                </a:solidFill>
-                <a:latin typeface="Consolas" panose="020B0609020204030204" pitchFamily="49" charset="0"/>
-              </a:rPr>
-              <a:t>"1.0.0"</a:t>
-            </a:r>
-            <a:r>
-              <a:rPr lang="en-US" sz="1600" dirty="0">
-                <a:solidFill>
-                  <a:srgbClr val="000000"/>
-                </a:solidFill>
-                <a:latin typeface="Consolas" panose="020B0609020204030204" pitchFamily="49" charset="0"/>
-              </a:rPr>
-              <a:t> </a:t>
-            </a:r>
-            <a:r>
-              <a:rPr lang="en-US" sz="1600" dirty="0">
-                <a:solidFill>
-                  <a:srgbClr val="800000"/>
-                </a:solidFill>
-                <a:latin typeface="Consolas" panose="020B0609020204030204" pitchFamily="49" charset="0"/>
-              </a:rPr>
-              <a:t>/&gt;</a:t>
-            </a:r>
-            <a:endParaRPr lang="en-US" sz="1600" dirty="0">
-              <a:solidFill>
-                <a:srgbClr val="000000"/>
-              </a:solidFill>
-              <a:latin typeface="Consolas" panose="020B0609020204030204" pitchFamily="49" charset="0"/>
-            </a:endParaRPr>
-          </a:p>
-          <a:p>
-            <a:r>
-              <a:rPr lang="en-US" sz="1600" dirty="0">
-                <a:solidFill>
-                  <a:srgbClr val="800000"/>
-                </a:solidFill>
-                <a:latin typeface="Consolas" panose="020B0609020204030204" pitchFamily="49" charset="0"/>
-              </a:rPr>
-              <a:t>&lt;/</a:t>
-            </a:r>
-            <a:r>
-              <a:rPr lang="en-US" sz="1600" dirty="0" err="1">
-                <a:solidFill>
-                  <a:srgbClr val="800000"/>
-                </a:solidFill>
-                <a:latin typeface="Consolas" panose="020B0609020204030204" pitchFamily="49" charset="0"/>
-              </a:rPr>
-              <a:t>ItemGroup</a:t>
-            </a:r>
-            <a:r>
-              <a:rPr lang="en-US" sz="1600" dirty="0">
-                <a:solidFill>
-                  <a:srgbClr val="800000"/>
                 </a:solidFill>
                 <a:latin typeface="Consolas" panose="020B0609020204030204" pitchFamily="49" charset="0"/>
               </a:rPr>

</xml_diff>

<commit_message>
Upgrade to EF 2.1
</commit_message>
<xml_diff>
--- a/EfCoreGettingStarted.pptx
+++ b/EfCoreGettingStarted.pptx
@@ -5,7 +5,7 @@
     <p:sldMasterId id="2147483660" r:id="rId1"/>
   </p:sldMasterIdLst>
   <p:notesMasterIdLst>
-    <p:notesMasterId r:id="rId22"/>
+    <p:notesMasterId r:id="rId25"/>
   </p:notesMasterIdLst>
   <p:sldIdLst>
     <p:sldId id="267" r:id="rId2"/>
@@ -15,19 +15,22 @@
     <p:sldId id="271" r:id="rId6"/>
     <p:sldId id="259" r:id="rId7"/>
     <p:sldId id="258" r:id="rId8"/>
-    <p:sldId id="261" r:id="rId9"/>
-    <p:sldId id="273" r:id="rId10"/>
-    <p:sldId id="263" r:id="rId11"/>
-    <p:sldId id="264" r:id="rId12"/>
-    <p:sldId id="266" r:id="rId13"/>
-    <p:sldId id="265" r:id="rId14"/>
-    <p:sldId id="274" r:id="rId15"/>
-    <p:sldId id="275" r:id="rId16"/>
-    <p:sldId id="276" r:id="rId17"/>
-    <p:sldId id="277" r:id="rId18"/>
-    <p:sldId id="260" r:id="rId19"/>
-    <p:sldId id="257" r:id="rId20"/>
-    <p:sldId id="268" r:id="rId21"/>
+    <p:sldId id="278" r:id="rId9"/>
+    <p:sldId id="283" r:id="rId10"/>
+    <p:sldId id="284" r:id="rId11"/>
+    <p:sldId id="273" r:id="rId12"/>
+    <p:sldId id="263" r:id="rId13"/>
+    <p:sldId id="264" r:id="rId14"/>
+    <p:sldId id="266" r:id="rId15"/>
+    <p:sldId id="265" r:id="rId16"/>
+    <p:sldId id="274" r:id="rId17"/>
+    <p:sldId id="275" r:id="rId18"/>
+    <p:sldId id="276" r:id="rId19"/>
+    <p:sldId id="277" r:id="rId20"/>
+    <p:sldId id="285" r:id="rId21"/>
+    <p:sldId id="260" r:id="rId22"/>
+    <p:sldId id="257" r:id="rId23"/>
+    <p:sldId id="268" r:id="rId24"/>
   </p:sldIdLst>
   <p:sldSz cx="12192000" cy="6858000"/>
   <p:notesSz cx="6858000" cy="9144000"/>
@@ -134,10 +137,6 @@
 </p:presentation>
 </file>
 
-<file path=ppt/revisionInfo.xml><?xml version="1.0" encoding="utf-8"?>
-<p1510:revInfo xmlns:a="http://schemas.openxmlformats.org/drawingml/2006/main" xmlns:r="http://schemas.openxmlformats.org/officeDocument/2006/relationships" xmlns:p1510="http://schemas.microsoft.com/office/powerpoint/2015/10/main"/>
-</file>
-
 <file path=ppt/charts/chart1.xml><?xml version="1.0" encoding="utf-8"?>
 <c:chartSpace xmlns:c="http://schemas.openxmlformats.org/drawingml/2006/chart" xmlns:a="http://schemas.openxmlformats.org/drawingml/2006/main" xmlns:r="http://schemas.openxmlformats.org/officeDocument/2006/relationships" xmlns:c16r2="http://schemas.microsoft.com/office/drawing/2015/06/chart">
   <c:date1904 val="0"/>
@@ -296,7 +295,7 @@
                 <c:formatCode>General</c:formatCode>
                 <c:ptCount val="3"/>
                 <c:pt idx="0">
-                  <c:v>653</c:v>
+                  <c:v>753</c:v>
                 </c:pt>
                 <c:pt idx="1">
                   <c:v>880</c:v>
@@ -322,7 +321,7 @@
               <c:strCache>
                 <c:ptCount val="1"/>
                 <c:pt idx="0">
-                  <c:v>EF Core</c:v>
+                  <c:v>EF Core 1</c:v>
                 </c:pt>
               </c:strCache>
             </c:strRef>
@@ -420,7 +419,7 @@
                 <c:formatCode>General</c:formatCode>
                 <c:ptCount val="3"/>
                 <c:pt idx="0">
-                  <c:v>179</c:v>
+                  <c:v>224</c:v>
                 </c:pt>
                 <c:pt idx="1">
                   <c:v>142</c:v>
@@ -554,6 +553,774 @@
           </a:p>
         </c:txPr>
         <c:crossAx val="410031392"/>
+        <c:crosses val="autoZero"/>
+        <c:crossBetween val="between"/>
+      </c:valAx>
+      <c:spPr>
+        <a:noFill/>
+        <a:ln>
+          <a:noFill/>
+        </a:ln>
+        <a:effectLst/>
+      </c:spPr>
+    </c:plotArea>
+    <c:legend>
+      <c:legendPos val="b"/>
+      <c:overlay val="0"/>
+      <c:spPr>
+        <a:noFill/>
+        <a:ln>
+          <a:noFill/>
+        </a:ln>
+        <a:effectLst/>
+      </c:spPr>
+      <c:txPr>
+        <a:bodyPr rot="0" spcFirstLastPara="1" vertOverflow="ellipsis" vert="horz" wrap="square" anchor="ctr" anchorCtr="1"/>
+        <a:lstStyle/>
+        <a:p>
+          <a:pPr>
+            <a:defRPr sz="1197" b="0" i="0" u="none" strike="noStrike" kern="1200" baseline="0">
+              <a:solidFill>
+                <a:schemeClr val="tx1">
+                  <a:lumMod val="65000"/>
+                  <a:lumOff val="35000"/>
+                </a:schemeClr>
+              </a:solidFill>
+              <a:latin typeface="+mn-lt"/>
+              <a:ea typeface="+mn-ea"/>
+              <a:cs typeface="+mn-cs"/>
+            </a:defRPr>
+          </a:pPr>
+          <a:endParaRPr lang="en-US"/>
+        </a:p>
+      </c:txPr>
+    </c:legend>
+    <c:plotVisOnly val="1"/>
+    <c:dispBlanksAs val="gap"/>
+    <c:showDLblsOverMax val="0"/>
+  </c:chart>
+  <c:spPr>
+    <a:noFill/>
+    <a:ln>
+      <a:solidFill>
+        <a:srgbClr val="FA8621"/>
+      </a:solidFill>
+    </a:ln>
+    <a:effectLst/>
+  </c:spPr>
+  <c:txPr>
+    <a:bodyPr/>
+    <a:lstStyle/>
+    <a:p>
+      <a:pPr>
+        <a:defRPr/>
+      </a:pPr>
+      <a:endParaRPr lang="en-US"/>
+    </a:p>
+  </c:txPr>
+  <c:externalData r:id="rId3">
+    <c:autoUpdate val="0"/>
+  </c:externalData>
+</c:chartSpace>
+</file>
+
+<file path=ppt/charts/chart2.xml><?xml version="1.0" encoding="utf-8"?>
+<c:chartSpace xmlns:c="http://schemas.openxmlformats.org/drawingml/2006/chart" xmlns:a="http://schemas.openxmlformats.org/drawingml/2006/main" xmlns:r="http://schemas.openxmlformats.org/officeDocument/2006/relationships" xmlns:c16r2="http://schemas.microsoft.com/office/drawing/2015/06/chart">
+  <c:date1904 val="0"/>
+  <c:lang val="en-US"/>
+  <c:roundedCorners val="0"/>
+  <mc:AlternateContent xmlns:mc="http://schemas.openxmlformats.org/markup-compatibility/2006">
+    <mc:Choice xmlns:c14="http://schemas.microsoft.com/office/drawing/2007/8/2/chart" Requires="c14">
+      <c14:style val="104"/>
+    </mc:Choice>
+    <mc:Fallback>
+      <c:style val="4"/>
+    </mc:Fallback>
+  </mc:AlternateContent>
+  <c:chart>
+    <c:autoTitleDeleted val="0"/>
+    <c:plotArea>
+      <c:layout/>
+      <c:barChart>
+        <c:barDir val="col"/>
+        <c:grouping val="clustered"/>
+        <c:varyColors val="0"/>
+        <c:ser>
+          <c:idx val="0"/>
+          <c:order val="0"/>
+          <c:tx>
+            <c:strRef>
+              <c:f>Sheet1!$B$1</c:f>
+              <c:strCache>
+                <c:ptCount val="1"/>
+                <c:pt idx="0">
+                  <c:v>EF 6</c:v>
+                </c:pt>
+              </c:strCache>
+            </c:strRef>
+          </c:tx>
+          <c:spPr>
+            <a:solidFill>
+              <a:schemeClr val="accent4">
+                <a:lumMod val="75000"/>
+              </a:schemeClr>
+            </a:solidFill>
+            <a:ln>
+              <a:noFill/>
+            </a:ln>
+            <a:effectLst/>
+          </c:spPr>
+          <c:invertIfNegative val="0"/>
+          <c:dLbls>
+            <c:spPr>
+              <a:noFill/>
+              <a:ln>
+                <a:noFill/>
+              </a:ln>
+              <a:effectLst/>
+            </c:spPr>
+            <c:txPr>
+              <a:bodyPr rot="0" spcFirstLastPara="1" vertOverflow="ellipsis" vert="horz" wrap="square" lIns="38100" tIns="19050" rIns="38100" bIns="19050" anchor="ctr" anchorCtr="1">
+                <a:spAutoFit/>
+              </a:bodyPr>
+              <a:lstStyle/>
+              <a:p>
+                <a:pPr>
+                  <a:defRPr sz="1197" b="0" i="0" u="none" strike="noStrike" kern="1200" baseline="0">
+                    <a:solidFill>
+                      <a:schemeClr val="tx1">
+                        <a:lumMod val="75000"/>
+                        <a:lumOff val="25000"/>
+                      </a:schemeClr>
+                    </a:solidFill>
+                    <a:latin typeface="+mn-lt"/>
+                    <a:ea typeface="+mn-ea"/>
+                    <a:cs typeface="+mn-cs"/>
+                  </a:defRPr>
+                </a:pPr>
+                <a:endParaRPr lang="en-US"/>
+              </a:p>
+            </c:txPr>
+            <c:showLegendKey val="0"/>
+            <c:showVal val="1"/>
+            <c:showCatName val="0"/>
+            <c:showSerName val="0"/>
+            <c:showPercent val="0"/>
+            <c:showBubbleSize val="0"/>
+            <c:showLeaderLines val="0"/>
+            <c:extLst>
+              <c:ext xmlns:c15="http://schemas.microsoft.com/office/drawing/2012/chart" uri="{CE6537A1-D6FC-4f65-9D91-7224C49458BB}">
+                <c15:showLeaderLines val="1"/>
+                <c15:leaderLines>
+                  <c:spPr>
+                    <a:ln w="9525" cap="flat" cmpd="sng" algn="ctr">
+                      <a:solidFill>
+                        <a:schemeClr val="tx1">
+                          <a:lumMod val="35000"/>
+                          <a:lumOff val="65000"/>
+                        </a:schemeClr>
+                      </a:solidFill>
+                      <a:round/>
+                    </a:ln>
+                    <a:effectLst/>
+                  </c:spPr>
+                </c15:leaderLines>
+              </c:ext>
+            </c:extLst>
+          </c:dLbls>
+          <c:cat>
+            <c:strRef>
+              <c:f>Sheet1!$A$2</c:f>
+              <c:strCache>
+                <c:ptCount val="1"/>
+                <c:pt idx="0">
+                  <c:v>Category 1</c:v>
+                </c:pt>
+              </c:strCache>
+            </c:strRef>
+          </c:cat>
+          <c:val>
+            <c:numRef>
+              <c:f>Sheet1!$B$2</c:f>
+              <c:numCache>
+                <c:formatCode>General</c:formatCode>
+                <c:ptCount val="1"/>
+                <c:pt idx="0">
+                  <c:v>753</c:v>
+                </c:pt>
+              </c:numCache>
+            </c:numRef>
+          </c:val>
+          <c:extLst>
+            <c:ext xmlns:c16="http://schemas.microsoft.com/office/drawing/2014/chart" uri="{C3380CC4-5D6E-409C-BE32-E72D297353CC}">
+              <c16:uniqueId val="{00000000-8B71-4019-ADD2-9F9C1F7B898D}"/>
+            </c:ext>
+          </c:extLst>
+        </c:ser>
+        <c:ser>
+          <c:idx val="1"/>
+          <c:order val="1"/>
+          <c:tx>
+            <c:strRef>
+              <c:f>Sheet1!$C$1</c:f>
+              <c:strCache>
+                <c:ptCount val="1"/>
+                <c:pt idx="0">
+                  <c:v>EF Core 1</c:v>
+                </c:pt>
+              </c:strCache>
+            </c:strRef>
+          </c:tx>
+          <c:spPr>
+            <a:solidFill>
+              <a:schemeClr val="accent2">
+                <a:shade val="76000"/>
+              </a:schemeClr>
+            </a:solidFill>
+            <a:ln>
+              <a:noFill/>
+            </a:ln>
+            <a:effectLst/>
+          </c:spPr>
+          <c:invertIfNegative val="0"/>
+          <c:dLbls>
+            <c:spPr>
+              <a:noFill/>
+              <a:ln>
+                <a:noFill/>
+              </a:ln>
+              <a:effectLst/>
+            </c:spPr>
+            <c:txPr>
+              <a:bodyPr rot="0" spcFirstLastPara="1" vertOverflow="ellipsis" vert="horz" wrap="square" lIns="38100" tIns="19050" rIns="38100" bIns="19050" anchor="ctr" anchorCtr="1">
+                <a:spAutoFit/>
+              </a:bodyPr>
+              <a:lstStyle/>
+              <a:p>
+                <a:pPr>
+                  <a:defRPr sz="1197" b="0" i="0" u="none" strike="noStrike" kern="1200" baseline="0">
+                    <a:solidFill>
+                      <a:schemeClr val="tx1">
+                        <a:lumMod val="75000"/>
+                        <a:lumOff val="25000"/>
+                      </a:schemeClr>
+                    </a:solidFill>
+                    <a:latin typeface="+mn-lt"/>
+                    <a:ea typeface="+mn-ea"/>
+                    <a:cs typeface="+mn-cs"/>
+                  </a:defRPr>
+                </a:pPr>
+                <a:endParaRPr lang="en-US"/>
+              </a:p>
+            </c:txPr>
+            <c:showLegendKey val="0"/>
+            <c:showVal val="1"/>
+            <c:showCatName val="0"/>
+            <c:showSerName val="0"/>
+            <c:showPercent val="0"/>
+            <c:showBubbleSize val="0"/>
+            <c:showLeaderLines val="0"/>
+            <c:extLst>
+              <c:ext xmlns:c15="http://schemas.microsoft.com/office/drawing/2012/chart" uri="{CE6537A1-D6FC-4f65-9D91-7224C49458BB}">
+                <c15:showLeaderLines val="1"/>
+                <c15:leaderLines>
+                  <c:spPr>
+                    <a:ln w="9525" cap="flat" cmpd="sng" algn="ctr">
+                      <a:solidFill>
+                        <a:schemeClr val="tx1">
+                          <a:lumMod val="35000"/>
+                          <a:lumOff val="65000"/>
+                        </a:schemeClr>
+                      </a:solidFill>
+                      <a:round/>
+                    </a:ln>
+                    <a:effectLst/>
+                  </c:spPr>
+                </c15:leaderLines>
+              </c:ext>
+            </c:extLst>
+          </c:dLbls>
+          <c:cat>
+            <c:strRef>
+              <c:f>Sheet1!$A$2</c:f>
+              <c:strCache>
+                <c:ptCount val="1"/>
+                <c:pt idx="0">
+                  <c:v>Category 1</c:v>
+                </c:pt>
+              </c:strCache>
+            </c:strRef>
+          </c:cat>
+          <c:val>
+            <c:numRef>
+              <c:f>Sheet1!$C$2</c:f>
+              <c:numCache>
+                <c:formatCode>General</c:formatCode>
+                <c:ptCount val="1"/>
+                <c:pt idx="0">
+                  <c:v>224</c:v>
+                </c:pt>
+              </c:numCache>
+            </c:numRef>
+          </c:val>
+          <c:extLst>
+            <c:ext xmlns:c16="http://schemas.microsoft.com/office/drawing/2014/chart" uri="{C3380CC4-5D6E-409C-BE32-E72D297353CC}">
+              <c16:uniqueId val="{00000003-8B71-4019-ADD2-9F9C1F7B898D}"/>
+            </c:ext>
+          </c:extLst>
+        </c:ser>
+        <c:ser>
+          <c:idx val="2"/>
+          <c:order val="2"/>
+          <c:tx>
+            <c:strRef>
+              <c:f>Sheet1!$D$1</c:f>
+              <c:strCache>
+                <c:ptCount val="1"/>
+                <c:pt idx="0">
+                  <c:v>EF Core 2</c:v>
+                </c:pt>
+              </c:strCache>
+            </c:strRef>
+          </c:tx>
+          <c:spPr>
+            <a:solidFill>
+              <a:schemeClr val="accent2"/>
+            </a:solidFill>
+            <a:ln>
+              <a:noFill/>
+            </a:ln>
+            <a:effectLst/>
+          </c:spPr>
+          <c:invertIfNegative val="0"/>
+          <c:dLbls>
+            <c:spPr>
+              <a:noFill/>
+              <a:ln>
+                <a:noFill/>
+              </a:ln>
+              <a:effectLst/>
+            </c:spPr>
+            <c:txPr>
+              <a:bodyPr rot="0" spcFirstLastPara="1" vertOverflow="ellipsis" vert="horz" wrap="square" lIns="38100" tIns="19050" rIns="38100" bIns="19050" anchor="ctr" anchorCtr="1">
+                <a:spAutoFit/>
+              </a:bodyPr>
+              <a:lstStyle/>
+              <a:p>
+                <a:pPr>
+                  <a:defRPr sz="1197" b="0" i="0" u="none" strike="noStrike" kern="1200" baseline="0">
+                    <a:solidFill>
+                      <a:schemeClr val="tx1">
+                        <a:lumMod val="75000"/>
+                        <a:lumOff val="25000"/>
+                      </a:schemeClr>
+                    </a:solidFill>
+                    <a:latin typeface="+mn-lt"/>
+                    <a:ea typeface="+mn-ea"/>
+                    <a:cs typeface="+mn-cs"/>
+                  </a:defRPr>
+                </a:pPr>
+                <a:endParaRPr lang="en-US"/>
+              </a:p>
+            </c:txPr>
+            <c:showLegendKey val="0"/>
+            <c:showVal val="1"/>
+            <c:showCatName val="0"/>
+            <c:showSerName val="0"/>
+            <c:showPercent val="0"/>
+            <c:showBubbleSize val="0"/>
+            <c:showLeaderLines val="0"/>
+            <c:extLst>
+              <c:ext xmlns:c15="http://schemas.microsoft.com/office/drawing/2012/chart" uri="{CE6537A1-D6FC-4f65-9D91-7224C49458BB}">
+                <c15:showLeaderLines val="1"/>
+                <c15:leaderLines>
+                  <c:spPr>
+                    <a:ln w="9525" cap="flat" cmpd="sng" algn="ctr">
+                      <a:solidFill>
+                        <a:schemeClr val="tx1">
+                          <a:lumMod val="35000"/>
+                          <a:lumOff val="65000"/>
+                        </a:schemeClr>
+                      </a:solidFill>
+                      <a:round/>
+                    </a:ln>
+                    <a:effectLst/>
+                  </c:spPr>
+                </c15:leaderLines>
+              </c:ext>
+            </c:extLst>
+          </c:dLbls>
+          <c:cat>
+            <c:strRef>
+              <c:f>Sheet1!$A$2</c:f>
+              <c:strCache>
+                <c:ptCount val="1"/>
+                <c:pt idx="0">
+                  <c:v>Category 1</c:v>
+                </c:pt>
+              </c:strCache>
+            </c:strRef>
+          </c:cat>
+          <c:val>
+            <c:numRef>
+              <c:f>Sheet1!$D$2</c:f>
+              <c:numCache>
+                <c:formatCode>General</c:formatCode>
+                <c:ptCount val="1"/>
+                <c:pt idx="0">
+                  <c:v>196</c:v>
+                </c:pt>
+              </c:numCache>
+            </c:numRef>
+          </c:val>
+          <c:extLst>
+            <c:ext xmlns:c16="http://schemas.microsoft.com/office/drawing/2014/chart" uri="{C3380CC4-5D6E-409C-BE32-E72D297353CC}">
+              <c16:uniqueId val="{00000004-8B71-4019-ADD2-9F9C1F7B898D}"/>
+            </c:ext>
+          </c:extLst>
+        </c:ser>
+        <c:ser>
+          <c:idx val="3"/>
+          <c:order val="3"/>
+          <c:tx>
+            <c:strRef>
+              <c:f>Sheet1!$E$1</c:f>
+              <c:strCache>
+                <c:ptCount val="1"/>
+                <c:pt idx="0">
+                  <c:v>EF Core 2 AsNoTracking</c:v>
+                </c:pt>
+              </c:strCache>
+            </c:strRef>
+          </c:tx>
+          <c:spPr>
+            <a:solidFill>
+              <a:schemeClr val="accent2">
+                <a:tint val="77000"/>
+              </a:schemeClr>
+            </a:solidFill>
+            <a:ln>
+              <a:noFill/>
+            </a:ln>
+            <a:effectLst/>
+          </c:spPr>
+          <c:invertIfNegative val="0"/>
+          <c:dLbls>
+            <c:spPr>
+              <a:noFill/>
+              <a:ln>
+                <a:noFill/>
+              </a:ln>
+              <a:effectLst/>
+            </c:spPr>
+            <c:txPr>
+              <a:bodyPr rot="0" spcFirstLastPara="1" vertOverflow="ellipsis" vert="horz" wrap="square" lIns="38100" tIns="19050" rIns="38100" bIns="19050" anchor="ctr" anchorCtr="1">
+                <a:spAutoFit/>
+              </a:bodyPr>
+              <a:lstStyle/>
+              <a:p>
+                <a:pPr>
+                  <a:defRPr sz="1197" b="0" i="0" u="none" strike="noStrike" kern="1200" baseline="0">
+                    <a:solidFill>
+                      <a:schemeClr val="tx1">
+                        <a:lumMod val="75000"/>
+                        <a:lumOff val="25000"/>
+                      </a:schemeClr>
+                    </a:solidFill>
+                    <a:latin typeface="+mn-lt"/>
+                    <a:ea typeface="+mn-ea"/>
+                    <a:cs typeface="+mn-cs"/>
+                  </a:defRPr>
+                </a:pPr>
+                <a:endParaRPr lang="en-US"/>
+              </a:p>
+            </c:txPr>
+            <c:showLegendKey val="0"/>
+            <c:showVal val="1"/>
+            <c:showCatName val="0"/>
+            <c:showSerName val="0"/>
+            <c:showPercent val="0"/>
+            <c:showBubbleSize val="0"/>
+            <c:showLeaderLines val="0"/>
+            <c:extLst>
+              <c:ext xmlns:c15="http://schemas.microsoft.com/office/drawing/2012/chart" uri="{CE6537A1-D6FC-4f65-9D91-7224C49458BB}">
+                <c15:showLeaderLines val="1"/>
+                <c15:leaderLines>
+                  <c:spPr>
+                    <a:ln w="9525" cap="flat" cmpd="sng" algn="ctr">
+                      <a:solidFill>
+                        <a:schemeClr val="tx1">
+                          <a:lumMod val="35000"/>
+                          <a:lumOff val="65000"/>
+                        </a:schemeClr>
+                      </a:solidFill>
+                      <a:round/>
+                    </a:ln>
+                    <a:effectLst/>
+                  </c:spPr>
+                </c15:leaderLines>
+              </c:ext>
+            </c:extLst>
+          </c:dLbls>
+          <c:cat>
+            <c:strRef>
+              <c:f>Sheet1!$A$2</c:f>
+              <c:strCache>
+                <c:ptCount val="1"/>
+                <c:pt idx="0">
+                  <c:v>Category 1</c:v>
+                </c:pt>
+              </c:strCache>
+            </c:strRef>
+          </c:cat>
+          <c:val>
+            <c:numRef>
+              <c:f>Sheet1!$E$2</c:f>
+              <c:numCache>
+                <c:formatCode>General</c:formatCode>
+                <c:ptCount val="1"/>
+                <c:pt idx="0">
+                  <c:v>115</c:v>
+                </c:pt>
+              </c:numCache>
+            </c:numRef>
+          </c:val>
+          <c:extLst>
+            <c:ext xmlns:c16="http://schemas.microsoft.com/office/drawing/2014/chart" uri="{C3380CC4-5D6E-409C-BE32-E72D297353CC}">
+              <c16:uniqueId val="{00000005-8B71-4019-ADD2-9F9C1F7B898D}"/>
+            </c:ext>
+          </c:extLst>
+        </c:ser>
+        <c:ser>
+          <c:idx val="4"/>
+          <c:order val="4"/>
+          <c:tx>
+            <c:strRef>
+              <c:f>Sheet1!$F$1</c:f>
+              <c:strCache>
+                <c:ptCount val="1"/>
+                <c:pt idx="0">
+                  <c:v>Dapper</c:v>
+                </c:pt>
+              </c:strCache>
+            </c:strRef>
+          </c:tx>
+          <c:spPr>
+            <a:solidFill>
+              <a:schemeClr val="accent5">
+                <a:lumMod val="60000"/>
+                <a:lumOff val="40000"/>
+              </a:schemeClr>
+            </a:solidFill>
+            <a:ln>
+              <a:noFill/>
+            </a:ln>
+            <a:effectLst/>
+          </c:spPr>
+          <c:invertIfNegative val="0"/>
+          <c:dLbls>
+            <c:spPr>
+              <a:noFill/>
+              <a:ln>
+                <a:noFill/>
+              </a:ln>
+              <a:effectLst/>
+            </c:spPr>
+            <c:txPr>
+              <a:bodyPr rot="0" spcFirstLastPara="1" vertOverflow="ellipsis" vert="horz" wrap="square" lIns="38100" tIns="19050" rIns="38100" bIns="19050" anchor="ctr" anchorCtr="1">
+                <a:spAutoFit/>
+              </a:bodyPr>
+              <a:lstStyle/>
+              <a:p>
+                <a:pPr>
+                  <a:defRPr sz="1197" b="0" i="0" u="none" strike="noStrike" kern="1200" baseline="0">
+                    <a:solidFill>
+                      <a:schemeClr val="tx1">
+                        <a:lumMod val="75000"/>
+                        <a:lumOff val="25000"/>
+                      </a:schemeClr>
+                    </a:solidFill>
+                    <a:latin typeface="+mn-lt"/>
+                    <a:ea typeface="+mn-ea"/>
+                    <a:cs typeface="+mn-cs"/>
+                  </a:defRPr>
+                </a:pPr>
+                <a:endParaRPr lang="en-US"/>
+              </a:p>
+            </c:txPr>
+            <c:showLegendKey val="0"/>
+            <c:showVal val="1"/>
+            <c:showCatName val="0"/>
+            <c:showSerName val="0"/>
+            <c:showPercent val="0"/>
+            <c:showBubbleSize val="0"/>
+            <c:showLeaderLines val="0"/>
+            <c:extLst>
+              <c:ext xmlns:c15="http://schemas.microsoft.com/office/drawing/2012/chart" uri="{CE6537A1-D6FC-4f65-9D91-7224C49458BB}">
+                <c15:showLeaderLines val="1"/>
+                <c15:leaderLines>
+                  <c:spPr>
+                    <a:ln w="9525" cap="flat" cmpd="sng" algn="ctr">
+                      <a:solidFill>
+                        <a:schemeClr val="tx1">
+                          <a:lumMod val="35000"/>
+                          <a:lumOff val="65000"/>
+                        </a:schemeClr>
+                      </a:solidFill>
+                      <a:round/>
+                    </a:ln>
+                    <a:effectLst/>
+                  </c:spPr>
+                </c15:leaderLines>
+              </c:ext>
+            </c:extLst>
+          </c:dLbls>
+          <c:cat>
+            <c:strRef>
+              <c:f>Sheet1!$A$2</c:f>
+              <c:strCache>
+                <c:ptCount val="1"/>
+                <c:pt idx="0">
+                  <c:v>Category 1</c:v>
+                </c:pt>
+              </c:strCache>
+            </c:strRef>
+          </c:cat>
+          <c:val>
+            <c:numRef>
+              <c:f>Sheet1!$F$2</c:f>
+              <c:numCache>
+                <c:formatCode>General</c:formatCode>
+                <c:ptCount val="1"/>
+                <c:pt idx="0">
+                  <c:v>99.8</c:v>
+                </c:pt>
+              </c:numCache>
+            </c:numRef>
+          </c:val>
+          <c:extLst>
+            <c:ext xmlns:c16="http://schemas.microsoft.com/office/drawing/2014/chart" uri="{C3380CC4-5D6E-409C-BE32-E72D297353CC}">
+              <c16:uniqueId val="{00000006-8B71-4019-ADD2-9F9C1F7B898D}"/>
+            </c:ext>
+          </c:extLst>
+        </c:ser>
+        <c:dLbls>
+          <c:showLegendKey val="0"/>
+          <c:showVal val="0"/>
+          <c:showCatName val="0"/>
+          <c:showSerName val="0"/>
+          <c:showPercent val="0"/>
+          <c:showBubbleSize val="0"/>
+        </c:dLbls>
+        <c:gapWidth val="219"/>
+        <c:overlap val="-27"/>
+        <c:axId val="454154280"/>
+        <c:axId val="454154608"/>
+      </c:barChart>
+      <c:catAx>
+        <c:axId val="454154280"/>
+        <c:scaling>
+          <c:orientation val="minMax"/>
+        </c:scaling>
+        <c:delete val="0"/>
+        <c:axPos val="b"/>
+        <c:numFmt formatCode="General" sourceLinked="1"/>
+        <c:majorTickMark val="none"/>
+        <c:minorTickMark val="none"/>
+        <c:tickLblPos val="nextTo"/>
+        <c:spPr>
+          <a:noFill/>
+          <a:ln w="9525" cap="flat" cmpd="sng" algn="ctr">
+            <a:solidFill>
+              <a:schemeClr val="tx1">
+                <a:lumMod val="15000"/>
+                <a:lumOff val="85000"/>
+              </a:schemeClr>
+            </a:solidFill>
+            <a:round/>
+          </a:ln>
+          <a:effectLst/>
+        </c:spPr>
+        <c:txPr>
+          <a:bodyPr rot="-60000000" spcFirstLastPara="1" vertOverflow="ellipsis" vert="horz" wrap="square" anchor="ctr" anchorCtr="1"/>
+          <a:lstStyle/>
+          <a:p>
+            <a:pPr>
+              <a:defRPr sz="1197" b="0" i="0" u="none" strike="noStrike" kern="1200" baseline="0">
+                <a:solidFill>
+                  <a:schemeClr val="tx1">
+                    <a:lumMod val="65000"/>
+                    <a:lumOff val="35000"/>
+                  </a:schemeClr>
+                </a:solidFill>
+                <a:latin typeface="+mn-lt"/>
+                <a:ea typeface="+mn-ea"/>
+                <a:cs typeface="+mn-cs"/>
+              </a:defRPr>
+            </a:pPr>
+            <a:endParaRPr lang="en-US"/>
+          </a:p>
+        </c:txPr>
+        <c:crossAx val="454154608"/>
+        <c:crosses val="autoZero"/>
+        <c:auto val="1"/>
+        <c:lblAlgn val="ctr"/>
+        <c:lblOffset val="100"/>
+        <c:noMultiLvlLbl val="0"/>
+      </c:catAx>
+      <c:valAx>
+        <c:axId val="454154608"/>
+        <c:scaling>
+          <c:orientation val="minMax"/>
+        </c:scaling>
+        <c:delete val="0"/>
+        <c:axPos val="l"/>
+        <c:majorGridlines>
+          <c:spPr>
+            <a:ln w="9525" cap="flat" cmpd="sng" algn="ctr">
+              <a:solidFill>
+                <a:schemeClr val="tx1">
+                  <a:lumMod val="15000"/>
+                  <a:lumOff val="85000"/>
+                </a:schemeClr>
+              </a:solidFill>
+              <a:round/>
+            </a:ln>
+            <a:effectLst/>
+          </c:spPr>
+        </c:majorGridlines>
+        <c:numFmt formatCode="General" sourceLinked="1"/>
+        <c:majorTickMark val="none"/>
+        <c:minorTickMark val="none"/>
+        <c:tickLblPos val="nextTo"/>
+        <c:spPr>
+          <a:noFill/>
+          <a:ln>
+            <a:noFill/>
+          </a:ln>
+          <a:effectLst/>
+        </c:spPr>
+        <c:txPr>
+          <a:bodyPr rot="-60000000" spcFirstLastPara="1" vertOverflow="ellipsis" vert="horz" wrap="square" anchor="ctr" anchorCtr="1"/>
+          <a:lstStyle/>
+          <a:p>
+            <a:pPr>
+              <a:defRPr sz="1197" b="0" i="0" u="none" strike="noStrike" kern="1200" baseline="0">
+                <a:solidFill>
+                  <a:schemeClr val="tx1">
+                    <a:lumMod val="65000"/>
+                    <a:lumOff val="35000"/>
+                  </a:schemeClr>
+                </a:solidFill>
+                <a:latin typeface="+mn-lt"/>
+                <a:ea typeface="+mn-ea"/>
+                <a:cs typeface="+mn-cs"/>
+              </a:defRPr>
+            </a:pPr>
+            <a:endParaRPr lang="en-US"/>
+          </a:p>
+        </c:txPr>
+        <c:crossAx val="454154280"/>
         <c:crosses val="autoZero"/>
         <c:crossBetween val="between"/>
       </c:valAx>
@@ -623,6 +1390,493 @@
 </c:chartSpace>
 </file>
 
+<file path=ppt/charts/chart3.xml><?xml version="1.0" encoding="utf-8"?>
+<c:chartSpace xmlns:c="http://schemas.openxmlformats.org/drawingml/2006/chart" xmlns:a="http://schemas.openxmlformats.org/drawingml/2006/main" xmlns:r="http://schemas.openxmlformats.org/officeDocument/2006/relationships" xmlns:c16r2="http://schemas.microsoft.com/office/drawing/2015/06/chart">
+  <c:date1904 val="0"/>
+  <c:lang val="en-US"/>
+  <c:roundedCorners val="0"/>
+  <mc:AlternateContent xmlns:mc="http://schemas.openxmlformats.org/markup-compatibility/2006">
+    <mc:Choice xmlns:c14="http://schemas.microsoft.com/office/drawing/2007/8/2/chart" Requires="c14">
+      <c14:style val="102"/>
+    </mc:Choice>
+    <mc:Fallback>
+      <c:style val="2"/>
+    </mc:Fallback>
+  </mc:AlternateContent>
+  <c:chart>
+    <c:title>
+      <c:overlay val="0"/>
+      <c:spPr>
+        <a:noFill/>
+        <a:ln>
+          <a:noFill/>
+        </a:ln>
+        <a:effectLst/>
+      </c:spPr>
+      <c:txPr>
+        <a:bodyPr rot="0" spcFirstLastPara="1" vertOverflow="ellipsis" vert="horz" wrap="square" anchor="ctr" anchorCtr="1"/>
+        <a:lstStyle/>
+        <a:p>
+          <a:pPr>
+            <a:defRPr sz="1862" b="0" i="0" u="none" strike="noStrike" kern="1200" spc="0" baseline="0">
+              <a:solidFill>
+                <a:schemeClr val="tx1">
+                  <a:lumMod val="65000"/>
+                  <a:lumOff val="35000"/>
+                </a:schemeClr>
+              </a:solidFill>
+              <a:latin typeface="+mn-lt"/>
+              <a:ea typeface="+mn-ea"/>
+              <a:cs typeface="+mn-cs"/>
+            </a:defRPr>
+          </a:pPr>
+          <a:endParaRPr lang="en-US"/>
+        </a:p>
+      </c:txPr>
+    </c:title>
+    <c:autoTitleDeleted val="0"/>
+    <c:plotArea>
+      <c:layout/>
+      <c:barChart>
+        <c:barDir val="col"/>
+        <c:grouping val="clustered"/>
+        <c:varyColors val="0"/>
+        <c:ser>
+          <c:idx val="0"/>
+          <c:order val="0"/>
+          <c:tx>
+            <c:strRef>
+              <c:f>Sheet1!$B$1</c:f>
+              <c:strCache>
+                <c:ptCount val="1"/>
+                <c:pt idx="0">
+                  <c:v>EF6</c:v>
+                </c:pt>
+              </c:strCache>
+            </c:strRef>
+          </c:tx>
+          <c:spPr>
+            <a:solidFill>
+              <a:schemeClr val="accent1"/>
+            </a:solidFill>
+            <a:ln>
+              <a:noFill/>
+            </a:ln>
+            <a:effectLst/>
+          </c:spPr>
+          <c:invertIfNegative val="0"/>
+          <c:dLbls>
+            <c:spPr>
+              <a:solidFill>
+                <a:srgbClr val="FFFFFF"/>
+              </a:solidFill>
+              <a:ln>
+                <a:solidFill>
+                  <a:srgbClr val="2C2C2C">
+                    <a:lumMod val="25000"/>
+                    <a:lumOff val="75000"/>
+                  </a:srgbClr>
+                </a:solidFill>
+              </a:ln>
+              <a:effectLst/>
+            </c:spPr>
+            <c:txPr>
+              <a:bodyPr rot="0" spcFirstLastPara="1" vertOverflow="clip" horzOverflow="clip" vert="horz" wrap="square" lIns="38100" tIns="19050" rIns="38100" bIns="19050" anchor="ctr" anchorCtr="1">
+                <a:spAutoFit/>
+              </a:bodyPr>
+              <a:lstStyle/>
+              <a:p>
+                <a:pPr>
+                  <a:defRPr sz="1197" b="0" i="0" u="none" strike="noStrike" kern="1200" baseline="0">
+                    <a:solidFill>
+                      <a:schemeClr val="dk1">
+                        <a:lumMod val="65000"/>
+                        <a:lumOff val="35000"/>
+                      </a:schemeClr>
+                    </a:solidFill>
+                    <a:latin typeface="+mn-lt"/>
+                    <a:ea typeface="+mn-ea"/>
+                    <a:cs typeface="+mn-cs"/>
+                  </a:defRPr>
+                </a:pPr>
+                <a:endParaRPr lang="en-US"/>
+              </a:p>
+            </c:txPr>
+            <c:showLegendKey val="0"/>
+            <c:showVal val="1"/>
+            <c:showCatName val="1"/>
+            <c:showSerName val="0"/>
+            <c:showPercent val="0"/>
+            <c:showBubbleSize val="0"/>
+            <c:showLeaderLines val="0"/>
+            <c:extLst>
+              <c:ext xmlns:c15="http://schemas.microsoft.com/office/drawing/2012/chart" uri="{CE6537A1-D6FC-4f65-9D91-7224C49458BB}">
+                <c15:spPr xmlns:c15="http://schemas.microsoft.com/office/drawing/2012/chart">
+                  <a:prstGeom prst="wedgeRectCallout">
+                    <a:avLst/>
+                  </a:prstGeom>
+                  <a:noFill/>
+                  <a:ln>
+                    <a:noFill/>
+                  </a:ln>
+                </c15:spPr>
+                <c15:showLeaderLines val="0"/>
+              </c:ext>
+            </c:extLst>
+          </c:dLbls>
+          <c:cat>
+            <c:strRef>
+              <c:f>Sheet1!$A$2:$A$4</c:f>
+              <c:strCache>
+                <c:ptCount val="3"/>
+                <c:pt idx="0">
+                  <c:v>ToList</c:v>
+                </c:pt>
+                <c:pt idx="1">
+                  <c:v>Complex Query</c:v>
+                </c:pt>
+                <c:pt idx="2">
+                  <c:v>Add and Save</c:v>
+                </c:pt>
+              </c:strCache>
+            </c:strRef>
+          </c:cat>
+          <c:val>
+            <c:numRef>
+              <c:f>Sheet1!$B$2:$B$4</c:f>
+              <c:numCache>
+                <c:formatCode>General</c:formatCode>
+                <c:ptCount val="3"/>
+                <c:pt idx="0">
+                  <c:v>753</c:v>
+                </c:pt>
+                <c:pt idx="1">
+                  <c:v>880</c:v>
+                </c:pt>
+                <c:pt idx="2">
+                  <c:v>1032.3</c:v>
+                </c:pt>
+              </c:numCache>
+            </c:numRef>
+          </c:val>
+          <c:extLst>
+            <c:ext xmlns:c16="http://schemas.microsoft.com/office/drawing/2014/chart" uri="{C3380CC4-5D6E-409C-BE32-E72D297353CC}">
+              <c16:uniqueId val="{00000000-975D-43AD-88E8-1D35FACD3F10}"/>
+            </c:ext>
+          </c:extLst>
+        </c:ser>
+        <c:ser>
+          <c:idx val="1"/>
+          <c:order val="1"/>
+          <c:tx>
+            <c:strRef>
+              <c:f>Sheet1!$C$1</c:f>
+              <c:strCache>
+                <c:ptCount val="1"/>
+                <c:pt idx="0">
+                  <c:v>EF Core</c:v>
+                </c:pt>
+              </c:strCache>
+            </c:strRef>
+          </c:tx>
+          <c:spPr>
+            <a:solidFill>
+              <a:schemeClr val="accent2"/>
+            </a:solidFill>
+            <a:ln>
+              <a:noFill/>
+            </a:ln>
+            <a:effectLst/>
+          </c:spPr>
+          <c:invertIfNegative val="0"/>
+          <c:dLbls>
+            <c:spPr>
+              <a:solidFill>
+                <a:srgbClr val="FFFFFF"/>
+              </a:solidFill>
+              <a:ln>
+                <a:solidFill>
+                  <a:srgbClr val="2C2C2C">
+                    <a:lumMod val="25000"/>
+                    <a:lumOff val="75000"/>
+                  </a:srgbClr>
+                </a:solidFill>
+              </a:ln>
+              <a:effectLst/>
+            </c:spPr>
+            <c:txPr>
+              <a:bodyPr rot="0" spcFirstLastPara="1" vertOverflow="clip" horzOverflow="clip" vert="horz" wrap="square" lIns="38100" tIns="19050" rIns="38100" bIns="19050" anchor="ctr" anchorCtr="1">
+                <a:spAutoFit/>
+              </a:bodyPr>
+              <a:lstStyle/>
+              <a:p>
+                <a:pPr>
+                  <a:defRPr sz="1197" b="0" i="0" u="none" strike="noStrike" kern="1200" baseline="0">
+                    <a:solidFill>
+                      <a:schemeClr val="dk1">
+                        <a:lumMod val="65000"/>
+                        <a:lumOff val="35000"/>
+                      </a:schemeClr>
+                    </a:solidFill>
+                    <a:latin typeface="+mn-lt"/>
+                    <a:ea typeface="+mn-ea"/>
+                    <a:cs typeface="+mn-cs"/>
+                  </a:defRPr>
+                </a:pPr>
+                <a:endParaRPr lang="en-US"/>
+              </a:p>
+            </c:txPr>
+            <c:showLegendKey val="0"/>
+            <c:showVal val="1"/>
+            <c:showCatName val="1"/>
+            <c:showSerName val="0"/>
+            <c:showPercent val="0"/>
+            <c:showBubbleSize val="0"/>
+            <c:showLeaderLines val="0"/>
+            <c:extLst>
+              <c:ext xmlns:c15="http://schemas.microsoft.com/office/drawing/2012/chart" uri="{CE6537A1-D6FC-4f65-9D91-7224C49458BB}">
+                <c15:spPr xmlns:c15="http://schemas.microsoft.com/office/drawing/2012/chart">
+                  <a:prstGeom prst="wedgeRectCallout">
+                    <a:avLst/>
+                  </a:prstGeom>
+                  <a:noFill/>
+                  <a:ln>
+                    <a:noFill/>
+                  </a:ln>
+                </c15:spPr>
+                <c15:showLeaderLines val="0"/>
+              </c:ext>
+            </c:extLst>
+          </c:dLbls>
+          <c:cat>
+            <c:strRef>
+              <c:f>Sheet1!$A$2:$A$4</c:f>
+              <c:strCache>
+                <c:ptCount val="3"/>
+                <c:pt idx="0">
+                  <c:v>ToList</c:v>
+                </c:pt>
+                <c:pt idx="1">
+                  <c:v>Complex Query</c:v>
+                </c:pt>
+                <c:pt idx="2">
+                  <c:v>Add and Save</c:v>
+                </c:pt>
+              </c:strCache>
+            </c:strRef>
+          </c:cat>
+          <c:val>
+            <c:numRef>
+              <c:f>Sheet1!$C$2:$C$4</c:f>
+              <c:numCache>
+                <c:formatCode>General</c:formatCode>
+                <c:ptCount val="3"/>
+                <c:pt idx="0">
+                  <c:v>224</c:v>
+                </c:pt>
+                <c:pt idx="1">
+                  <c:v>142</c:v>
+                </c:pt>
+                <c:pt idx="2">
+                  <c:v>10.1</c:v>
+                </c:pt>
+              </c:numCache>
+            </c:numRef>
+          </c:val>
+          <c:extLst>
+            <c:ext xmlns:c16="http://schemas.microsoft.com/office/drawing/2014/chart" uri="{C3380CC4-5D6E-409C-BE32-E72D297353CC}">
+              <c16:uniqueId val="{00000001-975D-43AD-88E8-1D35FACD3F10}"/>
+            </c:ext>
+          </c:extLst>
+        </c:ser>
+        <c:dLbls>
+          <c:showLegendKey val="0"/>
+          <c:showVal val="0"/>
+          <c:showCatName val="0"/>
+          <c:showSerName val="0"/>
+          <c:showPercent val="0"/>
+          <c:showBubbleSize val="0"/>
+        </c:dLbls>
+        <c:gapWidth val="219"/>
+        <c:overlap val="-27"/>
+        <c:axId val="410031392"/>
+        <c:axId val="410035000"/>
+      </c:barChart>
+      <c:catAx>
+        <c:axId val="410031392"/>
+        <c:scaling>
+          <c:orientation val="minMax"/>
+        </c:scaling>
+        <c:delete val="0"/>
+        <c:axPos val="b"/>
+        <c:numFmt formatCode="General" sourceLinked="1"/>
+        <c:majorTickMark val="none"/>
+        <c:minorTickMark val="none"/>
+        <c:tickLblPos val="nextTo"/>
+        <c:spPr>
+          <a:noFill/>
+          <a:ln w="9525" cap="flat" cmpd="sng" algn="ctr">
+            <a:solidFill>
+              <a:schemeClr val="tx1">
+                <a:lumMod val="15000"/>
+                <a:lumOff val="85000"/>
+              </a:schemeClr>
+            </a:solidFill>
+            <a:round/>
+          </a:ln>
+          <a:effectLst/>
+        </c:spPr>
+        <c:txPr>
+          <a:bodyPr rot="-60000000" spcFirstLastPara="1" vertOverflow="ellipsis" vert="horz" wrap="square" anchor="ctr" anchorCtr="1"/>
+          <a:lstStyle/>
+          <a:p>
+            <a:pPr>
+              <a:defRPr sz="1197" b="0" i="0" u="none" strike="noStrike" kern="1200" baseline="0">
+                <a:solidFill>
+                  <a:schemeClr val="tx1">
+                    <a:lumMod val="65000"/>
+                    <a:lumOff val="35000"/>
+                  </a:schemeClr>
+                </a:solidFill>
+                <a:latin typeface="+mn-lt"/>
+                <a:ea typeface="+mn-ea"/>
+                <a:cs typeface="+mn-cs"/>
+              </a:defRPr>
+            </a:pPr>
+            <a:endParaRPr lang="en-US"/>
+          </a:p>
+        </c:txPr>
+        <c:crossAx val="410035000"/>
+        <c:crosses val="autoZero"/>
+        <c:auto val="1"/>
+        <c:lblAlgn val="ctr"/>
+        <c:lblOffset val="100"/>
+        <c:noMultiLvlLbl val="0"/>
+      </c:catAx>
+      <c:valAx>
+        <c:axId val="410035000"/>
+        <c:scaling>
+          <c:orientation val="minMax"/>
+        </c:scaling>
+        <c:delete val="0"/>
+        <c:axPos val="l"/>
+        <c:majorGridlines>
+          <c:spPr>
+            <a:ln w="9525" cap="flat" cmpd="sng" algn="ctr">
+              <a:solidFill>
+                <a:schemeClr val="tx1">
+                  <a:lumMod val="15000"/>
+                  <a:lumOff val="85000"/>
+                </a:schemeClr>
+              </a:solidFill>
+              <a:round/>
+            </a:ln>
+            <a:effectLst/>
+          </c:spPr>
+        </c:majorGridlines>
+        <c:numFmt formatCode="General" sourceLinked="1"/>
+        <c:majorTickMark val="none"/>
+        <c:minorTickMark val="none"/>
+        <c:tickLblPos val="nextTo"/>
+        <c:spPr>
+          <a:noFill/>
+          <a:ln>
+            <a:noFill/>
+          </a:ln>
+          <a:effectLst/>
+        </c:spPr>
+        <c:txPr>
+          <a:bodyPr rot="-60000000" spcFirstLastPara="1" vertOverflow="ellipsis" vert="horz" wrap="square" anchor="ctr" anchorCtr="1"/>
+          <a:lstStyle/>
+          <a:p>
+            <a:pPr>
+              <a:defRPr sz="1197" b="0" i="0" u="none" strike="noStrike" kern="1200" baseline="0">
+                <a:solidFill>
+                  <a:schemeClr val="tx1">
+                    <a:lumMod val="65000"/>
+                    <a:lumOff val="35000"/>
+                  </a:schemeClr>
+                </a:solidFill>
+                <a:latin typeface="+mn-lt"/>
+                <a:ea typeface="+mn-ea"/>
+                <a:cs typeface="+mn-cs"/>
+              </a:defRPr>
+            </a:pPr>
+            <a:endParaRPr lang="en-US"/>
+          </a:p>
+        </c:txPr>
+        <c:crossAx val="410031392"/>
+        <c:crosses val="autoZero"/>
+        <c:crossBetween val="between"/>
+      </c:valAx>
+      <c:spPr>
+        <a:noFill/>
+        <a:ln>
+          <a:noFill/>
+        </a:ln>
+        <a:effectLst/>
+      </c:spPr>
+    </c:plotArea>
+    <c:legend>
+      <c:legendPos val="b"/>
+      <c:overlay val="0"/>
+      <c:spPr>
+        <a:noFill/>
+        <a:ln>
+          <a:noFill/>
+        </a:ln>
+        <a:effectLst/>
+      </c:spPr>
+      <c:txPr>
+        <a:bodyPr rot="0" spcFirstLastPara="1" vertOverflow="ellipsis" vert="horz" wrap="square" anchor="ctr" anchorCtr="1"/>
+        <a:lstStyle/>
+        <a:p>
+          <a:pPr>
+            <a:defRPr sz="1197" b="0" i="0" u="none" strike="noStrike" kern="1200" baseline="0">
+              <a:solidFill>
+                <a:schemeClr val="tx1">
+                  <a:lumMod val="65000"/>
+                  <a:lumOff val="35000"/>
+                </a:schemeClr>
+              </a:solidFill>
+              <a:latin typeface="+mn-lt"/>
+              <a:ea typeface="+mn-ea"/>
+              <a:cs typeface="+mn-cs"/>
+            </a:defRPr>
+          </a:pPr>
+          <a:endParaRPr lang="en-US"/>
+        </a:p>
+      </c:txPr>
+    </c:legend>
+    <c:plotVisOnly val="1"/>
+    <c:dispBlanksAs val="gap"/>
+    <c:showDLblsOverMax val="0"/>
+  </c:chart>
+  <c:spPr>
+    <a:noFill/>
+    <a:ln>
+      <a:solidFill>
+        <a:srgbClr val="FA8621"/>
+      </a:solidFill>
+    </a:ln>
+    <a:effectLst/>
+  </c:spPr>
+  <c:txPr>
+    <a:bodyPr/>
+    <a:lstStyle/>
+    <a:p>
+      <a:pPr>
+        <a:defRPr/>
+      </a:pPr>
+      <a:endParaRPr lang="en-US"/>
+    </a:p>
+  </c:txPr>
+  <c:externalData r:id="rId3">
+    <c:autoUpdate val="0"/>
+  </c:externalData>
+</c:chartSpace>
+</file>
+
 <file path=ppt/charts/colors1.xml><?xml version="1.0" encoding="utf-8"?>
 <cs:colorStyle xmlns:cs="http://schemas.microsoft.com/office/drawing/2012/chartStyle" xmlns:a="http://schemas.openxmlformats.org/drawingml/2006/main" meth="cycle" id="10">
   <a:schemeClr val="accent1"/>
@@ -663,7 +1917,1059 @@
 </cs:colorStyle>
 </file>
 
+<file path=ppt/charts/colors2.xml><?xml version="1.0" encoding="utf-8"?>
+<cs:colorStyle xmlns:cs="http://schemas.microsoft.com/office/drawing/2012/chartStyle" xmlns:a="http://schemas.openxmlformats.org/drawingml/2006/main" meth="withinLinear" id="15">
+  <a:schemeClr val="accent2"/>
+</cs:colorStyle>
+</file>
+
+<file path=ppt/charts/colors3.xml><?xml version="1.0" encoding="utf-8"?>
+<cs:colorStyle xmlns:cs="http://schemas.microsoft.com/office/drawing/2012/chartStyle" xmlns:a="http://schemas.openxmlformats.org/drawingml/2006/main" meth="cycle" id="10">
+  <a:schemeClr val="accent1"/>
+  <a:schemeClr val="accent2"/>
+  <a:schemeClr val="accent3"/>
+  <a:schemeClr val="accent4"/>
+  <a:schemeClr val="accent5"/>
+  <a:schemeClr val="accent6"/>
+  <cs:variation/>
+  <cs:variation>
+    <a:lumMod val="60000"/>
+  </cs:variation>
+  <cs:variation>
+    <a:lumMod val="80000"/>
+    <a:lumOff val="20000"/>
+  </cs:variation>
+  <cs:variation>
+    <a:lumMod val="80000"/>
+  </cs:variation>
+  <cs:variation>
+    <a:lumMod val="60000"/>
+    <a:lumOff val="40000"/>
+  </cs:variation>
+  <cs:variation>
+    <a:lumMod val="50000"/>
+  </cs:variation>
+  <cs:variation>
+    <a:lumMod val="70000"/>
+    <a:lumOff val="30000"/>
+  </cs:variation>
+  <cs:variation>
+    <a:lumMod val="70000"/>
+  </cs:variation>
+  <cs:variation>
+    <a:lumMod val="50000"/>
+    <a:lumOff val="50000"/>
+  </cs:variation>
+</cs:colorStyle>
+</file>
+
 <file path=ppt/charts/style1.xml><?xml version="1.0" encoding="utf-8"?>
+<cs:chartStyle xmlns:cs="http://schemas.microsoft.com/office/drawing/2012/chartStyle" xmlns:a="http://schemas.openxmlformats.org/drawingml/2006/main" id="201">
+  <cs:axisTitle>
+    <cs:lnRef idx="0"/>
+    <cs:fillRef idx="0"/>
+    <cs:effectRef idx="0"/>
+    <cs:fontRef idx="minor">
+      <a:schemeClr val="tx1">
+        <a:lumMod val="65000"/>
+        <a:lumOff val="35000"/>
+      </a:schemeClr>
+    </cs:fontRef>
+    <cs:defRPr sz="1330" kern="1200"/>
+  </cs:axisTitle>
+  <cs:categoryAxis>
+    <cs:lnRef idx="0"/>
+    <cs:fillRef idx="0"/>
+    <cs:effectRef idx="0"/>
+    <cs:fontRef idx="minor">
+      <a:schemeClr val="tx1">
+        <a:lumMod val="65000"/>
+        <a:lumOff val="35000"/>
+      </a:schemeClr>
+    </cs:fontRef>
+    <cs:spPr>
+      <a:ln w="9525" cap="flat" cmpd="sng" algn="ctr">
+        <a:solidFill>
+          <a:schemeClr val="tx1">
+            <a:lumMod val="15000"/>
+            <a:lumOff val="85000"/>
+          </a:schemeClr>
+        </a:solidFill>
+        <a:round/>
+      </a:ln>
+    </cs:spPr>
+    <cs:defRPr sz="1197" kern="1200"/>
+  </cs:categoryAxis>
+  <cs:chartArea mods="allowNoFillOverride allowNoLineOverride">
+    <cs:lnRef idx="0"/>
+    <cs:fillRef idx="0"/>
+    <cs:effectRef idx="0"/>
+    <cs:fontRef idx="minor">
+      <a:schemeClr val="tx1"/>
+    </cs:fontRef>
+    <cs:spPr>
+      <a:solidFill>
+        <a:schemeClr val="bg1"/>
+      </a:solidFill>
+      <a:ln w="9525" cap="flat" cmpd="sng" algn="ctr">
+        <a:solidFill>
+          <a:schemeClr val="tx1">
+            <a:lumMod val="15000"/>
+            <a:lumOff val="85000"/>
+          </a:schemeClr>
+        </a:solidFill>
+        <a:round/>
+      </a:ln>
+    </cs:spPr>
+    <cs:defRPr sz="1330" kern="1200"/>
+  </cs:chartArea>
+  <cs:dataLabel>
+    <cs:lnRef idx="0"/>
+    <cs:fillRef idx="0"/>
+    <cs:effectRef idx="0"/>
+    <cs:fontRef idx="minor">
+      <a:schemeClr val="tx1">
+        <a:lumMod val="75000"/>
+        <a:lumOff val="25000"/>
+      </a:schemeClr>
+    </cs:fontRef>
+    <cs:defRPr sz="1197" kern="1200"/>
+  </cs:dataLabel>
+  <cs:dataLabelCallout>
+    <cs:lnRef idx="0"/>
+    <cs:fillRef idx="0"/>
+    <cs:effectRef idx="0"/>
+    <cs:fontRef idx="minor">
+      <a:schemeClr val="dk1">
+        <a:lumMod val="65000"/>
+        <a:lumOff val="35000"/>
+      </a:schemeClr>
+    </cs:fontRef>
+    <cs:spPr>
+      <a:solidFill>
+        <a:schemeClr val="lt1"/>
+      </a:solidFill>
+      <a:ln>
+        <a:solidFill>
+          <a:schemeClr val="dk1">
+            <a:lumMod val="25000"/>
+            <a:lumOff val="75000"/>
+          </a:schemeClr>
+        </a:solidFill>
+      </a:ln>
+    </cs:spPr>
+    <cs:defRPr sz="1197" kern="1200"/>
+    <cs:bodyPr rot="0" spcFirstLastPara="1" vertOverflow="clip" horzOverflow="clip" vert="horz" wrap="square" lIns="36576" tIns="18288" rIns="36576" bIns="18288" anchor="ctr" anchorCtr="1">
+      <a:spAutoFit/>
+    </cs:bodyPr>
+  </cs:dataLabelCallout>
+  <cs:dataPoint>
+    <cs:lnRef idx="0"/>
+    <cs:fillRef idx="1">
+      <cs:styleClr val="auto"/>
+    </cs:fillRef>
+    <cs:effectRef idx="0"/>
+    <cs:fontRef idx="minor">
+      <a:schemeClr val="tx1"/>
+    </cs:fontRef>
+  </cs:dataPoint>
+  <cs:dataPoint3D>
+    <cs:lnRef idx="0"/>
+    <cs:fillRef idx="1">
+      <cs:styleClr val="auto"/>
+    </cs:fillRef>
+    <cs:effectRef idx="0"/>
+    <cs:fontRef idx="minor">
+      <a:schemeClr val="tx1"/>
+    </cs:fontRef>
+  </cs:dataPoint3D>
+  <cs:dataPointLine>
+    <cs:lnRef idx="0">
+      <cs:styleClr val="auto"/>
+    </cs:lnRef>
+    <cs:fillRef idx="1"/>
+    <cs:effectRef idx="0"/>
+    <cs:fontRef idx="minor">
+      <a:schemeClr val="tx1"/>
+    </cs:fontRef>
+    <cs:spPr>
+      <a:ln w="28575" cap="rnd">
+        <a:solidFill>
+          <a:schemeClr val="phClr"/>
+        </a:solidFill>
+        <a:round/>
+      </a:ln>
+    </cs:spPr>
+  </cs:dataPointLine>
+  <cs:dataPointMarker>
+    <cs:lnRef idx="0">
+      <cs:styleClr val="auto"/>
+    </cs:lnRef>
+    <cs:fillRef idx="1">
+      <cs:styleClr val="auto"/>
+    </cs:fillRef>
+    <cs:effectRef idx="0"/>
+    <cs:fontRef idx="minor">
+      <a:schemeClr val="tx1"/>
+    </cs:fontRef>
+    <cs:spPr>
+      <a:ln w="9525">
+        <a:solidFill>
+          <a:schemeClr val="phClr"/>
+        </a:solidFill>
+      </a:ln>
+    </cs:spPr>
+  </cs:dataPointMarker>
+  <cs:dataPointMarkerLayout symbol="circle" size="5"/>
+  <cs:dataPointWireframe>
+    <cs:lnRef idx="0">
+      <cs:styleClr val="auto"/>
+    </cs:lnRef>
+    <cs:fillRef idx="1"/>
+    <cs:effectRef idx="0"/>
+    <cs:fontRef idx="minor">
+      <a:schemeClr val="tx1"/>
+    </cs:fontRef>
+    <cs:spPr>
+      <a:ln w="9525" cap="rnd">
+        <a:solidFill>
+          <a:schemeClr val="phClr"/>
+        </a:solidFill>
+        <a:round/>
+      </a:ln>
+    </cs:spPr>
+  </cs:dataPointWireframe>
+  <cs:dataTable>
+    <cs:lnRef idx="0"/>
+    <cs:fillRef idx="0"/>
+    <cs:effectRef idx="0"/>
+    <cs:fontRef idx="minor">
+      <a:schemeClr val="tx1">
+        <a:lumMod val="65000"/>
+        <a:lumOff val="35000"/>
+      </a:schemeClr>
+    </cs:fontRef>
+    <cs:spPr>
+      <a:noFill/>
+      <a:ln w="9525" cap="flat" cmpd="sng" algn="ctr">
+        <a:solidFill>
+          <a:schemeClr val="tx1">
+            <a:lumMod val="15000"/>
+            <a:lumOff val="85000"/>
+          </a:schemeClr>
+        </a:solidFill>
+        <a:round/>
+      </a:ln>
+    </cs:spPr>
+    <cs:defRPr sz="1197" kern="1200"/>
+  </cs:dataTable>
+  <cs:downBar>
+    <cs:lnRef idx="0"/>
+    <cs:fillRef idx="0"/>
+    <cs:effectRef idx="0"/>
+    <cs:fontRef idx="minor">
+      <a:schemeClr val="dk1"/>
+    </cs:fontRef>
+    <cs:spPr>
+      <a:solidFill>
+        <a:schemeClr val="dk1">
+          <a:lumMod val="65000"/>
+          <a:lumOff val="35000"/>
+        </a:schemeClr>
+      </a:solidFill>
+      <a:ln w="9525">
+        <a:solidFill>
+          <a:schemeClr val="tx1">
+            <a:lumMod val="65000"/>
+            <a:lumOff val="35000"/>
+          </a:schemeClr>
+        </a:solidFill>
+      </a:ln>
+    </cs:spPr>
+  </cs:downBar>
+  <cs:dropLine>
+    <cs:lnRef idx="0"/>
+    <cs:fillRef idx="0"/>
+    <cs:effectRef idx="0"/>
+    <cs:fontRef idx="minor">
+      <a:schemeClr val="tx1"/>
+    </cs:fontRef>
+    <cs:spPr>
+      <a:ln w="9525" cap="flat" cmpd="sng" algn="ctr">
+        <a:solidFill>
+          <a:schemeClr val="tx1">
+            <a:lumMod val="35000"/>
+            <a:lumOff val="65000"/>
+          </a:schemeClr>
+        </a:solidFill>
+        <a:round/>
+      </a:ln>
+    </cs:spPr>
+  </cs:dropLine>
+  <cs:errorBar>
+    <cs:lnRef idx="0"/>
+    <cs:fillRef idx="0"/>
+    <cs:effectRef idx="0"/>
+    <cs:fontRef idx="minor">
+      <a:schemeClr val="tx1"/>
+    </cs:fontRef>
+    <cs:spPr>
+      <a:ln w="9525" cap="flat" cmpd="sng" algn="ctr">
+        <a:solidFill>
+          <a:schemeClr val="tx1">
+            <a:lumMod val="65000"/>
+            <a:lumOff val="35000"/>
+          </a:schemeClr>
+        </a:solidFill>
+        <a:round/>
+      </a:ln>
+    </cs:spPr>
+  </cs:errorBar>
+  <cs:floor>
+    <cs:lnRef idx="0"/>
+    <cs:fillRef idx="0"/>
+    <cs:effectRef idx="0"/>
+    <cs:fontRef idx="minor">
+      <a:schemeClr val="tx1"/>
+    </cs:fontRef>
+    <cs:spPr>
+      <a:noFill/>
+      <a:ln>
+        <a:noFill/>
+      </a:ln>
+    </cs:spPr>
+  </cs:floor>
+  <cs:gridlineMajor>
+    <cs:lnRef idx="0"/>
+    <cs:fillRef idx="0"/>
+    <cs:effectRef idx="0"/>
+    <cs:fontRef idx="minor">
+      <a:schemeClr val="tx1"/>
+    </cs:fontRef>
+    <cs:spPr>
+      <a:ln w="9525" cap="flat" cmpd="sng" algn="ctr">
+        <a:solidFill>
+          <a:schemeClr val="tx1">
+            <a:lumMod val="15000"/>
+            <a:lumOff val="85000"/>
+          </a:schemeClr>
+        </a:solidFill>
+        <a:round/>
+      </a:ln>
+    </cs:spPr>
+  </cs:gridlineMajor>
+  <cs:gridlineMinor>
+    <cs:lnRef idx="0"/>
+    <cs:fillRef idx="0"/>
+    <cs:effectRef idx="0"/>
+    <cs:fontRef idx="minor">
+      <a:schemeClr val="tx1"/>
+    </cs:fontRef>
+    <cs:spPr>
+      <a:ln w="9525" cap="flat" cmpd="sng" algn="ctr">
+        <a:solidFill>
+          <a:schemeClr val="tx1">
+            <a:lumMod val="5000"/>
+            <a:lumOff val="95000"/>
+          </a:schemeClr>
+        </a:solidFill>
+        <a:round/>
+      </a:ln>
+    </cs:spPr>
+  </cs:gridlineMinor>
+  <cs:hiLoLine>
+    <cs:lnRef idx="0"/>
+    <cs:fillRef idx="0"/>
+    <cs:effectRef idx="0"/>
+    <cs:fontRef idx="minor">
+      <a:schemeClr val="tx1"/>
+    </cs:fontRef>
+    <cs:spPr>
+      <a:ln w="9525" cap="flat" cmpd="sng" algn="ctr">
+        <a:solidFill>
+          <a:schemeClr val="tx1">
+            <a:lumMod val="75000"/>
+            <a:lumOff val="25000"/>
+          </a:schemeClr>
+        </a:solidFill>
+        <a:round/>
+      </a:ln>
+    </cs:spPr>
+  </cs:hiLoLine>
+  <cs:leaderLine>
+    <cs:lnRef idx="0"/>
+    <cs:fillRef idx="0"/>
+    <cs:effectRef idx="0"/>
+    <cs:fontRef idx="minor">
+      <a:schemeClr val="tx1"/>
+    </cs:fontRef>
+    <cs:spPr>
+      <a:ln w="9525" cap="flat" cmpd="sng" algn="ctr">
+        <a:solidFill>
+          <a:schemeClr val="tx1">
+            <a:lumMod val="35000"/>
+            <a:lumOff val="65000"/>
+          </a:schemeClr>
+        </a:solidFill>
+        <a:round/>
+      </a:ln>
+    </cs:spPr>
+  </cs:leaderLine>
+  <cs:legend>
+    <cs:lnRef idx="0"/>
+    <cs:fillRef idx="0"/>
+    <cs:effectRef idx="0"/>
+    <cs:fontRef idx="minor">
+      <a:schemeClr val="tx1">
+        <a:lumMod val="65000"/>
+        <a:lumOff val="35000"/>
+      </a:schemeClr>
+    </cs:fontRef>
+    <cs:defRPr sz="1197" kern="1200"/>
+  </cs:legend>
+  <cs:plotArea mods="allowNoFillOverride allowNoLineOverride">
+    <cs:lnRef idx="0"/>
+    <cs:fillRef idx="0"/>
+    <cs:effectRef idx="0"/>
+    <cs:fontRef idx="minor">
+      <a:schemeClr val="tx1"/>
+    </cs:fontRef>
+  </cs:plotArea>
+  <cs:plotArea3D mods="allowNoFillOverride allowNoLineOverride">
+    <cs:lnRef idx="0"/>
+    <cs:fillRef idx="0"/>
+    <cs:effectRef idx="0"/>
+    <cs:fontRef idx="minor">
+      <a:schemeClr val="tx1"/>
+    </cs:fontRef>
+  </cs:plotArea3D>
+  <cs:seriesAxis>
+    <cs:lnRef idx="0"/>
+    <cs:fillRef idx="0"/>
+    <cs:effectRef idx="0"/>
+    <cs:fontRef idx="minor">
+      <a:schemeClr val="tx1">
+        <a:lumMod val="65000"/>
+        <a:lumOff val="35000"/>
+      </a:schemeClr>
+    </cs:fontRef>
+    <cs:defRPr sz="1197" kern="1200"/>
+  </cs:seriesAxis>
+  <cs:seriesLine>
+    <cs:lnRef idx="0"/>
+    <cs:fillRef idx="0"/>
+    <cs:effectRef idx="0"/>
+    <cs:fontRef idx="minor">
+      <a:schemeClr val="tx1"/>
+    </cs:fontRef>
+    <cs:spPr>
+      <a:ln w="9525" cap="flat" cmpd="sng" algn="ctr">
+        <a:solidFill>
+          <a:schemeClr val="tx1">
+            <a:lumMod val="35000"/>
+            <a:lumOff val="65000"/>
+          </a:schemeClr>
+        </a:solidFill>
+        <a:round/>
+      </a:ln>
+    </cs:spPr>
+  </cs:seriesLine>
+  <cs:title>
+    <cs:lnRef idx="0"/>
+    <cs:fillRef idx="0"/>
+    <cs:effectRef idx="0"/>
+    <cs:fontRef idx="minor">
+      <a:schemeClr val="tx1">
+        <a:lumMod val="65000"/>
+        <a:lumOff val="35000"/>
+      </a:schemeClr>
+    </cs:fontRef>
+    <cs:defRPr sz="1862" b="0" kern="1200" spc="0" baseline="0"/>
+  </cs:title>
+  <cs:trendline>
+    <cs:lnRef idx="0">
+      <cs:styleClr val="auto"/>
+    </cs:lnRef>
+    <cs:fillRef idx="0"/>
+    <cs:effectRef idx="0"/>
+    <cs:fontRef idx="minor">
+      <a:schemeClr val="tx1"/>
+    </cs:fontRef>
+    <cs:spPr>
+      <a:ln w="19050" cap="rnd">
+        <a:solidFill>
+          <a:schemeClr val="phClr"/>
+        </a:solidFill>
+        <a:prstDash val="sysDot"/>
+      </a:ln>
+    </cs:spPr>
+  </cs:trendline>
+  <cs:trendlineLabel>
+    <cs:lnRef idx="0"/>
+    <cs:fillRef idx="0"/>
+    <cs:effectRef idx="0"/>
+    <cs:fontRef idx="minor">
+      <a:schemeClr val="tx1">
+        <a:lumMod val="65000"/>
+        <a:lumOff val="35000"/>
+      </a:schemeClr>
+    </cs:fontRef>
+    <cs:defRPr sz="1197" kern="1200"/>
+  </cs:trendlineLabel>
+  <cs:upBar>
+    <cs:lnRef idx="0"/>
+    <cs:fillRef idx="0"/>
+    <cs:effectRef idx="0"/>
+    <cs:fontRef idx="minor">
+      <a:schemeClr val="dk1"/>
+    </cs:fontRef>
+    <cs:spPr>
+      <a:solidFill>
+        <a:schemeClr val="lt1"/>
+      </a:solidFill>
+      <a:ln w="9525">
+        <a:solidFill>
+          <a:schemeClr val="tx1">
+            <a:lumMod val="15000"/>
+            <a:lumOff val="85000"/>
+          </a:schemeClr>
+        </a:solidFill>
+      </a:ln>
+    </cs:spPr>
+  </cs:upBar>
+  <cs:valueAxis>
+    <cs:lnRef idx="0"/>
+    <cs:fillRef idx="0"/>
+    <cs:effectRef idx="0"/>
+    <cs:fontRef idx="minor">
+      <a:schemeClr val="tx1">
+        <a:lumMod val="65000"/>
+        <a:lumOff val="35000"/>
+      </a:schemeClr>
+    </cs:fontRef>
+    <cs:defRPr sz="1197" kern="1200"/>
+  </cs:valueAxis>
+  <cs:wall>
+    <cs:lnRef idx="0"/>
+    <cs:fillRef idx="0"/>
+    <cs:effectRef idx="0"/>
+    <cs:fontRef idx="minor">
+      <a:schemeClr val="tx1"/>
+    </cs:fontRef>
+    <cs:spPr>
+      <a:noFill/>
+      <a:ln>
+        <a:noFill/>
+      </a:ln>
+    </cs:spPr>
+  </cs:wall>
+</cs:chartStyle>
+</file>
+
+<file path=ppt/charts/style2.xml><?xml version="1.0" encoding="utf-8"?>
+<cs:chartStyle xmlns:cs="http://schemas.microsoft.com/office/drawing/2012/chartStyle" xmlns:a="http://schemas.openxmlformats.org/drawingml/2006/main" id="201">
+  <cs:axisTitle>
+    <cs:lnRef idx="0"/>
+    <cs:fillRef idx="0"/>
+    <cs:effectRef idx="0"/>
+    <cs:fontRef idx="minor">
+      <a:schemeClr val="tx1">
+        <a:lumMod val="65000"/>
+        <a:lumOff val="35000"/>
+      </a:schemeClr>
+    </cs:fontRef>
+    <cs:defRPr sz="1330" kern="1200"/>
+  </cs:axisTitle>
+  <cs:categoryAxis>
+    <cs:lnRef idx="0"/>
+    <cs:fillRef idx="0"/>
+    <cs:effectRef idx="0"/>
+    <cs:fontRef idx="minor">
+      <a:schemeClr val="tx1">
+        <a:lumMod val="65000"/>
+        <a:lumOff val="35000"/>
+      </a:schemeClr>
+    </cs:fontRef>
+    <cs:spPr>
+      <a:ln w="9525" cap="flat" cmpd="sng" algn="ctr">
+        <a:solidFill>
+          <a:schemeClr val="tx1">
+            <a:lumMod val="15000"/>
+            <a:lumOff val="85000"/>
+          </a:schemeClr>
+        </a:solidFill>
+        <a:round/>
+      </a:ln>
+    </cs:spPr>
+    <cs:defRPr sz="1197" kern="1200"/>
+  </cs:categoryAxis>
+  <cs:chartArea mods="allowNoFillOverride allowNoLineOverride">
+    <cs:lnRef idx="0"/>
+    <cs:fillRef idx="0"/>
+    <cs:effectRef idx="0"/>
+    <cs:fontRef idx="minor">
+      <a:schemeClr val="tx1"/>
+    </cs:fontRef>
+    <cs:spPr>
+      <a:solidFill>
+        <a:schemeClr val="bg1"/>
+      </a:solidFill>
+      <a:ln w="9525" cap="flat" cmpd="sng" algn="ctr">
+        <a:solidFill>
+          <a:schemeClr val="tx1">
+            <a:lumMod val="15000"/>
+            <a:lumOff val="85000"/>
+          </a:schemeClr>
+        </a:solidFill>
+        <a:round/>
+      </a:ln>
+    </cs:spPr>
+    <cs:defRPr sz="1330" kern="1200"/>
+  </cs:chartArea>
+  <cs:dataLabel>
+    <cs:lnRef idx="0"/>
+    <cs:fillRef idx="0"/>
+    <cs:effectRef idx="0"/>
+    <cs:fontRef idx="minor">
+      <a:schemeClr val="tx1">
+        <a:lumMod val="75000"/>
+        <a:lumOff val="25000"/>
+      </a:schemeClr>
+    </cs:fontRef>
+    <cs:defRPr sz="1197" kern="1200"/>
+  </cs:dataLabel>
+  <cs:dataLabelCallout>
+    <cs:lnRef idx="0"/>
+    <cs:fillRef idx="0"/>
+    <cs:effectRef idx="0"/>
+    <cs:fontRef idx="minor">
+      <a:schemeClr val="dk1">
+        <a:lumMod val="65000"/>
+        <a:lumOff val="35000"/>
+      </a:schemeClr>
+    </cs:fontRef>
+    <cs:spPr>
+      <a:solidFill>
+        <a:schemeClr val="lt1"/>
+      </a:solidFill>
+      <a:ln>
+        <a:solidFill>
+          <a:schemeClr val="dk1">
+            <a:lumMod val="25000"/>
+            <a:lumOff val="75000"/>
+          </a:schemeClr>
+        </a:solidFill>
+      </a:ln>
+    </cs:spPr>
+    <cs:defRPr sz="1197" kern="1200"/>
+    <cs:bodyPr rot="0" spcFirstLastPara="1" vertOverflow="clip" horzOverflow="clip" vert="horz" wrap="square" lIns="36576" tIns="18288" rIns="36576" bIns="18288" anchor="ctr" anchorCtr="1">
+      <a:spAutoFit/>
+    </cs:bodyPr>
+  </cs:dataLabelCallout>
+  <cs:dataPoint>
+    <cs:lnRef idx="0"/>
+    <cs:fillRef idx="1">
+      <cs:styleClr val="auto"/>
+    </cs:fillRef>
+    <cs:effectRef idx="0"/>
+    <cs:fontRef idx="minor">
+      <a:schemeClr val="tx1"/>
+    </cs:fontRef>
+  </cs:dataPoint>
+  <cs:dataPoint3D>
+    <cs:lnRef idx="0"/>
+    <cs:fillRef idx="1">
+      <cs:styleClr val="auto"/>
+    </cs:fillRef>
+    <cs:effectRef idx="0"/>
+    <cs:fontRef idx="minor">
+      <a:schemeClr val="tx1"/>
+    </cs:fontRef>
+  </cs:dataPoint3D>
+  <cs:dataPointLine>
+    <cs:lnRef idx="0">
+      <cs:styleClr val="auto"/>
+    </cs:lnRef>
+    <cs:fillRef idx="1"/>
+    <cs:effectRef idx="0"/>
+    <cs:fontRef idx="minor">
+      <a:schemeClr val="tx1"/>
+    </cs:fontRef>
+    <cs:spPr>
+      <a:ln w="28575" cap="rnd">
+        <a:solidFill>
+          <a:schemeClr val="phClr"/>
+        </a:solidFill>
+        <a:round/>
+      </a:ln>
+    </cs:spPr>
+  </cs:dataPointLine>
+  <cs:dataPointMarker>
+    <cs:lnRef idx="0">
+      <cs:styleClr val="auto"/>
+    </cs:lnRef>
+    <cs:fillRef idx="1">
+      <cs:styleClr val="auto"/>
+    </cs:fillRef>
+    <cs:effectRef idx="0"/>
+    <cs:fontRef idx="minor">
+      <a:schemeClr val="tx1"/>
+    </cs:fontRef>
+    <cs:spPr>
+      <a:ln w="9525">
+        <a:solidFill>
+          <a:schemeClr val="phClr"/>
+        </a:solidFill>
+      </a:ln>
+    </cs:spPr>
+  </cs:dataPointMarker>
+  <cs:dataPointMarkerLayout symbol="circle" size="5"/>
+  <cs:dataPointWireframe>
+    <cs:lnRef idx="0">
+      <cs:styleClr val="auto"/>
+    </cs:lnRef>
+    <cs:fillRef idx="1"/>
+    <cs:effectRef idx="0"/>
+    <cs:fontRef idx="minor">
+      <a:schemeClr val="tx1"/>
+    </cs:fontRef>
+    <cs:spPr>
+      <a:ln w="9525" cap="rnd">
+        <a:solidFill>
+          <a:schemeClr val="phClr"/>
+        </a:solidFill>
+        <a:round/>
+      </a:ln>
+    </cs:spPr>
+  </cs:dataPointWireframe>
+  <cs:dataTable>
+    <cs:lnRef idx="0"/>
+    <cs:fillRef idx="0"/>
+    <cs:effectRef idx="0"/>
+    <cs:fontRef idx="minor">
+      <a:schemeClr val="tx1">
+        <a:lumMod val="65000"/>
+        <a:lumOff val="35000"/>
+      </a:schemeClr>
+    </cs:fontRef>
+    <cs:spPr>
+      <a:noFill/>
+      <a:ln w="9525" cap="flat" cmpd="sng" algn="ctr">
+        <a:solidFill>
+          <a:schemeClr val="tx1">
+            <a:lumMod val="15000"/>
+            <a:lumOff val="85000"/>
+          </a:schemeClr>
+        </a:solidFill>
+        <a:round/>
+      </a:ln>
+    </cs:spPr>
+    <cs:defRPr sz="1197" kern="1200"/>
+  </cs:dataTable>
+  <cs:downBar>
+    <cs:lnRef idx="0"/>
+    <cs:fillRef idx="0"/>
+    <cs:effectRef idx="0"/>
+    <cs:fontRef idx="minor">
+      <a:schemeClr val="dk1"/>
+    </cs:fontRef>
+    <cs:spPr>
+      <a:solidFill>
+        <a:schemeClr val="dk1">
+          <a:lumMod val="65000"/>
+          <a:lumOff val="35000"/>
+        </a:schemeClr>
+      </a:solidFill>
+      <a:ln w="9525">
+        <a:solidFill>
+          <a:schemeClr val="tx1">
+            <a:lumMod val="65000"/>
+            <a:lumOff val="35000"/>
+          </a:schemeClr>
+        </a:solidFill>
+      </a:ln>
+    </cs:spPr>
+  </cs:downBar>
+  <cs:dropLine>
+    <cs:lnRef idx="0"/>
+    <cs:fillRef idx="0"/>
+    <cs:effectRef idx="0"/>
+    <cs:fontRef idx="minor">
+      <a:schemeClr val="tx1"/>
+    </cs:fontRef>
+    <cs:spPr>
+      <a:ln w="9525" cap="flat" cmpd="sng" algn="ctr">
+        <a:solidFill>
+          <a:schemeClr val="tx1">
+            <a:lumMod val="35000"/>
+            <a:lumOff val="65000"/>
+          </a:schemeClr>
+        </a:solidFill>
+        <a:round/>
+      </a:ln>
+    </cs:spPr>
+  </cs:dropLine>
+  <cs:errorBar>
+    <cs:lnRef idx="0"/>
+    <cs:fillRef idx="0"/>
+    <cs:effectRef idx="0"/>
+    <cs:fontRef idx="minor">
+      <a:schemeClr val="tx1"/>
+    </cs:fontRef>
+    <cs:spPr>
+      <a:ln w="9525" cap="flat" cmpd="sng" algn="ctr">
+        <a:solidFill>
+          <a:schemeClr val="tx1">
+            <a:lumMod val="65000"/>
+            <a:lumOff val="35000"/>
+          </a:schemeClr>
+        </a:solidFill>
+        <a:round/>
+      </a:ln>
+    </cs:spPr>
+  </cs:errorBar>
+  <cs:floor>
+    <cs:lnRef idx="0"/>
+    <cs:fillRef idx="0"/>
+    <cs:effectRef idx="0"/>
+    <cs:fontRef idx="minor">
+      <a:schemeClr val="tx1"/>
+    </cs:fontRef>
+    <cs:spPr>
+      <a:noFill/>
+      <a:ln>
+        <a:noFill/>
+      </a:ln>
+    </cs:spPr>
+  </cs:floor>
+  <cs:gridlineMajor>
+    <cs:lnRef idx="0"/>
+    <cs:fillRef idx="0"/>
+    <cs:effectRef idx="0"/>
+    <cs:fontRef idx="minor">
+      <a:schemeClr val="tx1"/>
+    </cs:fontRef>
+    <cs:spPr>
+      <a:ln w="9525" cap="flat" cmpd="sng" algn="ctr">
+        <a:solidFill>
+          <a:schemeClr val="tx1">
+            <a:lumMod val="15000"/>
+            <a:lumOff val="85000"/>
+          </a:schemeClr>
+        </a:solidFill>
+        <a:round/>
+      </a:ln>
+    </cs:spPr>
+  </cs:gridlineMajor>
+  <cs:gridlineMinor>
+    <cs:lnRef idx="0"/>
+    <cs:fillRef idx="0"/>
+    <cs:effectRef idx="0"/>
+    <cs:fontRef idx="minor">
+      <a:schemeClr val="tx1"/>
+    </cs:fontRef>
+    <cs:spPr>
+      <a:ln w="9525" cap="flat" cmpd="sng" algn="ctr">
+        <a:solidFill>
+          <a:schemeClr val="tx1">
+            <a:lumMod val="5000"/>
+            <a:lumOff val="95000"/>
+          </a:schemeClr>
+        </a:solidFill>
+        <a:round/>
+      </a:ln>
+    </cs:spPr>
+  </cs:gridlineMinor>
+  <cs:hiLoLine>
+    <cs:lnRef idx="0"/>
+    <cs:fillRef idx="0"/>
+    <cs:effectRef idx="0"/>
+    <cs:fontRef idx="minor">
+      <a:schemeClr val="tx1"/>
+    </cs:fontRef>
+    <cs:spPr>
+      <a:ln w="9525" cap="flat" cmpd="sng" algn="ctr">
+        <a:solidFill>
+          <a:schemeClr val="tx1">
+            <a:lumMod val="75000"/>
+            <a:lumOff val="25000"/>
+          </a:schemeClr>
+        </a:solidFill>
+        <a:round/>
+      </a:ln>
+    </cs:spPr>
+  </cs:hiLoLine>
+  <cs:leaderLine>
+    <cs:lnRef idx="0"/>
+    <cs:fillRef idx="0"/>
+    <cs:effectRef idx="0"/>
+    <cs:fontRef idx="minor">
+      <a:schemeClr val="tx1"/>
+    </cs:fontRef>
+    <cs:spPr>
+      <a:ln w="9525" cap="flat" cmpd="sng" algn="ctr">
+        <a:solidFill>
+          <a:schemeClr val="tx1">
+            <a:lumMod val="35000"/>
+            <a:lumOff val="65000"/>
+          </a:schemeClr>
+        </a:solidFill>
+        <a:round/>
+      </a:ln>
+    </cs:spPr>
+  </cs:leaderLine>
+  <cs:legend>
+    <cs:lnRef idx="0"/>
+    <cs:fillRef idx="0"/>
+    <cs:effectRef idx="0"/>
+    <cs:fontRef idx="minor">
+      <a:schemeClr val="tx1">
+        <a:lumMod val="65000"/>
+        <a:lumOff val="35000"/>
+      </a:schemeClr>
+    </cs:fontRef>
+    <cs:defRPr sz="1197" kern="1200"/>
+  </cs:legend>
+  <cs:plotArea mods="allowNoFillOverride allowNoLineOverride">
+    <cs:lnRef idx="0"/>
+    <cs:fillRef idx="0"/>
+    <cs:effectRef idx="0"/>
+    <cs:fontRef idx="minor">
+      <a:schemeClr val="tx1"/>
+    </cs:fontRef>
+  </cs:plotArea>
+  <cs:plotArea3D mods="allowNoFillOverride allowNoLineOverride">
+    <cs:lnRef idx="0"/>
+    <cs:fillRef idx="0"/>
+    <cs:effectRef idx="0"/>
+    <cs:fontRef idx="minor">
+      <a:schemeClr val="tx1"/>
+    </cs:fontRef>
+  </cs:plotArea3D>
+  <cs:seriesAxis>
+    <cs:lnRef idx="0"/>
+    <cs:fillRef idx="0"/>
+    <cs:effectRef idx="0"/>
+    <cs:fontRef idx="minor">
+      <a:schemeClr val="tx1">
+        <a:lumMod val="65000"/>
+        <a:lumOff val="35000"/>
+      </a:schemeClr>
+    </cs:fontRef>
+    <cs:defRPr sz="1197" kern="1200"/>
+  </cs:seriesAxis>
+  <cs:seriesLine>
+    <cs:lnRef idx="0"/>
+    <cs:fillRef idx="0"/>
+    <cs:effectRef idx="0"/>
+    <cs:fontRef idx="minor">
+      <a:schemeClr val="tx1"/>
+    </cs:fontRef>
+    <cs:spPr>
+      <a:ln w="9525" cap="flat" cmpd="sng" algn="ctr">
+        <a:solidFill>
+          <a:schemeClr val="tx1">
+            <a:lumMod val="35000"/>
+            <a:lumOff val="65000"/>
+          </a:schemeClr>
+        </a:solidFill>
+        <a:round/>
+      </a:ln>
+    </cs:spPr>
+  </cs:seriesLine>
+  <cs:title>
+    <cs:lnRef idx="0"/>
+    <cs:fillRef idx="0"/>
+    <cs:effectRef idx="0"/>
+    <cs:fontRef idx="minor">
+      <a:schemeClr val="tx1">
+        <a:lumMod val="65000"/>
+        <a:lumOff val="35000"/>
+      </a:schemeClr>
+    </cs:fontRef>
+    <cs:defRPr sz="1862" b="0" kern="1200" spc="0" baseline="0"/>
+  </cs:title>
+  <cs:trendline>
+    <cs:lnRef idx="0">
+      <cs:styleClr val="auto"/>
+    </cs:lnRef>
+    <cs:fillRef idx="0"/>
+    <cs:effectRef idx="0"/>
+    <cs:fontRef idx="minor">
+      <a:schemeClr val="tx1"/>
+    </cs:fontRef>
+    <cs:spPr>
+      <a:ln w="19050" cap="rnd">
+        <a:solidFill>
+          <a:schemeClr val="phClr"/>
+        </a:solidFill>
+        <a:prstDash val="sysDot"/>
+      </a:ln>
+    </cs:spPr>
+  </cs:trendline>
+  <cs:trendlineLabel>
+    <cs:lnRef idx="0"/>
+    <cs:fillRef idx="0"/>
+    <cs:effectRef idx="0"/>
+    <cs:fontRef idx="minor">
+      <a:schemeClr val="tx1">
+        <a:lumMod val="65000"/>
+        <a:lumOff val="35000"/>
+      </a:schemeClr>
+    </cs:fontRef>
+    <cs:defRPr sz="1197" kern="1200"/>
+  </cs:trendlineLabel>
+  <cs:upBar>
+    <cs:lnRef idx="0"/>
+    <cs:fillRef idx="0"/>
+    <cs:effectRef idx="0"/>
+    <cs:fontRef idx="minor">
+      <a:schemeClr val="dk1"/>
+    </cs:fontRef>
+    <cs:spPr>
+      <a:solidFill>
+        <a:schemeClr val="lt1"/>
+      </a:solidFill>
+      <a:ln w="9525">
+        <a:solidFill>
+          <a:schemeClr val="tx1">
+            <a:lumMod val="15000"/>
+            <a:lumOff val="85000"/>
+          </a:schemeClr>
+        </a:solidFill>
+      </a:ln>
+    </cs:spPr>
+  </cs:upBar>
+  <cs:valueAxis>
+    <cs:lnRef idx="0"/>
+    <cs:fillRef idx="0"/>
+    <cs:effectRef idx="0"/>
+    <cs:fontRef idx="minor">
+      <a:schemeClr val="tx1">
+        <a:lumMod val="65000"/>
+        <a:lumOff val="35000"/>
+      </a:schemeClr>
+    </cs:fontRef>
+    <cs:defRPr sz="1197" kern="1200"/>
+  </cs:valueAxis>
+  <cs:wall>
+    <cs:lnRef idx="0"/>
+    <cs:fillRef idx="0"/>
+    <cs:effectRef idx="0"/>
+    <cs:fontRef idx="minor">
+      <a:schemeClr val="tx1"/>
+    </cs:fontRef>
+    <cs:spPr>
+      <a:noFill/>
+      <a:ln>
+        <a:noFill/>
+      </a:ln>
+    </cs:spPr>
+  </cs:wall>
+</cs:chartStyle>
+</file>
+
+<file path=ppt/charts/style3.xml><?xml version="1.0" encoding="utf-8"?>
 <cs:chartStyle xmlns:cs="http://schemas.microsoft.com/office/drawing/2012/chartStyle" xmlns:a="http://schemas.openxmlformats.org/drawingml/2006/main" id="201">
   <cs:axisTitle>
     <cs:lnRef idx="0"/>
@@ -6309,7 +8615,7 @@
           <a:p>
             <a:fld id="{28763278-E906-4118-802D-5C795C8A9976}" type="datetimeFigureOut">
               <a:rPr lang="en-US" smtClean="0"/>
-              <a:t>10/5/2017</a:t>
+              <a:t>5/31/2018</a:t>
             </a:fld>
             <a:endParaRPr lang="en-US"/>
           </a:p>
@@ -6871,7 +9177,7 @@
           <a:p>
             <a:fld id="{D61AC4E1-DCA9-4F23-934B-0CE248A16E59}" type="slidenum">
               <a:rPr lang="en-US" smtClean="0"/>
-              <a:t>10</a:t>
+              <a:t>12</a:t>
             </a:fld>
             <a:endParaRPr lang="en-US"/>
           </a:p>
@@ -7066,7 +9372,7 @@
           <a:p>
             <a:fld id="{F4E58F4B-C394-4BCA-8CBA-0EA8C6D27B86}" type="datetimeFigureOut">
               <a:rPr lang="en-US" smtClean="0"/>
-              <a:t>10/5/2017</a:t>
+              <a:t>5/31/2018</a:t>
             </a:fld>
             <a:endParaRPr lang="en-US"/>
           </a:p>
@@ -7236,7 +9542,7 @@
           <a:p>
             <a:fld id="{F4E58F4B-C394-4BCA-8CBA-0EA8C6D27B86}" type="datetimeFigureOut">
               <a:rPr lang="en-US" smtClean="0"/>
-              <a:t>10/5/2017</a:t>
+              <a:t>5/31/2018</a:t>
             </a:fld>
             <a:endParaRPr lang="en-US"/>
           </a:p>
@@ -7459,7 +9765,7 @@
           <a:p>
             <a:fld id="{F4E58F4B-C394-4BCA-8CBA-0EA8C6D27B86}" type="datetimeFigureOut">
               <a:rPr lang="en-US" smtClean="0"/>
-              <a:t>10/5/2017</a:t>
+              <a:t>5/31/2018</a:t>
             </a:fld>
             <a:endParaRPr lang="en-US"/>
           </a:p>
@@ -7639,7 +9945,7 @@
           <a:p>
             <a:fld id="{F4E58F4B-C394-4BCA-8CBA-0EA8C6D27B86}" type="datetimeFigureOut">
               <a:rPr lang="en-US" smtClean="0"/>
-              <a:t>10/5/2017</a:t>
+              <a:t>5/31/2018</a:t>
             </a:fld>
             <a:endParaRPr lang="en-US"/>
           </a:p>
@@ -7945,7 +10251,7 @@
           <a:p>
             <a:fld id="{F4E58F4B-C394-4BCA-8CBA-0EA8C6D27B86}" type="datetimeFigureOut">
               <a:rPr lang="en-US" smtClean="0"/>
-              <a:t>10/5/2017</a:t>
+              <a:t>5/31/2018</a:t>
             </a:fld>
             <a:endParaRPr lang="en-US"/>
           </a:p>
@@ -8249,7 +10555,7 @@
           <a:p>
             <a:fld id="{F4E58F4B-C394-4BCA-8CBA-0EA8C6D27B86}" type="datetimeFigureOut">
               <a:rPr lang="en-US" smtClean="0"/>
-              <a:t>10/5/2017</a:t>
+              <a:t>5/31/2018</a:t>
             </a:fld>
             <a:endParaRPr lang="en-US"/>
           </a:p>
@@ -8671,7 +10977,7 @@
           <a:p>
             <a:fld id="{F4E58F4B-C394-4BCA-8CBA-0EA8C6D27B86}" type="datetimeFigureOut">
               <a:rPr lang="en-US" smtClean="0"/>
-              <a:t>10/5/2017</a:t>
+              <a:t>5/31/2018</a:t>
             </a:fld>
             <a:endParaRPr lang="en-US"/>
           </a:p>
@@ -8789,7 +11095,7 @@
           <a:p>
             <a:fld id="{F4E58F4B-C394-4BCA-8CBA-0EA8C6D27B86}" type="datetimeFigureOut">
               <a:rPr lang="en-US" smtClean="0"/>
-              <a:t>10/5/2017</a:t>
+              <a:t>5/31/2018</a:t>
             </a:fld>
             <a:endParaRPr lang="en-US"/>
           </a:p>
@@ -8884,7 +11190,7 @@
           <a:p>
             <a:fld id="{F4E58F4B-C394-4BCA-8CBA-0EA8C6D27B86}" type="datetimeFigureOut">
               <a:rPr lang="en-US" smtClean="0"/>
-              <a:t>10/5/2017</a:t>
+              <a:t>5/31/2018</a:t>
             </a:fld>
             <a:endParaRPr lang="en-US"/>
           </a:p>
@@ -9157,7 +11463,7 @@
           <a:p>
             <a:fld id="{F4E58F4B-C394-4BCA-8CBA-0EA8C6D27B86}" type="datetimeFigureOut">
               <a:rPr lang="en-US" smtClean="0"/>
-              <a:t>10/5/2017</a:t>
+              <a:t>5/31/2018</a:t>
             </a:fld>
             <a:endParaRPr lang="en-US"/>
           </a:p>
@@ -9422,7 +11728,7 @@
           <a:p>
             <a:fld id="{F4E58F4B-C394-4BCA-8CBA-0EA8C6D27B86}" type="datetimeFigureOut">
               <a:rPr lang="en-US" smtClean="0"/>
-              <a:t>10/5/2017</a:t>
+              <a:t>5/31/2018</a:t>
             </a:fld>
             <a:endParaRPr lang="en-US"/>
           </a:p>
@@ -9671,7 +11977,7 @@
           <a:p>
             <a:fld id="{F4E58F4B-C394-4BCA-8CBA-0EA8C6D27B86}" type="datetimeFigureOut">
               <a:rPr lang="en-US" smtClean="0"/>
-              <a:t>10/5/2017</a:t>
+              <a:t>5/31/2018</a:t>
             </a:fld>
             <a:endParaRPr lang="en-US"/>
           </a:p>
@@ -10631,6 +12937,310 @@
           <a:p>
             <a:r>
               <a:rPr lang="en-US" dirty="0"/>
+              <a:t>Complex</a:t>
+            </a:r>
+            <a:br>
+              <a:rPr lang="en-US" dirty="0"/>
+            </a:br>
+            <a:r>
+              <a:rPr lang="en-US" dirty="0"/>
+              <a:t>Query?</a:t>
+            </a:r>
+          </a:p>
+        </p:txBody>
+      </p:sp>
+      <p:graphicFrame>
+        <p:nvGraphicFramePr>
+          <p:cNvPr id="6" name="Content Placeholder 5"/>
+          <p:cNvGraphicFramePr>
+            <a:graphicFrameLocks noGrp="1"/>
+          </p:cNvGraphicFramePr>
+          <p:nvPr>
+            <p:ph idx="1"/>
+            <p:extLst/>
+          </p:nvPr>
+        </p:nvGraphicFramePr>
+        <p:xfrm>
+          <a:off x="1203325" y="2011365"/>
+          <a:ext cx="9783763" cy="4009924"/>
+        </p:xfrm>
+        <a:graphic>
+          <a:graphicData uri="http://schemas.openxmlformats.org/drawingml/2006/chart">
+            <c:chart xmlns:c="http://schemas.openxmlformats.org/drawingml/2006/chart" xmlns:r="http://schemas.openxmlformats.org/officeDocument/2006/relationships" r:id="rId2"/>
+          </a:graphicData>
+        </a:graphic>
+      </p:graphicFrame>
+      <p:pic>
+        <p:nvPicPr>
+          <p:cNvPr id="4" name="chart"/>
+          <p:cNvPicPr>
+            <a:picLocks noChangeAspect="1"/>
+          </p:cNvPicPr>
+          <p:nvPr/>
+        </p:nvPicPr>
+        <p:blipFill>
+          <a:blip r:embed="rId3"/>
+          <a:stretch>
+            <a:fillRect/>
+          </a:stretch>
+        </p:blipFill>
+        <p:spPr>
+          <a:xfrm>
+            <a:off x="4367808" y="2"/>
+            <a:ext cx="7824192" cy="2606708"/>
+          </a:xfrm>
+          <a:prstGeom prst="rect">
+            <a:avLst/>
+          </a:prstGeom>
+        </p:spPr>
+      </p:pic>
+    </p:spTree>
+    <p:extLst>
+      <p:ext uri="{BB962C8B-B14F-4D97-AF65-F5344CB8AC3E}">
+        <p14:creationId xmlns:p14="http://schemas.microsoft.com/office/powerpoint/2010/main" val="519626333"/>
+      </p:ext>
+    </p:extLst>
+  </p:cSld>
+  <p:clrMapOvr>
+    <a:masterClrMapping/>
+  </p:clrMapOvr>
+  <p:timing>
+    <p:tnLst>
+      <p:par>
+        <p:cTn id="1" dur="indefinite" restart="never" nodeType="tmRoot">
+          <p:childTnLst>
+            <p:seq concurrent="1" nextAc="seek">
+              <p:cTn id="2" dur="indefinite" nodeType="mainSeq">
+                <p:childTnLst>
+                  <p:par>
+                    <p:cTn id="3" fill="hold">
+                      <p:stCondLst>
+                        <p:cond delay="indefinite"/>
+                      </p:stCondLst>
+                      <p:childTnLst>
+                        <p:par>
+                          <p:cTn id="4" fill="hold">
+                            <p:stCondLst>
+                              <p:cond delay="0"/>
+                            </p:stCondLst>
+                            <p:childTnLst>
+                              <p:par>
+                                <p:cTn id="5" presetID="2" presetClass="entr" presetSubtype="2" fill="hold" nodeType="clickEffect">
+                                  <p:stCondLst>
+                                    <p:cond delay="0"/>
+                                  </p:stCondLst>
+                                  <p:childTnLst>
+                                    <p:set>
+                                      <p:cBhvr>
+                                        <p:cTn id="6" dur="1" fill="hold">
+                                          <p:stCondLst>
+                                            <p:cond delay="0"/>
+                                          </p:stCondLst>
+                                        </p:cTn>
+                                        <p:tgtEl>
+                                          <p:spTgt spid="4"/>
+                                        </p:tgtEl>
+                                        <p:attrNameLst>
+                                          <p:attrName>style.visibility</p:attrName>
+                                        </p:attrNameLst>
+                                      </p:cBhvr>
+                                      <p:to>
+                                        <p:strVal val="visible"/>
+                                      </p:to>
+                                    </p:set>
+                                    <p:anim calcmode="lin" valueType="num">
+                                      <p:cBhvr additive="base">
+                                        <p:cTn id="7" dur="500" fill="hold"/>
+                                        <p:tgtEl>
+                                          <p:spTgt spid="4"/>
+                                        </p:tgtEl>
+                                        <p:attrNameLst>
+                                          <p:attrName>ppt_x</p:attrName>
+                                        </p:attrNameLst>
+                                      </p:cBhvr>
+                                      <p:tavLst>
+                                        <p:tav tm="0">
+                                          <p:val>
+                                            <p:strVal val="1+#ppt_w/2"/>
+                                          </p:val>
+                                        </p:tav>
+                                        <p:tav tm="100000">
+                                          <p:val>
+                                            <p:strVal val="#ppt_x"/>
+                                          </p:val>
+                                        </p:tav>
+                                      </p:tavLst>
+                                    </p:anim>
+                                    <p:anim calcmode="lin" valueType="num">
+                                      <p:cBhvr additive="base">
+                                        <p:cTn id="8" dur="500" fill="hold"/>
+                                        <p:tgtEl>
+                                          <p:spTgt spid="4"/>
+                                        </p:tgtEl>
+                                        <p:attrNameLst>
+                                          <p:attrName>ppt_y</p:attrName>
+                                        </p:attrNameLst>
+                                      </p:cBhvr>
+                                      <p:tavLst>
+                                        <p:tav tm="0">
+                                          <p:val>
+                                            <p:strVal val="#ppt_y"/>
+                                          </p:val>
+                                        </p:tav>
+                                        <p:tav tm="100000">
+                                          <p:val>
+                                            <p:strVal val="#ppt_y"/>
+                                          </p:val>
+                                        </p:tav>
+                                      </p:tavLst>
+                                    </p:anim>
+                                  </p:childTnLst>
+                                </p:cTn>
+                              </p:par>
+                            </p:childTnLst>
+                          </p:cTn>
+                        </p:par>
+                      </p:childTnLst>
+                    </p:cTn>
+                  </p:par>
+                </p:childTnLst>
+              </p:cTn>
+              <p:prevCondLst>
+                <p:cond evt="onPrev" delay="0">
+                  <p:tgtEl>
+                    <p:sldTgt/>
+                  </p:tgtEl>
+                </p:cond>
+              </p:prevCondLst>
+              <p:nextCondLst>
+                <p:cond evt="onNext" delay="0">
+                  <p:tgtEl>
+                    <p:sldTgt/>
+                  </p:tgtEl>
+                </p:cond>
+              </p:nextCondLst>
+            </p:seq>
+          </p:childTnLst>
+        </p:cTn>
+      </p:par>
+    </p:tnLst>
+  </p:timing>
+</p:sld>
+</file>
+
+<file path=ppt/slides/slide11.xml><?xml version="1.0" encoding="utf-8"?>
+<p:sld xmlns:a="http://schemas.openxmlformats.org/drawingml/2006/main" xmlns:r="http://schemas.openxmlformats.org/officeDocument/2006/relationships" xmlns:p="http://schemas.openxmlformats.org/presentationml/2006/main">
+  <p:cSld>
+    <p:spTree>
+      <p:nvGrpSpPr>
+        <p:cNvPr id="1" name=""/>
+        <p:cNvGrpSpPr/>
+        <p:nvPr/>
+      </p:nvGrpSpPr>
+      <p:grpSpPr>
+        <a:xfrm>
+          <a:off x="0" y="0"/>
+          <a:ext cx="0" cy="0"/>
+          <a:chOff x="0" y="0"/>
+          <a:chExt cx="0" cy="0"/>
+        </a:xfrm>
+      </p:grpSpPr>
+      <p:sp>
+        <p:nvSpPr>
+          <p:cNvPr id="2" name="Title 1"/>
+          <p:cNvSpPr>
+            <a:spLocks noGrp="1"/>
+          </p:cNvSpPr>
+          <p:nvPr>
+            <p:ph type="title"/>
+          </p:nvPr>
+        </p:nvSpPr>
+        <p:spPr/>
+        <p:txBody>
+          <a:bodyPr/>
+          <a:lstStyle/>
+          <a:p>
+            <a:r>
+              <a:rPr lang="en-US" dirty="0"/>
+              <a:t>Demo</a:t>
+            </a:r>
+          </a:p>
+        </p:txBody>
+      </p:sp>
+      <p:sp>
+        <p:nvSpPr>
+          <p:cNvPr id="3" name="Text Placeholder 2"/>
+          <p:cNvSpPr>
+            <a:spLocks noGrp="1"/>
+          </p:cNvSpPr>
+          <p:nvPr>
+            <p:ph type="body" idx="1"/>
+          </p:nvPr>
+        </p:nvSpPr>
+        <p:spPr>
+          <a:xfrm>
+            <a:off x="833191" y="4010334"/>
+            <a:ext cx="10515600" cy="1174639"/>
+          </a:xfrm>
+        </p:spPr>
+        <p:txBody>
+          <a:bodyPr/>
+          <a:lstStyle/>
+          <a:p>
+            <a:r>
+              <a:rPr lang="en-US" dirty="0"/>
+              <a:t>Performance</a:t>
+            </a:r>
+          </a:p>
+        </p:txBody>
+      </p:sp>
+    </p:spTree>
+    <p:extLst>
+      <p:ext uri="{BB962C8B-B14F-4D97-AF65-F5344CB8AC3E}">
+        <p14:creationId xmlns:p14="http://schemas.microsoft.com/office/powerpoint/2010/main" val="3234188995"/>
+      </p:ext>
+    </p:extLst>
+  </p:cSld>
+  <p:clrMapOvr>
+    <a:masterClrMapping/>
+  </p:clrMapOvr>
+</p:sld>
+</file>
+
+<file path=ppt/slides/slide12.xml><?xml version="1.0" encoding="utf-8"?>
+<p:sld xmlns:a="http://schemas.openxmlformats.org/drawingml/2006/main" xmlns:r="http://schemas.openxmlformats.org/officeDocument/2006/relationships" xmlns:p="http://schemas.openxmlformats.org/presentationml/2006/main">
+  <p:cSld>
+    <p:spTree>
+      <p:nvGrpSpPr>
+        <p:cNvPr id="1" name=""/>
+        <p:cNvGrpSpPr/>
+        <p:nvPr/>
+      </p:nvGrpSpPr>
+      <p:grpSpPr>
+        <a:xfrm>
+          <a:off x="0" y="0"/>
+          <a:ext cx="0" cy="0"/>
+          <a:chOff x="0" y="0"/>
+          <a:chExt cx="0" cy="0"/>
+        </a:xfrm>
+      </p:grpSpPr>
+      <p:sp>
+        <p:nvSpPr>
+          <p:cNvPr id="2" name="Title 1"/>
+          <p:cNvSpPr>
+            <a:spLocks noGrp="1"/>
+          </p:cNvSpPr>
+          <p:nvPr>
+            <p:ph type="title"/>
+          </p:nvPr>
+        </p:nvSpPr>
+        <p:spPr/>
+        <p:txBody>
+          <a:bodyPr/>
+          <a:lstStyle/>
+          <a:p>
+            <a:r>
+              <a:rPr lang="en-US" dirty="0"/>
               <a:t>Shadow Properties</a:t>
             </a:r>
           </a:p>
@@ -10849,7 +13459,7 @@
 </p:sld>
 </file>
 
-<file path=ppt/slides/slide11.xml><?xml version="1.0" encoding="utf-8"?>
+<file path=ppt/slides/slide13.xml><?xml version="1.0" encoding="utf-8"?>
 <p:sld xmlns:a="http://schemas.openxmlformats.org/drawingml/2006/main" xmlns:r="http://schemas.openxmlformats.org/officeDocument/2006/relationships" xmlns:p="http://schemas.openxmlformats.org/presentationml/2006/main" show="0">
   <p:cSld>
     <p:spTree>
@@ -15241,7 +17851,7 @@
 </p:sld>
 </file>
 
-<file path=ppt/slides/slide12.xml><?xml version="1.0" encoding="utf-8"?>
+<file path=ppt/slides/slide14.xml><?xml version="1.0" encoding="utf-8"?>
 <p:sld xmlns:a="http://schemas.openxmlformats.org/drawingml/2006/main" xmlns:r="http://schemas.openxmlformats.org/officeDocument/2006/relationships" xmlns:p="http://schemas.openxmlformats.org/presentationml/2006/main">
   <p:cSld>
     <p:spTree>
@@ -15419,7 +18029,7 @@
 </p:sld>
 </file>
 
-<file path=ppt/slides/slide13.xml><?xml version="1.0" encoding="utf-8"?>
+<file path=ppt/slides/slide15.xml><?xml version="1.0" encoding="utf-8"?>
 <p:sld xmlns:a="http://schemas.openxmlformats.org/drawingml/2006/main" xmlns:r="http://schemas.openxmlformats.org/officeDocument/2006/relationships" xmlns:p="http://schemas.openxmlformats.org/presentationml/2006/main">
   <p:cSld>
     <p:spTree>
@@ -15922,7 +18532,7 @@
 </p:sld>
 </file>
 
-<file path=ppt/slides/slide14.xml><?xml version="1.0" encoding="utf-8"?>
+<file path=ppt/slides/slide16.xml><?xml version="1.0" encoding="utf-8"?>
 <p:sld xmlns:a="http://schemas.openxmlformats.org/drawingml/2006/main" xmlns:r="http://schemas.openxmlformats.org/officeDocument/2006/relationships" xmlns:p="http://schemas.openxmlformats.org/presentationml/2006/main">
   <p:cSld>
     <p:spTree>
@@ -16110,7 +18720,7 @@
 </p:sld>
 </file>
 
-<file path=ppt/slides/slide15.xml><?xml version="1.0" encoding="utf-8"?>
+<file path=ppt/slides/slide17.xml><?xml version="1.0" encoding="utf-8"?>
 <p:sld xmlns:a="http://schemas.openxmlformats.org/drawingml/2006/main" xmlns:r="http://schemas.openxmlformats.org/officeDocument/2006/relationships" xmlns:p="http://schemas.openxmlformats.org/presentationml/2006/main">
   <p:cSld>
     <p:spTree>
@@ -16433,7 +19043,7 @@
 </p:sld>
 </file>
 
-<file path=ppt/slides/slide16.xml><?xml version="1.0" encoding="utf-8"?>
+<file path=ppt/slides/slide18.xml><?xml version="1.0" encoding="utf-8"?>
 <p:sld xmlns:a="http://schemas.openxmlformats.org/drawingml/2006/main" xmlns:r="http://schemas.openxmlformats.org/officeDocument/2006/relationships" xmlns:p="http://schemas.openxmlformats.org/presentationml/2006/main">
   <p:cSld>
     <p:spTree>
@@ -17318,7 +19928,7 @@
 </p:sld>
 </file>
 
-<file path=ppt/slides/slide17.xml><?xml version="1.0" encoding="utf-8"?>
+<file path=ppt/slides/slide19.xml><?xml version="1.0" encoding="utf-8"?>
 <p:sld xmlns:a="http://schemas.openxmlformats.org/drawingml/2006/main" xmlns:r="http://schemas.openxmlformats.org/officeDocument/2006/relationships" xmlns:p="http://schemas.openxmlformats.org/presentationml/2006/main">
   <p:cSld>
     <p:spTree>
@@ -17449,271 +20059,6 @@
     <p:extLst>
       <p:ext uri="{BB962C8B-B14F-4D97-AF65-F5344CB8AC3E}">
         <p14:creationId xmlns:p14="http://schemas.microsoft.com/office/powerpoint/2010/main" val="933879729"/>
-      </p:ext>
-    </p:extLst>
-  </p:cSld>
-  <p:clrMapOvr>
-    <a:masterClrMapping/>
-  </p:clrMapOvr>
-</p:sld>
-</file>
-
-<file path=ppt/slides/slide18.xml><?xml version="1.0" encoding="utf-8"?>
-<p:sld xmlns:a="http://schemas.openxmlformats.org/drawingml/2006/main" xmlns:r="http://schemas.openxmlformats.org/officeDocument/2006/relationships" xmlns:p="http://schemas.openxmlformats.org/presentationml/2006/main">
-  <p:cSld>
-    <p:spTree>
-      <p:nvGrpSpPr>
-        <p:cNvPr id="1" name=""/>
-        <p:cNvGrpSpPr/>
-        <p:nvPr/>
-      </p:nvGrpSpPr>
-      <p:grpSpPr>
-        <a:xfrm>
-          <a:off x="0" y="0"/>
-          <a:ext cx="0" cy="0"/>
-          <a:chOff x="0" y="0"/>
-          <a:chExt cx="0" cy="0"/>
-        </a:xfrm>
-      </p:grpSpPr>
-      <p:sp>
-        <p:nvSpPr>
-          <p:cNvPr id="2" name="Title 1"/>
-          <p:cNvSpPr>
-            <a:spLocks noGrp="1"/>
-          </p:cNvSpPr>
-          <p:nvPr>
-            <p:ph type="title" idx="4294967295"/>
-          </p:nvPr>
-        </p:nvSpPr>
-        <p:spPr>
-          <a:xfrm rot="16200000">
-            <a:off x="0" y="2546350"/>
-            <a:ext cx="5807075" cy="1325563"/>
-          </a:xfrm>
-        </p:spPr>
-        <p:txBody>
-          <a:bodyPr/>
-          <a:lstStyle/>
-          <a:p>
-            <a:r>
-              <a:rPr lang="en-US" dirty="0"/>
-              <a:t>Comparison</a:t>
-            </a:r>
-          </a:p>
-        </p:txBody>
-      </p:sp>
-      <p:sp>
-        <p:nvSpPr>
-          <p:cNvPr id="4" name="Rectangle 3"/>
-          <p:cNvSpPr/>
-          <p:nvPr/>
-        </p:nvSpPr>
-        <p:spPr>
-          <a:xfrm>
-            <a:off x="3006172" y="6311900"/>
-            <a:ext cx="5942589" cy="369332"/>
-          </a:xfrm>
-          <a:prstGeom prst="rect">
-            <a:avLst/>
-          </a:prstGeom>
-        </p:spPr>
-        <p:txBody>
-          <a:bodyPr wrap="none">
-            <a:spAutoFit/>
-          </a:bodyPr>
-          <a:lstStyle/>
-          <a:p>
-            <a:r>
-              <a:rPr lang="en-US" dirty="0">
-                <a:hlinkClick r:id="rId2"/>
-              </a:rPr>
-              <a:t>https://docs.efproject.net/en/latest/efcore-vs-ef6/index.html</a:t>
-            </a:r>
-            <a:r>
-              <a:rPr lang="en-US" dirty="0"/>
-              <a:t> </a:t>
-            </a:r>
-          </a:p>
-        </p:txBody>
-      </p:sp>
-      <p:graphicFrame>
-        <p:nvGraphicFramePr>
-          <p:cNvPr id="5" name="Diagram 4"/>
-          <p:cNvGraphicFramePr/>
-          <p:nvPr>
-            <p:extLst>
-              <p:ext uri="{D42A27DB-BD31-4B8C-83A1-F6EECF244321}">
-                <p14:modId xmlns:p14="http://schemas.microsoft.com/office/powerpoint/2010/main" val="3729870568"/>
-              </p:ext>
-            </p:extLst>
-          </p:nvPr>
-        </p:nvGraphicFramePr>
-        <p:xfrm>
-          <a:off x="1684867" y="173567"/>
-          <a:ext cx="8822267" cy="6138333"/>
-        </p:xfrm>
-        <a:graphic>
-          <a:graphicData uri="http://schemas.openxmlformats.org/drawingml/2006/diagram">
-            <dgm:relIds xmlns:dgm="http://schemas.openxmlformats.org/drawingml/2006/diagram" xmlns:r="http://schemas.openxmlformats.org/officeDocument/2006/relationships" r:dm="rId3" r:lo="rId4" r:qs="rId5" r:cs="rId6"/>
-          </a:graphicData>
-        </a:graphic>
-      </p:graphicFrame>
-    </p:spTree>
-    <p:extLst>
-      <p:ext uri="{BB962C8B-B14F-4D97-AF65-F5344CB8AC3E}">
-        <p14:creationId xmlns:p14="http://schemas.microsoft.com/office/powerpoint/2010/main" val="3270552162"/>
-      </p:ext>
-    </p:extLst>
-  </p:cSld>
-  <p:clrMapOvr>
-    <a:masterClrMapping/>
-  </p:clrMapOvr>
-</p:sld>
-</file>
-
-<file path=ppt/slides/slide19.xml><?xml version="1.0" encoding="utf-8"?>
-<p:sld xmlns:a="http://schemas.openxmlformats.org/drawingml/2006/main" xmlns:r="http://schemas.openxmlformats.org/officeDocument/2006/relationships" xmlns:p="http://schemas.openxmlformats.org/presentationml/2006/main">
-  <p:cSld>
-    <p:spTree>
-      <p:nvGrpSpPr>
-        <p:cNvPr id="1" name=""/>
-        <p:cNvGrpSpPr/>
-        <p:nvPr/>
-      </p:nvGrpSpPr>
-      <p:grpSpPr>
-        <a:xfrm>
-          <a:off x="0" y="0"/>
-          <a:ext cx="0" cy="0"/>
-          <a:chOff x="0" y="0"/>
-          <a:chExt cx="0" cy="0"/>
-        </a:xfrm>
-      </p:grpSpPr>
-      <p:sp>
-        <p:nvSpPr>
-          <p:cNvPr id="2" name="Title 1"/>
-          <p:cNvSpPr>
-            <a:spLocks noGrp="1"/>
-          </p:cNvSpPr>
-          <p:nvPr>
-            <p:ph type="title"/>
-          </p:nvPr>
-        </p:nvSpPr>
-        <p:spPr/>
-        <p:txBody>
-          <a:bodyPr/>
-          <a:lstStyle/>
-          <a:p>
-            <a:r>
-              <a:rPr lang="en-US" dirty="0"/>
-              <a:t>Links</a:t>
-            </a:r>
-          </a:p>
-        </p:txBody>
-      </p:sp>
-      <p:sp>
-        <p:nvSpPr>
-          <p:cNvPr id="3" name="Content Placeholder 2"/>
-          <p:cNvSpPr>
-            <a:spLocks noGrp="1"/>
-          </p:cNvSpPr>
-          <p:nvPr>
-            <p:ph idx="1"/>
-          </p:nvPr>
-        </p:nvSpPr>
-        <p:spPr/>
-        <p:txBody>
-          <a:bodyPr>
-            <a:normAutofit/>
-          </a:bodyPr>
-          <a:lstStyle/>
-          <a:p>
-            <a:pPr lvl="0">
-              <a:buClr>
-                <a:srgbClr val="FFFFFF"/>
-              </a:buClr>
-            </a:pPr>
-            <a:r>
-              <a:rPr lang="en-US" dirty="0">
-                <a:gradFill>
-                  <a:gsLst>
-                    <a:gs pos="1250">
-                      <a:schemeClr val="tx2"/>
-                    </a:gs>
-                    <a:gs pos="99000">
-                      <a:schemeClr val="tx2"/>
-                    </a:gs>
-                  </a:gsLst>
-                  <a:lin ang="5400000" scaled="0"/>
-                </a:gradFill>
-              </a:rPr>
-              <a:t>http://docs.efproject.net </a:t>
-            </a:r>
-          </a:p>
-          <a:p>
-            <a:pPr lvl="0">
-              <a:buClr>
-                <a:srgbClr val="FFFFFF"/>
-              </a:buClr>
-            </a:pPr>
-            <a:r>
-              <a:rPr lang="en-US" dirty="0">
-                <a:gradFill>
-                  <a:gsLst>
-                    <a:gs pos="1250">
-                      <a:schemeClr val="tx2"/>
-                    </a:gs>
-                    <a:gs pos="99000">
-                      <a:schemeClr val="tx2"/>
-                    </a:gs>
-                  </a:gsLst>
-                  <a:lin ang="5400000" scaled="0"/>
-                </a:gradFill>
-              </a:rPr>
-              <a:t>http://github.com/aspnet/EntityFramework </a:t>
-            </a:r>
-          </a:p>
-          <a:p>
-            <a:pPr lvl="0">
-              <a:buClr>
-                <a:srgbClr val="FFFFFF"/>
-              </a:buClr>
-            </a:pPr>
-            <a:r>
-              <a:rPr lang="en-US" dirty="0"/>
-              <a:t>https://ef.readthedocs.io/en/latest/</a:t>
-            </a:r>
-          </a:p>
-          <a:p>
-            <a:r>
-              <a:rPr lang="en-US" dirty="0"/>
-              <a:t>EF Core Roadmap - http://bit.ly/efcoreroadmap </a:t>
-            </a:r>
-          </a:p>
-          <a:p>
-            <a:r>
-              <a:rPr lang="en-US" dirty="0"/>
-              <a:t>https://github.com/rowanmiller/Demo-EFCore</a:t>
-            </a:r>
-          </a:p>
-          <a:p>
-            <a:r>
-              <a:rPr lang="en-US" dirty="0"/>
-              <a:t>https://blogs.msdn.microsoft.com/dotnet/2016/10/25/announcing-entity-framework-core-1-1-preview-1/ </a:t>
-            </a:r>
-          </a:p>
-          <a:p>
-            <a:r>
-              <a:rPr lang="en-US"/>
-              <a:t>https://blogs.msdn.microsoft.com/dotnet/2017/08/14/announcing-entity-framework-core-2-0/</a:t>
-            </a:r>
-            <a:endParaRPr lang="en-US" dirty="0"/>
-          </a:p>
-        </p:txBody>
-      </p:sp>
-    </p:spTree>
-    <p:extLst>
-      <p:ext uri="{BB962C8B-B14F-4D97-AF65-F5344CB8AC3E}">
-        <p14:creationId xmlns:p14="http://schemas.microsoft.com/office/powerpoint/2010/main" val="3967018087"/>
       </p:ext>
     </p:extLst>
   </p:cSld>
@@ -17982,6 +20327,510 @@
           <a:chExt cx="0" cy="0"/>
         </a:xfrm>
       </p:grpSpPr>
+      <p:sp>
+        <p:nvSpPr>
+          <p:cNvPr id="2" name="Title 1">
+            <a:extLst>
+              <a:ext uri="{FF2B5EF4-FFF2-40B4-BE49-F238E27FC236}">
+                <a16:creationId xmlns:a16="http://schemas.microsoft.com/office/drawing/2014/main" id="{A86472AB-BF42-4D3C-B971-BFE898C027EF}"/>
+              </a:ext>
+            </a:extLst>
+          </p:cNvPr>
+          <p:cNvSpPr>
+            <a:spLocks noGrp="1"/>
+          </p:cNvSpPr>
+          <p:nvPr>
+            <p:ph type="title"/>
+          </p:nvPr>
+        </p:nvSpPr>
+        <p:spPr/>
+        <p:txBody>
+          <a:bodyPr/>
+          <a:lstStyle/>
+          <a:p>
+            <a:r>
+              <a:rPr lang="en-US" dirty="0"/>
+              <a:t>EF 2.1 features</a:t>
+            </a:r>
+          </a:p>
+        </p:txBody>
+      </p:sp>
+      <p:sp>
+        <p:nvSpPr>
+          <p:cNvPr id="3" name="Content Placeholder 2">
+            <a:extLst>
+              <a:ext uri="{FF2B5EF4-FFF2-40B4-BE49-F238E27FC236}">
+                <a16:creationId xmlns:a16="http://schemas.microsoft.com/office/drawing/2014/main" id="{E1A6CBD6-B064-4F20-B559-CF69F483ED5D}"/>
+              </a:ext>
+            </a:extLst>
+          </p:cNvPr>
+          <p:cNvSpPr>
+            <a:spLocks noGrp="1"/>
+          </p:cNvSpPr>
+          <p:nvPr>
+            <p:ph sz="half" idx="1"/>
+          </p:nvPr>
+        </p:nvSpPr>
+        <p:spPr/>
+        <p:txBody>
+          <a:bodyPr>
+            <a:normAutofit/>
+          </a:bodyPr>
+          <a:lstStyle/>
+          <a:p>
+            <a:r>
+              <a:rPr lang="en-US" dirty="0"/>
+              <a:t>Lazy Loading</a:t>
+            </a:r>
+          </a:p>
+          <a:p>
+            <a:r>
+              <a:rPr lang="en-US" dirty="0"/>
+              <a:t>Parameters in entity constructors</a:t>
+            </a:r>
+          </a:p>
+          <a:p>
+            <a:r>
+              <a:rPr lang="en-US" dirty="0"/>
+              <a:t>Value conversions</a:t>
+            </a:r>
+          </a:p>
+          <a:p>
+            <a:r>
+              <a:rPr lang="en-US" dirty="0"/>
+              <a:t>Server side </a:t>
+            </a:r>
+            <a:r>
+              <a:rPr lang="en-US" dirty="0" err="1"/>
+              <a:t>GroupBy</a:t>
+            </a:r>
+            <a:endParaRPr lang="en-US" dirty="0"/>
+          </a:p>
+          <a:p>
+            <a:r>
+              <a:rPr lang="en-US" dirty="0"/>
+              <a:t>Data Seeding</a:t>
+            </a:r>
+          </a:p>
+          <a:p>
+            <a:r>
+              <a:rPr lang="en-US" dirty="0"/>
+              <a:t>Query types</a:t>
+            </a:r>
+          </a:p>
+          <a:p>
+            <a:r>
+              <a:rPr lang="en-US" dirty="0"/>
+              <a:t>Include for derived </a:t>
+            </a:r>
+            <a:r>
+              <a:rPr lang="en-US" dirty="0" err="1"/>
+              <a:t>tpes</a:t>
+            </a:r>
+            <a:endParaRPr lang="en-US" dirty="0"/>
+          </a:p>
+          <a:p>
+            <a:endParaRPr lang="en-US" dirty="0"/>
+          </a:p>
+        </p:txBody>
+      </p:sp>
+      <p:sp>
+        <p:nvSpPr>
+          <p:cNvPr id="4" name="Content Placeholder 3">
+            <a:extLst>
+              <a:ext uri="{FF2B5EF4-FFF2-40B4-BE49-F238E27FC236}">
+                <a16:creationId xmlns:a16="http://schemas.microsoft.com/office/drawing/2014/main" id="{11ACDA69-2859-4359-B77E-3F91347031A4}"/>
+              </a:ext>
+            </a:extLst>
+          </p:cNvPr>
+          <p:cNvSpPr>
+            <a:spLocks noGrp="1"/>
+          </p:cNvSpPr>
+          <p:nvPr>
+            <p:ph sz="half" idx="2"/>
+          </p:nvPr>
+        </p:nvSpPr>
+        <p:spPr/>
+        <p:txBody>
+          <a:bodyPr/>
+          <a:lstStyle/>
+          <a:p>
+            <a:r>
+              <a:rPr lang="en-US" dirty="0" err="1"/>
+              <a:t>System.Transactions</a:t>
+            </a:r>
+            <a:endParaRPr lang="en-US" dirty="0"/>
+          </a:p>
+          <a:p>
+            <a:r>
+              <a:rPr lang="en-US" dirty="0"/>
+              <a:t>Optimized correlated sub-queries</a:t>
+            </a:r>
+          </a:p>
+          <a:p>
+            <a:r>
+              <a:rPr lang="en-US" dirty="0" err="1"/>
+              <a:t>OwnedAttribute</a:t>
+            </a:r>
+            <a:endParaRPr lang="en-US" dirty="0"/>
+          </a:p>
+          <a:p>
+            <a:r>
+              <a:rPr lang="en-US" dirty="0"/>
+              <a:t>CLI integrated in core SDK</a:t>
+            </a:r>
+          </a:p>
+          <a:p>
+            <a:r>
+              <a:rPr lang="en-US" dirty="0"/>
+              <a:t>State change events</a:t>
+            </a:r>
+          </a:p>
+          <a:p>
+            <a:r>
+              <a:rPr lang="en-US" dirty="0" err="1"/>
+              <a:t>FromSql</a:t>
+            </a:r>
+            <a:r>
+              <a:rPr lang="en-US" dirty="0"/>
+              <a:t> code analyzer</a:t>
+            </a:r>
+          </a:p>
+          <a:p>
+            <a:endParaRPr lang="en-US" dirty="0"/>
+          </a:p>
+        </p:txBody>
+      </p:sp>
+      <p:sp>
+        <p:nvSpPr>
+          <p:cNvPr id="5" name="Rectangle 4">
+            <a:extLst>
+              <a:ext uri="{FF2B5EF4-FFF2-40B4-BE49-F238E27FC236}">
+                <a16:creationId xmlns:a16="http://schemas.microsoft.com/office/drawing/2014/main" id="{C5639E8D-5719-41AC-BAEA-E557195EC91B}"/>
+              </a:ext>
+            </a:extLst>
+          </p:cNvPr>
+          <p:cNvSpPr/>
+          <p:nvPr/>
+        </p:nvSpPr>
+        <p:spPr>
+          <a:xfrm>
+            <a:off x="146365" y="6436664"/>
+            <a:ext cx="11897188" cy="369332"/>
+          </a:xfrm>
+          <a:prstGeom prst="rect">
+            <a:avLst/>
+          </a:prstGeom>
+        </p:spPr>
+        <p:txBody>
+          <a:bodyPr wrap="square">
+            <a:spAutoFit/>
+          </a:bodyPr>
+          <a:lstStyle/>
+          <a:p>
+            <a:pPr algn="ctr"/>
+            <a:r>
+              <a:rPr lang="en-US" dirty="0"/>
+              <a:t>https://blogs.msdn.microsoft.com/dotnet/2018/05/30/announcing-entity-framework-core-2-1/</a:t>
+            </a:r>
+          </a:p>
+        </p:txBody>
+      </p:sp>
+    </p:spTree>
+    <p:extLst>
+      <p:ext uri="{BB962C8B-B14F-4D97-AF65-F5344CB8AC3E}">
+        <p14:creationId xmlns:p14="http://schemas.microsoft.com/office/powerpoint/2010/main" val="1921587581"/>
+      </p:ext>
+    </p:extLst>
+  </p:cSld>
+  <p:clrMapOvr>
+    <a:masterClrMapping/>
+  </p:clrMapOvr>
+</p:sld>
+</file>
+
+<file path=ppt/slides/slide21.xml><?xml version="1.0" encoding="utf-8"?>
+<p:sld xmlns:a="http://schemas.openxmlformats.org/drawingml/2006/main" xmlns:r="http://schemas.openxmlformats.org/officeDocument/2006/relationships" xmlns:p="http://schemas.openxmlformats.org/presentationml/2006/main">
+  <p:cSld>
+    <p:spTree>
+      <p:nvGrpSpPr>
+        <p:cNvPr id="1" name=""/>
+        <p:cNvGrpSpPr/>
+        <p:nvPr/>
+      </p:nvGrpSpPr>
+      <p:grpSpPr>
+        <a:xfrm>
+          <a:off x="0" y="0"/>
+          <a:ext cx="0" cy="0"/>
+          <a:chOff x="0" y="0"/>
+          <a:chExt cx="0" cy="0"/>
+        </a:xfrm>
+      </p:grpSpPr>
+      <p:sp>
+        <p:nvSpPr>
+          <p:cNvPr id="2" name="Title 1"/>
+          <p:cNvSpPr>
+            <a:spLocks noGrp="1"/>
+          </p:cNvSpPr>
+          <p:nvPr>
+            <p:ph type="title" idx="4294967295"/>
+          </p:nvPr>
+        </p:nvSpPr>
+        <p:spPr>
+          <a:xfrm rot="16200000">
+            <a:off x="0" y="2546350"/>
+            <a:ext cx="5807075" cy="1325563"/>
+          </a:xfrm>
+        </p:spPr>
+        <p:txBody>
+          <a:bodyPr/>
+          <a:lstStyle/>
+          <a:p>
+            <a:r>
+              <a:rPr lang="en-US" dirty="0"/>
+              <a:t>Comparison</a:t>
+            </a:r>
+          </a:p>
+        </p:txBody>
+      </p:sp>
+      <p:sp>
+        <p:nvSpPr>
+          <p:cNvPr id="4" name="Rectangle 3"/>
+          <p:cNvSpPr/>
+          <p:nvPr/>
+        </p:nvSpPr>
+        <p:spPr>
+          <a:xfrm>
+            <a:off x="3006172" y="6311900"/>
+            <a:ext cx="5942589" cy="369332"/>
+          </a:xfrm>
+          <a:prstGeom prst="rect">
+            <a:avLst/>
+          </a:prstGeom>
+        </p:spPr>
+        <p:txBody>
+          <a:bodyPr wrap="none">
+            <a:spAutoFit/>
+          </a:bodyPr>
+          <a:lstStyle/>
+          <a:p>
+            <a:r>
+              <a:rPr lang="en-US" dirty="0">
+                <a:hlinkClick r:id="rId2"/>
+              </a:rPr>
+              <a:t>https://docs.efproject.net/en/latest/efcore-vs-ef6/index.html</a:t>
+            </a:r>
+            <a:r>
+              <a:rPr lang="en-US" dirty="0"/>
+              <a:t> </a:t>
+            </a:r>
+          </a:p>
+        </p:txBody>
+      </p:sp>
+      <p:graphicFrame>
+        <p:nvGraphicFramePr>
+          <p:cNvPr id="5" name="Diagram 4"/>
+          <p:cNvGraphicFramePr/>
+          <p:nvPr>
+            <p:extLst>
+              <p:ext uri="{D42A27DB-BD31-4B8C-83A1-F6EECF244321}">
+                <p14:modId xmlns:p14="http://schemas.microsoft.com/office/powerpoint/2010/main" val="3729870568"/>
+              </p:ext>
+            </p:extLst>
+          </p:nvPr>
+        </p:nvGraphicFramePr>
+        <p:xfrm>
+          <a:off x="1684867" y="173567"/>
+          <a:ext cx="8822267" cy="6138333"/>
+        </p:xfrm>
+        <a:graphic>
+          <a:graphicData uri="http://schemas.openxmlformats.org/drawingml/2006/diagram">
+            <dgm:relIds xmlns:dgm="http://schemas.openxmlformats.org/drawingml/2006/diagram" xmlns:r="http://schemas.openxmlformats.org/officeDocument/2006/relationships" r:dm="rId3" r:lo="rId4" r:qs="rId5" r:cs="rId6"/>
+          </a:graphicData>
+        </a:graphic>
+      </p:graphicFrame>
+    </p:spTree>
+    <p:extLst>
+      <p:ext uri="{BB962C8B-B14F-4D97-AF65-F5344CB8AC3E}">
+        <p14:creationId xmlns:p14="http://schemas.microsoft.com/office/powerpoint/2010/main" val="3270552162"/>
+      </p:ext>
+    </p:extLst>
+  </p:cSld>
+  <p:clrMapOvr>
+    <a:masterClrMapping/>
+  </p:clrMapOvr>
+</p:sld>
+</file>
+
+<file path=ppt/slides/slide22.xml><?xml version="1.0" encoding="utf-8"?>
+<p:sld xmlns:a="http://schemas.openxmlformats.org/drawingml/2006/main" xmlns:r="http://schemas.openxmlformats.org/officeDocument/2006/relationships" xmlns:p="http://schemas.openxmlformats.org/presentationml/2006/main">
+  <p:cSld>
+    <p:spTree>
+      <p:nvGrpSpPr>
+        <p:cNvPr id="1" name=""/>
+        <p:cNvGrpSpPr/>
+        <p:nvPr/>
+      </p:nvGrpSpPr>
+      <p:grpSpPr>
+        <a:xfrm>
+          <a:off x="0" y="0"/>
+          <a:ext cx="0" cy="0"/>
+          <a:chOff x="0" y="0"/>
+          <a:chExt cx="0" cy="0"/>
+        </a:xfrm>
+      </p:grpSpPr>
+      <p:sp>
+        <p:nvSpPr>
+          <p:cNvPr id="2" name="Title 1"/>
+          <p:cNvSpPr>
+            <a:spLocks noGrp="1"/>
+          </p:cNvSpPr>
+          <p:nvPr>
+            <p:ph type="title"/>
+          </p:nvPr>
+        </p:nvSpPr>
+        <p:spPr/>
+        <p:txBody>
+          <a:bodyPr/>
+          <a:lstStyle/>
+          <a:p>
+            <a:r>
+              <a:rPr lang="en-US" dirty="0"/>
+              <a:t>Links</a:t>
+            </a:r>
+          </a:p>
+        </p:txBody>
+      </p:sp>
+      <p:sp>
+        <p:nvSpPr>
+          <p:cNvPr id="3" name="Content Placeholder 2"/>
+          <p:cNvSpPr>
+            <a:spLocks noGrp="1"/>
+          </p:cNvSpPr>
+          <p:nvPr>
+            <p:ph idx="1"/>
+          </p:nvPr>
+        </p:nvSpPr>
+        <p:spPr/>
+        <p:txBody>
+          <a:bodyPr>
+            <a:normAutofit/>
+          </a:bodyPr>
+          <a:lstStyle/>
+          <a:p>
+            <a:pPr lvl="0">
+              <a:buClr>
+                <a:srgbClr val="FFFFFF"/>
+              </a:buClr>
+            </a:pPr>
+            <a:r>
+              <a:rPr lang="en-US" dirty="0">
+                <a:gradFill>
+                  <a:gsLst>
+                    <a:gs pos="1250">
+                      <a:schemeClr val="tx2"/>
+                    </a:gs>
+                    <a:gs pos="99000">
+                      <a:schemeClr val="tx2"/>
+                    </a:gs>
+                  </a:gsLst>
+                  <a:lin ang="5400000" scaled="0"/>
+                </a:gradFill>
+              </a:rPr>
+              <a:t>http://docs.efproject.net </a:t>
+            </a:r>
+          </a:p>
+          <a:p>
+            <a:pPr lvl="0">
+              <a:buClr>
+                <a:srgbClr val="FFFFFF"/>
+              </a:buClr>
+            </a:pPr>
+            <a:r>
+              <a:rPr lang="en-US" dirty="0">
+                <a:gradFill>
+                  <a:gsLst>
+                    <a:gs pos="1250">
+                      <a:schemeClr val="tx2"/>
+                    </a:gs>
+                    <a:gs pos="99000">
+                      <a:schemeClr val="tx2"/>
+                    </a:gs>
+                  </a:gsLst>
+                  <a:lin ang="5400000" scaled="0"/>
+                </a:gradFill>
+              </a:rPr>
+              <a:t>http://github.com/aspnet/EntityFramework </a:t>
+            </a:r>
+          </a:p>
+          <a:p>
+            <a:pPr lvl="0">
+              <a:buClr>
+                <a:srgbClr val="FFFFFF"/>
+              </a:buClr>
+            </a:pPr>
+            <a:r>
+              <a:rPr lang="en-US" dirty="0"/>
+              <a:t>https://ef.readthedocs.io/en/latest/</a:t>
+            </a:r>
+          </a:p>
+          <a:p>
+            <a:r>
+              <a:rPr lang="en-US" dirty="0"/>
+              <a:t>EF Core Roadmap - http://bit.ly/efcoreroadmap </a:t>
+            </a:r>
+          </a:p>
+          <a:p>
+            <a:r>
+              <a:rPr lang="en-US" dirty="0"/>
+              <a:t>https://github.com/rowanmiller/Demo-EFCore</a:t>
+            </a:r>
+          </a:p>
+          <a:p>
+            <a:r>
+              <a:rPr lang="en-US" dirty="0"/>
+              <a:t>https://blogs.msdn.microsoft.com/dotnet/2016/10/25/announcing-entity-framework-core-1-1-preview-1/ </a:t>
+            </a:r>
+          </a:p>
+          <a:p>
+            <a:r>
+              <a:rPr lang="en-US"/>
+              <a:t>https://blogs.msdn.microsoft.com/dotnet/2017/08/14/announcing-entity-framework-core-2-0/</a:t>
+            </a:r>
+            <a:endParaRPr lang="en-US" dirty="0"/>
+          </a:p>
+        </p:txBody>
+      </p:sp>
+    </p:spTree>
+    <p:extLst>
+      <p:ext uri="{BB962C8B-B14F-4D97-AF65-F5344CB8AC3E}">
+        <p14:creationId xmlns:p14="http://schemas.microsoft.com/office/powerpoint/2010/main" val="3967018087"/>
+      </p:ext>
+    </p:extLst>
+  </p:cSld>
+  <p:clrMapOvr>
+    <a:masterClrMapping/>
+  </p:clrMapOvr>
+</p:sld>
+</file>
+
+<file path=ppt/slides/slide23.xml><?xml version="1.0" encoding="utf-8"?>
+<p:sld xmlns:a="http://schemas.openxmlformats.org/drawingml/2006/main" xmlns:r="http://schemas.openxmlformats.org/officeDocument/2006/relationships" xmlns:p="http://schemas.openxmlformats.org/presentationml/2006/main">
+  <p:cSld>
+    <p:spTree>
+      <p:nvGrpSpPr>
+        <p:cNvPr id="1" name=""/>
+        <p:cNvGrpSpPr/>
+        <p:nvPr/>
+      </p:nvGrpSpPr>
+      <p:grpSpPr>
+        <a:xfrm>
+          <a:off x="0" y="0"/>
+          <a:ext cx="0" cy="0"/>
+          <a:chOff x="0" y="0"/>
+          <a:chExt cx="0" cy="0"/>
+        </a:xfrm>
+      </p:grpSpPr>
       <p:pic>
         <p:nvPicPr>
           <p:cNvPr id="4" name="Picture 3"/>
@@ -18743,7 +21592,7 @@
                 </a:solidFill>
                 <a:latin typeface="Consolas" panose="020B0609020204030204" pitchFamily="49" charset="0"/>
               </a:rPr>
-              <a:t>"2.0.0"</a:t>
+              <a:t>"2.1.0"</a:t>
             </a:r>
             <a:r>
               <a:rPr lang="en-US" sz="1600" dirty="0">
@@ -18877,7 +21726,7 @@
                 </a:solidFill>
                 <a:latin typeface="Consolas" panose="020B0609020204030204" pitchFamily="49" charset="0"/>
               </a:rPr>
-              <a:t>"2.0.0"</a:t>
+              <a:t>"2.1.0"</a:t>
             </a:r>
             <a:r>
               <a:rPr lang="en-US" sz="1600" dirty="0">
@@ -18943,7 +21792,7 @@
           </a:p>
           <a:p>
             <a:r>
-              <a:rPr lang="en-US" sz="1600" dirty="0">
+              <a:rPr lang="en-US" sz="1600" strike="sngStrike" dirty="0">
                 <a:solidFill>
                   <a:srgbClr val="800000"/>
                 </a:solidFill>
@@ -18952,7 +21801,7 @@
               <a:t>&lt;</a:t>
             </a:r>
             <a:r>
-              <a:rPr lang="en-US" sz="1600" dirty="0" err="1">
+              <a:rPr lang="en-US" sz="1600" strike="sngStrike" dirty="0" err="1">
                 <a:solidFill>
                   <a:srgbClr val="800000"/>
                 </a:solidFill>
@@ -18961,7 +21810,7 @@
               <a:t>ItemGroup</a:t>
             </a:r>
             <a:r>
-              <a:rPr lang="en-US" sz="1600" dirty="0">
+              <a:rPr lang="en-US" sz="1600" strike="sngStrike" dirty="0">
                 <a:solidFill>
                   <a:srgbClr val="800000"/>
                 </a:solidFill>
@@ -18969,7 +21818,7 @@
               </a:rPr>
               <a:t>&gt;</a:t>
             </a:r>
-            <a:endParaRPr lang="en-US" sz="1600" dirty="0">
+            <a:endParaRPr lang="en-US" sz="1600" strike="sngStrike" dirty="0">
               <a:solidFill>
                 <a:srgbClr val="000000"/>
               </a:solidFill>
@@ -18978,7 +21827,7 @@
           </a:p>
           <a:p>
             <a:r>
-              <a:rPr lang="en-US" sz="1600" dirty="0">
+              <a:rPr lang="en-US" sz="1600" strike="sngStrike" dirty="0">
                 <a:solidFill>
                   <a:srgbClr val="800000"/>
                 </a:solidFill>
@@ -18987,7 +21836,7 @@
               <a:t>  &lt;</a:t>
             </a:r>
             <a:r>
-              <a:rPr lang="en-US" sz="1600" dirty="0" err="1">
+              <a:rPr lang="en-US" sz="1600" strike="sngStrike" dirty="0" err="1">
                 <a:solidFill>
                   <a:srgbClr val="800000"/>
                 </a:solidFill>
@@ -18996,7 +21845,7 @@
               <a:t>DotNetCliToolReference</a:t>
             </a:r>
             <a:r>
-              <a:rPr lang="en-US" sz="1600" dirty="0">
+              <a:rPr lang="en-US" sz="1600" strike="sngStrike" dirty="0">
                 <a:solidFill>
                   <a:srgbClr val="000000"/>
                 </a:solidFill>
@@ -19005,7 +21854,7 @@
               <a:t> </a:t>
             </a:r>
             <a:r>
-              <a:rPr lang="en-US" sz="1600" dirty="0">
+              <a:rPr lang="en-US" sz="1600" strike="sngStrike" dirty="0">
                 <a:solidFill>
                   <a:srgbClr val="FF0000"/>
                 </a:solidFill>
@@ -19014,7 +21863,7 @@
               <a:t>Include</a:t>
             </a:r>
             <a:r>
-              <a:rPr lang="en-US" sz="1600" dirty="0">
+              <a:rPr lang="en-US" sz="1600" strike="sngStrike" dirty="0">
                 <a:solidFill>
                   <a:srgbClr val="000000"/>
                 </a:solidFill>
@@ -19023,7 +21872,7 @@
               <a:t>=</a:t>
             </a:r>
             <a:r>
-              <a:rPr lang="en-US" sz="1600" dirty="0">
+              <a:rPr lang="en-US" sz="1600" strike="sngStrike" dirty="0">
                 <a:solidFill>
                   <a:srgbClr val="0000FF"/>
                 </a:solidFill>
@@ -19032,7 +21881,7 @@
               <a:t>"</a:t>
             </a:r>
             <a:r>
-              <a:rPr lang="en-US" sz="1600" dirty="0" err="1">
+              <a:rPr lang="en-US" sz="1600" strike="sngStrike" dirty="0" err="1">
                 <a:solidFill>
                   <a:srgbClr val="0000FF"/>
                 </a:solidFill>
@@ -19041,7 +21890,7 @@
               <a:t>Microsoft.EntityFrameworkCore.Tools.DotNet</a:t>
             </a:r>
             <a:r>
-              <a:rPr lang="en-US" sz="1600" dirty="0">
+              <a:rPr lang="en-US" sz="1600" strike="sngStrike" dirty="0">
                 <a:solidFill>
                   <a:srgbClr val="0000FF"/>
                 </a:solidFill>
@@ -19050,7 +21899,7 @@
               <a:t>"</a:t>
             </a:r>
             <a:r>
-              <a:rPr lang="en-US" sz="1600" dirty="0">
+              <a:rPr lang="en-US" sz="1600" strike="sngStrike" dirty="0">
                 <a:solidFill>
                   <a:srgbClr val="000000"/>
                 </a:solidFill>
@@ -19059,7 +21908,7 @@
               <a:t> </a:t>
             </a:r>
             <a:r>
-              <a:rPr lang="en-US" sz="1600" dirty="0">
+              <a:rPr lang="en-US" sz="1600" strike="sngStrike" dirty="0">
                 <a:solidFill>
                   <a:srgbClr val="FF0000"/>
                 </a:solidFill>
@@ -19068,7 +21917,7 @@
               <a:t>Version</a:t>
             </a:r>
             <a:r>
-              <a:rPr lang="en-US" sz="1600" dirty="0">
+              <a:rPr lang="en-US" sz="1600" strike="sngStrike" dirty="0">
                 <a:solidFill>
                   <a:srgbClr val="000000"/>
                 </a:solidFill>
@@ -19077,7 +21926,7 @@
               <a:t>=</a:t>
             </a:r>
             <a:r>
-              <a:rPr lang="en-US" sz="1600" dirty="0">
+              <a:rPr lang="en-US" sz="1600" strike="sngStrike" dirty="0">
                 <a:solidFill>
                   <a:srgbClr val="0000FF"/>
                 </a:solidFill>
@@ -19086,7 +21935,7 @@
               <a:t>"2.0.0"</a:t>
             </a:r>
             <a:r>
-              <a:rPr lang="en-US" sz="1600" dirty="0">
+              <a:rPr lang="en-US" sz="1600" strike="sngStrike" dirty="0">
                 <a:solidFill>
                   <a:srgbClr val="000000"/>
                 </a:solidFill>
@@ -19095,7 +21944,7 @@
               <a:t> </a:t>
             </a:r>
             <a:r>
-              <a:rPr lang="en-US" sz="1600" dirty="0">
+              <a:rPr lang="en-US" sz="1600" strike="sngStrike" dirty="0">
                 <a:solidFill>
                   <a:srgbClr val="800000"/>
                 </a:solidFill>
@@ -19103,7 +21952,7 @@
               </a:rPr>
               <a:t>/&gt;</a:t>
             </a:r>
-            <a:endParaRPr lang="en-US" sz="1600" dirty="0">
+            <a:endParaRPr lang="en-US" sz="1600" strike="sngStrike" dirty="0">
               <a:solidFill>
                 <a:srgbClr val="000000"/>
               </a:solidFill>
@@ -19112,7 +21961,7 @@
           </a:p>
           <a:p>
             <a:r>
-              <a:rPr lang="en-US" sz="1600" dirty="0">
+              <a:rPr lang="en-US" sz="1600" strike="sngStrike" dirty="0">
                 <a:solidFill>
                   <a:srgbClr val="800000"/>
                 </a:solidFill>
@@ -19121,7 +21970,7 @@
               <a:t>&lt;/</a:t>
             </a:r>
             <a:r>
-              <a:rPr lang="en-US" sz="1600" dirty="0" err="1">
+              <a:rPr lang="en-US" sz="1600" strike="sngStrike" dirty="0" err="1">
                 <a:solidFill>
                   <a:srgbClr val="800000"/>
                 </a:solidFill>
@@ -19130,7 +21979,7 @@
               <a:t>ItemGroup</a:t>
             </a:r>
             <a:r>
-              <a:rPr lang="en-US" sz="1600" dirty="0">
+              <a:rPr lang="en-US" sz="1600" strike="sngStrike" dirty="0">
                 <a:solidFill>
                   <a:srgbClr val="800000"/>
                 </a:solidFill>
@@ -19138,7 +21987,7 @@
               </a:rPr>
               <a:t>&gt;</a:t>
             </a:r>
-            <a:endParaRPr lang="en-US" sz="1600" b="0" dirty="0">
+            <a:endParaRPr lang="en-US" sz="1600" b="0" strike="sngStrike" dirty="0">
               <a:solidFill>
                 <a:srgbClr val="000000"/>
               </a:solidFill>
@@ -21156,16 +24005,12 @@
           </p:cNvGraphicFramePr>
           <p:nvPr>
             <p:ph idx="1"/>
-            <p:extLst>
-              <p:ext uri="{D42A27DB-BD31-4B8C-83A1-F6EECF244321}">
-                <p14:modId xmlns:p14="http://schemas.microsoft.com/office/powerpoint/2010/main" val="1796097713"/>
-              </p:ext>
-            </p:extLst>
+            <p:extLst/>
           </p:nvPr>
         </p:nvGraphicFramePr>
         <p:xfrm>
-          <a:off x="1203325" y="2011363"/>
-          <a:ext cx="9783763" cy="4206875"/>
+          <a:off x="1203325" y="2011365"/>
+          <a:ext cx="9783763" cy="4009924"/>
         </p:xfrm>
         <a:graphic>
           <a:graphicData uri="http://schemas.openxmlformats.org/drawingml/2006/chart">
@@ -21173,34 +24018,106 @@
           </a:graphicData>
         </a:graphic>
       </p:graphicFrame>
-      <p:pic>
-        <p:nvPicPr>
-          <p:cNvPr id="4" name="chart"/>
-          <p:cNvPicPr>
-            <a:picLocks noChangeAspect="1"/>
-          </p:cNvPicPr>
-          <p:nvPr/>
-        </p:nvPicPr>
-        <p:blipFill>
-          <a:blip r:embed="rId3"/>
-          <a:stretch>
-            <a:fillRect/>
-          </a:stretch>
-        </p:blipFill>
-        <p:spPr>
-          <a:xfrm>
-            <a:off x="5111496" y="1"/>
-            <a:ext cx="7080504" cy="2606708"/>
-          </a:xfrm>
-          <a:prstGeom prst="rect">
-            <a:avLst/>
-          </a:prstGeom>
-        </p:spPr>
-      </p:pic>
     </p:spTree>
     <p:extLst>
       <p:ext uri="{BB962C8B-B14F-4D97-AF65-F5344CB8AC3E}">
-        <p14:creationId xmlns:p14="http://schemas.microsoft.com/office/powerpoint/2010/main" val="1501957826"/>
+        <p14:creationId xmlns:p14="http://schemas.microsoft.com/office/powerpoint/2010/main" val="2004295485"/>
+      </p:ext>
+    </p:extLst>
+  </p:cSld>
+  <p:clrMapOvr>
+    <a:masterClrMapping/>
+  </p:clrMapOvr>
+</p:sld>
+</file>
+
+<file path=ppt/slides/slide9.xml><?xml version="1.0" encoding="utf-8"?>
+<p:sld xmlns:a="http://schemas.openxmlformats.org/drawingml/2006/main" xmlns:r="http://schemas.openxmlformats.org/officeDocument/2006/relationships" xmlns:p="http://schemas.openxmlformats.org/presentationml/2006/main">
+  <p:cSld>
+    <p:spTree>
+      <p:nvGrpSpPr>
+        <p:cNvPr id="1" name=""/>
+        <p:cNvGrpSpPr/>
+        <p:nvPr/>
+      </p:nvGrpSpPr>
+      <p:grpSpPr>
+        <a:xfrm>
+          <a:off x="0" y="0"/>
+          <a:ext cx="0" cy="0"/>
+          <a:chOff x="0" y="0"/>
+          <a:chExt cx="0" cy="0"/>
+        </a:xfrm>
+      </p:grpSpPr>
+      <p:sp>
+        <p:nvSpPr>
+          <p:cNvPr id="2" name="Title 1">
+            <a:extLst>
+              <a:ext uri="{FF2B5EF4-FFF2-40B4-BE49-F238E27FC236}">
+                <a16:creationId xmlns:a16="http://schemas.microsoft.com/office/drawing/2014/main" id="{2D4BBAE8-8737-46B7-955E-253112F54169}"/>
+              </a:ext>
+            </a:extLst>
+          </p:cNvPr>
+          <p:cNvSpPr>
+            <a:spLocks noGrp="1"/>
+          </p:cNvSpPr>
+          <p:nvPr>
+            <p:ph type="title"/>
+          </p:nvPr>
+        </p:nvSpPr>
+        <p:spPr/>
+        <p:txBody>
+          <a:bodyPr/>
+          <a:lstStyle/>
+          <a:p>
+            <a:r>
+              <a:rPr lang="en-US" dirty="0"/>
+              <a:t>EF vs Dapper</a:t>
+            </a:r>
+            <a:br>
+              <a:rPr lang="en-US" dirty="0"/>
+            </a:br>
+            <a:r>
+              <a:rPr lang="en-US" sz="2667" dirty="0" err="1"/>
+              <a:t>Customer.ToList</a:t>
+            </a:r>
+            <a:r>
+              <a:rPr lang="en-US" sz="2667" dirty="0"/>
+              <a:t>()</a:t>
+            </a:r>
+          </a:p>
+        </p:txBody>
+      </p:sp>
+      <p:graphicFrame>
+        <p:nvGraphicFramePr>
+          <p:cNvPr id="6" name="Content Placeholder 5">
+            <a:extLst>
+              <a:ext uri="{FF2B5EF4-FFF2-40B4-BE49-F238E27FC236}">
+                <a16:creationId xmlns:a16="http://schemas.microsoft.com/office/drawing/2014/main" id="{697C5B73-7CA9-4BD6-A416-7AFA82784FB0}"/>
+              </a:ext>
+            </a:extLst>
+          </p:cNvPr>
+          <p:cNvGraphicFramePr>
+            <a:graphicFrameLocks noGrp="1"/>
+          </p:cNvGraphicFramePr>
+          <p:nvPr>
+            <p:ph idx="1"/>
+            <p:extLst/>
+          </p:nvPr>
+        </p:nvGraphicFramePr>
+        <p:xfrm>
+          <a:off x="609600" y="1600201"/>
+          <a:ext cx="10972800" cy="4525433"/>
+        </p:xfrm>
+        <a:graphic>
+          <a:graphicData uri="http://schemas.openxmlformats.org/drawingml/2006/chart">
+            <c:chart xmlns:c="http://schemas.openxmlformats.org/drawingml/2006/chart" xmlns:r="http://schemas.openxmlformats.org/officeDocument/2006/relationships" r:id="rId2"/>
+          </a:graphicData>
+        </a:graphic>
+      </p:graphicFrame>
+    </p:spTree>
+    <p:extLst>
+      <p:ext uri="{BB962C8B-B14F-4D97-AF65-F5344CB8AC3E}">
+        <p14:creationId xmlns:p14="http://schemas.microsoft.com/office/powerpoint/2010/main" val="1398194690"/>
       </p:ext>
     </p:extLst>
   </p:cSld>
@@ -21228,7 +24145,7 @@
                             </p:stCondLst>
                             <p:childTnLst>
                               <p:par>
-                                <p:cTn id="5" presetID="2" presetClass="entr" presetSubtype="2" fill="hold" nodeType="clickEffect">
+                                <p:cTn id="5" presetID="22" presetClass="entr" presetSubtype="4" fill="hold" grpId="0" nodeType="clickEffect">
                                   <p:stCondLst>
                                     <p:cond delay="0"/>
                                   </p:stCondLst>
@@ -21241,7 +24158,11 @@
                                           </p:stCondLst>
                                         </p:cTn>
                                         <p:tgtEl>
-                                          <p:spTgt spid="4"/>
+                                          <p:spTgt spid="6">
+                                            <p:graphicEl>
+                                              <a:chart seriesIdx="1" categoryIdx="-4" bldStep="series"/>
+                                            </p:graphicEl>
+                                          </p:spTgt>
                                         </p:tgtEl>
                                         <p:attrNameLst>
                                           <p:attrName>style.visibility</p:attrName>
@@ -21251,52 +24172,140 @@
                                         <p:strVal val="visible"/>
                                       </p:to>
                                     </p:set>
-                                    <p:anim calcmode="lin" valueType="num">
-                                      <p:cBhvr additive="base">
-                                        <p:cTn id="7" dur="500" fill="hold"/>
+                                    <p:animEffect transition="in" filter="wipe(down)">
+                                      <p:cBhvr>
+                                        <p:cTn id="7" dur="500"/>
                                         <p:tgtEl>
-                                          <p:spTgt spid="4"/>
+                                          <p:spTgt spid="6">
+                                            <p:graphicEl>
+                                              <a:chart seriesIdx="1" categoryIdx="-4" bldStep="series"/>
+                                            </p:graphicEl>
+                                          </p:spTgt>
+                                        </p:tgtEl>
+                                      </p:cBhvr>
+                                    </p:animEffect>
+                                  </p:childTnLst>
+                                </p:cTn>
+                              </p:par>
+                            </p:childTnLst>
+                          </p:cTn>
+                        </p:par>
+                      </p:childTnLst>
+                    </p:cTn>
+                  </p:par>
+                  <p:par>
+                    <p:cTn id="8" fill="hold">
+                      <p:stCondLst>
+                        <p:cond delay="indefinite"/>
+                      </p:stCondLst>
+                      <p:childTnLst>
+                        <p:par>
+                          <p:cTn id="9" fill="hold">
+                            <p:stCondLst>
+                              <p:cond delay="0"/>
+                            </p:stCondLst>
+                            <p:childTnLst>
+                              <p:par>
+                                <p:cTn id="10" presetID="22" presetClass="entr" presetSubtype="4" fill="hold" grpId="0" nodeType="clickEffect">
+                                  <p:stCondLst>
+                                    <p:cond delay="0"/>
+                                  </p:stCondLst>
+                                  <p:childTnLst>
+                                    <p:set>
+                                      <p:cBhvr>
+                                        <p:cTn id="11" dur="1" fill="hold">
+                                          <p:stCondLst>
+                                            <p:cond delay="0"/>
+                                          </p:stCondLst>
+                                        </p:cTn>
+                                        <p:tgtEl>
+                                          <p:spTgt spid="6">
+                                            <p:graphicEl>
+                                              <a:chart seriesIdx="2" categoryIdx="-4" bldStep="series"/>
+                                            </p:graphicEl>
+                                          </p:spTgt>
                                         </p:tgtEl>
                                         <p:attrNameLst>
-                                          <p:attrName>ppt_x</p:attrName>
+                                          <p:attrName>style.visibility</p:attrName>
                                         </p:attrNameLst>
                                       </p:cBhvr>
-                                      <p:tavLst>
-                                        <p:tav tm="0">
-                                          <p:val>
-                                            <p:strVal val="1+#ppt_w/2"/>
-                                          </p:val>
-                                        </p:tav>
-                                        <p:tav tm="100000">
-                                          <p:val>
-                                            <p:strVal val="#ppt_x"/>
-                                          </p:val>
-                                        </p:tav>
-                                      </p:tavLst>
-                                    </p:anim>
-                                    <p:anim calcmode="lin" valueType="num">
-                                      <p:cBhvr additive="base">
-                                        <p:cTn id="8" dur="500" fill="hold"/>
+                                      <p:to>
+                                        <p:strVal val="visible"/>
+                                      </p:to>
+                                    </p:set>
+                                    <p:animEffect transition="in" filter="wipe(down)">
+                                      <p:cBhvr>
+                                        <p:cTn id="12" dur="500"/>
                                         <p:tgtEl>
-                                          <p:spTgt spid="4"/>
+                                          <p:spTgt spid="6">
+                                            <p:graphicEl>
+                                              <a:chart seriesIdx="2" categoryIdx="-4" bldStep="series"/>
+                                            </p:graphicEl>
+                                          </p:spTgt>
+                                        </p:tgtEl>
+                                      </p:cBhvr>
+                                    </p:animEffect>
+                                  </p:childTnLst>
+                                </p:cTn>
+                              </p:par>
+                            </p:childTnLst>
+                          </p:cTn>
+                        </p:par>
+                      </p:childTnLst>
+                    </p:cTn>
+                  </p:par>
+                  <p:par>
+                    <p:cTn id="13" fill="hold">
+                      <p:stCondLst>
+                        <p:cond delay="indefinite"/>
+                      </p:stCondLst>
+                      <p:childTnLst>
+                        <p:par>
+                          <p:cTn id="14" fill="hold">
+                            <p:stCondLst>
+                              <p:cond delay="0"/>
+                            </p:stCondLst>
+                            <p:childTnLst>
+                              <p:par>
+                                <p:cTn id="15" presetID="22" presetClass="entr" presetSubtype="4" fill="hold" grpId="0" nodeType="clickEffect">
+                                  <p:stCondLst>
+                                    <p:cond delay="0"/>
+                                  </p:stCondLst>
+                                  <p:childTnLst>
+                                    <p:set>
+                                      <p:cBhvr>
+                                        <p:cTn id="16" dur="1" fill="hold">
+                                          <p:stCondLst>
+                                            <p:cond delay="0"/>
+                                          </p:stCondLst>
+                                        </p:cTn>
+                                        <p:tgtEl>
+                                          <p:spTgt spid="6">
+                                            <p:graphicEl>
+                                              <a:chart seriesIdx="3" categoryIdx="-4" bldStep="series"/>
+                                            </p:graphicEl>
+                                          </p:spTgt>
                                         </p:tgtEl>
                                         <p:attrNameLst>
-                                          <p:attrName>ppt_y</p:attrName>
+                                          <p:attrName>style.visibility</p:attrName>
                                         </p:attrNameLst>
                                       </p:cBhvr>
-                                      <p:tavLst>
-                                        <p:tav tm="0">
-                                          <p:val>
-                                            <p:strVal val="#ppt_y"/>
-                                          </p:val>
-                                        </p:tav>
-                                        <p:tav tm="100000">
-                                          <p:val>
-                                            <p:strVal val="#ppt_y"/>
-                                          </p:val>
-                                        </p:tav>
-                                      </p:tavLst>
-                                    </p:anim>
+                                      <p:to>
+                                        <p:strVal val="visible"/>
+                                      </p:to>
+                                    </p:set>
+                                    <p:animEffect transition="in" filter="wipe(down)">
+                                      <p:cBhvr>
+                                        <p:cTn id="17" dur="500"/>
+                                        <p:tgtEl>
+                                          <p:spTgt spid="6">
+                                            <p:graphicEl>
+                                              <a:chart seriesIdx="3" categoryIdx="-4" bldStep="series"/>
+                                            </p:graphicEl>
+                                          </p:spTgt>
+                                        </p:tgtEl>
+                                      </p:cBhvr>
+                                    </p:animEffect>
                                   </p:childTnLst>
                                 </p:cTn>
                               </p:par>
@@ -21327,86 +24336,14 @@
         </p:cTn>
       </p:par>
     </p:tnLst>
+    <p:bldLst>
+      <p:bldGraphic spid="6" grpId="0" uiExpand="1">
+        <p:bldSub>
+          <a:bldChart bld="series"/>
+        </p:bldSub>
+      </p:bldGraphic>
+    </p:bldLst>
   </p:timing>
-</p:sld>
-</file>
-
-<file path=ppt/slides/slide9.xml><?xml version="1.0" encoding="utf-8"?>
-<p:sld xmlns:a="http://schemas.openxmlformats.org/drawingml/2006/main" xmlns:r="http://schemas.openxmlformats.org/officeDocument/2006/relationships" xmlns:p="http://schemas.openxmlformats.org/presentationml/2006/main">
-  <p:cSld>
-    <p:spTree>
-      <p:nvGrpSpPr>
-        <p:cNvPr id="1" name=""/>
-        <p:cNvGrpSpPr/>
-        <p:nvPr/>
-      </p:nvGrpSpPr>
-      <p:grpSpPr>
-        <a:xfrm>
-          <a:off x="0" y="0"/>
-          <a:ext cx="0" cy="0"/>
-          <a:chOff x="0" y="0"/>
-          <a:chExt cx="0" cy="0"/>
-        </a:xfrm>
-      </p:grpSpPr>
-      <p:sp>
-        <p:nvSpPr>
-          <p:cNvPr id="2" name="Title 1"/>
-          <p:cNvSpPr>
-            <a:spLocks noGrp="1"/>
-          </p:cNvSpPr>
-          <p:nvPr>
-            <p:ph type="title"/>
-          </p:nvPr>
-        </p:nvSpPr>
-        <p:spPr/>
-        <p:txBody>
-          <a:bodyPr/>
-          <a:lstStyle/>
-          <a:p>
-            <a:r>
-              <a:rPr lang="en-US" dirty="0"/>
-              <a:t>Demo</a:t>
-            </a:r>
-          </a:p>
-        </p:txBody>
-      </p:sp>
-      <p:sp>
-        <p:nvSpPr>
-          <p:cNvPr id="3" name="Text Placeholder 2"/>
-          <p:cNvSpPr>
-            <a:spLocks noGrp="1"/>
-          </p:cNvSpPr>
-          <p:nvPr>
-            <p:ph type="body" idx="1"/>
-          </p:nvPr>
-        </p:nvSpPr>
-        <p:spPr>
-          <a:xfrm>
-            <a:off x="833191" y="4010334"/>
-            <a:ext cx="10515600" cy="1174639"/>
-          </a:xfrm>
-        </p:spPr>
-        <p:txBody>
-          <a:bodyPr/>
-          <a:lstStyle/>
-          <a:p>
-            <a:r>
-              <a:rPr lang="en-US" dirty="0"/>
-              <a:t>Performance</a:t>
-            </a:r>
-          </a:p>
-        </p:txBody>
-      </p:sp>
-    </p:spTree>
-    <p:extLst>
-      <p:ext uri="{BB962C8B-B14F-4D97-AF65-F5344CB8AC3E}">
-        <p14:creationId xmlns:p14="http://schemas.microsoft.com/office/powerpoint/2010/main" val="3234188995"/>
-      </p:ext>
-    </p:extLst>
-  </p:cSld>
-  <p:clrMapOvr>
-    <a:masterClrMapping/>
-  </p:clrMapOvr>
 </p:sld>
 </file>
 

</xml_diff>

<commit_message>
update dependencies to 2.1.5
</commit_message>
<xml_diff>
--- a/EfCoreGettingStarted.pptx
+++ b/EfCoreGettingStarted.pptx
@@ -20589,7 +20589,7 @@
         <p:spPr/>
         <p:txBody>
           <a:bodyPr>
-            <a:normAutofit fontScale="92500" lnSpcReduction="10000"/>
+            <a:normAutofit lnSpcReduction="10000"/>
           </a:bodyPr>
           <a:lstStyle/>
           <a:p>
@@ -20654,26 +20654,16 @@
           </a:p>
           <a:p>
             <a:r>
-              <a:rPr lang="en-US" dirty="0">
-                <a:solidFill>
-                  <a:schemeClr val="tx1">
-                    <a:lumMod val="75000"/>
-                  </a:schemeClr>
-                </a:solidFill>
-              </a:rPr>
-              <a:t>Oracle Sample coming in 2.1</a:t>
-            </a:r>
-          </a:p>
-          <a:p>
-            <a:r>
-              <a:rPr lang="en-US" dirty="0">
-                <a:solidFill>
-                  <a:schemeClr val="tx1">
-                    <a:lumMod val="75000"/>
-                  </a:schemeClr>
-                </a:solidFill>
-              </a:rPr>
-              <a:t>CosmosDB in 2.1</a:t>
+              <a:rPr lang="en-US" dirty="0"/>
+              <a:t>Oracle </a:t>
+            </a:r>
+            <a:r>
+              <a:rPr lang="en-US" strike="sngStrike" dirty="0"/>
+              <a:t>(Coming Soon)</a:t>
+            </a:r>
+            <a:r>
+              <a:rPr lang="en-US" dirty="0"/>
+              <a:t> (not yet available)</a:t>
             </a:r>
           </a:p>
         </p:txBody>

</xml_diff>

<commit_message>
Slide and project updates
</commit_message>
<xml_diff>
--- a/EfCoreGettingStarted.pptx
+++ b/EfCoreGettingStarted.pptx
@@ -5494,7 +5494,13 @@
     </dgm:pt>
     <dgm:pt modelId="{23B27124-AE21-4706-BDC3-355EB6D197D9}">
       <dgm:prSet phldrT="[Text]"/>
-      <dgm:spPr/>
+      <dgm:spPr>
+        <a:solidFill>
+          <a:schemeClr val="bg2">
+            <a:lumMod val="75000"/>
+          </a:schemeClr>
+        </a:solidFill>
+      </dgm:spPr>
       <dgm:t>
         <a:bodyPr/>
         <a:lstStyle/>
@@ -5639,7 +5645,13 @@
     </dgm:pt>
     <dgm:pt modelId="{9C5C9927-BE4F-44C1-ABA7-3D7F1AFDA444}">
       <dgm:prSet phldrT="[Text]"/>
-      <dgm:spPr/>
+      <dgm:spPr>
+        <a:solidFill>
+          <a:schemeClr val="bg2">
+            <a:lumMod val="75000"/>
+          </a:schemeClr>
+        </a:solidFill>
+      </dgm:spPr>
       <dgm:t>
         <a:bodyPr/>
         <a:lstStyle/>
@@ -5675,7 +5687,13 @@
     </dgm:pt>
     <dgm:pt modelId="{AF18FC50-02CA-4C7F-AAB4-B98DAC64CC0B}">
       <dgm:prSet phldrT="[Text]"/>
-      <dgm:spPr/>
+      <dgm:spPr>
+        <a:solidFill>
+          <a:schemeClr val="bg2">
+            <a:lumMod val="75000"/>
+          </a:schemeClr>
+        </a:solidFill>
+      </dgm:spPr>
       <dgm:t>
         <a:bodyPr/>
         <a:lstStyle/>
@@ -7025,45 +7043,11 @@
             <a:gd name="adj" fmla="val 10000"/>
           </a:avLst>
         </a:prstGeom>
-        <a:gradFill rotWithShape="0">
-          <a:gsLst>
-            <a:gs pos="0">
-              <a:schemeClr val="dk2">
-                <a:hueOff val="0"/>
-                <a:satOff val="0"/>
-                <a:lumOff val="0"/>
-                <a:alphaOff val="0"/>
-                <a:tint val="85000"/>
-                <a:shade val="98000"/>
-                <a:satMod val="110000"/>
-                <a:lumMod val="103000"/>
-              </a:schemeClr>
-            </a:gs>
-            <a:gs pos="50000">
-              <a:schemeClr val="dk2">
-                <a:hueOff val="0"/>
-                <a:satOff val="0"/>
-                <a:lumOff val="0"/>
-                <a:alphaOff val="0"/>
-                <a:shade val="85000"/>
-                <a:satMod val="105000"/>
-                <a:lumMod val="100000"/>
-              </a:schemeClr>
-            </a:gs>
-            <a:gs pos="100000">
-              <a:schemeClr val="dk2">
-                <a:hueOff val="0"/>
-                <a:satOff val="0"/>
-                <a:lumOff val="0"/>
-                <a:alphaOff val="0"/>
-                <a:shade val="60000"/>
-                <a:satMod val="120000"/>
-                <a:lumMod val="100000"/>
-              </a:schemeClr>
-            </a:gs>
-          </a:gsLst>
-          <a:lin ang="5400000" scaled="0"/>
-        </a:gradFill>
+        <a:solidFill>
+          <a:schemeClr val="bg2">
+            <a:lumMod val="75000"/>
+          </a:schemeClr>
+        </a:solidFill>
         <a:ln>
           <a:noFill/>
         </a:ln>
@@ -7133,45 +7117,11 @@
             <a:gd name="adj" fmla="val 10000"/>
           </a:avLst>
         </a:prstGeom>
-        <a:gradFill rotWithShape="0">
-          <a:gsLst>
-            <a:gs pos="0">
-              <a:schemeClr val="dk2">
-                <a:hueOff val="0"/>
-                <a:satOff val="0"/>
-                <a:lumOff val="0"/>
-                <a:alphaOff val="0"/>
-                <a:tint val="85000"/>
-                <a:shade val="98000"/>
-                <a:satMod val="110000"/>
-                <a:lumMod val="103000"/>
-              </a:schemeClr>
-            </a:gs>
-            <a:gs pos="50000">
-              <a:schemeClr val="dk2">
-                <a:hueOff val="0"/>
-                <a:satOff val="0"/>
-                <a:lumOff val="0"/>
-                <a:alphaOff val="0"/>
-                <a:shade val="85000"/>
-                <a:satMod val="105000"/>
-                <a:lumMod val="100000"/>
-              </a:schemeClr>
-            </a:gs>
-            <a:gs pos="100000">
-              <a:schemeClr val="dk2">
-                <a:hueOff val="0"/>
-                <a:satOff val="0"/>
-                <a:lumOff val="0"/>
-                <a:alphaOff val="0"/>
-                <a:shade val="60000"/>
-                <a:satMod val="120000"/>
-                <a:lumMod val="100000"/>
-              </a:schemeClr>
-            </a:gs>
-          </a:gsLst>
-          <a:lin ang="5400000" scaled="0"/>
-        </a:gradFill>
+        <a:solidFill>
+          <a:schemeClr val="bg2">
+            <a:lumMod val="75000"/>
+          </a:schemeClr>
+        </a:solidFill>
         <a:ln>
           <a:noFill/>
         </a:ln>
@@ -7241,45 +7191,11 @@
             <a:gd name="adj" fmla="val 10000"/>
           </a:avLst>
         </a:prstGeom>
-        <a:gradFill rotWithShape="0">
-          <a:gsLst>
-            <a:gs pos="0">
-              <a:schemeClr val="dk2">
-                <a:hueOff val="0"/>
-                <a:satOff val="0"/>
-                <a:lumOff val="0"/>
-                <a:alphaOff val="0"/>
-                <a:tint val="85000"/>
-                <a:shade val="98000"/>
-                <a:satMod val="110000"/>
-                <a:lumMod val="103000"/>
-              </a:schemeClr>
-            </a:gs>
-            <a:gs pos="50000">
-              <a:schemeClr val="dk2">
-                <a:hueOff val="0"/>
-                <a:satOff val="0"/>
-                <a:lumOff val="0"/>
-                <a:alphaOff val="0"/>
-                <a:shade val="85000"/>
-                <a:satMod val="105000"/>
-                <a:lumMod val="100000"/>
-              </a:schemeClr>
-            </a:gs>
-            <a:gs pos="100000">
-              <a:schemeClr val="dk2">
-                <a:hueOff val="0"/>
-                <a:satOff val="0"/>
-                <a:lumOff val="0"/>
-                <a:alphaOff val="0"/>
-                <a:shade val="60000"/>
-                <a:satMod val="120000"/>
-                <a:lumMod val="100000"/>
-              </a:schemeClr>
-            </a:gs>
-          </a:gsLst>
-          <a:lin ang="5400000" scaled="0"/>
-        </a:gradFill>
+        <a:solidFill>
+          <a:schemeClr val="bg2">
+            <a:lumMod val="75000"/>
+          </a:schemeClr>
+        </a:solidFill>
         <a:ln>
           <a:noFill/>
         </a:ln>
@@ -10986,7 +10902,7 @@
           <a:p>
             <a:fld id="{28763278-E906-4118-802D-5C795C8A9976}" type="datetimeFigureOut">
               <a:rPr lang="en-US" smtClean="0"/>
-              <a:t>3/24/2018</a:t>
+              <a:t>3/1/2019</a:t>
             </a:fld>
             <a:endParaRPr lang="en-US"/>
           </a:p>
@@ -11743,7 +11659,7 @@
           <a:p>
             <a:fld id="{F4E58F4B-C394-4BCA-8CBA-0EA8C6D27B86}" type="datetimeFigureOut">
               <a:rPr lang="en-US" smtClean="0"/>
-              <a:t>3/24/2018</a:t>
+              <a:t>3/1/2019</a:t>
             </a:fld>
             <a:endParaRPr lang="en-US"/>
           </a:p>
@@ -11913,7 +11829,7 @@
           <a:p>
             <a:fld id="{F4E58F4B-C394-4BCA-8CBA-0EA8C6D27B86}" type="datetimeFigureOut">
               <a:rPr lang="en-US" smtClean="0"/>
-              <a:t>3/24/2018</a:t>
+              <a:t>3/1/2019</a:t>
             </a:fld>
             <a:endParaRPr lang="en-US"/>
           </a:p>
@@ -12136,7 +12052,7 @@
           <a:p>
             <a:fld id="{F4E58F4B-C394-4BCA-8CBA-0EA8C6D27B86}" type="datetimeFigureOut">
               <a:rPr lang="en-US" smtClean="0"/>
-              <a:t>3/24/2018</a:t>
+              <a:t>3/1/2019</a:t>
             </a:fld>
             <a:endParaRPr lang="en-US"/>
           </a:p>
@@ -12316,7 +12232,7 @@
           <a:p>
             <a:fld id="{F4E58F4B-C394-4BCA-8CBA-0EA8C6D27B86}" type="datetimeFigureOut">
               <a:rPr lang="en-US" smtClean="0"/>
-              <a:t>3/24/2018</a:t>
+              <a:t>3/1/2019</a:t>
             </a:fld>
             <a:endParaRPr lang="en-US"/>
           </a:p>
@@ -12622,7 +12538,7 @@
           <a:p>
             <a:fld id="{F4E58F4B-C394-4BCA-8CBA-0EA8C6D27B86}" type="datetimeFigureOut">
               <a:rPr lang="en-US" smtClean="0"/>
-              <a:t>3/24/2018</a:t>
+              <a:t>3/1/2019</a:t>
             </a:fld>
             <a:endParaRPr lang="en-US"/>
           </a:p>
@@ -12926,7 +12842,7 @@
           <a:p>
             <a:fld id="{F4E58F4B-C394-4BCA-8CBA-0EA8C6D27B86}" type="datetimeFigureOut">
               <a:rPr lang="en-US" smtClean="0"/>
-              <a:t>3/24/2018</a:t>
+              <a:t>3/1/2019</a:t>
             </a:fld>
             <a:endParaRPr lang="en-US"/>
           </a:p>
@@ -13348,7 +13264,7 @@
           <a:p>
             <a:fld id="{F4E58F4B-C394-4BCA-8CBA-0EA8C6D27B86}" type="datetimeFigureOut">
               <a:rPr lang="en-US" smtClean="0"/>
-              <a:t>3/24/2018</a:t>
+              <a:t>3/1/2019</a:t>
             </a:fld>
             <a:endParaRPr lang="en-US"/>
           </a:p>
@@ -13466,7 +13382,7 @@
           <a:p>
             <a:fld id="{F4E58F4B-C394-4BCA-8CBA-0EA8C6D27B86}" type="datetimeFigureOut">
               <a:rPr lang="en-US" smtClean="0"/>
-              <a:t>3/24/2018</a:t>
+              <a:t>3/1/2019</a:t>
             </a:fld>
             <a:endParaRPr lang="en-US"/>
           </a:p>
@@ -13561,7 +13477,7 @@
           <a:p>
             <a:fld id="{F4E58F4B-C394-4BCA-8CBA-0EA8C6D27B86}" type="datetimeFigureOut">
               <a:rPr lang="en-US" smtClean="0"/>
-              <a:t>3/24/2018</a:t>
+              <a:t>3/1/2019</a:t>
             </a:fld>
             <a:endParaRPr lang="en-US"/>
           </a:p>
@@ -13834,7 +13750,7 @@
           <a:p>
             <a:fld id="{F4E58F4B-C394-4BCA-8CBA-0EA8C6D27B86}" type="datetimeFigureOut">
               <a:rPr lang="en-US" smtClean="0"/>
-              <a:t>3/24/2018</a:t>
+              <a:t>3/1/2019</a:t>
             </a:fld>
             <a:endParaRPr lang="en-US"/>
           </a:p>
@@ -14099,7 +14015,7 @@
           <a:p>
             <a:fld id="{F4E58F4B-C394-4BCA-8CBA-0EA8C6D27B86}" type="datetimeFigureOut">
               <a:rPr lang="en-US" smtClean="0"/>
-              <a:t>3/24/2018</a:t>
+              <a:t>3/1/2019</a:t>
             </a:fld>
             <a:endParaRPr lang="en-US"/>
           </a:p>
@@ -14348,7 +14264,7 @@
           <a:p>
             <a:fld id="{F4E58F4B-C394-4BCA-8CBA-0EA8C6D27B86}" type="datetimeFigureOut">
               <a:rPr lang="en-US" smtClean="0"/>
-              <a:t>3/24/2018</a:t>
+              <a:t>3/1/2019</a:t>
             </a:fld>
             <a:endParaRPr lang="en-US"/>
           </a:p>
@@ -20663,7 +20579,15 @@
             </a:r>
             <a:r>
               <a:rPr lang="en-US" dirty="0"/>
-              <a:t> (not yet available)</a:t>
+              <a:t> </a:t>
+            </a:r>
+            <a:r>
+              <a:rPr lang="en-US" strike="dblStrike" dirty="0"/>
+              <a:t>(not yet available) </a:t>
+            </a:r>
+            <a:r>
+              <a:rPr lang="en-US" dirty="0"/>
+              <a:t>Coming Q3 2018</a:t>
             </a:r>
           </a:p>
         </p:txBody>
@@ -23268,7 +23192,7 @@
           <p:nvPr>
             <p:extLst>
               <p:ext uri="{D42A27DB-BD31-4B8C-83A1-F6EECF244321}">
-                <p14:modId xmlns:p14="http://schemas.microsoft.com/office/powerpoint/2010/main" val="595096488"/>
+                <p14:modId xmlns:p14="http://schemas.microsoft.com/office/powerpoint/2010/main" val="3990962228"/>
               </p:ext>
             </p:extLst>
           </p:nvPr>
@@ -24226,7 +24150,7 @@
                 </a:solidFill>
                 <a:latin typeface="Consolas" panose="020B0609020204030204" pitchFamily="49" charset="0"/>
               </a:rPr>
-              <a:t>"2.0.0"</a:t>
+              <a:t>"2.2.2"</a:t>
             </a:r>
             <a:r>
               <a:rPr lang="en-US" sz="1600" dirty="0">
@@ -24261,7 +24185,150 @@
                 </a:solidFill>
                 <a:latin typeface="Consolas" panose="020B0609020204030204" pitchFamily="49" charset="0"/>
               </a:rPr>
-              <a:t>  &lt;</a:t>
+              <a:t>  </a:t>
+            </a:r>
+            <a:r>
+              <a:rPr lang="en-US" sz="1600" strike="sngStrike" dirty="0">
+                <a:solidFill>
+                  <a:srgbClr val="800000"/>
+                </a:solidFill>
+                <a:latin typeface="Consolas" panose="020B0609020204030204" pitchFamily="49" charset="0"/>
+              </a:rPr>
+              <a:t>&lt;</a:t>
+            </a:r>
+            <a:r>
+              <a:rPr lang="en-US" sz="1600" strike="sngStrike" dirty="0" err="1">
+                <a:solidFill>
+                  <a:srgbClr val="800000"/>
+                </a:solidFill>
+                <a:latin typeface="Consolas" panose="020B0609020204030204" pitchFamily="49" charset="0"/>
+              </a:rPr>
+              <a:t>PackageReference</a:t>
+            </a:r>
+            <a:r>
+              <a:rPr lang="en-US" sz="1600" strike="sngStrike" dirty="0">
+                <a:solidFill>
+                  <a:srgbClr val="000000"/>
+                </a:solidFill>
+                <a:latin typeface="Consolas" panose="020B0609020204030204" pitchFamily="49" charset="0"/>
+              </a:rPr>
+              <a:t> </a:t>
+            </a:r>
+            <a:r>
+              <a:rPr lang="en-US" sz="1600" strike="sngStrike" dirty="0">
+                <a:solidFill>
+                  <a:srgbClr val="FF0000"/>
+                </a:solidFill>
+                <a:latin typeface="Consolas" panose="020B0609020204030204" pitchFamily="49" charset="0"/>
+              </a:rPr>
+              <a:t>Include</a:t>
+            </a:r>
+            <a:r>
+              <a:rPr lang="en-US" sz="1600" strike="sngStrike" dirty="0">
+                <a:solidFill>
+                  <a:srgbClr val="000000"/>
+                </a:solidFill>
+                <a:latin typeface="Consolas" panose="020B0609020204030204" pitchFamily="49" charset="0"/>
+              </a:rPr>
+              <a:t>=</a:t>
+            </a:r>
+            <a:r>
+              <a:rPr lang="en-US" sz="1600" strike="sngStrike" dirty="0">
+                <a:solidFill>
+                  <a:srgbClr val="0000FF"/>
+                </a:solidFill>
+                <a:latin typeface="Consolas" panose="020B0609020204030204" pitchFamily="49" charset="0"/>
+              </a:rPr>
+              <a:t>"</a:t>
+            </a:r>
+            <a:r>
+              <a:rPr lang="en-US" sz="1600" strike="sngStrike" dirty="0" err="1">
+                <a:solidFill>
+                  <a:srgbClr val="0000FF"/>
+                </a:solidFill>
+                <a:latin typeface="Consolas" panose="020B0609020204030204" pitchFamily="49" charset="0"/>
+              </a:rPr>
+              <a:t>Microsoft.EntityFrameworkCore.Tools</a:t>
+            </a:r>
+            <a:r>
+              <a:rPr lang="en-US" sz="1600" strike="sngStrike" dirty="0">
+                <a:solidFill>
+                  <a:srgbClr val="0000FF"/>
+                </a:solidFill>
+                <a:latin typeface="Consolas" panose="020B0609020204030204" pitchFamily="49" charset="0"/>
+              </a:rPr>
+              <a:t>"</a:t>
+            </a:r>
+            <a:r>
+              <a:rPr lang="en-US" sz="1600" strike="sngStrike" dirty="0">
+                <a:solidFill>
+                  <a:srgbClr val="000000"/>
+                </a:solidFill>
+                <a:latin typeface="Consolas" panose="020B0609020204030204" pitchFamily="49" charset="0"/>
+              </a:rPr>
+              <a:t> </a:t>
+            </a:r>
+            <a:r>
+              <a:rPr lang="en-US" sz="1600" strike="sngStrike" dirty="0">
+                <a:solidFill>
+                  <a:srgbClr val="FF0000"/>
+                </a:solidFill>
+                <a:latin typeface="Consolas" panose="020B0609020204030204" pitchFamily="49" charset="0"/>
+              </a:rPr>
+              <a:t>Version</a:t>
+            </a:r>
+            <a:r>
+              <a:rPr lang="en-US" sz="1600" strike="sngStrike" dirty="0">
+                <a:solidFill>
+                  <a:srgbClr val="000000"/>
+                </a:solidFill>
+                <a:latin typeface="Consolas" panose="020B0609020204030204" pitchFamily="49" charset="0"/>
+              </a:rPr>
+              <a:t>=</a:t>
+            </a:r>
+            <a:r>
+              <a:rPr lang="en-US" sz="1600" strike="sngStrike" dirty="0">
+                <a:solidFill>
+                  <a:srgbClr val="0000FF"/>
+                </a:solidFill>
+                <a:latin typeface="Consolas" panose="020B0609020204030204" pitchFamily="49" charset="0"/>
+              </a:rPr>
+              <a:t>"2.0.0"</a:t>
+            </a:r>
+            <a:r>
+              <a:rPr lang="en-US" sz="1600" strike="sngStrike" dirty="0">
+                <a:solidFill>
+                  <a:srgbClr val="000000"/>
+                </a:solidFill>
+                <a:latin typeface="Consolas" panose="020B0609020204030204" pitchFamily="49" charset="0"/>
+              </a:rPr>
+              <a:t> </a:t>
+            </a:r>
+            <a:r>
+              <a:rPr lang="en-US" sz="1600" strike="sngStrike" dirty="0">
+                <a:solidFill>
+                  <a:srgbClr val="800000"/>
+                </a:solidFill>
+                <a:latin typeface="Consolas" panose="020B0609020204030204" pitchFamily="49" charset="0"/>
+              </a:rPr>
+              <a:t>/&gt;</a:t>
+            </a:r>
+            <a:endParaRPr lang="en-US" sz="1600" strike="sngStrike" dirty="0">
+              <a:solidFill>
+                <a:srgbClr val="000000"/>
+              </a:solidFill>
+              <a:latin typeface="Consolas" panose="020B0609020204030204" pitchFamily="49" charset="0"/>
+            </a:endParaRPr>
+          </a:p>
+          <a:p>
+            <a:r>
+              <a:rPr lang="en-US" sz="1600" dirty="0">
+                <a:solidFill>
+                  <a:srgbClr val="800000"/>
+                </a:solidFill>
+                <a:latin typeface="Consolas" panose="020B0609020204030204" pitchFamily="49" charset="0"/>
+              </a:rPr>
+              <a:t>&lt;/</a:t>
             </a:r>
             <a:r>
               <a:rPr lang="en-US" sz="1600" dirty="0" err="1">
@@ -24270,116 +24337,19 @@
                 </a:solidFill>
                 <a:latin typeface="Consolas" panose="020B0609020204030204" pitchFamily="49" charset="0"/>
               </a:rPr>
-              <a:t>PackageReference</a:t>
+              <a:t>ItemGroup</a:t>
             </a:r>
             <a:r>
               <a:rPr lang="en-US" sz="1600" dirty="0">
                 <a:solidFill>
-                  <a:srgbClr val="000000"/>
-                </a:solidFill>
-                <a:latin typeface="Consolas" panose="020B0609020204030204" pitchFamily="49" charset="0"/>
-              </a:rPr>
-              <a:t> </a:t>
-            </a:r>
-            <a:r>
-              <a:rPr lang="en-US" sz="1600" dirty="0">
-                <a:solidFill>
-                  <a:srgbClr val="FF0000"/>
-                </a:solidFill>
-                <a:latin typeface="Consolas" panose="020B0609020204030204" pitchFamily="49" charset="0"/>
-              </a:rPr>
-              <a:t>Include</a:t>
-            </a:r>
-            <a:r>
-              <a:rPr lang="en-US" sz="1600" dirty="0">
-                <a:solidFill>
-                  <a:srgbClr val="000000"/>
-                </a:solidFill>
-                <a:latin typeface="Consolas" panose="020B0609020204030204" pitchFamily="49" charset="0"/>
-              </a:rPr>
-              <a:t>=</a:t>
-            </a:r>
-            <a:r>
-              <a:rPr lang="en-US" sz="1600" dirty="0">
-                <a:solidFill>
-                  <a:srgbClr val="0000FF"/>
-                </a:solidFill>
-                <a:latin typeface="Consolas" panose="020B0609020204030204" pitchFamily="49" charset="0"/>
-              </a:rPr>
-              <a:t>"</a:t>
-            </a:r>
-            <a:r>
-              <a:rPr lang="en-US" sz="1600" dirty="0" err="1">
-                <a:solidFill>
-                  <a:srgbClr val="0000FF"/>
-                </a:solidFill>
-                <a:latin typeface="Consolas" panose="020B0609020204030204" pitchFamily="49" charset="0"/>
-              </a:rPr>
-              <a:t>Microsoft.EntityFrameworkCore.Tools</a:t>
-            </a:r>
-            <a:r>
-              <a:rPr lang="en-US" sz="1600" dirty="0">
-                <a:solidFill>
-                  <a:srgbClr val="0000FF"/>
-                </a:solidFill>
-                <a:latin typeface="Consolas" panose="020B0609020204030204" pitchFamily="49" charset="0"/>
-              </a:rPr>
-              <a:t>"</a:t>
-            </a:r>
-            <a:r>
-              <a:rPr lang="en-US" sz="1600" dirty="0">
-                <a:solidFill>
-                  <a:srgbClr val="000000"/>
-                </a:solidFill>
-                <a:latin typeface="Consolas" panose="020B0609020204030204" pitchFamily="49" charset="0"/>
-              </a:rPr>
-              <a:t> </a:t>
-            </a:r>
-            <a:r>
-              <a:rPr lang="en-US" sz="1600" dirty="0">
-                <a:solidFill>
-                  <a:srgbClr val="FF0000"/>
-                </a:solidFill>
-                <a:latin typeface="Consolas" panose="020B0609020204030204" pitchFamily="49" charset="0"/>
-              </a:rPr>
-              <a:t>Version</a:t>
-            </a:r>
-            <a:r>
-              <a:rPr lang="en-US" sz="1600" dirty="0">
-                <a:solidFill>
-                  <a:srgbClr val="000000"/>
-                </a:solidFill>
-                <a:latin typeface="Consolas" panose="020B0609020204030204" pitchFamily="49" charset="0"/>
-              </a:rPr>
-              <a:t>=</a:t>
-            </a:r>
-            <a:r>
-              <a:rPr lang="en-US" sz="1600" dirty="0">
-                <a:solidFill>
-                  <a:srgbClr val="0000FF"/>
-                </a:solidFill>
-                <a:latin typeface="Consolas" panose="020B0609020204030204" pitchFamily="49" charset="0"/>
-              </a:rPr>
-              <a:t>"2.0.0"</a:t>
-            </a:r>
-            <a:r>
-              <a:rPr lang="en-US" sz="1600" dirty="0">
-                <a:solidFill>
-                  <a:srgbClr val="000000"/>
-                </a:solidFill>
-                <a:latin typeface="Consolas" panose="020B0609020204030204" pitchFamily="49" charset="0"/>
-              </a:rPr>
-              <a:t> </a:t>
-            </a:r>
-            <a:r>
-              <a:rPr lang="en-US" sz="1600" dirty="0">
-                <a:solidFill>
                   <a:srgbClr val="800000"/>
                 </a:solidFill>
                 <a:latin typeface="Consolas" panose="020B0609020204030204" pitchFamily="49" charset="0"/>
               </a:rPr>
-              <a:t>/&gt;</a:t>
-            </a:r>
+              <a:t>&gt;</a:t>
+            </a:r>
+          </a:p>
+          <a:p>
             <a:endParaRPr lang="en-US" sz="1600" dirty="0">
               <a:solidFill>
                 <a:srgbClr val="000000"/>
@@ -24389,16 +24359,16 @@
           </a:p>
           <a:p>
             <a:r>
-              <a:rPr lang="en-US" sz="1600" dirty="0">
+              <a:rPr lang="en-US" sz="1600" strike="sngStrike" dirty="0">
                 <a:solidFill>
                   <a:srgbClr val="800000"/>
                 </a:solidFill>
                 <a:latin typeface="Consolas" panose="020B0609020204030204" pitchFamily="49" charset="0"/>
               </a:rPr>
-              <a:t>&lt;/</a:t>
-            </a:r>
-            <a:r>
-              <a:rPr lang="en-US" sz="1600" dirty="0" err="1">
+              <a:t>&lt;</a:t>
+            </a:r>
+            <a:r>
+              <a:rPr lang="en-US" sz="1600" strike="sngStrike" dirty="0" err="1">
                 <a:solidFill>
                   <a:srgbClr val="800000"/>
                 </a:solidFill>
@@ -24407,7 +24377,7 @@
               <a:t>ItemGroup</a:t>
             </a:r>
             <a:r>
-              <a:rPr lang="en-US" sz="1600" dirty="0">
+              <a:rPr lang="en-US" sz="1600" strike="sngStrike" dirty="0">
                 <a:solidFill>
                   <a:srgbClr val="800000"/>
                 </a:solidFill>
@@ -24415,9 +24385,7 @@
               </a:rPr>
               <a:t>&gt;</a:t>
             </a:r>
-          </a:p>
-          <a:p>
-            <a:endParaRPr lang="en-US" sz="1600" dirty="0">
+            <a:endParaRPr lang="en-US" sz="1600" strike="sngStrike" dirty="0">
               <a:solidFill>
                 <a:srgbClr val="000000"/>
               </a:solidFill>
@@ -24426,33 +24394,132 @@
           </a:p>
           <a:p>
             <a:r>
-              <a:rPr lang="en-US" sz="1600" dirty="0">
+              <a:rPr lang="en-US" sz="1600" strike="sngStrike" dirty="0">
                 <a:solidFill>
                   <a:srgbClr val="800000"/>
                 </a:solidFill>
                 <a:latin typeface="Consolas" panose="020B0609020204030204" pitchFamily="49" charset="0"/>
               </a:rPr>
-              <a:t>&lt;</a:t>
-            </a:r>
-            <a:r>
-              <a:rPr lang="en-US" sz="1600" dirty="0" err="1">
+              <a:t>  &lt;</a:t>
+            </a:r>
+            <a:r>
+              <a:rPr lang="en-US" sz="1600" strike="sngStrike" dirty="0" err="1">
                 <a:solidFill>
                   <a:srgbClr val="800000"/>
                 </a:solidFill>
                 <a:latin typeface="Consolas" panose="020B0609020204030204" pitchFamily="49" charset="0"/>
               </a:rPr>
-              <a:t>ItemGroup</a:t>
-            </a:r>
-            <a:r>
-              <a:rPr lang="en-US" sz="1600" dirty="0">
+              <a:t>DotNetCliToolReference</a:t>
+            </a:r>
+            <a:r>
+              <a:rPr lang="en-US" sz="1600" strike="sngStrike" dirty="0">
+                <a:solidFill>
+                  <a:srgbClr val="000000"/>
+                </a:solidFill>
+                <a:latin typeface="Consolas" panose="020B0609020204030204" pitchFamily="49" charset="0"/>
+              </a:rPr>
+              <a:t> </a:t>
+            </a:r>
+            <a:r>
+              <a:rPr lang="en-US" sz="1600" strike="sngStrike" dirty="0">
+                <a:solidFill>
+                  <a:srgbClr val="FF0000"/>
+                </a:solidFill>
+                <a:latin typeface="Consolas" panose="020B0609020204030204" pitchFamily="49" charset="0"/>
+              </a:rPr>
+              <a:t>Include</a:t>
+            </a:r>
+            <a:r>
+              <a:rPr lang="en-US" sz="1600" strike="sngStrike" dirty="0">
+                <a:solidFill>
+                  <a:srgbClr val="000000"/>
+                </a:solidFill>
+                <a:latin typeface="Consolas" panose="020B0609020204030204" pitchFamily="49" charset="0"/>
+              </a:rPr>
+              <a:t>=</a:t>
+            </a:r>
+            <a:r>
+              <a:rPr lang="en-US" sz="1600" strike="sngStrike" dirty="0">
+                <a:solidFill>
+                  <a:srgbClr val="0000FF"/>
+                </a:solidFill>
+                <a:latin typeface="Consolas" panose="020B0609020204030204" pitchFamily="49" charset="0"/>
+              </a:rPr>
+              <a:t>"</a:t>
+            </a:r>
+            <a:r>
+              <a:rPr lang="en-US" sz="1600" strike="sngStrike" dirty="0" err="1">
+                <a:solidFill>
+                  <a:srgbClr val="0000FF"/>
+                </a:solidFill>
+                <a:latin typeface="Consolas" panose="020B0609020204030204" pitchFamily="49" charset="0"/>
+              </a:rPr>
+              <a:t>Microsoft.EntityFrameworkCore.Tools.DotNet</a:t>
+            </a:r>
+            <a:r>
+              <a:rPr lang="en-US" sz="1600" strike="sngStrike" dirty="0">
+                <a:solidFill>
+                  <a:srgbClr val="0000FF"/>
+                </a:solidFill>
+                <a:latin typeface="Consolas" panose="020B0609020204030204" pitchFamily="49" charset="0"/>
+              </a:rPr>
+              <a:t>"</a:t>
+            </a:r>
+            <a:r>
+              <a:rPr lang="en-US" sz="1600" strike="sngStrike" dirty="0">
+                <a:solidFill>
+                  <a:srgbClr val="000000"/>
+                </a:solidFill>
+                <a:latin typeface="Consolas" panose="020B0609020204030204" pitchFamily="49" charset="0"/>
+              </a:rPr>
+              <a:t> </a:t>
+            </a:r>
+            <a:r>
+              <a:rPr lang="en-US" sz="1600" strike="sngStrike" dirty="0">
+                <a:solidFill>
+                  <a:srgbClr val="FF0000"/>
+                </a:solidFill>
+                <a:latin typeface="Consolas" panose="020B0609020204030204" pitchFamily="49" charset="0"/>
+              </a:rPr>
+              <a:t>Version</a:t>
+            </a:r>
+            <a:r>
+              <a:rPr lang="en-US" sz="1600" strike="sngStrike" dirty="0">
+                <a:solidFill>
+                  <a:srgbClr val="000000"/>
+                </a:solidFill>
+                <a:latin typeface="Consolas" panose="020B0609020204030204" pitchFamily="49" charset="0"/>
+              </a:rPr>
+              <a:t>=</a:t>
+            </a:r>
+            <a:r>
+              <a:rPr lang="en-US" sz="1600" strike="sngStrike" dirty="0">
+                <a:solidFill>
+                  <a:srgbClr val="0000FF"/>
+                </a:solidFill>
+                <a:latin typeface="Consolas" panose="020B0609020204030204" pitchFamily="49" charset="0"/>
+              </a:rPr>
+              <a:t>"2.0.0"</a:t>
+            </a:r>
+            <a:r>
+              <a:rPr lang="en-US" sz="1600" strike="sngStrike" dirty="0">
+                <a:solidFill>
+                  <a:srgbClr val="000000"/>
+                </a:solidFill>
+                <a:latin typeface="Consolas" panose="020B0609020204030204" pitchFamily="49" charset="0"/>
+              </a:rPr>
+              <a:t> </a:t>
+            </a:r>
+            <a:r>
+              <a:rPr lang="en-US" sz="1600" strike="sngStrike" dirty="0">
                 <a:solidFill>
                   <a:srgbClr val="800000"/>
                 </a:solidFill>
                 <a:latin typeface="Consolas" panose="020B0609020204030204" pitchFamily="49" charset="0"/>
               </a:rPr>
-              <a:t>&gt;</a:t>
-            </a:r>
-            <a:endParaRPr lang="en-US" sz="1600" dirty="0">
+              <a:t>/&gt;</a:t>
+            </a:r>
+            <a:endParaRPr lang="en-US" sz="1600" strike="sngStrike" dirty="0">
               <a:solidFill>
                 <a:srgbClr val="000000"/>
               </a:solidFill>
@@ -24461,167 +24528,33 @@
           </a:p>
           <a:p>
             <a:r>
-              <a:rPr lang="en-US" sz="1600" dirty="0">
+              <a:rPr lang="en-US" sz="1600" strike="sngStrike" dirty="0">
                 <a:solidFill>
                   <a:srgbClr val="800000"/>
                 </a:solidFill>
                 <a:latin typeface="Consolas" panose="020B0609020204030204" pitchFamily="49" charset="0"/>
               </a:rPr>
-              <a:t>  &lt;</a:t>
-            </a:r>
-            <a:r>
-              <a:rPr lang="en-US" sz="1600" dirty="0" err="1">
+              <a:t>&lt;/</a:t>
+            </a:r>
+            <a:r>
+              <a:rPr lang="en-US" sz="1600" strike="sngStrike" dirty="0" err="1">
                 <a:solidFill>
                   <a:srgbClr val="800000"/>
                 </a:solidFill>
                 <a:latin typeface="Consolas" panose="020B0609020204030204" pitchFamily="49" charset="0"/>
               </a:rPr>
-              <a:t>DotNetCliToolReference</a:t>
-            </a:r>
-            <a:r>
-              <a:rPr lang="en-US" sz="1600" dirty="0">
-                <a:solidFill>
-                  <a:srgbClr val="000000"/>
-                </a:solidFill>
-                <a:latin typeface="Consolas" panose="020B0609020204030204" pitchFamily="49" charset="0"/>
-              </a:rPr>
-              <a:t> </a:t>
-            </a:r>
-            <a:r>
-              <a:rPr lang="en-US" sz="1600" dirty="0">
-                <a:solidFill>
-                  <a:srgbClr val="FF0000"/>
-                </a:solidFill>
-                <a:latin typeface="Consolas" panose="020B0609020204030204" pitchFamily="49" charset="0"/>
-              </a:rPr>
-              <a:t>Include</a:t>
-            </a:r>
-            <a:r>
-              <a:rPr lang="en-US" sz="1600" dirty="0">
-                <a:solidFill>
-                  <a:srgbClr val="000000"/>
-                </a:solidFill>
-                <a:latin typeface="Consolas" panose="020B0609020204030204" pitchFamily="49" charset="0"/>
-              </a:rPr>
-              <a:t>=</a:t>
-            </a:r>
-            <a:r>
-              <a:rPr lang="en-US" sz="1600" dirty="0">
-                <a:solidFill>
-                  <a:srgbClr val="0000FF"/>
-                </a:solidFill>
-                <a:latin typeface="Consolas" panose="020B0609020204030204" pitchFamily="49" charset="0"/>
-              </a:rPr>
-              <a:t>"</a:t>
-            </a:r>
-            <a:r>
-              <a:rPr lang="en-US" sz="1600" dirty="0" err="1">
-                <a:solidFill>
-                  <a:srgbClr val="0000FF"/>
-                </a:solidFill>
-                <a:latin typeface="Consolas" panose="020B0609020204030204" pitchFamily="49" charset="0"/>
-              </a:rPr>
-              <a:t>Microsoft.EntityFrameworkCore.Tools.DotNet</a:t>
-            </a:r>
-            <a:r>
-              <a:rPr lang="en-US" sz="1600" dirty="0">
-                <a:solidFill>
-                  <a:srgbClr val="0000FF"/>
-                </a:solidFill>
-                <a:latin typeface="Consolas" panose="020B0609020204030204" pitchFamily="49" charset="0"/>
-              </a:rPr>
-              <a:t>"</a:t>
-            </a:r>
-            <a:r>
-              <a:rPr lang="en-US" sz="1600" dirty="0">
-                <a:solidFill>
-                  <a:srgbClr val="000000"/>
-                </a:solidFill>
-                <a:latin typeface="Consolas" panose="020B0609020204030204" pitchFamily="49" charset="0"/>
-              </a:rPr>
-              <a:t> </a:t>
-            </a:r>
-            <a:r>
-              <a:rPr lang="en-US" sz="1600" dirty="0">
-                <a:solidFill>
-                  <a:srgbClr val="FF0000"/>
-                </a:solidFill>
-                <a:latin typeface="Consolas" panose="020B0609020204030204" pitchFamily="49" charset="0"/>
-              </a:rPr>
-              <a:t>Version</a:t>
-            </a:r>
-            <a:r>
-              <a:rPr lang="en-US" sz="1600" dirty="0">
-                <a:solidFill>
-                  <a:srgbClr val="000000"/>
-                </a:solidFill>
-                <a:latin typeface="Consolas" panose="020B0609020204030204" pitchFamily="49" charset="0"/>
-              </a:rPr>
-              <a:t>=</a:t>
-            </a:r>
-            <a:r>
-              <a:rPr lang="en-US" sz="1600" dirty="0">
-                <a:solidFill>
-                  <a:srgbClr val="0000FF"/>
-                </a:solidFill>
-                <a:latin typeface="Consolas" panose="020B0609020204030204" pitchFamily="49" charset="0"/>
-              </a:rPr>
-              <a:t>"2.0.0"</a:t>
-            </a:r>
-            <a:r>
-              <a:rPr lang="en-US" sz="1600" dirty="0">
-                <a:solidFill>
-                  <a:srgbClr val="000000"/>
-                </a:solidFill>
-                <a:latin typeface="Consolas" panose="020B0609020204030204" pitchFamily="49" charset="0"/>
-              </a:rPr>
-              <a:t> </a:t>
-            </a:r>
-            <a:r>
-              <a:rPr lang="en-US" sz="1600" dirty="0">
+              <a:t>ItemGroup</a:t>
+            </a:r>
+            <a:r>
+              <a:rPr lang="en-US" sz="1600" strike="sngStrike" dirty="0">
                 <a:solidFill>
                   <a:srgbClr val="800000"/>
                 </a:solidFill>
                 <a:latin typeface="Consolas" panose="020B0609020204030204" pitchFamily="49" charset="0"/>
               </a:rPr>
-              <a:t>/&gt;</a:t>
-            </a:r>
-            <a:endParaRPr lang="en-US" sz="1600" dirty="0">
-              <a:solidFill>
-                <a:srgbClr val="000000"/>
-              </a:solidFill>
-              <a:latin typeface="Consolas" panose="020B0609020204030204" pitchFamily="49" charset="0"/>
-            </a:endParaRPr>
-          </a:p>
-          <a:p>
-            <a:r>
-              <a:rPr lang="en-US" sz="1600" dirty="0">
-                <a:solidFill>
-                  <a:srgbClr val="800000"/>
-                </a:solidFill>
-                <a:latin typeface="Consolas" panose="020B0609020204030204" pitchFamily="49" charset="0"/>
-              </a:rPr>
-              <a:t>&lt;/</a:t>
-            </a:r>
-            <a:r>
-              <a:rPr lang="en-US" sz="1600" dirty="0" err="1">
-                <a:solidFill>
-                  <a:srgbClr val="800000"/>
-                </a:solidFill>
-                <a:latin typeface="Consolas" panose="020B0609020204030204" pitchFamily="49" charset="0"/>
-              </a:rPr>
-              <a:t>ItemGroup</a:t>
-            </a:r>
-            <a:r>
-              <a:rPr lang="en-US" sz="1600" dirty="0">
-                <a:solidFill>
-                  <a:srgbClr val="800000"/>
-                </a:solidFill>
-                <a:latin typeface="Consolas" panose="020B0609020204030204" pitchFamily="49" charset="0"/>
-              </a:rPr>
               <a:t>&gt;</a:t>
             </a:r>
-            <a:endParaRPr lang="en-US" sz="1600" b="0" dirty="0">
+            <a:endParaRPr lang="en-US" sz="1600" b="0" strike="sngStrike" dirty="0">
               <a:solidFill>
                 <a:srgbClr val="000000"/>
               </a:solidFill>

</xml_diff>